<commit_message>
+ links for more info & issues
</commit_message>
<xml_diff>
--- a/kubernetes/00_intro.pptx
+++ b/kubernetes/00_intro.pptx
@@ -5,10 +5,10 @@
     <p:sldMasterId id="2147483733" r:id="rId1"/>
   </p:sldMasterIdLst>
   <p:notesMasterIdLst>
-    <p:notesMasterId r:id="rId11"/>
+    <p:notesMasterId r:id="rId12"/>
   </p:notesMasterIdLst>
   <p:handoutMasterIdLst>
-    <p:handoutMasterId r:id="rId12"/>
+    <p:handoutMasterId r:id="rId13"/>
   </p:handoutMasterIdLst>
   <p:sldIdLst>
     <p:sldId id="433" r:id="rId2"/>
@@ -19,7 +19,8 @@
     <p:sldId id="445" r:id="rId7"/>
     <p:sldId id="446" r:id="rId8"/>
     <p:sldId id="447" r:id="rId9"/>
-    <p:sldId id="265" r:id="rId10"/>
+    <p:sldId id="448" r:id="rId10"/>
+    <p:sldId id="265" r:id="rId11"/>
   </p:sldIdLst>
   <p:sldSz cx="12195175" cy="6858000"/>
   <p:notesSz cx="6858000" cy="9144000"/>
@@ -558,7 +559,7 @@
             <a:fld id="{7D8C2C35-2B8A-446E-BEC0-FD36716C29AC}" type="slidenum">
               <a:rPr lang="de-DE" smtClean="0"/>
               <a:pPr/>
-              <a:t>9</a:t>
+              <a:t>10</a:t>
             </a:fld>
             <a:endParaRPr lang="de-DE" dirty="0"/>
           </a:p>
@@ -8215,6 +8216,32 @@
 </p:sld>
 </file>
 
+<file path=ppt/slides/slide10.xml><?xml version="1.0" encoding="utf-8"?>
+<p:sld xmlns:a="http://schemas.openxmlformats.org/drawingml/2006/main" xmlns:r="http://schemas.openxmlformats.org/officeDocument/2006/relationships" xmlns:p="http://schemas.openxmlformats.org/presentationml/2006/main" show="0">
+  <p:cSld>
+    <p:spTree>
+      <p:nvGrpSpPr>
+        <p:cNvPr id="1" name=""/>
+        <p:cNvGrpSpPr/>
+        <p:nvPr/>
+      </p:nvGrpSpPr>
+      <p:grpSpPr>
+        <a:xfrm>
+          <a:off x="0" y="0"/>
+          <a:ext cx="0" cy="0"/>
+          <a:chOff x="0" y="0"/>
+          <a:chExt cx="0" cy="0"/>
+        </a:xfrm>
+      </p:grpSpPr>
+    </p:spTree>
+  </p:cSld>
+  <p:clrMapOvr>
+    <a:masterClrMapping/>
+  </p:clrMapOvr>
+  <p:transition spd="med"/>
+</p:sld>
+</file>
+
 <file path=ppt/slides/slide2.xml><?xml version="1.0" encoding="utf-8"?>
 <p:sld xmlns:a="http://schemas.openxmlformats.org/drawingml/2006/main" xmlns:r="http://schemas.openxmlformats.org/officeDocument/2006/relationships" xmlns:p="http://schemas.openxmlformats.org/presentationml/2006/main">
   <p:cSld>
@@ -9339,7 +9366,7 @@
 </file>
 
 <file path=ppt/slides/slide9.xml><?xml version="1.0" encoding="utf-8"?>
-<p:sld xmlns:a="http://schemas.openxmlformats.org/drawingml/2006/main" xmlns:r="http://schemas.openxmlformats.org/officeDocument/2006/relationships" xmlns:p="http://schemas.openxmlformats.org/presentationml/2006/main" show="0">
+<p:sld xmlns:a="http://schemas.openxmlformats.org/drawingml/2006/main" xmlns:r="http://schemas.openxmlformats.org/officeDocument/2006/relationships" xmlns:p="http://schemas.openxmlformats.org/presentationml/2006/main">
   <p:cSld>
     <p:spTree>
       <p:nvGrpSpPr>
@@ -9355,12 +9382,167 @@
           <a:chExt cx="0" cy="0"/>
         </a:xfrm>
       </p:grpSpPr>
+      <p:sp>
+        <p:nvSpPr>
+          <p:cNvPr id="2" name="Title 1"/>
+          <p:cNvSpPr>
+            <a:spLocks noGrp="1"/>
+          </p:cNvSpPr>
+          <p:nvPr>
+            <p:ph type="title"/>
+          </p:nvPr>
+        </p:nvSpPr>
+        <p:spPr/>
+        <p:txBody>
+          <a:bodyPr/>
+          <a:lstStyle/>
+          <a:p>
+            <a:r>
+              <a:rPr lang="en-US" dirty="0"/>
+              <a:t>If it doesn’t work as expected …</a:t>
+            </a:r>
+          </a:p>
+        </p:txBody>
+      </p:sp>
+      <p:sp>
+        <p:nvSpPr>
+          <p:cNvPr id="3" name="Rectangle 2"/>
+          <p:cNvSpPr/>
+          <p:nvPr/>
+        </p:nvSpPr>
+        <p:spPr>
+          <a:xfrm>
+            <a:off x="504001" y="5851688"/>
+            <a:ext cx="9554399" cy="415498"/>
+          </a:xfrm>
+          <a:prstGeom prst="rect">
+            <a:avLst/>
+          </a:prstGeom>
+        </p:spPr>
+        <p:txBody>
+          <a:bodyPr wrap="square">
+            <a:spAutoFit/>
+          </a:bodyPr>
+          <a:lstStyle/>
+          <a:p>
+            <a:r>
+              <a:rPr lang="en-US" dirty="0">
+                <a:hlinkClick r:id="rId2"/>
+              </a:rPr>
+              <a:t>https://github.com/kubernetes/community/blob/master/communication.md</a:t>
+            </a:r>
+            <a:r>
+              <a:rPr lang="en-US" dirty="0"/>
+              <a:t> </a:t>
+            </a:r>
+            <a:endParaRPr lang="en-US" dirty="0"/>
+          </a:p>
+        </p:txBody>
+      </p:sp>
+      <p:pic>
+        <p:nvPicPr>
+          <p:cNvPr id="4" name="Picture 3"/>
+          <p:cNvPicPr>
+            <a:picLocks noChangeAspect="1"/>
+          </p:cNvPicPr>
+          <p:nvPr/>
+        </p:nvPicPr>
+        <p:blipFill>
+          <a:blip r:embed="rId3"/>
+          <a:stretch>
+            <a:fillRect/>
+          </a:stretch>
+        </p:blipFill>
+        <p:spPr>
+          <a:xfrm>
+            <a:off x="504001" y="1170215"/>
+            <a:ext cx="9249599" cy="3520576"/>
+          </a:xfrm>
+          <a:prstGeom prst="rect">
+            <a:avLst/>
+          </a:prstGeom>
+        </p:spPr>
+      </p:pic>
+      <p:sp>
+        <p:nvSpPr>
+          <p:cNvPr id="5" name="Rectangle 4"/>
+          <p:cNvSpPr/>
+          <p:nvPr/>
+        </p:nvSpPr>
+        <p:spPr>
+          <a:xfrm>
+            <a:off x="504001" y="5298469"/>
+            <a:ext cx="3788217" cy="415498"/>
+          </a:xfrm>
+          <a:prstGeom prst="rect">
+            <a:avLst/>
+          </a:prstGeom>
+        </p:spPr>
+        <p:txBody>
+          <a:bodyPr wrap="none">
+            <a:spAutoFit/>
+          </a:bodyPr>
+          <a:lstStyle/>
+          <a:p>
+            <a:r>
+              <a:rPr lang="en-US" dirty="0">
+                <a:hlinkClick r:id="rId4"/>
+              </a:rPr>
+              <a:t>https://github.com/kubernetes</a:t>
+            </a:r>
+            <a:r>
+              <a:rPr lang="en-US" dirty="0"/>
+              <a:t> </a:t>
+            </a:r>
+            <a:endParaRPr lang="en-US" dirty="0"/>
+          </a:p>
+        </p:txBody>
+      </p:sp>
+      <p:sp>
+        <p:nvSpPr>
+          <p:cNvPr id="6" name="Rectangle 5"/>
+          <p:cNvSpPr/>
+          <p:nvPr/>
+        </p:nvSpPr>
+        <p:spPr>
+          <a:xfrm>
+            <a:off x="504000" y="4767554"/>
+            <a:ext cx="8792399" cy="415498"/>
+          </a:xfrm>
+          <a:prstGeom prst="rect">
+            <a:avLst/>
+          </a:prstGeom>
+        </p:spPr>
+        <p:txBody>
+          <a:bodyPr wrap="square">
+            <a:spAutoFit/>
+          </a:bodyPr>
+          <a:lstStyle/>
+          <a:p>
+            <a:r>
+              <a:rPr lang="en-US" dirty="0">
+                <a:hlinkClick r:id="rId5"/>
+              </a:rPr>
+              <a:t>https://groups.google.com/forum/#!forum/kubernetes-users</a:t>
+            </a:r>
+            <a:r>
+              <a:rPr lang="en-US" dirty="0"/>
+              <a:t> </a:t>
+            </a:r>
+            <a:endParaRPr lang="en-US" dirty="0"/>
+          </a:p>
+        </p:txBody>
+      </p:sp>
     </p:spTree>
+    <p:extLst>
+      <p:ext uri="{BB962C8B-B14F-4D97-AF65-F5344CB8AC3E}">
+        <p14:creationId xmlns:p14="http://schemas.microsoft.com/office/powerpoint/2010/main" val="2777277099"/>
+      </p:ext>
+    </p:extLst>
   </p:cSld>
   <p:clrMapOvr>
     <a:masterClrMapping/>
   </p:clrMapOvr>
-  <p:transition spd="med"/>
 </p:sld>
 </file>
 

</xml_diff>

<commit_message>
demo description & small fixes
</commit_message>
<xml_diff>
--- a/kubernetes/00_intro.pptx
+++ b/kubernetes/00_intro.pptx
@@ -13,10 +13,10 @@
   <p:sldIdLst>
     <p:sldId id="433" r:id="rId2"/>
     <p:sldId id="440" r:id="rId3"/>
-    <p:sldId id="442" r:id="rId4"/>
-    <p:sldId id="441" r:id="rId5"/>
-    <p:sldId id="444" r:id="rId6"/>
-    <p:sldId id="445" r:id="rId7"/>
+    <p:sldId id="441" r:id="rId4"/>
+    <p:sldId id="444" r:id="rId5"/>
+    <p:sldId id="445" r:id="rId6"/>
+    <p:sldId id="442" r:id="rId7"/>
     <p:sldId id="446" r:id="rId8"/>
     <p:sldId id="447" r:id="rId9"/>
     <p:sldId id="448" r:id="rId10"/>
@@ -8267,7 +8267,7 @@
         </p:nvSpPr>
         <p:spPr>
           <a:xfrm>
-            <a:off x="3277298" y="4097832"/>
+            <a:off x="2653924" y="4097832"/>
             <a:ext cx="6593323" cy="1631216"/>
           </a:xfrm>
           <a:prstGeom prst="rect">
@@ -8343,7 +8343,7 @@
         </p:blipFill>
         <p:spPr>
           <a:xfrm>
-            <a:off x="3469264" y="499223"/>
+            <a:off x="2653924" y="499223"/>
             <a:ext cx="6209391" cy="3245462"/>
           </a:xfrm>
           <a:prstGeom prst="rect">
@@ -8361,10 +8361,507 @@
   <p:clrMapOvr>
     <a:masterClrMapping/>
   </p:clrMapOvr>
+  <p:timing>
+    <p:tnLst>
+      <p:par>
+        <p:cTn id="1" dur="indefinite" restart="never" nodeType="tmRoot">
+          <p:childTnLst>
+            <p:seq concurrent="1" nextAc="seek">
+              <p:cTn id="2" dur="indefinite" nodeType="mainSeq">
+                <p:childTnLst>
+                  <p:par>
+                    <p:cTn id="3" fill="hold">
+                      <p:stCondLst>
+                        <p:cond delay="indefinite"/>
+                      </p:stCondLst>
+                      <p:childTnLst>
+                        <p:par>
+                          <p:cTn id="4" fill="hold">
+                            <p:stCondLst>
+                              <p:cond delay="0"/>
+                            </p:stCondLst>
+                            <p:childTnLst>
+                              <p:par>
+                                <p:cTn id="5" presetID="1" presetClass="entr" presetSubtype="0" fill="hold" grpId="0" nodeType="clickEffect">
+                                  <p:stCondLst>
+                                    <p:cond delay="0"/>
+                                  </p:stCondLst>
+                                  <p:childTnLst>
+                                    <p:set>
+                                      <p:cBhvr>
+                                        <p:cTn id="6" dur="1" fill="hold">
+                                          <p:stCondLst>
+                                            <p:cond delay="0"/>
+                                          </p:stCondLst>
+                                        </p:cTn>
+                                        <p:tgtEl>
+                                          <p:spTgt spid="7"/>
+                                        </p:tgtEl>
+                                        <p:attrNameLst>
+                                          <p:attrName>style.visibility</p:attrName>
+                                        </p:attrNameLst>
+                                      </p:cBhvr>
+                                      <p:to>
+                                        <p:strVal val="visible"/>
+                                      </p:to>
+                                    </p:set>
+                                  </p:childTnLst>
+                                </p:cTn>
+                              </p:par>
+                            </p:childTnLst>
+                          </p:cTn>
+                        </p:par>
+                      </p:childTnLst>
+                    </p:cTn>
+                  </p:par>
+                </p:childTnLst>
+              </p:cTn>
+              <p:prevCondLst>
+                <p:cond evt="onPrev" delay="0">
+                  <p:tgtEl>
+                    <p:sldTgt/>
+                  </p:tgtEl>
+                </p:cond>
+              </p:prevCondLst>
+              <p:nextCondLst>
+                <p:cond evt="onNext" delay="0">
+                  <p:tgtEl>
+                    <p:sldTgt/>
+                  </p:tgtEl>
+                </p:cond>
+              </p:nextCondLst>
+            </p:seq>
+          </p:childTnLst>
+        </p:cTn>
+      </p:par>
+    </p:tnLst>
+    <p:bldLst>
+      <p:bldP spid="7" grpId="0"/>
+    </p:bldLst>
+  </p:timing>
 </p:sld>
 </file>
 
 <file path=ppt/slides/slide3.xml><?xml version="1.0" encoding="utf-8"?>
+<p:sld xmlns:a="http://schemas.openxmlformats.org/drawingml/2006/main" xmlns:r="http://schemas.openxmlformats.org/officeDocument/2006/relationships" xmlns:p="http://schemas.openxmlformats.org/presentationml/2006/main">
+  <p:cSld>
+    <p:spTree>
+      <p:nvGrpSpPr>
+        <p:cNvPr id="1" name=""/>
+        <p:cNvGrpSpPr/>
+        <p:nvPr/>
+      </p:nvGrpSpPr>
+      <p:grpSpPr>
+        <a:xfrm>
+          <a:off x="0" y="0"/>
+          <a:ext cx="0" cy="0"/>
+          <a:chOff x="0" y="0"/>
+          <a:chExt cx="0" cy="0"/>
+        </a:xfrm>
+      </p:grpSpPr>
+      <p:pic>
+        <p:nvPicPr>
+          <p:cNvPr id="2" name="Picture 1"/>
+          <p:cNvPicPr>
+            <a:picLocks noChangeAspect="1"/>
+          </p:cNvPicPr>
+          <p:nvPr/>
+        </p:nvPicPr>
+        <p:blipFill>
+          <a:blip r:embed="rId2"/>
+          <a:stretch>
+            <a:fillRect/>
+          </a:stretch>
+        </p:blipFill>
+        <p:spPr>
+          <a:xfrm>
+            <a:off x="2502640" y="1302384"/>
+            <a:ext cx="7736947" cy="4342786"/>
+          </a:xfrm>
+          <a:prstGeom prst="rect">
+            <a:avLst/>
+          </a:prstGeom>
+        </p:spPr>
+      </p:pic>
+      <p:sp>
+        <p:nvSpPr>
+          <p:cNvPr id="3" name="Rectangle 2"/>
+          <p:cNvSpPr/>
+          <p:nvPr/>
+        </p:nvSpPr>
+        <p:spPr>
+          <a:xfrm>
+            <a:off x="2502639" y="5932408"/>
+            <a:ext cx="7736947" cy="415498"/>
+          </a:xfrm>
+          <a:prstGeom prst="rect">
+            <a:avLst/>
+          </a:prstGeom>
+        </p:spPr>
+        <p:txBody>
+          <a:bodyPr wrap="square">
+            <a:spAutoFit/>
+          </a:bodyPr>
+          <a:lstStyle/>
+          <a:p>
+            <a:pPr algn="ctr"/>
+            <a:r>
+              <a:rPr lang="en-US" dirty="0">
+                <a:hlinkClick r:id="rId3"/>
+              </a:rPr>
+              <a:t>https://twitter.com/simonbrown/status/847339104874381312</a:t>
+            </a:r>
+            <a:r>
+              <a:rPr lang="en-US" dirty="0"/>
+              <a:t> </a:t>
+            </a:r>
+          </a:p>
+        </p:txBody>
+      </p:sp>
+      <p:sp>
+        <p:nvSpPr>
+          <p:cNvPr id="8" name="Title 1"/>
+          <p:cNvSpPr>
+            <a:spLocks noGrp="1"/>
+          </p:cNvSpPr>
+          <p:nvPr>
+            <p:ph type="title"/>
+          </p:nvPr>
+        </p:nvSpPr>
+        <p:spPr>
+          <a:xfrm>
+            <a:off x="663732" y="367386"/>
+            <a:ext cx="11414760" cy="1107996"/>
+          </a:xfrm>
+        </p:spPr>
+        <p:txBody>
+          <a:bodyPr/>
+          <a:lstStyle/>
+          <a:p>
+            <a:pPr algn="ctr"/>
+            <a:r>
+              <a:rPr lang="en-US" sz="3600" dirty="0"/>
+              <a:t>Containers will NOT fix a broken architecture!</a:t>
+            </a:r>
+          </a:p>
+        </p:txBody>
+      </p:sp>
+    </p:spTree>
+    <p:extLst>
+      <p:ext uri="{BB962C8B-B14F-4D97-AF65-F5344CB8AC3E}">
+        <p14:creationId xmlns:p14="http://schemas.microsoft.com/office/powerpoint/2010/main" val="2802130325"/>
+      </p:ext>
+    </p:extLst>
+  </p:cSld>
+  <p:clrMapOvr>
+    <a:masterClrMapping/>
+  </p:clrMapOvr>
+</p:sld>
+</file>
+
+<file path=ppt/slides/slide4.xml><?xml version="1.0" encoding="utf-8"?>
+<p:sld xmlns:a="http://schemas.openxmlformats.org/drawingml/2006/main" xmlns:r="http://schemas.openxmlformats.org/officeDocument/2006/relationships" xmlns:p="http://schemas.openxmlformats.org/presentationml/2006/main">
+  <p:cSld>
+    <p:spTree>
+      <p:nvGrpSpPr>
+        <p:cNvPr id="1" name=""/>
+        <p:cNvGrpSpPr/>
+        <p:nvPr/>
+      </p:nvGrpSpPr>
+      <p:grpSpPr>
+        <a:xfrm>
+          <a:off x="0" y="0"/>
+          <a:ext cx="0" cy="0"/>
+          <a:chOff x="0" y="0"/>
+          <a:chExt cx="0" cy="0"/>
+        </a:xfrm>
+      </p:grpSpPr>
+      <p:pic>
+        <p:nvPicPr>
+          <p:cNvPr id="2050" name="Picture 2" descr="https://pbs.twimg.com/media/Cd6UYMOWoAAgVUp.jpg:small"/>
+          <p:cNvPicPr>
+            <a:picLocks noChangeAspect="1" noChangeArrowheads="1"/>
+          </p:cNvPicPr>
+          <p:nvPr/>
+        </p:nvPicPr>
+        <p:blipFill>
+          <a:blip r:embed="rId2">
+            <a:extLst>
+              <a:ext uri="{28A0092B-C50C-407E-A947-70E740481C1C}">
+                <a14:useLocalDpi xmlns:a14="http://schemas.microsoft.com/office/drawing/2010/main" val="0"/>
+              </a:ext>
+            </a:extLst>
+          </a:blip>
+          <a:srcRect/>
+          <a:stretch>
+            <a:fillRect/>
+          </a:stretch>
+        </p:blipFill>
+        <p:spPr bwMode="auto">
+          <a:xfrm>
+            <a:off x="3167698" y="603171"/>
+            <a:ext cx="5458142" cy="4093607"/>
+          </a:xfrm>
+          <a:prstGeom prst="rect">
+            <a:avLst/>
+          </a:prstGeom>
+          <a:noFill/>
+          <a:extLst>
+            <a:ext uri="{909E8E84-426E-40DD-AFC4-6F175D3DCCD1}">
+              <a14:hiddenFill xmlns:a14="http://schemas.microsoft.com/office/drawing/2010/main">
+                <a:solidFill>
+                  <a:srgbClr val="FFFFFF"/>
+                </a:solidFill>
+              </a14:hiddenFill>
+            </a:ext>
+          </a:extLst>
+        </p:spPr>
+      </p:pic>
+      <p:sp>
+        <p:nvSpPr>
+          <p:cNvPr id="4" name="Rectangle 3"/>
+          <p:cNvSpPr/>
+          <p:nvPr/>
+        </p:nvSpPr>
+        <p:spPr>
+          <a:xfrm>
+            <a:off x="839787" y="5014883"/>
+            <a:ext cx="10515600" cy="738664"/>
+          </a:xfrm>
+          <a:prstGeom prst="rect">
+            <a:avLst/>
+          </a:prstGeom>
+        </p:spPr>
+        <p:txBody>
+          <a:bodyPr wrap="square">
+            <a:spAutoFit/>
+          </a:bodyPr>
+          <a:lstStyle/>
+          <a:p>
+            <a:pPr algn="ctr"/>
+            <a:r>
+              <a:rPr lang="en-US" sz="2400" b="1" dirty="0"/>
+              <a:t>Here's a diagram of two microservices and their shared database.</a:t>
+            </a:r>
+          </a:p>
+          <a:p>
+            <a:pPr algn="ctr"/>
+            <a:r>
+              <a:rPr lang="en-US" sz="1800" dirty="0">
+                <a:hlinkClick r:id="rId3"/>
+              </a:rPr>
+              <a:t>https://twitter.com/mathiasverraes/status/711168935798902785</a:t>
+            </a:r>
+            <a:r>
+              <a:rPr lang="en-US" sz="1800" dirty="0"/>
+              <a:t> </a:t>
+            </a:r>
+          </a:p>
+        </p:txBody>
+      </p:sp>
+    </p:spTree>
+    <p:extLst>
+      <p:ext uri="{BB962C8B-B14F-4D97-AF65-F5344CB8AC3E}">
+        <p14:creationId xmlns:p14="http://schemas.microsoft.com/office/powerpoint/2010/main" val="2585139535"/>
+      </p:ext>
+    </p:extLst>
+  </p:cSld>
+  <p:clrMapOvr>
+    <a:masterClrMapping/>
+  </p:clrMapOvr>
+</p:sld>
+</file>
+
+<file path=ppt/slides/slide5.xml><?xml version="1.0" encoding="utf-8"?>
+<p:sld xmlns:a="http://schemas.openxmlformats.org/drawingml/2006/main" xmlns:r="http://schemas.openxmlformats.org/officeDocument/2006/relationships" xmlns:p="http://schemas.openxmlformats.org/presentationml/2006/main">
+  <p:cSld>
+    <p:spTree>
+      <p:nvGrpSpPr>
+        <p:cNvPr id="1" name=""/>
+        <p:cNvGrpSpPr/>
+        <p:nvPr/>
+      </p:nvGrpSpPr>
+      <p:grpSpPr>
+        <a:xfrm>
+          <a:off x="0" y="0"/>
+          <a:ext cx="0" cy="0"/>
+          <a:chOff x="0" y="0"/>
+          <a:chExt cx="0" cy="0"/>
+        </a:xfrm>
+      </p:grpSpPr>
+      <p:sp>
+        <p:nvSpPr>
+          <p:cNvPr id="3" name="Rectangle 2"/>
+          <p:cNvSpPr/>
+          <p:nvPr/>
+        </p:nvSpPr>
+        <p:spPr>
+          <a:xfrm>
+            <a:off x="1213166" y="4295408"/>
+            <a:ext cx="10285412" cy="1785104"/>
+          </a:xfrm>
+          <a:prstGeom prst="rect">
+            <a:avLst/>
+          </a:prstGeom>
+        </p:spPr>
+        <p:txBody>
+          <a:bodyPr wrap="square">
+            <a:spAutoFit/>
+          </a:bodyPr>
+          <a:lstStyle/>
+          <a:p>
+            <a:pPr algn="ctr"/>
+            <a:r>
+              <a:rPr lang="en-US" sz="3200" b="1" dirty="0"/>
+              <a:t>To make error is human. </a:t>
+            </a:r>
+          </a:p>
+          <a:p>
+            <a:pPr algn="ctr"/>
+            <a:r>
+              <a:rPr lang="en-US" sz="3200" b="1" dirty="0"/>
+              <a:t>To propagate error to all server in automatic way is #</a:t>
+            </a:r>
+            <a:r>
+              <a:rPr lang="en-US" sz="3200" b="1" dirty="0" err="1"/>
+              <a:t>devops</a:t>
+            </a:r>
+            <a:r>
+              <a:rPr lang="en-US" sz="3200" b="1" dirty="0"/>
+              <a:t>.</a:t>
+            </a:r>
+          </a:p>
+          <a:p>
+            <a:pPr algn="ctr"/>
+            <a:r>
+              <a:rPr lang="en-US" sz="1400" b="1" dirty="0">
+                <a:hlinkClick r:id="rId2"/>
+              </a:rPr>
+              <a:t>https://twitter.com/DEVOPS_BORAT/status/41587168870797312</a:t>
+            </a:r>
+            <a:r>
+              <a:rPr lang="en-US" sz="1400" b="1" dirty="0"/>
+              <a:t> </a:t>
+            </a:r>
+          </a:p>
+        </p:txBody>
+      </p:sp>
+      <p:pic>
+        <p:nvPicPr>
+          <p:cNvPr id="2" name="Picture 1"/>
+          <p:cNvPicPr>
+            <a:picLocks noChangeAspect="1"/>
+          </p:cNvPicPr>
+          <p:nvPr/>
+        </p:nvPicPr>
+        <p:blipFill>
+          <a:blip r:embed="rId3"/>
+          <a:stretch>
+            <a:fillRect/>
+          </a:stretch>
+        </p:blipFill>
+        <p:spPr>
+          <a:xfrm>
+            <a:off x="3342197" y="494983"/>
+            <a:ext cx="6027351" cy="3448272"/>
+          </a:xfrm>
+          <a:prstGeom prst="rect">
+            <a:avLst/>
+          </a:prstGeom>
+        </p:spPr>
+      </p:pic>
+    </p:spTree>
+    <p:extLst>
+      <p:ext uri="{BB962C8B-B14F-4D97-AF65-F5344CB8AC3E}">
+        <p14:creationId xmlns:p14="http://schemas.microsoft.com/office/powerpoint/2010/main" val="3634449589"/>
+      </p:ext>
+    </p:extLst>
+  </p:cSld>
+  <p:clrMapOvr>
+    <a:masterClrMapping/>
+  </p:clrMapOvr>
+  <p:timing>
+    <p:tnLst>
+      <p:par>
+        <p:cTn id="1" dur="indefinite" restart="never" nodeType="tmRoot">
+          <p:childTnLst>
+            <p:seq concurrent="1" nextAc="seek">
+              <p:cTn id="2" dur="indefinite" nodeType="mainSeq">
+                <p:childTnLst>
+                  <p:par>
+                    <p:cTn id="3" fill="hold">
+                      <p:stCondLst>
+                        <p:cond delay="indefinite"/>
+                      </p:stCondLst>
+                      <p:childTnLst>
+                        <p:par>
+                          <p:cTn id="4" fill="hold">
+                            <p:stCondLst>
+                              <p:cond delay="0"/>
+                            </p:stCondLst>
+                            <p:childTnLst>
+                              <p:par>
+                                <p:cTn id="5" presetID="1" presetClass="entr" presetSubtype="0" fill="hold" grpId="0" nodeType="clickEffect">
+                                  <p:stCondLst>
+                                    <p:cond delay="0"/>
+                                  </p:stCondLst>
+                                  <p:childTnLst>
+                                    <p:set>
+                                      <p:cBhvr>
+                                        <p:cTn id="6" dur="1" fill="hold">
+                                          <p:stCondLst>
+                                            <p:cond delay="0"/>
+                                          </p:stCondLst>
+                                        </p:cTn>
+                                        <p:tgtEl>
+                                          <p:spTgt spid="3"/>
+                                        </p:tgtEl>
+                                        <p:attrNameLst>
+                                          <p:attrName>style.visibility</p:attrName>
+                                        </p:attrNameLst>
+                                      </p:cBhvr>
+                                      <p:to>
+                                        <p:strVal val="visible"/>
+                                      </p:to>
+                                    </p:set>
+                                  </p:childTnLst>
+                                </p:cTn>
+                              </p:par>
+                            </p:childTnLst>
+                          </p:cTn>
+                        </p:par>
+                      </p:childTnLst>
+                    </p:cTn>
+                  </p:par>
+                </p:childTnLst>
+              </p:cTn>
+              <p:prevCondLst>
+                <p:cond evt="onPrev" delay="0">
+                  <p:tgtEl>
+                    <p:sldTgt/>
+                  </p:tgtEl>
+                </p:cond>
+              </p:prevCondLst>
+              <p:nextCondLst>
+                <p:cond evt="onNext" delay="0">
+                  <p:tgtEl>
+                    <p:sldTgt/>
+                  </p:tgtEl>
+                </p:cond>
+              </p:nextCondLst>
+            </p:seq>
+          </p:childTnLst>
+        </p:cTn>
+      </p:par>
+    </p:tnLst>
+    <p:bldLst>
+      <p:bldP spid="3" grpId="0"/>
+    </p:bldLst>
+  </p:timing>
+</p:sld>
+</file>
+
+<file path=ppt/slides/slide6.xml><?xml version="1.0" encoding="utf-8"?>
 <p:sld xmlns:a="http://schemas.openxmlformats.org/drawingml/2006/main" xmlns:r="http://schemas.openxmlformats.org/officeDocument/2006/relationships" xmlns:p="http://schemas.openxmlformats.org/presentationml/2006/main">
   <p:cSld>
     <p:spTree>
@@ -8521,347 +9018,6 @@
 </p:sld>
 </file>
 
-<file path=ppt/slides/slide4.xml><?xml version="1.0" encoding="utf-8"?>
-<p:sld xmlns:a="http://schemas.openxmlformats.org/drawingml/2006/main" xmlns:r="http://schemas.openxmlformats.org/officeDocument/2006/relationships" xmlns:p="http://schemas.openxmlformats.org/presentationml/2006/main">
-  <p:cSld>
-    <p:spTree>
-      <p:nvGrpSpPr>
-        <p:cNvPr id="1" name=""/>
-        <p:cNvGrpSpPr/>
-        <p:nvPr/>
-      </p:nvGrpSpPr>
-      <p:grpSpPr>
-        <a:xfrm>
-          <a:off x="0" y="0"/>
-          <a:ext cx="0" cy="0"/>
-          <a:chOff x="0" y="0"/>
-          <a:chExt cx="0" cy="0"/>
-        </a:xfrm>
-      </p:grpSpPr>
-      <p:pic>
-        <p:nvPicPr>
-          <p:cNvPr id="2" name="Picture 1"/>
-          <p:cNvPicPr>
-            <a:picLocks noChangeAspect="1"/>
-          </p:cNvPicPr>
-          <p:nvPr/>
-        </p:nvPicPr>
-        <p:blipFill>
-          <a:blip r:embed="rId2"/>
-          <a:stretch>
-            <a:fillRect/>
-          </a:stretch>
-        </p:blipFill>
-        <p:spPr>
-          <a:xfrm>
-            <a:off x="2502640" y="1302384"/>
-            <a:ext cx="7736947" cy="4342786"/>
-          </a:xfrm>
-          <a:prstGeom prst="rect">
-            <a:avLst/>
-          </a:prstGeom>
-        </p:spPr>
-      </p:pic>
-      <p:sp>
-        <p:nvSpPr>
-          <p:cNvPr id="3" name="Rectangle 2"/>
-          <p:cNvSpPr/>
-          <p:nvPr/>
-        </p:nvSpPr>
-        <p:spPr>
-          <a:xfrm>
-            <a:off x="2502639" y="5932408"/>
-            <a:ext cx="7736947" cy="415498"/>
-          </a:xfrm>
-          <a:prstGeom prst="rect">
-            <a:avLst/>
-          </a:prstGeom>
-        </p:spPr>
-        <p:txBody>
-          <a:bodyPr wrap="square">
-            <a:spAutoFit/>
-          </a:bodyPr>
-          <a:lstStyle/>
-          <a:p>
-            <a:pPr algn="ctr"/>
-            <a:r>
-              <a:rPr lang="en-US" dirty="0">
-                <a:hlinkClick r:id="rId3"/>
-              </a:rPr>
-              <a:t>https://twitter.com/simonbrown/status/847339104874381312</a:t>
-            </a:r>
-            <a:r>
-              <a:rPr lang="en-US" dirty="0"/>
-              <a:t> </a:t>
-            </a:r>
-          </a:p>
-        </p:txBody>
-      </p:sp>
-      <p:sp>
-        <p:nvSpPr>
-          <p:cNvPr id="8" name="Title 1"/>
-          <p:cNvSpPr>
-            <a:spLocks noGrp="1"/>
-          </p:cNvSpPr>
-          <p:nvPr>
-            <p:ph type="title"/>
-          </p:nvPr>
-        </p:nvSpPr>
-        <p:spPr>
-          <a:xfrm>
-            <a:off x="663732" y="367386"/>
-            <a:ext cx="11414760" cy="1107996"/>
-          </a:xfrm>
-        </p:spPr>
-        <p:txBody>
-          <a:bodyPr/>
-          <a:lstStyle/>
-          <a:p>
-            <a:pPr algn="ctr"/>
-            <a:r>
-              <a:rPr lang="en-US" sz="3600" dirty="0"/>
-              <a:t>Containers will NOT fix a broken architecture!</a:t>
-            </a:r>
-          </a:p>
-        </p:txBody>
-      </p:sp>
-    </p:spTree>
-    <p:extLst>
-      <p:ext uri="{BB962C8B-B14F-4D97-AF65-F5344CB8AC3E}">
-        <p14:creationId xmlns:p14="http://schemas.microsoft.com/office/powerpoint/2010/main" val="2802130325"/>
-      </p:ext>
-    </p:extLst>
-  </p:cSld>
-  <p:clrMapOvr>
-    <a:masterClrMapping/>
-  </p:clrMapOvr>
-</p:sld>
-</file>
-
-<file path=ppt/slides/slide5.xml><?xml version="1.0" encoding="utf-8"?>
-<p:sld xmlns:a="http://schemas.openxmlformats.org/drawingml/2006/main" xmlns:r="http://schemas.openxmlformats.org/officeDocument/2006/relationships" xmlns:p="http://schemas.openxmlformats.org/presentationml/2006/main">
-  <p:cSld>
-    <p:spTree>
-      <p:nvGrpSpPr>
-        <p:cNvPr id="1" name=""/>
-        <p:cNvGrpSpPr/>
-        <p:nvPr/>
-      </p:nvGrpSpPr>
-      <p:grpSpPr>
-        <a:xfrm>
-          <a:off x="0" y="0"/>
-          <a:ext cx="0" cy="0"/>
-          <a:chOff x="0" y="0"/>
-          <a:chExt cx="0" cy="0"/>
-        </a:xfrm>
-      </p:grpSpPr>
-      <p:pic>
-        <p:nvPicPr>
-          <p:cNvPr id="2050" name="Picture 2" descr="https://pbs.twimg.com/media/Cd6UYMOWoAAgVUp.jpg:small"/>
-          <p:cNvPicPr>
-            <a:picLocks noChangeAspect="1" noChangeArrowheads="1"/>
-          </p:cNvPicPr>
-          <p:nvPr/>
-        </p:nvPicPr>
-        <p:blipFill>
-          <a:blip r:embed="rId2">
-            <a:extLst>
-              <a:ext uri="{28A0092B-C50C-407E-A947-70E740481C1C}">
-                <a14:useLocalDpi xmlns:a14="http://schemas.microsoft.com/office/drawing/2010/main" val="0"/>
-              </a:ext>
-            </a:extLst>
-          </a:blip>
-          <a:srcRect/>
-          <a:stretch>
-            <a:fillRect/>
-          </a:stretch>
-        </p:blipFill>
-        <p:spPr bwMode="auto">
-          <a:xfrm>
-            <a:off x="3167698" y="603171"/>
-            <a:ext cx="5458142" cy="4093607"/>
-          </a:xfrm>
-          <a:prstGeom prst="rect">
-            <a:avLst/>
-          </a:prstGeom>
-          <a:noFill/>
-          <a:extLst>
-            <a:ext uri="{909E8E84-426E-40DD-AFC4-6F175D3DCCD1}">
-              <a14:hiddenFill xmlns:a14="http://schemas.microsoft.com/office/drawing/2010/main">
-                <a:solidFill>
-                  <a:srgbClr val="FFFFFF"/>
-                </a:solidFill>
-              </a14:hiddenFill>
-            </a:ext>
-          </a:extLst>
-        </p:spPr>
-      </p:pic>
-      <p:sp>
-        <p:nvSpPr>
-          <p:cNvPr id="4" name="Rectangle 3"/>
-          <p:cNvSpPr/>
-          <p:nvPr/>
-        </p:nvSpPr>
-        <p:spPr>
-          <a:xfrm>
-            <a:off x="839787" y="5014883"/>
-            <a:ext cx="10515600" cy="738664"/>
-          </a:xfrm>
-          <a:prstGeom prst="rect">
-            <a:avLst/>
-          </a:prstGeom>
-        </p:spPr>
-        <p:txBody>
-          <a:bodyPr wrap="square">
-            <a:spAutoFit/>
-          </a:bodyPr>
-          <a:lstStyle/>
-          <a:p>
-            <a:pPr algn="ctr"/>
-            <a:r>
-              <a:rPr lang="en-US" sz="2400" b="1" dirty="0"/>
-              <a:t>Here's a diagram of two microservices and their shared database.</a:t>
-            </a:r>
-          </a:p>
-          <a:p>
-            <a:pPr algn="ctr"/>
-            <a:r>
-              <a:rPr lang="en-US" sz="1800" dirty="0">
-                <a:hlinkClick r:id="rId3"/>
-              </a:rPr>
-              <a:t>https://twitter.com/mathiasverraes/status/711168935798902785</a:t>
-            </a:r>
-            <a:r>
-              <a:rPr lang="en-US" sz="1800" dirty="0"/>
-              <a:t> </a:t>
-            </a:r>
-          </a:p>
-        </p:txBody>
-      </p:sp>
-    </p:spTree>
-    <p:extLst>
-      <p:ext uri="{BB962C8B-B14F-4D97-AF65-F5344CB8AC3E}">
-        <p14:creationId xmlns:p14="http://schemas.microsoft.com/office/powerpoint/2010/main" val="2585139535"/>
-      </p:ext>
-    </p:extLst>
-  </p:cSld>
-  <p:clrMapOvr>
-    <a:masterClrMapping/>
-  </p:clrMapOvr>
-</p:sld>
-</file>
-
-<file path=ppt/slides/slide6.xml><?xml version="1.0" encoding="utf-8"?>
-<p:sld xmlns:a="http://schemas.openxmlformats.org/drawingml/2006/main" xmlns:r="http://schemas.openxmlformats.org/officeDocument/2006/relationships" xmlns:p="http://schemas.openxmlformats.org/presentationml/2006/main">
-  <p:cSld>
-    <p:spTree>
-      <p:nvGrpSpPr>
-        <p:cNvPr id="1" name=""/>
-        <p:cNvGrpSpPr/>
-        <p:nvPr/>
-      </p:nvGrpSpPr>
-      <p:grpSpPr>
-        <a:xfrm>
-          <a:off x="0" y="0"/>
-          <a:ext cx="0" cy="0"/>
-          <a:chOff x="0" y="0"/>
-          <a:chExt cx="0" cy="0"/>
-        </a:xfrm>
-      </p:grpSpPr>
-      <p:sp>
-        <p:nvSpPr>
-          <p:cNvPr id="3" name="Rectangle 2"/>
-          <p:cNvSpPr/>
-          <p:nvPr/>
-        </p:nvSpPr>
-        <p:spPr>
-          <a:xfrm>
-            <a:off x="1213167" y="4662800"/>
-            <a:ext cx="10285412" cy="1569660"/>
-          </a:xfrm>
-          <a:prstGeom prst="rect">
-            <a:avLst/>
-          </a:prstGeom>
-        </p:spPr>
-        <p:txBody>
-          <a:bodyPr wrap="square">
-            <a:spAutoFit/>
-          </a:bodyPr>
-          <a:lstStyle/>
-          <a:p>
-            <a:pPr algn="ctr"/>
-            <a:r>
-              <a:rPr lang="en-US" sz="2800" b="1" dirty="0"/>
-              <a:t>To make error is human. </a:t>
-            </a:r>
-          </a:p>
-          <a:p>
-            <a:pPr algn="ctr"/>
-            <a:r>
-              <a:rPr lang="en-US" sz="2800" b="1" dirty="0"/>
-              <a:t>To propagate error to all server in automatic way is #</a:t>
-            </a:r>
-            <a:r>
-              <a:rPr lang="en-US" sz="2800" b="1" dirty="0" err="1"/>
-              <a:t>devops</a:t>
-            </a:r>
-            <a:r>
-              <a:rPr lang="en-US" sz="2800" b="1" dirty="0"/>
-              <a:t>.</a:t>
-            </a:r>
-          </a:p>
-          <a:p>
-            <a:pPr algn="ctr"/>
-            <a:r>
-              <a:rPr lang="en-US" sz="1200" b="1" dirty="0">
-                <a:hlinkClick r:id="rId2"/>
-              </a:rPr>
-              <a:t>https://twitter.com/DEVOPS_BORAT/status/41587168870797312</a:t>
-            </a:r>
-            <a:r>
-              <a:rPr lang="en-US" sz="1200" b="1" dirty="0"/>
-              <a:t> </a:t>
-            </a:r>
-          </a:p>
-        </p:txBody>
-      </p:sp>
-      <p:pic>
-        <p:nvPicPr>
-          <p:cNvPr id="2" name="Picture 1"/>
-          <p:cNvPicPr>
-            <a:picLocks noChangeAspect="1"/>
-          </p:cNvPicPr>
-          <p:nvPr/>
-        </p:nvPicPr>
-        <p:blipFill>
-          <a:blip r:embed="rId3"/>
-          <a:stretch>
-            <a:fillRect/>
-          </a:stretch>
-        </p:blipFill>
-        <p:spPr>
-          <a:xfrm>
-            <a:off x="2757420" y="446362"/>
-            <a:ext cx="7196905" cy="4117378"/>
-          </a:xfrm>
-          <a:prstGeom prst="rect">
-            <a:avLst/>
-          </a:prstGeom>
-        </p:spPr>
-      </p:pic>
-    </p:spTree>
-    <p:extLst>
-      <p:ext uri="{BB962C8B-B14F-4D97-AF65-F5344CB8AC3E}">
-        <p14:creationId xmlns:p14="http://schemas.microsoft.com/office/powerpoint/2010/main" val="3634449589"/>
-      </p:ext>
-    </p:extLst>
-  </p:cSld>
-  <p:clrMapOvr>
-    <a:masterClrMapping/>
-  </p:clrMapOvr>
-</p:sld>
-</file>
-
 <file path=ppt/slides/slide7.xml><?xml version="1.0" encoding="utf-8"?>
 <p:sld xmlns:a="http://schemas.openxmlformats.org/drawingml/2006/main" xmlns:r="http://schemas.openxmlformats.org/officeDocument/2006/relationships" xmlns:p="http://schemas.openxmlformats.org/presentationml/2006/main">
   <p:cSld>
@@ -8901,15 +9057,7 @@
           <a:p>
             <a:r>
               <a:rPr lang="en-US" dirty="0"/>
-              <a:t>So, what is </a:t>
-            </a:r>
-            <a:r>
-              <a:rPr lang="en-US" dirty="0" err="1"/>
-              <a:t>kubernetes</a:t>
-            </a:r>
-            <a:r>
-              <a:rPr lang="en-US" dirty="0"/>
-              <a:t> all about then?</a:t>
+              <a:t>So, what is Kubernetes all about then?</a:t>
             </a:r>
           </a:p>
         </p:txBody>
@@ -9345,6 +9493,35 @@
               <a:buFont typeface="Wingdings" panose="05000000000000000000" pitchFamily="2" charset="2"/>
               <a:buChar char="§"/>
             </a:pPr>
+            <a:r>
+              <a:rPr lang="en-US" sz="1800" kern="0" dirty="0">
+                <a:ea typeface="Arial Unicode MS" pitchFamily="34" charset="-128"/>
+                <a:cs typeface="Arial Unicode MS" pitchFamily="34" charset="-128"/>
+              </a:rPr>
+              <a:t>Documentation: </a:t>
+            </a:r>
+            <a:r>
+              <a:rPr lang="en-US" sz="1800" kern="0" dirty="0">
+                <a:ea typeface="Arial Unicode MS" pitchFamily="34" charset="-128"/>
+                <a:cs typeface="Arial Unicode MS" pitchFamily="34" charset="-128"/>
+                <a:hlinkClick r:id="rId2"/>
+              </a:rPr>
+              <a:t>https://kubernetes.io/docs/home/</a:t>
+            </a:r>
+            <a:r>
+              <a:rPr lang="en-US" sz="1800" kern="0" dirty="0">
+                <a:ea typeface="Arial Unicode MS" pitchFamily="34" charset="-128"/>
+                <a:cs typeface="Arial Unicode MS" pitchFamily="34" charset="-128"/>
+              </a:rPr>
+              <a:t> - concepts, tasks</a:t>
+            </a:r>
+            <a:r>
+              <a:rPr lang="en-US" sz="1800" kern="0">
+                <a:ea typeface="Arial Unicode MS" pitchFamily="34" charset="-128"/>
+                <a:cs typeface="Arial Unicode MS" pitchFamily="34" charset="-128"/>
+              </a:rPr>
+              <a:t>, API reference</a:t>
+            </a:r>
             <a:endParaRPr lang="en-US" sz="1800" kern="0" dirty="0">
               <a:ea typeface="Arial Unicode MS" pitchFamily="34" charset="-128"/>
               <a:cs typeface="Arial Unicode MS" pitchFamily="34" charset="-128"/>
@@ -9435,7 +9612,6 @@
               <a:rPr lang="en-US" dirty="0"/>
               <a:t> </a:t>
             </a:r>
-            <a:endParaRPr lang="en-US" dirty="0"/>
           </a:p>
         </p:txBody>
       </p:sp>
@@ -9494,7 +9670,6 @@
               <a:rPr lang="en-US" dirty="0"/>
               <a:t> </a:t>
             </a:r>
-            <a:endParaRPr lang="en-US" dirty="0"/>
           </a:p>
         </p:txBody>
       </p:sp>
@@ -9529,7 +9704,6 @@
               <a:rPr lang="en-US" dirty="0"/>
               <a:t> </a:t>
             </a:r>
-            <a:endParaRPr lang="en-US" dirty="0"/>
           </a:p>
         </p:txBody>
       </p:sp>

</xml_diff>

<commit_message>
+ infrastruktur & big picture
added infrastructure description
added description for the application we will build during exercises
</commit_message>
<xml_diff>
--- a/kubernetes/00_intro.pptx
+++ b/kubernetes/00_intro.pptx
@@ -5,10 +5,10 @@
     <p:sldMasterId id="2147483733" r:id="rId1"/>
   </p:sldMasterIdLst>
   <p:notesMasterIdLst>
-    <p:notesMasterId r:id="rId12"/>
+    <p:notesMasterId r:id="rId13"/>
   </p:notesMasterIdLst>
   <p:handoutMasterIdLst>
-    <p:handoutMasterId r:id="rId13"/>
+    <p:handoutMasterId r:id="rId14"/>
   </p:handoutMasterIdLst>
   <p:sldIdLst>
     <p:sldId id="433" r:id="rId2"/>
@@ -18,9 +18,10 @@
     <p:sldId id="445" r:id="rId6"/>
     <p:sldId id="442" r:id="rId7"/>
     <p:sldId id="446" r:id="rId8"/>
-    <p:sldId id="447" r:id="rId9"/>
-    <p:sldId id="448" r:id="rId10"/>
-    <p:sldId id="265" r:id="rId11"/>
+    <p:sldId id="449" r:id="rId9"/>
+    <p:sldId id="447" r:id="rId10"/>
+    <p:sldId id="448" r:id="rId11"/>
+    <p:sldId id="265" r:id="rId12"/>
   </p:sldIdLst>
   <p:sldSz cx="12195175" cy="6858000"/>
   <p:notesSz cx="6858000" cy="9144000"/>
@@ -559,7 +560,7 @@
             <a:fld id="{7D8C2C35-2B8A-446E-BEC0-FD36716C29AC}" type="slidenum">
               <a:rPr lang="de-DE" smtClean="0"/>
               <a:pPr/>
-              <a:t>10</a:t>
+              <a:t>11</a:t>
             </a:fld>
             <a:endParaRPr lang="de-DE" dirty="0"/>
           </a:p>
@@ -8217,6 +8218,184 @@
 </file>
 
 <file path=ppt/slides/slide10.xml><?xml version="1.0" encoding="utf-8"?>
+<p:sld xmlns:a="http://schemas.openxmlformats.org/drawingml/2006/main" xmlns:r="http://schemas.openxmlformats.org/officeDocument/2006/relationships" xmlns:p="http://schemas.openxmlformats.org/presentationml/2006/main">
+  <p:cSld>
+    <p:spTree>
+      <p:nvGrpSpPr>
+        <p:cNvPr id="1" name=""/>
+        <p:cNvGrpSpPr/>
+        <p:nvPr/>
+      </p:nvGrpSpPr>
+      <p:grpSpPr>
+        <a:xfrm>
+          <a:off x="0" y="0"/>
+          <a:ext cx="0" cy="0"/>
+          <a:chOff x="0" y="0"/>
+          <a:chExt cx="0" cy="0"/>
+        </a:xfrm>
+      </p:grpSpPr>
+      <p:sp>
+        <p:nvSpPr>
+          <p:cNvPr id="2" name="Title 1"/>
+          <p:cNvSpPr>
+            <a:spLocks noGrp="1"/>
+          </p:cNvSpPr>
+          <p:nvPr>
+            <p:ph type="title"/>
+          </p:nvPr>
+        </p:nvSpPr>
+        <p:spPr/>
+        <p:txBody>
+          <a:bodyPr/>
+          <a:lstStyle/>
+          <a:p>
+            <a:r>
+              <a:rPr lang="en-US" dirty="0"/>
+              <a:t>If it doesn’t work as expected …</a:t>
+            </a:r>
+          </a:p>
+        </p:txBody>
+      </p:sp>
+      <p:sp>
+        <p:nvSpPr>
+          <p:cNvPr id="3" name="Rectangle 2"/>
+          <p:cNvSpPr/>
+          <p:nvPr/>
+        </p:nvSpPr>
+        <p:spPr>
+          <a:xfrm>
+            <a:off x="504001" y="5851688"/>
+            <a:ext cx="9554399" cy="415498"/>
+          </a:xfrm>
+          <a:prstGeom prst="rect">
+            <a:avLst/>
+          </a:prstGeom>
+        </p:spPr>
+        <p:txBody>
+          <a:bodyPr wrap="square">
+            <a:spAutoFit/>
+          </a:bodyPr>
+          <a:lstStyle/>
+          <a:p>
+            <a:r>
+              <a:rPr lang="en-US" dirty="0">
+                <a:hlinkClick r:id="rId2"/>
+              </a:rPr>
+              <a:t>https://github.com/kubernetes/community/blob/master/communication.md</a:t>
+            </a:r>
+            <a:r>
+              <a:rPr lang="en-US" dirty="0"/>
+              <a:t> </a:t>
+            </a:r>
+          </a:p>
+        </p:txBody>
+      </p:sp>
+      <p:pic>
+        <p:nvPicPr>
+          <p:cNvPr id="4" name="Picture 3"/>
+          <p:cNvPicPr>
+            <a:picLocks noChangeAspect="1"/>
+          </p:cNvPicPr>
+          <p:nvPr/>
+        </p:nvPicPr>
+        <p:blipFill>
+          <a:blip r:embed="rId3"/>
+          <a:stretch>
+            <a:fillRect/>
+          </a:stretch>
+        </p:blipFill>
+        <p:spPr>
+          <a:xfrm>
+            <a:off x="504001" y="1170215"/>
+            <a:ext cx="9249599" cy="3520576"/>
+          </a:xfrm>
+          <a:prstGeom prst="rect">
+            <a:avLst/>
+          </a:prstGeom>
+        </p:spPr>
+      </p:pic>
+      <p:sp>
+        <p:nvSpPr>
+          <p:cNvPr id="5" name="Rectangle 4"/>
+          <p:cNvSpPr/>
+          <p:nvPr/>
+        </p:nvSpPr>
+        <p:spPr>
+          <a:xfrm>
+            <a:off x="504001" y="5298469"/>
+            <a:ext cx="3788217" cy="415498"/>
+          </a:xfrm>
+          <a:prstGeom prst="rect">
+            <a:avLst/>
+          </a:prstGeom>
+        </p:spPr>
+        <p:txBody>
+          <a:bodyPr wrap="none">
+            <a:spAutoFit/>
+          </a:bodyPr>
+          <a:lstStyle/>
+          <a:p>
+            <a:r>
+              <a:rPr lang="en-US" dirty="0">
+                <a:hlinkClick r:id="rId4"/>
+              </a:rPr>
+              <a:t>https://github.com/kubernetes</a:t>
+            </a:r>
+            <a:r>
+              <a:rPr lang="en-US" dirty="0"/>
+              <a:t> </a:t>
+            </a:r>
+          </a:p>
+        </p:txBody>
+      </p:sp>
+      <p:sp>
+        <p:nvSpPr>
+          <p:cNvPr id="6" name="Rectangle 5"/>
+          <p:cNvSpPr/>
+          <p:nvPr/>
+        </p:nvSpPr>
+        <p:spPr>
+          <a:xfrm>
+            <a:off x="504000" y="4767554"/>
+            <a:ext cx="8792399" cy="415498"/>
+          </a:xfrm>
+          <a:prstGeom prst="rect">
+            <a:avLst/>
+          </a:prstGeom>
+        </p:spPr>
+        <p:txBody>
+          <a:bodyPr wrap="square">
+            <a:spAutoFit/>
+          </a:bodyPr>
+          <a:lstStyle/>
+          <a:p>
+            <a:r>
+              <a:rPr lang="en-US" dirty="0">
+                <a:hlinkClick r:id="rId5"/>
+              </a:rPr>
+              <a:t>https://groups.google.com/forum/#!forum/kubernetes-users</a:t>
+            </a:r>
+            <a:r>
+              <a:rPr lang="en-US" dirty="0"/>
+              <a:t> </a:t>
+            </a:r>
+          </a:p>
+        </p:txBody>
+      </p:sp>
+    </p:spTree>
+    <p:extLst>
+      <p:ext uri="{BB962C8B-B14F-4D97-AF65-F5344CB8AC3E}">
+        <p14:creationId xmlns:p14="http://schemas.microsoft.com/office/powerpoint/2010/main" val="2777277099"/>
+      </p:ext>
+    </p:extLst>
+  </p:cSld>
+  <p:clrMapOvr>
+    <a:masterClrMapping/>
+  </p:clrMapOvr>
+</p:sld>
+</file>
+
+<file path=ppt/slides/slide11.xml><?xml version="1.0" encoding="utf-8"?>
 <p:sld xmlns:a="http://schemas.openxmlformats.org/drawingml/2006/main" xmlns:r="http://schemas.openxmlformats.org/officeDocument/2006/relationships" xmlns:p="http://schemas.openxmlformats.org/presentationml/2006/main" show="0">
   <p:cSld>
     <p:spTree>
@@ -9240,14 +9419,14 @@
           <a:p>
             <a:r>
               <a:rPr lang="en-US" dirty="0"/>
-              <a:t>So, what is Kubernetes all about then?</a:t>
+              <a:t>So, what is this Kubernetes all about then?</a:t>
             </a:r>
           </a:p>
         </p:txBody>
       </p:sp>
       <p:pic>
         <p:nvPicPr>
-          <p:cNvPr id="3074" name="Picture 2" descr="Bildergebnis für orchestration"/>
+          <p:cNvPr id="1026" name="Picture 2" descr="Related image"/>
           <p:cNvPicPr>
             <a:picLocks noChangeAspect="1" noChangeArrowheads="1"/>
           </p:cNvPicPr>
@@ -9268,8 +9447,8 @@
         </p:blipFill>
         <p:spPr bwMode="auto">
           <a:xfrm>
-            <a:off x="1091248" y="1527974"/>
-            <a:ext cx="6406832" cy="4276561"/>
+            <a:off x="435421" y="3213020"/>
+            <a:ext cx="2247900" cy="2933700"/>
           </a:xfrm>
           <a:prstGeom prst="rect">
             <a:avLst/>
@@ -9286,9 +9465,87 @@
           </a:extLst>
         </p:spPr>
       </p:pic>
+      <p:sp>
+        <p:nvSpPr>
+          <p:cNvPr id="13" name="Rectangle 12"/>
+          <p:cNvSpPr/>
+          <p:nvPr/>
+        </p:nvSpPr>
+        <p:spPr>
+          <a:xfrm>
+            <a:off x="435421" y="1117286"/>
+            <a:ext cx="10285412" cy="1938992"/>
+          </a:xfrm>
+          <a:prstGeom prst="rect">
+            <a:avLst/>
+          </a:prstGeom>
+        </p:spPr>
+        <p:txBody>
+          <a:bodyPr wrap="square">
+            <a:spAutoFit/>
+          </a:bodyPr>
+          <a:lstStyle/>
+          <a:p>
+            <a:r>
+              <a:rPr lang="en-US" sz="2000" b="1" dirty="0"/>
+              <a:t>Do you remember, how fun it was to …</a:t>
+            </a:r>
+          </a:p>
+          <a:p>
+            <a:pPr marL="342900" indent="-342900">
+              <a:buFont typeface="Wingdings" panose="05000000000000000000" pitchFamily="2" charset="2"/>
+              <a:buChar char="§"/>
+            </a:pPr>
+            <a:r>
+              <a:rPr lang="en-US" sz="2000" b="1" dirty="0"/>
+              <a:t>start and stop every container?</a:t>
+            </a:r>
+          </a:p>
+          <a:p>
+            <a:pPr marL="342900" indent="-342900">
+              <a:buFont typeface="Wingdings" panose="05000000000000000000" pitchFamily="2" charset="2"/>
+              <a:buChar char="§"/>
+            </a:pPr>
+            <a:r>
+              <a:rPr lang="en-US" sz="2000" b="1" dirty="0"/>
+              <a:t>map ports and don’t get confused?</a:t>
+            </a:r>
+          </a:p>
+          <a:p>
+            <a:pPr marL="342900" indent="-342900">
+              <a:buFont typeface="Wingdings" panose="05000000000000000000" pitchFamily="2" charset="2"/>
+              <a:buChar char="§"/>
+            </a:pPr>
+            <a:r>
+              <a:rPr lang="en-US" sz="2000" b="1" dirty="0"/>
+              <a:t>check the health of a container?</a:t>
+            </a:r>
+          </a:p>
+          <a:p>
+            <a:pPr marL="342900" indent="-342900">
+              <a:buFont typeface="Wingdings" panose="05000000000000000000" pitchFamily="2" charset="2"/>
+              <a:buChar char="§"/>
+            </a:pPr>
+            <a:r>
+              <a:rPr lang="en-US" sz="2000" b="1" dirty="0"/>
+              <a:t>miss a volume on a different host?</a:t>
+            </a:r>
+          </a:p>
+          <a:p>
+            <a:pPr marL="342900" indent="-342900">
+              <a:buFont typeface="Wingdings" panose="05000000000000000000" pitchFamily="2" charset="2"/>
+              <a:buChar char="§"/>
+            </a:pPr>
+            <a:r>
+              <a:rPr lang="en-US" sz="2000" b="1" dirty="0"/>
+              <a:t>…</a:t>
+            </a:r>
+          </a:p>
+        </p:txBody>
+      </p:sp>
       <p:pic>
         <p:nvPicPr>
-          <p:cNvPr id="6" name="Picture 2" descr="Bildergebnis für orchestration"/>
+          <p:cNvPr id="14" name="Picture 2" descr="Related image"/>
           <p:cNvPicPr>
             <a:picLocks noChangeAspect="1" noChangeArrowheads="1"/>
           </p:cNvPicPr>
@@ -9309,8 +9566,8 @@
         </p:blipFill>
         <p:spPr bwMode="auto">
           <a:xfrm>
-            <a:off x="8193088" y="959790"/>
-            <a:ext cx="2947352" cy="1967358"/>
+            <a:off x="3394521" y="3213020"/>
+            <a:ext cx="2247900" cy="2933700"/>
           </a:xfrm>
           <a:prstGeom prst="rect">
             <a:avLst/>
@@ -9329,7 +9586,7 @@
       </p:pic>
       <p:pic>
         <p:nvPicPr>
-          <p:cNvPr id="7" name="Picture 2" descr="Bildergebnis für orchestration"/>
+          <p:cNvPr id="15" name="Picture 2" descr="Related image"/>
           <p:cNvPicPr>
             <a:picLocks noChangeAspect="1" noChangeArrowheads="1"/>
           </p:cNvPicPr>
@@ -9350,8 +9607,8 @@
         </p:blipFill>
         <p:spPr bwMode="auto">
           <a:xfrm>
-            <a:off x="8193088" y="4004817"/>
-            <a:ext cx="2947352" cy="1967358"/>
+            <a:off x="6353621" y="3213020"/>
+            <a:ext cx="2247900" cy="2933700"/>
           </a:xfrm>
           <a:prstGeom prst="rect">
             <a:avLst/>
@@ -9368,6 +9625,47 @@
           </a:extLst>
         </p:spPr>
       </p:pic>
+      <p:pic>
+        <p:nvPicPr>
+          <p:cNvPr id="16" name="Picture 2" descr="Related image"/>
+          <p:cNvPicPr>
+            <a:picLocks noChangeAspect="1" noChangeArrowheads="1"/>
+          </p:cNvPicPr>
+          <p:nvPr/>
+        </p:nvPicPr>
+        <p:blipFill>
+          <a:blip r:embed="rId2">
+            <a:extLst>
+              <a:ext uri="{28A0092B-C50C-407E-A947-70E740481C1C}">
+                <a14:useLocalDpi xmlns:a14="http://schemas.microsoft.com/office/drawing/2010/main" val="0"/>
+              </a:ext>
+            </a:extLst>
+          </a:blip>
+          <a:srcRect/>
+          <a:stretch>
+            <a:fillRect/>
+          </a:stretch>
+        </p:blipFill>
+        <p:spPr bwMode="auto">
+          <a:xfrm>
+            <a:off x="9312721" y="3213020"/>
+            <a:ext cx="2247900" cy="2933700"/>
+          </a:xfrm>
+          <a:prstGeom prst="rect">
+            <a:avLst/>
+          </a:prstGeom>
+          <a:noFill/>
+          <a:extLst>
+            <a:ext uri="{909E8E84-426E-40DD-AFC4-6F175D3DCCD1}">
+              <a14:hiddenFill xmlns:a14="http://schemas.microsoft.com/office/drawing/2010/main">
+                <a:solidFill>
+                  <a:srgbClr val="FFFFFF"/>
+                </a:solidFill>
+              </a14:hiddenFill>
+            </a:ext>
+          </a:extLst>
+        </p:spPr>
+      </p:pic>
     </p:spTree>
     <p:extLst>
       <p:ext uri="{BB962C8B-B14F-4D97-AF65-F5344CB8AC3E}">
@@ -9378,6 +9676,84 @@
   <p:clrMapOvr>
     <a:masterClrMapping/>
   </p:clrMapOvr>
+  <p:timing>
+    <p:tnLst>
+      <p:par>
+        <p:cTn id="1" dur="indefinite" restart="never" nodeType="tmRoot">
+          <p:childTnLst>
+            <p:seq concurrent="1" nextAc="seek">
+              <p:cTn id="2" dur="indefinite" nodeType="mainSeq">
+                <p:childTnLst>
+                  <p:par>
+                    <p:cTn id="3" fill="hold">
+                      <p:stCondLst>
+                        <p:cond delay="indefinite"/>
+                      </p:stCondLst>
+                      <p:childTnLst>
+                        <p:par>
+                          <p:cTn id="4" fill="hold">
+                            <p:stCondLst>
+                              <p:cond delay="0"/>
+                            </p:stCondLst>
+                            <p:childTnLst>
+                              <p:par>
+                                <p:cTn id="5" presetID="1" presetClass="entr" presetSubtype="0" fill="hold" grpId="0" nodeType="clickEffect">
+                                  <p:stCondLst>
+                                    <p:cond delay="0"/>
+                                  </p:stCondLst>
+                                  <p:childTnLst>
+                                    <p:set>
+                                      <p:cBhvr>
+                                        <p:cTn id="6" dur="1" fill="hold">
+                                          <p:stCondLst>
+                                            <p:cond delay="0"/>
+                                          </p:stCondLst>
+                                        </p:cTn>
+                                        <p:tgtEl>
+                                          <p:spTgt spid="13"/>
+                                        </p:tgtEl>
+                                        <p:attrNameLst>
+                                          <p:attrName>style.visibility</p:attrName>
+                                        </p:attrNameLst>
+                                      </p:cBhvr>
+                                      <p:to>
+                                        <p:strVal val="visible"/>
+                                      </p:to>
+                                    </p:set>
+                                  </p:childTnLst>
+                                </p:cTn>
+                              </p:par>
+                            </p:childTnLst>
+                          </p:cTn>
+                        </p:par>
+                      </p:childTnLst>
+                    </p:cTn>
+                  </p:par>
+                </p:childTnLst>
+              </p:cTn>
+              <p:prevCondLst>
+                <p:cond evt="onPrev" delay="0">
+                  <p:tgtEl>
+                    <p:sldTgt/>
+                  </p:tgtEl>
+                </p:cond>
+              </p:prevCondLst>
+              <p:nextCondLst>
+                <p:cond evt="onNext" delay="0">
+                  <p:tgtEl>
+                    <p:sldTgt/>
+                  </p:tgtEl>
+                </p:cond>
+              </p:nextCondLst>
+            </p:seq>
+          </p:childTnLst>
+        </p:cTn>
+      </p:par>
+    </p:tnLst>
+    <p:bldLst>
+      <p:bldP spid="13" grpId="0"/>
+    </p:bldLst>
+  </p:timing>
 </p:sld>
 </file>
 
@@ -9408,314 +9784,150 @@
             <p:ph type="title"/>
           </p:nvPr>
         </p:nvSpPr>
-        <p:spPr/>
+        <p:spPr>
+          <a:xfrm>
+            <a:off x="435421" y="443040"/>
+            <a:ext cx="11186476" cy="369332"/>
+          </a:xfrm>
+        </p:spPr>
         <p:txBody>
           <a:bodyPr/>
           <a:lstStyle/>
           <a:p>
             <a:r>
               <a:rPr lang="en-US" dirty="0"/>
-              <a:t>Some facts about K8s, </a:t>
-            </a:r>
-            <a:r>
-              <a:rPr lang="en-US" dirty="0" err="1"/>
-              <a:t>kubernetes</a:t>
-            </a:r>
-            <a:r>
-              <a:rPr lang="en-US" dirty="0"/>
-              <a:t>, …</a:t>
+              <a:t>Orchestration</a:t>
             </a:r>
           </a:p>
         </p:txBody>
       </p:sp>
-      <p:sp>
-        <p:nvSpPr>
-          <p:cNvPr id="5" name="TextBox 4"/>
-          <p:cNvSpPr txBox="1"/>
+      <p:pic>
+        <p:nvPicPr>
+          <p:cNvPr id="3074" name="Picture 2" descr="Bildergebnis für orchestration"/>
+          <p:cNvPicPr>
+            <a:picLocks noChangeAspect="1" noChangeArrowheads="1"/>
+          </p:cNvPicPr>
           <p:nvPr/>
-        </p:nvSpPr>
-        <p:spPr>
-          <a:xfrm>
-            <a:off x="504001" y="1447800"/>
-            <a:ext cx="9691559" cy="3877985"/>
+        </p:nvPicPr>
+        <p:blipFill>
+          <a:blip r:embed="rId2">
+            <a:extLst>
+              <a:ext uri="{28A0092B-C50C-407E-A947-70E740481C1C}">
+                <a14:useLocalDpi xmlns:a14="http://schemas.microsoft.com/office/drawing/2010/main" val="0"/>
+              </a:ext>
+            </a:extLst>
+          </a:blip>
+          <a:srcRect/>
+          <a:stretch>
+            <a:fillRect/>
+          </a:stretch>
+        </p:blipFill>
+        <p:spPr bwMode="auto">
+          <a:xfrm>
+            <a:off x="1091248" y="1527974"/>
+            <a:ext cx="6406832" cy="4276561"/>
           </a:xfrm>
           <a:prstGeom prst="rect">
             <a:avLst/>
           </a:prstGeom>
           <a:noFill/>
-        </p:spPr>
-        <p:txBody>
-          <a:bodyPr wrap="square" lIns="0" tIns="0" rIns="0" bIns="0" rtlCol="0">
-            <a:spAutoFit/>
-          </a:bodyPr>
-          <a:lstStyle/>
-          <a:p>
-            <a:pPr marL="285750" indent="-285750" fontAlgn="base">
-              <a:spcBef>
-                <a:spcPct val="50000"/>
-              </a:spcBef>
-              <a:spcAft>
-                <a:spcPct val="0"/>
-              </a:spcAft>
-              <a:buClr>
-                <a:schemeClr val="tx1"/>
-              </a:buClr>
-              <a:buSzPct val="100000"/>
-              <a:buFont typeface="Wingdings" panose="05000000000000000000" pitchFamily="2" charset="2"/>
-              <a:buChar char="§"/>
-            </a:pPr>
-            <a:r>
-              <a:rPr lang="en-US" sz="1800" kern="0" dirty="0">
-                <a:ea typeface="Arial Unicode MS" pitchFamily="34" charset="-128"/>
-                <a:cs typeface="Arial Unicode MS" pitchFamily="34" charset="-128"/>
-              </a:rPr>
-              <a:t>Kubernetes = Greek for “helmsman” or “pilot”</a:t>
-            </a:r>
-          </a:p>
-          <a:p>
-            <a:pPr marL="285750" indent="-285750" fontAlgn="base">
-              <a:spcBef>
-                <a:spcPct val="50000"/>
-              </a:spcBef>
-              <a:spcAft>
-                <a:spcPct val="0"/>
-              </a:spcAft>
-              <a:buClr>
-                <a:schemeClr val="tx1"/>
-              </a:buClr>
-              <a:buSzPct val="100000"/>
-              <a:buFont typeface="Wingdings" panose="05000000000000000000" pitchFamily="2" charset="2"/>
-              <a:buChar char="§"/>
-            </a:pPr>
-            <a:r>
-              <a:rPr lang="en-US" sz="1800" kern="0" dirty="0">
-                <a:ea typeface="Arial Unicode MS" pitchFamily="34" charset="-128"/>
-                <a:cs typeface="Arial Unicode MS" pitchFamily="34" charset="-128"/>
-              </a:rPr>
-              <a:t>Based on Google’s Borg – a cluster manager for container orchestration</a:t>
-            </a:r>
-          </a:p>
-          <a:p>
-            <a:pPr marL="285750" indent="-285750" fontAlgn="base">
-              <a:spcBef>
-                <a:spcPct val="50000"/>
-              </a:spcBef>
-              <a:spcAft>
-                <a:spcPct val="0"/>
-              </a:spcAft>
-              <a:buClr>
-                <a:schemeClr val="tx1"/>
-              </a:buClr>
-              <a:buSzPct val="100000"/>
-              <a:buFont typeface="Wingdings" panose="05000000000000000000" pitchFamily="2" charset="2"/>
-              <a:buChar char="§"/>
-            </a:pPr>
-            <a:r>
-              <a:rPr lang="en-US" sz="1800" kern="0" dirty="0">
-                <a:ea typeface="Arial Unicode MS" pitchFamily="34" charset="-128"/>
-                <a:cs typeface="Arial Unicode MS" pitchFamily="34" charset="-128"/>
-              </a:rPr>
-              <a:t>Open sourced by Google and firstly announced in 2014</a:t>
-            </a:r>
-          </a:p>
-          <a:p>
-            <a:pPr marL="285750" indent="-285750" fontAlgn="base">
-              <a:spcBef>
-                <a:spcPct val="50000"/>
-              </a:spcBef>
-              <a:spcAft>
-                <a:spcPct val="0"/>
-              </a:spcAft>
-              <a:buClr>
-                <a:schemeClr val="tx1"/>
-              </a:buClr>
-              <a:buSzPct val="100000"/>
-              <a:buFont typeface="Wingdings" panose="05000000000000000000" pitchFamily="2" charset="2"/>
-              <a:buChar char="§"/>
-            </a:pPr>
-            <a:r>
-              <a:rPr lang="en-US" sz="1800" kern="0" dirty="0">
-                <a:ea typeface="Arial Unicode MS" pitchFamily="34" charset="-128"/>
-                <a:cs typeface="Arial Unicode MS" pitchFamily="34" charset="-128"/>
-              </a:rPr>
-              <a:t>v1.0 was released in July 2015</a:t>
-            </a:r>
-          </a:p>
-          <a:p>
-            <a:pPr marL="285750" indent="-285750" fontAlgn="base">
-              <a:spcBef>
-                <a:spcPct val="50000"/>
-              </a:spcBef>
-              <a:spcAft>
-                <a:spcPct val="0"/>
-              </a:spcAft>
-              <a:buClr>
-                <a:schemeClr val="tx1"/>
-              </a:buClr>
-              <a:buSzPct val="100000"/>
-              <a:buFont typeface="Wingdings" panose="05000000000000000000" pitchFamily="2" charset="2"/>
-              <a:buChar char="§"/>
-            </a:pPr>
-            <a:r>
-              <a:rPr lang="en-US" sz="1800" kern="0" dirty="0">
-                <a:ea typeface="Arial Unicode MS" pitchFamily="34" charset="-128"/>
-                <a:cs typeface="Arial Unicode MS" pitchFamily="34" charset="-128"/>
-              </a:rPr>
-              <a:t>By now K8s is governed by the Cloud Native Computing Foundation (CNF)</a:t>
-            </a:r>
-          </a:p>
-          <a:p>
-            <a:pPr marL="285750" indent="-285750" fontAlgn="base">
-              <a:spcBef>
-                <a:spcPct val="50000"/>
-              </a:spcBef>
-              <a:spcAft>
-                <a:spcPct val="0"/>
-              </a:spcAft>
-              <a:buClr>
-                <a:schemeClr val="tx1"/>
-              </a:buClr>
-              <a:buSzPct val="100000"/>
-              <a:buFont typeface="Wingdings" panose="05000000000000000000" pitchFamily="2" charset="2"/>
-              <a:buChar char="§"/>
-            </a:pPr>
-            <a:r>
-              <a:rPr lang="en-US" sz="1800" kern="0" dirty="0">
-                <a:ea typeface="Arial Unicode MS" pitchFamily="34" charset="-128"/>
-                <a:cs typeface="Arial Unicode MS" pitchFamily="34" charset="-128"/>
-              </a:rPr>
-              <a:t>Vanilla Kubernetes is the basis for commercial products like </a:t>
-            </a:r>
-            <a:r>
-              <a:rPr lang="en-US" sz="1800" kern="0" dirty="0" err="1">
-                <a:ea typeface="Arial Unicode MS" pitchFamily="34" charset="-128"/>
-                <a:cs typeface="Arial Unicode MS" pitchFamily="34" charset="-128"/>
-              </a:rPr>
-              <a:t>RedHat’s</a:t>
-            </a:r>
-            <a:r>
-              <a:rPr lang="en-US" sz="1800" kern="0" dirty="0">
-                <a:ea typeface="Arial Unicode MS" pitchFamily="34" charset="-128"/>
-                <a:cs typeface="Arial Unicode MS" pitchFamily="34" charset="-128"/>
-              </a:rPr>
-              <a:t> </a:t>
-            </a:r>
-            <a:r>
-              <a:rPr lang="en-US" sz="1800" kern="0" dirty="0" err="1">
-                <a:ea typeface="Arial Unicode MS" pitchFamily="34" charset="-128"/>
-                <a:cs typeface="Arial Unicode MS" pitchFamily="34" charset="-128"/>
-              </a:rPr>
-              <a:t>Openshift</a:t>
-            </a:r>
-            <a:r>
-              <a:rPr lang="en-US" sz="1800" kern="0" dirty="0">
-                <a:ea typeface="Arial Unicode MS" pitchFamily="34" charset="-128"/>
-                <a:cs typeface="Arial Unicode MS" pitchFamily="34" charset="-128"/>
-              </a:rPr>
-              <a:t> or CoreOS’ tectonic</a:t>
-            </a:r>
-          </a:p>
-          <a:p>
-            <a:pPr marL="285750" indent="-285750" fontAlgn="base">
-              <a:spcBef>
-                <a:spcPct val="50000"/>
-              </a:spcBef>
-              <a:spcAft>
-                <a:spcPct val="0"/>
-              </a:spcAft>
-              <a:buClr>
-                <a:schemeClr val="tx1"/>
-              </a:buClr>
-              <a:buSzPct val="100000"/>
-              <a:buFont typeface="Wingdings" panose="05000000000000000000" pitchFamily="2" charset="2"/>
-              <a:buChar char="§"/>
-            </a:pPr>
-            <a:r>
-              <a:rPr lang="en-US" sz="1800" kern="0" dirty="0">
-                <a:ea typeface="Arial Unicode MS" pitchFamily="34" charset="-128"/>
-                <a:cs typeface="Arial Unicode MS" pitchFamily="34" charset="-128"/>
-              </a:rPr>
-              <a:t>New minor releases roughly every 3 month</a:t>
-            </a:r>
-          </a:p>
-          <a:p>
-            <a:pPr marL="285750" indent="-285750" fontAlgn="base">
-              <a:spcBef>
-                <a:spcPct val="50000"/>
-              </a:spcBef>
-              <a:spcAft>
-                <a:spcPct val="0"/>
-              </a:spcAft>
-              <a:buClr>
-                <a:schemeClr val="tx1"/>
-              </a:buClr>
-              <a:buSzPct val="100000"/>
-              <a:buFont typeface="Wingdings" panose="05000000000000000000" pitchFamily="2" charset="2"/>
-              <a:buChar char="§"/>
-            </a:pPr>
-            <a:r>
-              <a:rPr lang="en-US" sz="1800" kern="0" dirty="0">
-                <a:ea typeface="Arial Unicode MS" pitchFamily="34" charset="-128"/>
-                <a:cs typeface="Arial Unicode MS" pitchFamily="34" charset="-128"/>
-              </a:rPr>
-              <a:t>Extensive list of beta features</a:t>
-            </a:r>
-          </a:p>
-          <a:p>
-            <a:pPr marL="285750" indent="-285750" fontAlgn="base">
-              <a:spcBef>
-                <a:spcPct val="50000"/>
-              </a:spcBef>
-              <a:spcAft>
-                <a:spcPct val="0"/>
-              </a:spcAft>
-              <a:buClr>
-                <a:schemeClr val="tx1"/>
-              </a:buClr>
-              <a:buSzPct val="100000"/>
-              <a:buFont typeface="Wingdings" panose="05000000000000000000" pitchFamily="2" charset="2"/>
-              <a:buChar char="§"/>
-            </a:pPr>
-            <a:r>
-              <a:rPr lang="en-US" sz="1800" kern="0" dirty="0">
-                <a:ea typeface="Arial Unicode MS" pitchFamily="34" charset="-128"/>
-                <a:cs typeface="Arial Unicode MS" pitchFamily="34" charset="-128"/>
-              </a:rPr>
-              <a:t>Documentation: </a:t>
-            </a:r>
-            <a:r>
-              <a:rPr lang="en-US" sz="1800" kern="0" dirty="0">
-                <a:ea typeface="Arial Unicode MS" pitchFamily="34" charset="-128"/>
-                <a:cs typeface="Arial Unicode MS" pitchFamily="34" charset="-128"/>
-                <a:hlinkClick r:id="rId2"/>
-              </a:rPr>
-              <a:t>https://kubernetes.io/docs/home/</a:t>
-            </a:r>
-            <a:r>
-              <a:rPr lang="en-US" sz="1800" kern="0" dirty="0">
-                <a:ea typeface="Arial Unicode MS" pitchFamily="34" charset="-128"/>
-                <a:cs typeface="Arial Unicode MS" pitchFamily="34" charset="-128"/>
-              </a:rPr>
-              <a:t> - concepts, tasks</a:t>
-            </a:r>
-            <a:r>
-              <a:rPr lang="en-US" sz="1800" kern="0">
-                <a:ea typeface="Arial Unicode MS" pitchFamily="34" charset="-128"/>
-                <a:cs typeface="Arial Unicode MS" pitchFamily="34" charset="-128"/>
-              </a:rPr>
-              <a:t>, API reference</a:t>
-            </a:r>
-            <a:endParaRPr lang="en-US" sz="1800" kern="0" dirty="0">
-              <a:ea typeface="Arial Unicode MS" pitchFamily="34" charset="-128"/>
-              <a:cs typeface="Arial Unicode MS" pitchFamily="34" charset="-128"/>
-            </a:endParaRPr>
-          </a:p>
-        </p:txBody>
-      </p:sp>
+          <a:extLst>
+            <a:ext uri="{909E8E84-426E-40DD-AFC4-6F175D3DCCD1}">
+              <a14:hiddenFill xmlns:a14="http://schemas.microsoft.com/office/drawing/2010/main">
+                <a:solidFill>
+                  <a:srgbClr val="FFFFFF"/>
+                </a:solidFill>
+              </a14:hiddenFill>
+            </a:ext>
+          </a:extLst>
+        </p:spPr>
+      </p:pic>
+      <p:pic>
+        <p:nvPicPr>
+          <p:cNvPr id="6" name="Picture 2" descr="Bildergebnis für orchestration"/>
+          <p:cNvPicPr>
+            <a:picLocks noChangeAspect="1" noChangeArrowheads="1"/>
+          </p:cNvPicPr>
+          <p:nvPr/>
+        </p:nvPicPr>
+        <p:blipFill>
+          <a:blip r:embed="rId2">
+            <a:extLst>
+              <a:ext uri="{28A0092B-C50C-407E-A947-70E740481C1C}">
+                <a14:useLocalDpi xmlns:a14="http://schemas.microsoft.com/office/drawing/2010/main" val="0"/>
+              </a:ext>
+            </a:extLst>
+          </a:blip>
+          <a:srcRect/>
+          <a:stretch>
+            <a:fillRect/>
+          </a:stretch>
+        </p:blipFill>
+        <p:spPr bwMode="auto">
+          <a:xfrm>
+            <a:off x="8193088" y="959790"/>
+            <a:ext cx="2947352" cy="1967358"/>
+          </a:xfrm>
+          <a:prstGeom prst="rect">
+            <a:avLst/>
+          </a:prstGeom>
+          <a:noFill/>
+          <a:extLst>
+            <a:ext uri="{909E8E84-426E-40DD-AFC4-6F175D3DCCD1}">
+              <a14:hiddenFill xmlns:a14="http://schemas.microsoft.com/office/drawing/2010/main">
+                <a:solidFill>
+                  <a:srgbClr val="FFFFFF"/>
+                </a:solidFill>
+              </a14:hiddenFill>
+            </a:ext>
+          </a:extLst>
+        </p:spPr>
+      </p:pic>
+      <p:pic>
+        <p:nvPicPr>
+          <p:cNvPr id="7" name="Picture 2" descr="Bildergebnis für orchestration"/>
+          <p:cNvPicPr>
+            <a:picLocks noChangeAspect="1" noChangeArrowheads="1"/>
+          </p:cNvPicPr>
+          <p:nvPr/>
+        </p:nvPicPr>
+        <p:blipFill>
+          <a:blip r:embed="rId2">
+            <a:extLst>
+              <a:ext uri="{28A0092B-C50C-407E-A947-70E740481C1C}">
+                <a14:useLocalDpi xmlns:a14="http://schemas.microsoft.com/office/drawing/2010/main" val="0"/>
+              </a:ext>
+            </a:extLst>
+          </a:blip>
+          <a:srcRect/>
+          <a:stretch>
+            <a:fillRect/>
+          </a:stretch>
+        </p:blipFill>
+        <p:spPr bwMode="auto">
+          <a:xfrm>
+            <a:off x="8193088" y="4004817"/>
+            <a:ext cx="2947352" cy="1967358"/>
+          </a:xfrm>
+          <a:prstGeom prst="rect">
+            <a:avLst/>
+          </a:prstGeom>
+          <a:noFill/>
+          <a:extLst>
+            <a:ext uri="{909E8E84-426E-40DD-AFC4-6F175D3DCCD1}">
+              <a14:hiddenFill xmlns:a14="http://schemas.microsoft.com/office/drawing/2010/main">
+                <a:solidFill>
+                  <a:srgbClr val="FFFFFF"/>
+                </a:solidFill>
+              </a14:hiddenFill>
+            </a:ext>
+          </a:extLst>
+        </p:spPr>
+      </p:pic>
     </p:spTree>
     <p:extLst>
       <p:ext uri="{BB962C8B-B14F-4D97-AF65-F5344CB8AC3E}">
-        <p14:creationId xmlns:p14="http://schemas.microsoft.com/office/powerpoint/2010/main" val="3263224504"/>
+        <p14:creationId xmlns:p14="http://schemas.microsoft.com/office/powerpoint/2010/main" val="290894176"/>
       </p:ext>
     </p:extLst>
   </p:cSld>
@@ -9759,133 +9971,302 @@
           <a:p>
             <a:r>
               <a:rPr lang="en-US" dirty="0"/>
-              <a:t>If it doesn’t work as expected …</a:t>
+              <a:t>Some facts about K8s, </a:t>
+            </a:r>
+            <a:r>
+              <a:rPr lang="en-US" dirty="0" err="1"/>
+              <a:t>kubernetes</a:t>
+            </a:r>
+            <a:r>
+              <a:rPr lang="en-US" dirty="0"/>
+              <a:t>, …</a:t>
             </a:r>
           </a:p>
         </p:txBody>
       </p:sp>
       <p:sp>
         <p:nvSpPr>
-          <p:cNvPr id="3" name="Rectangle 2"/>
-          <p:cNvSpPr/>
+          <p:cNvPr id="5" name="TextBox 4"/>
+          <p:cNvSpPr txBox="1"/>
           <p:nvPr/>
         </p:nvSpPr>
         <p:spPr>
           <a:xfrm>
-            <a:off x="504001" y="5851688"/>
-            <a:ext cx="9554399" cy="415498"/>
+            <a:off x="504001" y="1447800"/>
+            <a:ext cx="9691559" cy="3877985"/>
           </a:xfrm>
           <a:prstGeom prst="rect">
             <a:avLst/>
           </a:prstGeom>
+          <a:noFill/>
         </p:spPr>
         <p:txBody>
-          <a:bodyPr wrap="square">
+          <a:bodyPr wrap="square" lIns="0" tIns="0" rIns="0" bIns="0" rtlCol="0">
             <a:spAutoFit/>
           </a:bodyPr>
           <a:lstStyle/>
           <a:p>
-            <a:r>
-              <a:rPr lang="en-US" dirty="0">
+            <a:pPr marL="285750" indent="-285750" fontAlgn="base">
+              <a:spcBef>
+                <a:spcPct val="50000"/>
+              </a:spcBef>
+              <a:spcAft>
+                <a:spcPct val="0"/>
+              </a:spcAft>
+              <a:buClr>
+                <a:schemeClr val="tx1"/>
+              </a:buClr>
+              <a:buSzPct val="100000"/>
+              <a:buFont typeface="Wingdings" panose="05000000000000000000" pitchFamily="2" charset="2"/>
+              <a:buChar char="§"/>
+            </a:pPr>
+            <a:r>
+              <a:rPr lang="en-US" sz="1800" kern="0" dirty="0">
+                <a:ea typeface="Arial Unicode MS" pitchFamily="34" charset="-128"/>
+                <a:cs typeface="Arial Unicode MS" pitchFamily="34" charset="-128"/>
+              </a:rPr>
+              <a:t>Kubernetes = Greek for “helmsman” or “pilot”</a:t>
+            </a:r>
+          </a:p>
+          <a:p>
+            <a:pPr marL="285750" indent="-285750" fontAlgn="base">
+              <a:spcBef>
+                <a:spcPct val="50000"/>
+              </a:spcBef>
+              <a:spcAft>
+                <a:spcPct val="0"/>
+              </a:spcAft>
+              <a:buClr>
+                <a:schemeClr val="tx1"/>
+              </a:buClr>
+              <a:buSzPct val="100000"/>
+              <a:buFont typeface="Wingdings" panose="05000000000000000000" pitchFamily="2" charset="2"/>
+              <a:buChar char="§"/>
+            </a:pPr>
+            <a:r>
+              <a:rPr lang="en-US" sz="1800" kern="0" dirty="0">
+                <a:ea typeface="Arial Unicode MS" pitchFamily="34" charset="-128"/>
+                <a:cs typeface="Arial Unicode MS" pitchFamily="34" charset="-128"/>
+              </a:rPr>
+              <a:t>Based on Google’s Borg – a cluster manager for container orchestration</a:t>
+            </a:r>
+          </a:p>
+          <a:p>
+            <a:pPr marL="285750" indent="-285750" fontAlgn="base">
+              <a:spcBef>
+                <a:spcPct val="50000"/>
+              </a:spcBef>
+              <a:spcAft>
+                <a:spcPct val="0"/>
+              </a:spcAft>
+              <a:buClr>
+                <a:schemeClr val="tx1"/>
+              </a:buClr>
+              <a:buSzPct val="100000"/>
+              <a:buFont typeface="Wingdings" panose="05000000000000000000" pitchFamily="2" charset="2"/>
+              <a:buChar char="§"/>
+            </a:pPr>
+            <a:r>
+              <a:rPr lang="en-US" sz="1800" kern="0" dirty="0">
+                <a:ea typeface="Arial Unicode MS" pitchFamily="34" charset="-128"/>
+                <a:cs typeface="Arial Unicode MS" pitchFamily="34" charset="-128"/>
+              </a:rPr>
+              <a:t>Open sourced by Google and firstly announced in 2014</a:t>
+            </a:r>
+          </a:p>
+          <a:p>
+            <a:pPr marL="285750" indent="-285750" fontAlgn="base">
+              <a:spcBef>
+                <a:spcPct val="50000"/>
+              </a:spcBef>
+              <a:spcAft>
+                <a:spcPct val="0"/>
+              </a:spcAft>
+              <a:buClr>
+                <a:schemeClr val="tx1"/>
+              </a:buClr>
+              <a:buSzPct val="100000"/>
+              <a:buFont typeface="Wingdings" panose="05000000000000000000" pitchFamily="2" charset="2"/>
+              <a:buChar char="§"/>
+            </a:pPr>
+            <a:r>
+              <a:rPr lang="en-US" sz="1800" kern="0" dirty="0">
+                <a:ea typeface="Arial Unicode MS" pitchFamily="34" charset="-128"/>
+                <a:cs typeface="Arial Unicode MS" pitchFamily="34" charset="-128"/>
+              </a:rPr>
+              <a:t>v1.0 was released in July 2015</a:t>
+            </a:r>
+          </a:p>
+          <a:p>
+            <a:pPr marL="285750" indent="-285750" fontAlgn="base">
+              <a:spcBef>
+                <a:spcPct val="50000"/>
+              </a:spcBef>
+              <a:spcAft>
+                <a:spcPct val="0"/>
+              </a:spcAft>
+              <a:buClr>
+                <a:schemeClr val="tx1"/>
+              </a:buClr>
+              <a:buSzPct val="100000"/>
+              <a:buFont typeface="Wingdings" panose="05000000000000000000" pitchFamily="2" charset="2"/>
+              <a:buChar char="§"/>
+            </a:pPr>
+            <a:r>
+              <a:rPr lang="en-US" sz="1800" kern="0" dirty="0">
+                <a:ea typeface="Arial Unicode MS" pitchFamily="34" charset="-128"/>
+                <a:cs typeface="Arial Unicode MS" pitchFamily="34" charset="-128"/>
+              </a:rPr>
+              <a:t>By now K8s is governed by the Cloud Native Computing Foundation </a:t>
+            </a:r>
+            <a:r>
+              <a:rPr lang="en-US" sz="1800" kern="0">
+                <a:ea typeface="Arial Unicode MS" pitchFamily="34" charset="-128"/>
+                <a:cs typeface="Arial Unicode MS" pitchFamily="34" charset="-128"/>
+              </a:rPr>
+              <a:t>(CNCF</a:t>
+            </a:r>
+            <a:r>
+              <a:rPr lang="en-US" sz="1800" kern="0" dirty="0">
+                <a:ea typeface="Arial Unicode MS" pitchFamily="34" charset="-128"/>
+                <a:cs typeface="Arial Unicode MS" pitchFamily="34" charset="-128"/>
+              </a:rPr>
+              <a:t>)</a:t>
+            </a:r>
+          </a:p>
+          <a:p>
+            <a:pPr marL="285750" indent="-285750" fontAlgn="base">
+              <a:spcBef>
+                <a:spcPct val="50000"/>
+              </a:spcBef>
+              <a:spcAft>
+                <a:spcPct val="0"/>
+              </a:spcAft>
+              <a:buClr>
+                <a:schemeClr val="tx1"/>
+              </a:buClr>
+              <a:buSzPct val="100000"/>
+              <a:buFont typeface="Wingdings" panose="05000000000000000000" pitchFamily="2" charset="2"/>
+              <a:buChar char="§"/>
+            </a:pPr>
+            <a:r>
+              <a:rPr lang="en-US" sz="1800" kern="0" dirty="0">
+                <a:ea typeface="Arial Unicode MS" pitchFamily="34" charset="-128"/>
+                <a:cs typeface="Arial Unicode MS" pitchFamily="34" charset="-128"/>
+              </a:rPr>
+              <a:t>Vanilla Kubernetes is the basis for commercial products like </a:t>
+            </a:r>
+            <a:r>
+              <a:rPr lang="en-US" sz="1800" kern="0" dirty="0" err="1">
+                <a:ea typeface="Arial Unicode MS" pitchFamily="34" charset="-128"/>
+                <a:cs typeface="Arial Unicode MS" pitchFamily="34" charset="-128"/>
+              </a:rPr>
+              <a:t>RedHat’s</a:t>
+            </a:r>
+            <a:r>
+              <a:rPr lang="en-US" sz="1800" kern="0" dirty="0">
+                <a:ea typeface="Arial Unicode MS" pitchFamily="34" charset="-128"/>
+                <a:cs typeface="Arial Unicode MS" pitchFamily="34" charset="-128"/>
+              </a:rPr>
+              <a:t> </a:t>
+            </a:r>
+            <a:r>
+              <a:rPr lang="en-US" sz="1800" kern="0" dirty="0" err="1">
+                <a:ea typeface="Arial Unicode MS" pitchFamily="34" charset="-128"/>
+                <a:cs typeface="Arial Unicode MS" pitchFamily="34" charset="-128"/>
+              </a:rPr>
+              <a:t>Openshift</a:t>
+            </a:r>
+            <a:r>
+              <a:rPr lang="en-US" sz="1800" kern="0" dirty="0">
+                <a:ea typeface="Arial Unicode MS" pitchFamily="34" charset="-128"/>
+                <a:cs typeface="Arial Unicode MS" pitchFamily="34" charset="-128"/>
+              </a:rPr>
+              <a:t> or CoreOS’ tectonic</a:t>
+            </a:r>
+          </a:p>
+          <a:p>
+            <a:pPr marL="285750" indent="-285750" fontAlgn="base">
+              <a:spcBef>
+                <a:spcPct val="50000"/>
+              </a:spcBef>
+              <a:spcAft>
+                <a:spcPct val="0"/>
+              </a:spcAft>
+              <a:buClr>
+                <a:schemeClr val="tx1"/>
+              </a:buClr>
+              <a:buSzPct val="100000"/>
+              <a:buFont typeface="Wingdings" panose="05000000000000000000" pitchFamily="2" charset="2"/>
+              <a:buChar char="§"/>
+            </a:pPr>
+            <a:r>
+              <a:rPr lang="en-US" sz="1800" kern="0" dirty="0">
+                <a:ea typeface="Arial Unicode MS" pitchFamily="34" charset="-128"/>
+                <a:cs typeface="Arial Unicode MS" pitchFamily="34" charset="-128"/>
+              </a:rPr>
+              <a:t>New minor releases roughly every 3 month</a:t>
+            </a:r>
+          </a:p>
+          <a:p>
+            <a:pPr marL="285750" indent="-285750" fontAlgn="base">
+              <a:spcBef>
+                <a:spcPct val="50000"/>
+              </a:spcBef>
+              <a:spcAft>
+                <a:spcPct val="0"/>
+              </a:spcAft>
+              <a:buClr>
+                <a:schemeClr val="tx1"/>
+              </a:buClr>
+              <a:buSzPct val="100000"/>
+              <a:buFont typeface="Wingdings" panose="05000000000000000000" pitchFamily="2" charset="2"/>
+              <a:buChar char="§"/>
+            </a:pPr>
+            <a:r>
+              <a:rPr lang="en-US" sz="1800" kern="0" dirty="0">
+                <a:ea typeface="Arial Unicode MS" pitchFamily="34" charset="-128"/>
+                <a:cs typeface="Arial Unicode MS" pitchFamily="34" charset="-128"/>
+              </a:rPr>
+              <a:t>Extensive list of beta features</a:t>
+            </a:r>
+          </a:p>
+          <a:p>
+            <a:pPr marL="285750" indent="-285750" fontAlgn="base">
+              <a:spcBef>
+                <a:spcPct val="50000"/>
+              </a:spcBef>
+              <a:spcAft>
+                <a:spcPct val="0"/>
+              </a:spcAft>
+              <a:buClr>
+                <a:schemeClr val="tx1"/>
+              </a:buClr>
+              <a:buSzPct val="100000"/>
+              <a:buFont typeface="Wingdings" panose="05000000000000000000" pitchFamily="2" charset="2"/>
+              <a:buChar char="§"/>
+            </a:pPr>
+            <a:r>
+              <a:rPr lang="en-US" sz="1800" kern="0" dirty="0">
+                <a:ea typeface="Arial Unicode MS" pitchFamily="34" charset="-128"/>
+                <a:cs typeface="Arial Unicode MS" pitchFamily="34" charset="-128"/>
+              </a:rPr>
+              <a:t>Documentation: </a:t>
+            </a:r>
+            <a:r>
+              <a:rPr lang="en-US" sz="1800" kern="0" dirty="0">
+                <a:ea typeface="Arial Unicode MS" pitchFamily="34" charset="-128"/>
+                <a:cs typeface="Arial Unicode MS" pitchFamily="34" charset="-128"/>
                 <a:hlinkClick r:id="rId2"/>
               </a:rPr>
-              <a:t>https://github.com/kubernetes/community/blob/master/communication.md</a:t>
-            </a:r>
-            <a:r>
-              <a:rPr lang="en-US" dirty="0"/>
-              <a:t> </a:t>
-            </a:r>
-          </a:p>
-        </p:txBody>
-      </p:sp>
-      <p:pic>
-        <p:nvPicPr>
-          <p:cNvPr id="4" name="Picture 3"/>
-          <p:cNvPicPr>
-            <a:picLocks noChangeAspect="1"/>
-          </p:cNvPicPr>
-          <p:nvPr/>
-        </p:nvPicPr>
-        <p:blipFill>
-          <a:blip r:embed="rId3"/>
-          <a:stretch>
-            <a:fillRect/>
-          </a:stretch>
-        </p:blipFill>
-        <p:spPr>
-          <a:xfrm>
-            <a:off x="504001" y="1170215"/>
-            <a:ext cx="9249599" cy="3520576"/>
-          </a:xfrm>
-          <a:prstGeom prst="rect">
-            <a:avLst/>
-          </a:prstGeom>
-        </p:spPr>
-      </p:pic>
-      <p:sp>
-        <p:nvSpPr>
-          <p:cNvPr id="5" name="Rectangle 4"/>
-          <p:cNvSpPr/>
-          <p:nvPr/>
-        </p:nvSpPr>
-        <p:spPr>
-          <a:xfrm>
-            <a:off x="504001" y="5298469"/>
-            <a:ext cx="3788217" cy="415498"/>
-          </a:xfrm>
-          <a:prstGeom prst="rect">
-            <a:avLst/>
-          </a:prstGeom>
-        </p:spPr>
-        <p:txBody>
-          <a:bodyPr wrap="none">
-            <a:spAutoFit/>
-          </a:bodyPr>
-          <a:lstStyle/>
-          <a:p>
-            <a:r>
-              <a:rPr lang="en-US" dirty="0">
-                <a:hlinkClick r:id="rId4"/>
+              <a:t>https://kubernetes.io/docs/home/</a:t>
+            </a:r>
+            <a:r>
+              <a:rPr lang="en-US" sz="1800" kern="0" dirty="0">
+                <a:ea typeface="Arial Unicode MS" pitchFamily="34" charset="-128"/>
+                <a:cs typeface="Arial Unicode MS" pitchFamily="34" charset="-128"/>
               </a:rPr>
-              <a:t>https://github.com/kubernetes</a:t>
-            </a:r>
-            <a:r>
-              <a:rPr lang="en-US" dirty="0"/>
-              <a:t> </a:t>
-            </a:r>
-          </a:p>
-        </p:txBody>
-      </p:sp>
-      <p:sp>
-        <p:nvSpPr>
-          <p:cNvPr id="6" name="Rectangle 5"/>
-          <p:cNvSpPr/>
-          <p:nvPr/>
-        </p:nvSpPr>
-        <p:spPr>
-          <a:xfrm>
-            <a:off x="504000" y="4767554"/>
-            <a:ext cx="8792399" cy="415498"/>
-          </a:xfrm>
-          <a:prstGeom prst="rect">
-            <a:avLst/>
-          </a:prstGeom>
-        </p:spPr>
-        <p:txBody>
-          <a:bodyPr wrap="square">
-            <a:spAutoFit/>
-          </a:bodyPr>
-          <a:lstStyle/>
-          <a:p>
-            <a:r>
-              <a:rPr lang="en-US" dirty="0">
-                <a:hlinkClick r:id="rId5"/>
-              </a:rPr>
-              <a:t>https://groups.google.com/forum/#!forum/kubernetes-users</a:t>
-            </a:r>
-            <a:r>
-              <a:rPr lang="en-US" dirty="0"/>
-              <a:t> </a:t>
+              <a:t> - concepts, tasks, API reference</a:t>
             </a:r>
           </a:p>
         </p:txBody>
@@ -9893,7 +10274,7 @@
     </p:spTree>
     <p:extLst>
       <p:ext uri="{BB962C8B-B14F-4D97-AF65-F5344CB8AC3E}">
-        <p14:creationId xmlns:p14="http://schemas.microsoft.com/office/powerpoint/2010/main" val="2777277099"/>
+        <p14:creationId xmlns:p14="http://schemas.microsoft.com/office/powerpoint/2010/main" val="3263224504"/>
       </p:ext>
     </p:extLst>
   </p:cSld>

</xml_diff>

<commit_message>
fixes & updates for exercise prep
</commit_message>
<xml_diff>
--- a/kubernetes/00_intro.pptx
+++ b/kubernetes/00_intro.pptx
@@ -5,10 +5,10 @@
     <p:sldMasterId id="2147483733" r:id="rId1"/>
   </p:sldMasterIdLst>
   <p:notesMasterIdLst>
-    <p:notesMasterId r:id="rId13"/>
+    <p:notesMasterId r:id="rId14"/>
   </p:notesMasterIdLst>
   <p:handoutMasterIdLst>
-    <p:handoutMasterId r:id="rId14"/>
+    <p:handoutMasterId r:id="rId15"/>
   </p:handoutMasterIdLst>
   <p:sldIdLst>
     <p:sldId id="433" r:id="rId2"/>
@@ -18,10 +18,11 @@
     <p:sldId id="445" r:id="rId6"/>
     <p:sldId id="442" r:id="rId7"/>
     <p:sldId id="446" r:id="rId8"/>
-    <p:sldId id="449" r:id="rId9"/>
-    <p:sldId id="447" r:id="rId10"/>
-    <p:sldId id="448" r:id="rId11"/>
-    <p:sldId id="265" r:id="rId12"/>
+    <p:sldId id="450" r:id="rId9"/>
+    <p:sldId id="449" r:id="rId10"/>
+    <p:sldId id="447" r:id="rId11"/>
+    <p:sldId id="448" r:id="rId12"/>
+    <p:sldId id="265" r:id="rId13"/>
   </p:sldIdLst>
   <p:sldSz cx="12195175" cy="6858000"/>
   <p:notesSz cx="6858000" cy="9144000"/>
@@ -560,7 +561,7 @@
             <a:fld id="{7D8C2C35-2B8A-446E-BEC0-FD36716C29AC}" type="slidenum">
               <a:rPr lang="de-DE" smtClean="0"/>
               <a:pPr/>
-              <a:t>11</a:t>
+              <a:t>12</a:t>
             </a:fld>
             <a:endParaRPr lang="de-DE" dirty="0"/>
           </a:p>
@@ -8251,6 +8252,339 @@
           <a:p>
             <a:r>
               <a:rPr lang="en-US" dirty="0"/>
+              <a:t>Some facts about K8s, </a:t>
+            </a:r>
+            <a:r>
+              <a:rPr lang="en-US" dirty="0" err="1"/>
+              <a:t>kubernetes</a:t>
+            </a:r>
+            <a:r>
+              <a:rPr lang="en-US" dirty="0"/>
+              <a:t>, …</a:t>
+            </a:r>
+          </a:p>
+        </p:txBody>
+      </p:sp>
+      <p:sp>
+        <p:nvSpPr>
+          <p:cNvPr id="5" name="TextBox 4"/>
+          <p:cNvSpPr txBox="1"/>
+          <p:nvPr/>
+        </p:nvSpPr>
+        <p:spPr>
+          <a:xfrm>
+            <a:off x="504001" y="1447800"/>
+            <a:ext cx="9691559" cy="3877985"/>
+          </a:xfrm>
+          <a:prstGeom prst="rect">
+            <a:avLst/>
+          </a:prstGeom>
+          <a:noFill/>
+        </p:spPr>
+        <p:txBody>
+          <a:bodyPr wrap="square" lIns="0" tIns="0" rIns="0" bIns="0" rtlCol="0">
+            <a:spAutoFit/>
+          </a:bodyPr>
+          <a:lstStyle/>
+          <a:p>
+            <a:pPr marL="285750" indent="-285750" fontAlgn="base">
+              <a:spcBef>
+                <a:spcPct val="50000"/>
+              </a:spcBef>
+              <a:spcAft>
+                <a:spcPct val="0"/>
+              </a:spcAft>
+              <a:buClr>
+                <a:schemeClr val="tx1"/>
+              </a:buClr>
+              <a:buSzPct val="100000"/>
+              <a:buFont typeface="Wingdings" panose="05000000000000000000" pitchFamily="2" charset="2"/>
+              <a:buChar char="§"/>
+            </a:pPr>
+            <a:r>
+              <a:rPr lang="en-US" sz="1800" kern="0" dirty="0">
+                <a:ea typeface="Arial Unicode MS" pitchFamily="34" charset="-128"/>
+                <a:cs typeface="Arial Unicode MS" pitchFamily="34" charset="-128"/>
+              </a:rPr>
+              <a:t>Kubernetes = Greek for “helmsman” or “pilot”</a:t>
+            </a:r>
+          </a:p>
+          <a:p>
+            <a:pPr marL="285750" indent="-285750" fontAlgn="base">
+              <a:spcBef>
+                <a:spcPct val="50000"/>
+              </a:spcBef>
+              <a:spcAft>
+                <a:spcPct val="0"/>
+              </a:spcAft>
+              <a:buClr>
+                <a:schemeClr val="tx1"/>
+              </a:buClr>
+              <a:buSzPct val="100000"/>
+              <a:buFont typeface="Wingdings" panose="05000000000000000000" pitchFamily="2" charset="2"/>
+              <a:buChar char="§"/>
+            </a:pPr>
+            <a:r>
+              <a:rPr lang="en-US" sz="1800" kern="0" dirty="0">
+                <a:ea typeface="Arial Unicode MS" pitchFamily="34" charset="-128"/>
+                <a:cs typeface="Arial Unicode MS" pitchFamily="34" charset="-128"/>
+              </a:rPr>
+              <a:t>Based on Google’s Borg – a cluster manager for container orchestration</a:t>
+            </a:r>
+          </a:p>
+          <a:p>
+            <a:pPr marL="285750" indent="-285750" fontAlgn="base">
+              <a:spcBef>
+                <a:spcPct val="50000"/>
+              </a:spcBef>
+              <a:spcAft>
+                <a:spcPct val="0"/>
+              </a:spcAft>
+              <a:buClr>
+                <a:schemeClr val="tx1"/>
+              </a:buClr>
+              <a:buSzPct val="100000"/>
+              <a:buFont typeface="Wingdings" panose="05000000000000000000" pitchFamily="2" charset="2"/>
+              <a:buChar char="§"/>
+            </a:pPr>
+            <a:r>
+              <a:rPr lang="en-US" sz="1800" kern="0" dirty="0">
+                <a:ea typeface="Arial Unicode MS" pitchFamily="34" charset="-128"/>
+                <a:cs typeface="Arial Unicode MS" pitchFamily="34" charset="-128"/>
+              </a:rPr>
+              <a:t>Open sourced by Google and firstly announced in 2014</a:t>
+            </a:r>
+          </a:p>
+          <a:p>
+            <a:pPr marL="285750" indent="-285750" fontAlgn="base">
+              <a:spcBef>
+                <a:spcPct val="50000"/>
+              </a:spcBef>
+              <a:spcAft>
+                <a:spcPct val="0"/>
+              </a:spcAft>
+              <a:buClr>
+                <a:schemeClr val="tx1"/>
+              </a:buClr>
+              <a:buSzPct val="100000"/>
+              <a:buFont typeface="Wingdings" panose="05000000000000000000" pitchFamily="2" charset="2"/>
+              <a:buChar char="§"/>
+            </a:pPr>
+            <a:r>
+              <a:rPr lang="en-US" sz="1800" kern="0" dirty="0">
+                <a:ea typeface="Arial Unicode MS" pitchFamily="34" charset="-128"/>
+                <a:cs typeface="Arial Unicode MS" pitchFamily="34" charset="-128"/>
+              </a:rPr>
+              <a:t>v1.0 was released in July 2015</a:t>
+            </a:r>
+          </a:p>
+          <a:p>
+            <a:pPr marL="285750" indent="-285750" fontAlgn="base">
+              <a:spcBef>
+                <a:spcPct val="50000"/>
+              </a:spcBef>
+              <a:spcAft>
+                <a:spcPct val="0"/>
+              </a:spcAft>
+              <a:buClr>
+                <a:schemeClr val="tx1"/>
+              </a:buClr>
+              <a:buSzPct val="100000"/>
+              <a:buFont typeface="Wingdings" panose="05000000000000000000" pitchFamily="2" charset="2"/>
+              <a:buChar char="§"/>
+            </a:pPr>
+            <a:r>
+              <a:rPr lang="en-US" sz="1800" kern="0" dirty="0">
+                <a:ea typeface="Arial Unicode MS" pitchFamily="34" charset="-128"/>
+                <a:cs typeface="Arial Unicode MS" pitchFamily="34" charset="-128"/>
+              </a:rPr>
+              <a:t>By now K8s is governed by the Cloud Native Computing Foundation (CNCF)</a:t>
+            </a:r>
+          </a:p>
+          <a:p>
+            <a:pPr marL="285750" indent="-285750" fontAlgn="base">
+              <a:spcBef>
+                <a:spcPct val="50000"/>
+              </a:spcBef>
+              <a:spcAft>
+                <a:spcPct val="0"/>
+              </a:spcAft>
+              <a:buClr>
+                <a:schemeClr val="tx1"/>
+              </a:buClr>
+              <a:buSzPct val="100000"/>
+              <a:buFont typeface="Wingdings" panose="05000000000000000000" pitchFamily="2" charset="2"/>
+              <a:buChar char="§"/>
+            </a:pPr>
+            <a:r>
+              <a:rPr lang="en-US" sz="1800" kern="0" dirty="0">
+                <a:ea typeface="Arial Unicode MS" pitchFamily="34" charset="-128"/>
+                <a:cs typeface="Arial Unicode MS" pitchFamily="34" charset="-128"/>
+              </a:rPr>
+              <a:t>Vanilla Kubernetes is the basis for commercial products like </a:t>
+            </a:r>
+            <a:r>
+              <a:rPr lang="en-US" sz="1800" kern="0" dirty="0" err="1">
+                <a:ea typeface="Arial Unicode MS" pitchFamily="34" charset="-128"/>
+                <a:cs typeface="Arial Unicode MS" pitchFamily="34" charset="-128"/>
+              </a:rPr>
+              <a:t>RedHat’s</a:t>
+            </a:r>
+            <a:r>
+              <a:rPr lang="en-US" sz="1800" kern="0" dirty="0">
+                <a:ea typeface="Arial Unicode MS" pitchFamily="34" charset="-128"/>
+                <a:cs typeface="Arial Unicode MS" pitchFamily="34" charset="-128"/>
+              </a:rPr>
+              <a:t> </a:t>
+            </a:r>
+            <a:r>
+              <a:rPr lang="en-US" sz="1800" kern="0" dirty="0" err="1">
+                <a:ea typeface="Arial Unicode MS" pitchFamily="34" charset="-128"/>
+                <a:cs typeface="Arial Unicode MS" pitchFamily="34" charset="-128"/>
+              </a:rPr>
+              <a:t>Openshift</a:t>
+            </a:r>
+            <a:r>
+              <a:rPr lang="en-US" sz="1800" kern="0" dirty="0">
+                <a:ea typeface="Arial Unicode MS" pitchFamily="34" charset="-128"/>
+                <a:cs typeface="Arial Unicode MS" pitchFamily="34" charset="-128"/>
+              </a:rPr>
+              <a:t> or CoreOS’ tectonic</a:t>
+            </a:r>
+          </a:p>
+          <a:p>
+            <a:pPr marL="285750" indent="-285750" fontAlgn="base">
+              <a:spcBef>
+                <a:spcPct val="50000"/>
+              </a:spcBef>
+              <a:spcAft>
+                <a:spcPct val="0"/>
+              </a:spcAft>
+              <a:buClr>
+                <a:schemeClr val="tx1"/>
+              </a:buClr>
+              <a:buSzPct val="100000"/>
+              <a:buFont typeface="Wingdings" panose="05000000000000000000" pitchFamily="2" charset="2"/>
+              <a:buChar char="§"/>
+            </a:pPr>
+            <a:r>
+              <a:rPr lang="en-US" sz="1800" kern="0" dirty="0">
+                <a:ea typeface="Arial Unicode MS" pitchFamily="34" charset="-128"/>
+                <a:cs typeface="Arial Unicode MS" pitchFamily="34" charset="-128"/>
+              </a:rPr>
+              <a:t>New minor releases roughly every 3 month</a:t>
+            </a:r>
+          </a:p>
+          <a:p>
+            <a:pPr marL="285750" indent="-285750" fontAlgn="base">
+              <a:spcBef>
+                <a:spcPct val="50000"/>
+              </a:spcBef>
+              <a:spcAft>
+                <a:spcPct val="0"/>
+              </a:spcAft>
+              <a:buClr>
+                <a:schemeClr val="tx1"/>
+              </a:buClr>
+              <a:buSzPct val="100000"/>
+              <a:buFont typeface="Wingdings" panose="05000000000000000000" pitchFamily="2" charset="2"/>
+              <a:buChar char="§"/>
+            </a:pPr>
+            <a:r>
+              <a:rPr lang="en-US" sz="1800" kern="0" dirty="0">
+                <a:ea typeface="Arial Unicode MS" pitchFamily="34" charset="-128"/>
+                <a:cs typeface="Arial Unicode MS" pitchFamily="34" charset="-128"/>
+              </a:rPr>
+              <a:t>Extensive list of beta features</a:t>
+            </a:r>
+          </a:p>
+          <a:p>
+            <a:pPr marL="285750" indent="-285750" fontAlgn="base">
+              <a:spcBef>
+                <a:spcPct val="50000"/>
+              </a:spcBef>
+              <a:spcAft>
+                <a:spcPct val="0"/>
+              </a:spcAft>
+              <a:buClr>
+                <a:schemeClr val="tx1"/>
+              </a:buClr>
+              <a:buSzPct val="100000"/>
+              <a:buFont typeface="Wingdings" panose="05000000000000000000" pitchFamily="2" charset="2"/>
+              <a:buChar char="§"/>
+            </a:pPr>
+            <a:r>
+              <a:rPr lang="en-US" sz="1800" kern="0" dirty="0">
+                <a:ea typeface="Arial Unicode MS" pitchFamily="34" charset="-128"/>
+                <a:cs typeface="Arial Unicode MS" pitchFamily="34" charset="-128"/>
+              </a:rPr>
+              <a:t>Documentation: </a:t>
+            </a:r>
+            <a:r>
+              <a:rPr lang="en-US" sz="1800" kern="0" dirty="0">
+                <a:ea typeface="Arial Unicode MS" pitchFamily="34" charset="-128"/>
+                <a:cs typeface="Arial Unicode MS" pitchFamily="34" charset="-128"/>
+                <a:hlinkClick r:id="rId2"/>
+              </a:rPr>
+              <a:t>https://kubernetes.io/docs/home/</a:t>
+            </a:r>
+            <a:r>
+              <a:rPr lang="en-US" sz="1800" kern="0" dirty="0">
+                <a:ea typeface="Arial Unicode MS" pitchFamily="34" charset="-128"/>
+                <a:cs typeface="Arial Unicode MS" pitchFamily="34" charset="-128"/>
+              </a:rPr>
+              <a:t> - concepts, tasks, API reference</a:t>
+            </a:r>
+          </a:p>
+        </p:txBody>
+      </p:sp>
+    </p:spTree>
+    <p:extLst>
+      <p:ext uri="{BB962C8B-B14F-4D97-AF65-F5344CB8AC3E}">
+        <p14:creationId xmlns:p14="http://schemas.microsoft.com/office/powerpoint/2010/main" val="3263224504"/>
+      </p:ext>
+    </p:extLst>
+  </p:cSld>
+  <p:clrMapOvr>
+    <a:masterClrMapping/>
+  </p:clrMapOvr>
+</p:sld>
+</file>
+
+<file path=ppt/slides/slide11.xml><?xml version="1.0" encoding="utf-8"?>
+<p:sld xmlns:a="http://schemas.openxmlformats.org/drawingml/2006/main" xmlns:r="http://schemas.openxmlformats.org/officeDocument/2006/relationships" xmlns:p="http://schemas.openxmlformats.org/presentationml/2006/main">
+  <p:cSld>
+    <p:spTree>
+      <p:nvGrpSpPr>
+        <p:cNvPr id="1" name=""/>
+        <p:cNvGrpSpPr/>
+        <p:nvPr/>
+      </p:nvGrpSpPr>
+      <p:grpSpPr>
+        <a:xfrm>
+          <a:off x="0" y="0"/>
+          <a:ext cx="0" cy="0"/>
+          <a:chOff x="0" y="0"/>
+          <a:chExt cx="0" cy="0"/>
+        </a:xfrm>
+      </p:grpSpPr>
+      <p:sp>
+        <p:nvSpPr>
+          <p:cNvPr id="2" name="Title 1"/>
+          <p:cNvSpPr>
+            <a:spLocks noGrp="1"/>
+          </p:cNvSpPr>
+          <p:nvPr>
+            <p:ph type="title"/>
+          </p:nvPr>
+        </p:nvSpPr>
+        <p:spPr/>
+        <p:txBody>
+          <a:bodyPr/>
+          <a:lstStyle/>
+          <a:p>
+            <a:r>
+              <a:rPr lang="en-US" dirty="0"/>
               <a:t>If it doesn’t work as expected …</a:t>
             </a:r>
           </a:p>
@@ -8395,7 +8729,7 @@
 </p:sld>
 </file>
 
-<file path=ppt/slides/slide11.xml><?xml version="1.0" encoding="utf-8"?>
+<file path=ppt/slides/slide12.xml><?xml version="1.0" encoding="utf-8"?>
 <p:sld xmlns:a="http://schemas.openxmlformats.org/drawingml/2006/main" xmlns:r="http://schemas.openxmlformats.org/officeDocument/2006/relationships" xmlns:p="http://schemas.openxmlformats.org/presentationml/2006/main" show="0">
   <p:cSld>
     <p:spTree>
@@ -9697,7 +10031,7 @@
                             </p:stCondLst>
                             <p:childTnLst>
                               <p:par>
-                                <p:cTn id="5" presetID="1" presetClass="entr" presetSubtype="0" fill="hold" grpId="0" nodeType="clickEffect">
+                                <p:cTn id="5" presetID="1" presetClass="entr" presetSubtype="0" fill="hold" nodeType="clickEffect">
                                   <p:stCondLst>
                                     <p:cond delay="0"/>
                                   </p:stCondLst>
@@ -9710,7 +10044,142 @@
                                           </p:stCondLst>
                                         </p:cTn>
                                         <p:tgtEl>
-                                          <p:spTgt spid="13"/>
+                                          <p:spTgt spid="1026"/>
+                                        </p:tgtEl>
+                                        <p:attrNameLst>
+                                          <p:attrName>style.visibility</p:attrName>
+                                        </p:attrNameLst>
+                                      </p:cBhvr>
+                                      <p:to>
+                                        <p:strVal val="visible"/>
+                                      </p:to>
+                                    </p:set>
+                                  </p:childTnLst>
+                                </p:cTn>
+                              </p:par>
+                            </p:childTnLst>
+                          </p:cTn>
+                        </p:par>
+                      </p:childTnLst>
+                    </p:cTn>
+                  </p:par>
+                  <p:par>
+                    <p:cTn id="7" fill="hold">
+                      <p:stCondLst>
+                        <p:cond delay="indefinite"/>
+                      </p:stCondLst>
+                      <p:childTnLst>
+                        <p:par>
+                          <p:cTn id="8" fill="hold">
+                            <p:stCondLst>
+                              <p:cond delay="0"/>
+                            </p:stCondLst>
+                            <p:childTnLst>
+                              <p:par>
+                                <p:cTn id="9" presetID="1" presetClass="entr" presetSubtype="0" fill="hold" nodeType="clickEffect">
+                                  <p:stCondLst>
+                                    <p:cond delay="0"/>
+                                  </p:stCondLst>
+                                  <p:childTnLst>
+                                    <p:set>
+                                      <p:cBhvr>
+                                        <p:cTn id="10" dur="1" fill="hold">
+                                          <p:stCondLst>
+                                            <p:cond delay="0"/>
+                                          </p:stCondLst>
+                                        </p:cTn>
+                                        <p:tgtEl>
+                                          <p:spTgt spid="14"/>
+                                        </p:tgtEl>
+                                        <p:attrNameLst>
+                                          <p:attrName>style.visibility</p:attrName>
+                                        </p:attrNameLst>
+                                      </p:cBhvr>
+                                      <p:to>
+                                        <p:strVal val="visible"/>
+                                      </p:to>
+                                    </p:set>
+                                  </p:childTnLst>
+                                </p:cTn>
+                              </p:par>
+                            </p:childTnLst>
+                          </p:cTn>
+                        </p:par>
+                      </p:childTnLst>
+                    </p:cTn>
+                  </p:par>
+                  <p:par>
+                    <p:cTn id="11" fill="hold">
+                      <p:stCondLst>
+                        <p:cond delay="indefinite"/>
+                      </p:stCondLst>
+                      <p:childTnLst>
+                        <p:par>
+                          <p:cTn id="12" fill="hold">
+                            <p:stCondLst>
+                              <p:cond delay="0"/>
+                            </p:stCondLst>
+                            <p:childTnLst>
+                              <p:par>
+                                <p:cTn id="13" presetID="1" presetClass="entr" presetSubtype="0" fill="hold" nodeType="clickEffect">
+                                  <p:stCondLst>
+                                    <p:cond delay="0"/>
+                                  </p:stCondLst>
+                                  <p:childTnLst>
+                                    <p:set>
+                                      <p:cBhvr>
+                                        <p:cTn id="14" dur="1" fill="hold">
+                                          <p:stCondLst>
+                                            <p:cond delay="0"/>
+                                          </p:stCondLst>
+                                        </p:cTn>
+                                        <p:tgtEl>
+                                          <p:spTgt spid="15"/>
+                                        </p:tgtEl>
+                                        <p:attrNameLst>
+                                          <p:attrName>style.visibility</p:attrName>
+                                        </p:attrNameLst>
+                                      </p:cBhvr>
+                                      <p:to>
+                                        <p:strVal val="visible"/>
+                                      </p:to>
+                                    </p:set>
+                                  </p:childTnLst>
+                                </p:cTn>
+                              </p:par>
+                            </p:childTnLst>
+                          </p:cTn>
+                        </p:par>
+                      </p:childTnLst>
+                    </p:cTn>
+                  </p:par>
+                  <p:par>
+                    <p:cTn id="15" fill="hold">
+                      <p:stCondLst>
+                        <p:cond delay="indefinite"/>
+                      </p:stCondLst>
+                      <p:childTnLst>
+                        <p:par>
+                          <p:cTn id="16" fill="hold">
+                            <p:stCondLst>
+                              <p:cond delay="0"/>
+                            </p:stCondLst>
+                            <p:childTnLst>
+                              <p:par>
+                                <p:cTn id="17" presetID="1" presetClass="entr" presetSubtype="0" fill="hold" nodeType="clickEffect">
+                                  <p:stCondLst>
+                                    <p:cond delay="0"/>
+                                  </p:stCondLst>
+                                  <p:childTnLst>
+                                    <p:set>
+                                      <p:cBhvr>
+                                        <p:cTn id="18" dur="1" fill="hold">
+                                          <p:stCondLst>
+                                            <p:cond delay="0"/>
+                                          </p:stCondLst>
+                                        </p:cTn>
+                                        <p:tgtEl>
+                                          <p:spTgt spid="16"/>
                                         </p:tgtEl>
                                         <p:attrNameLst>
                                           <p:attrName>style.visibility</p:attrName>
@@ -9750,9 +10219,6 @@
         </p:cTn>
       </p:par>
     </p:tnLst>
-    <p:bldLst>
-      <p:bldP spid="13" grpId="0"/>
-    </p:bldLst>
   </p:timing>
 </p:sld>
 </file>
@@ -9776,7 +10242,7 @@
       </p:grpSpPr>
       <p:sp>
         <p:nvSpPr>
-          <p:cNvPr id="2" name="Title 1"/>
+          <p:cNvPr id="5" name="Title 4"/>
           <p:cNvSpPr>
             <a:spLocks noGrp="1"/>
           </p:cNvSpPr>
@@ -9784,26 +10250,21 @@
             <p:ph type="title"/>
           </p:nvPr>
         </p:nvSpPr>
-        <p:spPr>
-          <a:xfrm>
-            <a:off x="435421" y="443040"/>
-            <a:ext cx="11186476" cy="369332"/>
-          </a:xfrm>
-        </p:spPr>
+        <p:spPr/>
         <p:txBody>
           <a:bodyPr/>
           <a:lstStyle/>
           <a:p>
             <a:r>
               <a:rPr lang="en-US" dirty="0"/>
-              <a:t>Orchestration</a:t>
+              <a:t>Tell me, what you want…</a:t>
             </a:r>
           </a:p>
         </p:txBody>
       </p:sp>
       <p:pic>
         <p:nvPicPr>
-          <p:cNvPr id="3074" name="Picture 2" descr="Bildergebnis für orchestration"/>
+          <p:cNvPr id="1036" name="Picture 12" descr="Related image"/>
           <p:cNvPicPr>
             <a:picLocks noChangeAspect="1" noChangeArrowheads="1"/>
           </p:cNvPicPr>
@@ -9824,8 +10285,8 @@
         </p:blipFill>
         <p:spPr bwMode="auto">
           <a:xfrm>
-            <a:off x="1091248" y="1527974"/>
-            <a:ext cx="6406832" cy="4276561"/>
+            <a:off x="504001" y="2171700"/>
+            <a:ext cx="3705613" cy="2542223"/>
           </a:xfrm>
           <a:prstGeom prst="rect">
             <a:avLst/>
@@ -9844,14 +10305,14 @@
       </p:pic>
       <p:pic>
         <p:nvPicPr>
-          <p:cNvPr id="6" name="Picture 2" descr="Bildergebnis für orchestration"/>
+          <p:cNvPr id="1042" name="Picture 18" descr="Image result for Harlech Castle"/>
           <p:cNvPicPr>
             <a:picLocks noChangeAspect="1" noChangeArrowheads="1"/>
           </p:cNvPicPr>
           <p:nvPr/>
         </p:nvPicPr>
         <p:blipFill>
-          <a:blip r:embed="rId2">
+          <a:blip r:embed="rId3">
             <a:extLst>
               <a:ext uri="{28A0092B-C50C-407E-A947-70E740481C1C}">
                 <a14:useLocalDpi xmlns:a14="http://schemas.microsoft.com/office/drawing/2010/main" val="0"/>
@@ -9865,8 +10326,8 @@
         </p:blipFill>
         <p:spPr bwMode="auto">
           <a:xfrm>
-            <a:off x="8193088" y="959790"/>
-            <a:ext cx="2947352" cy="1967358"/>
+            <a:off x="5446651" y="1524001"/>
+            <a:ext cx="5762370" cy="3839608"/>
           </a:xfrm>
           <a:prstGeom prst="rect">
             <a:avLst/>
@@ -9883,51 +10344,102 @@
           </a:extLst>
         </p:spPr>
       </p:pic>
-      <p:pic>
-        <p:nvPicPr>
-          <p:cNvPr id="7" name="Picture 2" descr="Bildergebnis für orchestration"/>
-          <p:cNvPicPr>
-            <a:picLocks noChangeAspect="1" noChangeArrowheads="1"/>
-          </p:cNvPicPr>
+      <p:sp>
+        <p:nvSpPr>
+          <p:cNvPr id="2" name="Arrow: Notched Right 1"/>
+          <p:cNvSpPr/>
           <p:nvPr/>
-        </p:nvPicPr>
-        <p:blipFill>
-          <a:blip r:embed="rId2">
-            <a:extLst>
-              <a:ext uri="{28A0092B-C50C-407E-A947-70E740481C1C}">
-                <a14:useLocalDpi xmlns:a14="http://schemas.microsoft.com/office/drawing/2010/main" val="0"/>
-              </a:ext>
-            </a:extLst>
-          </a:blip>
-          <a:srcRect/>
-          <a:stretch>
-            <a:fillRect/>
-          </a:stretch>
-        </p:blipFill>
-        <p:spPr bwMode="auto">
-          <a:xfrm>
-            <a:off x="8193088" y="4004817"/>
-            <a:ext cx="2947352" cy="1967358"/>
-          </a:xfrm>
-          <a:prstGeom prst="rect">
+        </p:nvSpPr>
+        <p:spPr bwMode="gray">
+          <a:xfrm>
+            <a:off x="1485900" y="5577515"/>
+            <a:ext cx="8275320" cy="869551"/>
+          </a:xfrm>
+          <a:prstGeom prst="notchedRightArrow">
             <a:avLst/>
           </a:prstGeom>
-          <a:noFill/>
-          <a:extLst>
-            <a:ext uri="{909E8E84-426E-40DD-AFC4-6F175D3DCCD1}">
-              <a14:hiddenFill xmlns:a14="http://schemas.microsoft.com/office/drawing/2010/main">
-                <a:solidFill>
-                  <a:srgbClr val="FFFFFF"/>
-                </a:solidFill>
-              </a14:hiddenFill>
-            </a:ext>
-          </a:extLst>
-        </p:spPr>
-      </p:pic>
+          <a:ln>
+            <a:headEnd/>
+            <a:tailEnd/>
+          </a:ln>
+        </p:spPr>
+        <p:style>
+          <a:lnRef idx="2">
+            <a:schemeClr val="accent2"/>
+          </a:lnRef>
+          <a:fillRef idx="1">
+            <a:schemeClr val="lt1"/>
+          </a:fillRef>
+          <a:effectRef idx="0">
+            <a:schemeClr val="accent2"/>
+          </a:effectRef>
+          <a:fontRef idx="minor">
+            <a:schemeClr val="dk1"/>
+          </a:fontRef>
+        </p:style>
+        <p:txBody>
+          <a:bodyPr lIns="90000" tIns="72000" rIns="90000" bIns="72000" rtlCol="0" anchor="ctr"/>
+          <a:lstStyle/>
+          <a:p>
+            <a:pPr marR="0" algn="ctr" defTabSz="914400" eaLnBrk="1" fontAlgn="base" latinLnBrk="0" hangingPunct="1">
+              <a:lnSpc>
+                <a:spcPct val="100000"/>
+              </a:lnSpc>
+              <a:spcBef>
+                <a:spcPct val="50000"/>
+              </a:spcBef>
+              <a:spcAft>
+                <a:spcPct val="0"/>
+              </a:spcAft>
+              <a:buClr>
+                <a:srgbClr val="F0AB00"/>
+              </a:buClr>
+              <a:buSzPct val="80000"/>
+              <a:tabLst/>
+            </a:pPr>
+            <a:r>
+              <a:rPr kumimoji="0" lang="en-US" sz="1800" b="1" i="0" u="none" strike="noStrike" kern="0" cap="none" spc="0" normalizeH="0" baseline="0" noProof="0" dirty="0">
+                <a:ln>
+                  <a:noFill/>
+                </a:ln>
+                <a:effectLst/>
+                <a:uLnTx/>
+                <a:uFillTx/>
+                <a:ea typeface="Arial Unicode MS" pitchFamily="34" charset="-128"/>
+                <a:cs typeface="Arial Unicode MS" pitchFamily="34" charset="-128"/>
+              </a:rPr>
+              <a:t>All it takes,</a:t>
+            </a:r>
+            <a:r>
+              <a:rPr kumimoji="0" lang="en-US" sz="1800" b="1" i="0" u="none" strike="noStrike" kern="0" cap="none" spc="0" normalizeH="0" noProof="0" dirty="0">
+                <a:ln>
+                  <a:noFill/>
+                </a:ln>
+                <a:effectLst/>
+                <a:uLnTx/>
+                <a:uFillTx/>
+                <a:ea typeface="Arial Unicode MS" pitchFamily="34" charset="-128"/>
+                <a:cs typeface="Arial Unicode MS" pitchFamily="34" charset="-128"/>
+              </a:rPr>
+              <a:t> is a description and some bricks…</a:t>
+            </a:r>
+            <a:endParaRPr kumimoji="0" lang="en-US" sz="1800" b="1" i="0" u="none" strike="noStrike" kern="0" cap="none" spc="0" normalizeH="0" baseline="0" noProof="0" dirty="0">
+              <a:ln>
+                <a:noFill/>
+              </a:ln>
+              <a:effectLst/>
+              <a:uLnTx/>
+              <a:uFillTx/>
+              <a:ea typeface="Arial Unicode MS" pitchFamily="34" charset="-128"/>
+              <a:cs typeface="Arial Unicode MS" pitchFamily="34" charset="-128"/>
+            </a:endParaRPr>
+          </a:p>
+        </p:txBody>
+      </p:sp>
     </p:spTree>
     <p:extLst>
       <p:ext uri="{BB962C8B-B14F-4D97-AF65-F5344CB8AC3E}">
-        <p14:creationId xmlns:p14="http://schemas.microsoft.com/office/powerpoint/2010/main" val="290894176"/>
+        <p14:creationId xmlns:p14="http://schemas.microsoft.com/office/powerpoint/2010/main" val="3572379409"/>
       </p:ext>
     </p:extLst>
   </p:cSld>
@@ -9964,317 +10476,150 @@
             <p:ph type="title"/>
           </p:nvPr>
         </p:nvSpPr>
-        <p:spPr/>
+        <p:spPr>
+          <a:xfrm>
+            <a:off x="435421" y="443040"/>
+            <a:ext cx="11186476" cy="369332"/>
+          </a:xfrm>
+        </p:spPr>
         <p:txBody>
           <a:bodyPr/>
           <a:lstStyle/>
           <a:p>
             <a:r>
               <a:rPr lang="en-US" dirty="0"/>
-              <a:t>Some facts about K8s, </a:t>
-            </a:r>
-            <a:r>
-              <a:rPr lang="en-US" dirty="0" err="1"/>
-              <a:t>kubernetes</a:t>
-            </a:r>
-            <a:r>
-              <a:rPr lang="en-US" dirty="0"/>
-              <a:t>, …</a:t>
+              <a:t>Orchestration</a:t>
             </a:r>
           </a:p>
         </p:txBody>
       </p:sp>
-      <p:sp>
-        <p:nvSpPr>
-          <p:cNvPr id="5" name="TextBox 4"/>
-          <p:cNvSpPr txBox="1"/>
+      <p:pic>
+        <p:nvPicPr>
+          <p:cNvPr id="3074" name="Picture 2" descr="Bildergebnis für orchestration"/>
+          <p:cNvPicPr>
+            <a:picLocks noChangeAspect="1" noChangeArrowheads="1"/>
+          </p:cNvPicPr>
           <p:nvPr/>
-        </p:nvSpPr>
-        <p:spPr>
-          <a:xfrm>
-            <a:off x="504001" y="1447800"/>
-            <a:ext cx="9691559" cy="3877985"/>
+        </p:nvPicPr>
+        <p:blipFill>
+          <a:blip r:embed="rId2">
+            <a:extLst>
+              <a:ext uri="{28A0092B-C50C-407E-A947-70E740481C1C}">
+                <a14:useLocalDpi xmlns:a14="http://schemas.microsoft.com/office/drawing/2010/main" val="0"/>
+              </a:ext>
+            </a:extLst>
+          </a:blip>
+          <a:srcRect/>
+          <a:stretch>
+            <a:fillRect/>
+          </a:stretch>
+        </p:blipFill>
+        <p:spPr bwMode="auto">
+          <a:xfrm>
+            <a:off x="1091248" y="1527974"/>
+            <a:ext cx="6406832" cy="4276561"/>
           </a:xfrm>
           <a:prstGeom prst="rect">
             <a:avLst/>
           </a:prstGeom>
           <a:noFill/>
-        </p:spPr>
-        <p:txBody>
-          <a:bodyPr wrap="square" lIns="0" tIns="0" rIns="0" bIns="0" rtlCol="0">
-            <a:spAutoFit/>
-          </a:bodyPr>
-          <a:lstStyle/>
-          <a:p>
-            <a:pPr marL="285750" indent="-285750" fontAlgn="base">
-              <a:spcBef>
-                <a:spcPct val="50000"/>
-              </a:spcBef>
-              <a:spcAft>
-                <a:spcPct val="0"/>
-              </a:spcAft>
-              <a:buClr>
-                <a:schemeClr val="tx1"/>
-              </a:buClr>
-              <a:buSzPct val="100000"/>
-              <a:buFont typeface="Wingdings" panose="05000000000000000000" pitchFamily="2" charset="2"/>
-              <a:buChar char="§"/>
-            </a:pPr>
-            <a:r>
-              <a:rPr lang="en-US" sz="1800" kern="0" dirty="0">
-                <a:ea typeface="Arial Unicode MS" pitchFamily="34" charset="-128"/>
-                <a:cs typeface="Arial Unicode MS" pitchFamily="34" charset="-128"/>
-              </a:rPr>
-              <a:t>Kubernetes = Greek for “helmsman” or “pilot”</a:t>
-            </a:r>
-          </a:p>
-          <a:p>
-            <a:pPr marL="285750" indent="-285750" fontAlgn="base">
-              <a:spcBef>
-                <a:spcPct val="50000"/>
-              </a:spcBef>
-              <a:spcAft>
-                <a:spcPct val="0"/>
-              </a:spcAft>
-              <a:buClr>
-                <a:schemeClr val="tx1"/>
-              </a:buClr>
-              <a:buSzPct val="100000"/>
-              <a:buFont typeface="Wingdings" panose="05000000000000000000" pitchFamily="2" charset="2"/>
-              <a:buChar char="§"/>
-            </a:pPr>
-            <a:r>
-              <a:rPr lang="en-US" sz="1800" kern="0" dirty="0">
-                <a:ea typeface="Arial Unicode MS" pitchFamily="34" charset="-128"/>
-                <a:cs typeface="Arial Unicode MS" pitchFamily="34" charset="-128"/>
-              </a:rPr>
-              <a:t>Based on Google’s Borg – a cluster manager for container orchestration</a:t>
-            </a:r>
-          </a:p>
-          <a:p>
-            <a:pPr marL="285750" indent="-285750" fontAlgn="base">
-              <a:spcBef>
-                <a:spcPct val="50000"/>
-              </a:spcBef>
-              <a:spcAft>
-                <a:spcPct val="0"/>
-              </a:spcAft>
-              <a:buClr>
-                <a:schemeClr val="tx1"/>
-              </a:buClr>
-              <a:buSzPct val="100000"/>
-              <a:buFont typeface="Wingdings" panose="05000000000000000000" pitchFamily="2" charset="2"/>
-              <a:buChar char="§"/>
-            </a:pPr>
-            <a:r>
-              <a:rPr lang="en-US" sz="1800" kern="0" dirty="0">
-                <a:ea typeface="Arial Unicode MS" pitchFamily="34" charset="-128"/>
-                <a:cs typeface="Arial Unicode MS" pitchFamily="34" charset="-128"/>
-              </a:rPr>
-              <a:t>Open sourced by Google and firstly announced in 2014</a:t>
-            </a:r>
-          </a:p>
-          <a:p>
-            <a:pPr marL="285750" indent="-285750" fontAlgn="base">
-              <a:spcBef>
-                <a:spcPct val="50000"/>
-              </a:spcBef>
-              <a:spcAft>
-                <a:spcPct val="0"/>
-              </a:spcAft>
-              <a:buClr>
-                <a:schemeClr val="tx1"/>
-              </a:buClr>
-              <a:buSzPct val="100000"/>
-              <a:buFont typeface="Wingdings" panose="05000000000000000000" pitchFamily="2" charset="2"/>
-              <a:buChar char="§"/>
-            </a:pPr>
-            <a:r>
-              <a:rPr lang="en-US" sz="1800" kern="0" dirty="0">
-                <a:ea typeface="Arial Unicode MS" pitchFamily="34" charset="-128"/>
-                <a:cs typeface="Arial Unicode MS" pitchFamily="34" charset="-128"/>
-              </a:rPr>
-              <a:t>v1.0 was released in July 2015</a:t>
-            </a:r>
-          </a:p>
-          <a:p>
-            <a:pPr marL="285750" indent="-285750" fontAlgn="base">
-              <a:spcBef>
-                <a:spcPct val="50000"/>
-              </a:spcBef>
-              <a:spcAft>
-                <a:spcPct val="0"/>
-              </a:spcAft>
-              <a:buClr>
-                <a:schemeClr val="tx1"/>
-              </a:buClr>
-              <a:buSzPct val="100000"/>
-              <a:buFont typeface="Wingdings" panose="05000000000000000000" pitchFamily="2" charset="2"/>
-              <a:buChar char="§"/>
-            </a:pPr>
-            <a:r>
-              <a:rPr lang="en-US" sz="1800" kern="0" dirty="0">
-                <a:ea typeface="Arial Unicode MS" pitchFamily="34" charset="-128"/>
-                <a:cs typeface="Arial Unicode MS" pitchFamily="34" charset="-128"/>
-              </a:rPr>
-              <a:t>By now K8s is governed by the Cloud Native Computing Foundation </a:t>
-            </a:r>
-            <a:r>
-              <a:rPr lang="en-US" sz="1800" kern="0">
-                <a:ea typeface="Arial Unicode MS" pitchFamily="34" charset="-128"/>
-                <a:cs typeface="Arial Unicode MS" pitchFamily="34" charset="-128"/>
-              </a:rPr>
-              <a:t>(CNCF</a:t>
-            </a:r>
-            <a:r>
-              <a:rPr lang="en-US" sz="1800" kern="0" dirty="0">
-                <a:ea typeface="Arial Unicode MS" pitchFamily="34" charset="-128"/>
-                <a:cs typeface="Arial Unicode MS" pitchFamily="34" charset="-128"/>
-              </a:rPr>
-              <a:t>)</a:t>
-            </a:r>
-          </a:p>
-          <a:p>
-            <a:pPr marL="285750" indent="-285750" fontAlgn="base">
-              <a:spcBef>
-                <a:spcPct val="50000"/>
-              </a:spcBef>
-              <a:spcAft>
-                <a:spcPct val="0"/>
-              </a:spcAft>
-              <a:buClr>
-                <a:schemeClr val="tx1"/>
-              </a:buClr>
-              <a:buSzPct val="100000"/>
-              <a:buFont typeface="Wingdings" panose="05000000000000000000" pitchFamily="2" charset="2"/>
-              <a:buChar char="§"/>
-            </a:pPr>
-            <a:r>
-              <a:rPr lang="en-US" sz="1800" kern="0" dirty="0">
-                <a:ea typeface="Arial Unicode MS" pitchFamily="34" charset="-128"/>
-                <a:cs typeface="Arial Unicode MS" pitchFamily="34" charset="-128"/>
-              </a:rPr>
-              <a:t>Vanilla Kubernetes is the basis for commercial products like </a:t>
-            </a:r>
-            <a:r>
-              <a:rPr lang="en-US" sz="1800" kern="0" dirty="0" err="1">
-                <a:ea typeface="Arial Unicode MS" pitchFamily="34" charset="-128"/>
-                <a:cs typeface="Arial Unicode MS" pitchFamily="34" charset="-128"/>
-              </a:rPr>
-              <a:t>RedHat’s</a:t>
-            </a:r>
-            <a:r>
-              <a:rPr lang="en-US" sz="1800" kern="0" dirty="0">
-                <a:ea typeface="Arial Unicode MS" pitchFamily="34" charset="-128"/>
-                <a:cs typeface="Arial Unicode MS" pitchFamily="34" charset="-128"/>
-              </a:rPr>
-              <a:t> </a:t>
-            </a:r>
-            <a:r>
-              <a:rPr lang="en-US" sz="1800" kern="0" dirty="0" err="1">
-                <a:ea typeface="Arial Unicode MS" pitchFamily="34" charset="-128"/>
-                <a:cs typeface="Arial Unicode MS" pitchFamily="34" charset="-128"/>
-              </a:rPr>
-              <a:t>Openshift</a:t>
-            </a:r>
-            <a:r>
-              <a:rPr lang="en-US" sz="1800" kern="0" dirty="0">
-                <a:ea typeface="Arial Unicode MS" pitchFamily="34" charset="-128"/>
-                <a:cs typeface="Arial Unicode MS" pitchFamily="34" charset="-128"/>
-              </a:rPr>
-              <a:t> or CoreOS’ tectonic</a:t>
-            </a:r>
-          </a:p>
-          <a:p>
-            <a:pPr marL="285750" indent="-285750" fontAlgn="base">
-              <a:spcBef>
-                <a:spcPct val="50000"/>
-              </a:spcBef>
-              <a:spcAft>
-                <a:spcPct val="0"/>
-              </a:spcAft>
-              <a:buClr>
-                <a:schemeClr val="tx1"/>
-              </a:buClr>
-              <a:buSzPct val="100000"/>
-              <a:buFont typeface="Wingdings" panose="05000000000000000000" pitchFamily="2" charset="2"/>
-              <a:buChar char="§"/>
-            </a:pPr>
-            <a:r>
-              <a:rPr lang="en-US" sz="1800" kern="0" dirty="0">
-                <a:ea typeface="Arial Unicode MS" pitchFamily="34" charset="-128"/>
-                <a:cs typeface="Arial Unicode MS" pitchFamily="34" charset="-128"/>
-              </a:rPr>
-              <a:t>New minor releases roughly every 3 month</a:t>
-            </a:r>
-          </a:p>
-          <a:p>
-            <a:pPr marL="285750" indent="-285750" fontAlgn="base">
-              <a:spcBef>
-                <a:spcPct val="50000"/>
-              </a:spcBef>
-              <a:spcAft>
-                <a:spcPct val="0"/>
-              </a:spcAft>
-              <a:buClr>
-                <a:schemeClr val="tx1"/>
-              </a:buClr>
-              <a:buSzPct val="100000"/>
-              <a:buFont typeface="Wingdings" panose="05000000000000000000" pitchFamily="2" charset="2"/>
-              <a:buChar char="§"/>
-            </a:pPr>
-            <a:r>
-              <a:rPr lang="en-US" sz="1800" kern="0" dirty="0">
-                <a:ea typeface="Arial Unicode MS" pitchFamily="34" charset="-128"/>
-                <a:cs typeface="Arial Unicode MS" pitchFamily="34" charset="-128"/>
-              </a:rPr>
-              <a:t>Extensive list of beta features</a:t>
-            </a:r>
-          </a:p>
-          <a:p>
-            <a:pPr marL="285750" indent="-285750" fontAlgn="base">
-              <a:spcBef>
-                <a:spcPct val="50000"/>
-              </a:spcBef>
-              <a:spcAft>
-                <a:spcPct val="0"/>
-              </a:spcAft>
-              <a:buClr>
-                <a:schemeClr val="tx1"/>
-              </a:buClr>
-              <a:buSzPct val="100000"/>
-              <a:buFont typeface="Wingdings" panose="05000000000000000000" pitchFamily="2" charset="2"/>
-              <a:buChar char="§"/>
-            </a:pPr>
-            <a:r>
-              <a:rPr lang="en-US" sz="1800" kern="0" dirty="0">
-                <a:ea typeface="Arial Unicode MS" pitchFamily="34" charset="-128"/>
-                <a:cs typeface="Arial Unicode MS" pitchFamily="34" charset="-128"/>
-              </a:rPr>
-              <a:t>Documentation: </a:t>
-            </a:r>
-            <a:r>
-              <a:rPr lang="en-US" sz="1800" kern="0" dirty="0">
-                <a:ea typeface="Arial Unicode MS" pitchFamily="34" charset="-128"/>
-                <a:cs typeface="Arial Unicode MS" pitchFamily="34" charset="-128"/>
-                <a:hlinkClick r:id="rId2"/>
-              </a:rPr>
-              <a:t>https://kubernetes.io/docs/home/</a:t>
-            </a:r>
-            <a:r>
-              <a:rPr lang="en-US" sz="1800" kern="0" dirty="0">
-                <a:ea typeface="Arial Unicode MS" pitchFamily="34" charset="-128"/>
-                <a:cs typeface="Arial Unicode MS" pitchFamily="34" charset="-128"/>
-              </a:rPr>
-              <a:t> - concepts, tasks, API reference</a:t>
-            </a:r>
-          </a:p>
-        </p:txBody>
-      </p:sp>
+          <a:extLst>
+            <a:ext uri="{909E8E84-426E-40DD-AFC4-6F175D3DCCD1}">
+              <a14:hiddenFill xmlns:a14="http://schemas.microsoft.com/office/drawing/2010/main">
+                <a:solidFill>
+                  <a:srgbClr val="FFFFFF"/>
+                </a:solidFill>
+              </a14:hiddenFill>
+            </a:ext>
+          </a:extLst>
+        </p:spPr>
+      </p:pic>
+      <p:pic>
+        <p:nvPicPr>
+          <p:cNvPr id="6" name="Picture 2" descr="Bildergebnis für orchestration"/>
+          <p:cNvPicPr>
+            <a:picLocks noChangeAspect="1" noChangeArrowheads="1"/>
+          </p:cNvPicPr>
+          <p:nvPr/>
+        </p:nvPicPr>
+        <p:blipFill>
+          <a:blip r:embed="rId2">
+            <a:extLst>
+              <a:ext uri="{28A0092B-C50C-407E-A947-70E740481C1C}">
+                <a14:useLocalDpi xmlns:a14="http://schemas.microsoft.com/office/drawing/2010/main" val="0"/>
+              </a:ext>
+            </a:extLst>
+          </a:blip>
+          <a:srcRect/>
+          <a:stretch>
+            <a:fillRect/>
+          </a:stretch>
+        </p:blipFill>
+        <p:spPr bwMode="auto">
+          <a:xfrm>
+            <a:off x="8193088" y="959790"/>
+            <a:ext cx="2947352" cy="1967358"/>
+          </a:xfrm>
+          <a:prstGeom prst="rect">
+            <a:avLst/>
+          </a:prstGeom>
+          <a:noFill/>
+          <a:extLst>
+            <a:ext uri="{909E8E84-426E-40DD-AFC4-6F175D3DCCD1}">
+              <a14:hiddenFill xmlns:a14="http://schemas.microsoft.com/office/drawing/2010/main">
+                <a:solidFill>
+                  <a:srgbClr val="FFFFFF"/>
+                </a:solidFill>
+              </a14:hiddenFill>
+            </a:ext>
+          </a:extLst>
+        </p:spPr>
+      </p:pic>
+      <p:pic>
+        <p:nvPicPr>
+          <p:cNvPr id="7" name="Picture 2" descr="Bildergebnis für orchestration"/>
+          <p:cNvPicPr>
+            <a:picLocks noChangeAspect="1" noChangeArrowheads="1"/>
+          </p:cNvPicPr>
+          <p:nvPr/>
+        </p:nvPicPr>
+        <p:blipFill>
+          <a:blip r:embed="rId2">
+            <a:extLst>
+              <a:ext uri="{28A0092B-C50C-407E-A947-70E740481C1C}">
+                <a14:useLocalDpi xmlns:a14="http://schemas.microsoft.com/office/drawing/2010/main" val="0"/>
+              </a:ext>
+            </a:extLst>
+          </a:blip>
+          <a:srcRect/>
+          <a:stretch>
+            <a:fillRect/>
+          </a:stretch>
+        </p:blipFill>
+        <p:spPr bwMode="auto">
+          <a:xfrm>
+            <a:off x="8193088" y="4004817"/>
+            <a:ext cx="2947352" cy="1967358"/>
+          </a:xfrm>
+          <a:prstGeom prst="rect">
+            <a:avLst/>
+          </a:prstGeom>
+          <a:noFill/>
+          <a:extLst>
+            <a:ext uri="{909E8E84-426E-40DD-AFC4-6F175D3DCCD1}">
+              <a14:hiddenFill xmlns:a14="http://schemas.microsoft.com/office/drawing/2010/main">
+                <a:solidFill>
+                  <a:srgbClr val="FFFFFF"/>
+                </a:solidFill>
+              </a14:hiddenFill>
+            </a:ext>
+          </a:extLst>
+        </p:spPr>
+      </p:pic>
     </p:spTree>
     <p:extLst>
       <p:ext uri="{BB962C8B-B14F-4D97-AF65-F5344CB8AC3E}">
-        <p14:creationId xmlns:p14="http://schemas.microsoft.com/office/powerpoint/2010/main" val="3263224504"/>
+        <p14:creationId xmlns:p14="http://schemas.microsoft.com/office/powerpoint/2010/main" val="290894176"/>
       </p:ext>
     </p:extLst>
   </p:cSld>

</xml_diff>

<commit_message>
add overview of k8s cluster providers
</commit_message>
<xml_diff>
--- a/kubernetes/00_intro.pptx
+++ b/kubernetes/00_intro.pptx
@@ -5,10 +5,10 @@
     <p:sldMasterId id="2147483733" r:id="rId1"/>
   </p:sldMasterIdLst>
   <p:notesMasterIdLst>
-    <p:notesMasterId r:id="rId14"/>
+    <p:notesMasterId r:id="rId15"/>
   </p:notesMasterIdLst>
   <p:handoutMasterIdLst>
-    <p:handoutMasterId r:id="rId15"/>
+    <p:handoutMasterId r:id="rId16"/>
   </p:handoutMasterIdLst>
   <p:sldIdLst>
     <p:sldId id="433" r:id="rId2"/>
@@ -22,7 +22,8 @@
     <p:sldId id="449" r:id="rId10"/>
     <p:sldId id="447" r:id="rId11"/>
     <p:sldId id="448" r:id="rId12"/>
-    <p:sldId id="265" r:id="rId13"/>
+    <p:sldId id="451" r:id="rId13"/>
+    <p:sldId id="265" r:id="rId14"/>
   </p:sldIdLst>
   <p:sldSz cx="12195175" cy="6858000"/>
   <p:notesSz cx="6858000" cy="9144000"/>
@@ -561,7 +562,7 @@
             <a:fld id="{7D8C2C35-2B8A-446E-BEC0-FD36716C29AC}" type="slidenum">
               <a:rPr lang="de-DE" smtClean="0"/>
               <a:pPr/>
-              <a:t>12</a:t>
+              <a:t>13</a:t>
             </a:fld>
             <a:endParaRPr lang="de-DE" dirty="0"/>
           </a:p>
@@ -8730,6 +8731,263 @@
 </file>
 
 <file path=ppt/slides/slide12.xml><?xml version="1.0" encoding="utf-8"?>
+<p:sld xmlns:a="http://schemas.openxmlformats.org/drawingml/2006/main" xmlns:r="http://schemas.openxmlformats.org/officeDocument/2006/relationships" xmlns:p="http://schemas.openxmlformats.org/presentationml/2006/main">
+  <p:cSld>
+    <p:spTree>
+      <p:nvGrpSpPr>
+        <p:cNvPr id="1" name=""/>
+        <p:cNvGrpSpPr/>
+        <p:nvPr/>
+      </p:nvGrpSpPr>
+      <p:grpSpPr>
+        <a:xfrm>
+          <a:off x="0" y="0"/>
+          <a:ext cx="0" cy="0"/>
+          <a:chOff x="0" y="0"/>
+          <a:chExt cx="0" cy="0"/>
+        </a:xfrm>
+      </p:grpSpPr>
+      <p:sp>
+        <p:nvSpPr>
+          <p:cNvPr id="2" name="Title 1"/>
+          <p:cNvSpPr>
+            <a:spLocks noGrp="1"/>
+          </p:cNvSpPr>
+          <p:nvPr>
+            <p:ph type="title"/>
+          </p:nvPr>
+        </p:nvSpPr>
+        <p:spPr/>
+        <p:txBody>
+          <a:bodyPr/>
+          <a:lstStyle/>
+          <a:p>
+            <a:r>
+              <a:rPr lang="en-US" dirty="0"/>
+              <a:t>Wherefrom can I get a cluster?</a:t>
+            </a:r>
+          </a:p>
+        </p:txBody>
+      </p:sp>
+      <p:pic>
+        <p:nvPicPr>
+          <p:cNvPr id="1028" name="Picture 4" descr="Image result for aws"/>
+          <p:cNvPicPr>
+            <a:picLocks noChangeAspect="1" noChangeArrowheads="1"/>
+          </p:cNvPicPr>
+          <p:nvPr/>
+        </p:nvPicPr>
+        <p:blipFill>
+          <a:blip r:embed="rId2">
+            <a:extLst>
+              <a:ext uri="{28A0092B-C50C-407E-A947-70E740481C1C}">
+                <a14:useLocalDpi xmlns:a14="http://schemas.microsoft.com/office/drawing/2010/main" val="0"/>
+              </a:ext>
+            </a:extLst>
+          </a:blip>
+          <a:srcRect/>
+          <a:stretch>
+            <a:fillRect/>
+          </a:stretch>
+        </p:blipFill>
+        <p:spPr bwMode="auto">
+          <a:xfrm>
+            <a:off x="625921" y="2278339"/>
+            <a:ext cx="2528252" cy="1327757"/>
+          </a:xfrm>
+          <a:prstGeom prst="rect">
+            <a:avLst/>
+          </a:prstGeom>
+          <a:noFill/>
+          <a:extLst>
+            <a:ext uri="{909E8E84-426E-40DD-AFC4-6F175D3DCCD1}">
+              <a14:hiddenFill xmlns:a14="http://schemas.microsoft.com/office/drawing/2010/main">
+                <a:solidFill>
+                  <a:srgbClr val="FFFFFF"/>
+                </a:solidFill>
+              </a14:hiddenFill>
+            </a:ext>
+          </a:extLst>
+        </p:spPr>
+      </p:pic>
+      <p:pic>
+        <p:nvPicPr>
+          <p:cNvPr id="1034" name="Picture 10" descr="Image result for gcp"/>
+          <p:cNvPicPr>
+            <a:picLocks noChangeAspect="1" noChangeArrowheads="1"/>
+          </p:cNvPicPr>
+          <p:nvPr/>
+        </p:nvPicPr>
+        <p:blipFill>
+          <a:blip r:embed="rId3">
+            <a:extLst>
+              <a:ext uri="{28A0092B-C50C-407E-A947-70E740481C1C}">
+                <a14:useLocalDpi xmlns:a14="http://schemas.microsoft.com/office/drawing/2010/main" val="0"/>
+              </a:ext>
+            </a:extLst>
+          </a:blip>
+          <a:srcRect/>
+          <a:stretch>
+            <a:fillRect/>
+          </a:stretch>
+        </p:blipFill>
+        <p:spPr bwMode="auto">
+          <a:xfrm>
+            <a:off x="2240028" y="1035919"/>
+            <a:ext cx="6667500" cy="2667000"/>
+          </a:xfrm>
+          <a:prstGeom prst="rect">
+            <a:avLst/>
+          </a:prstGeom>
+          <a:noFill/>
+          <a:extLst>
+            <a:ext uri="{909E8E84-426E-40DD-AFC4-6F175D3DCCD1}">
+              <a14:hiddenFill xmlns:a14="http://schemas.microsoft.com/office/drawing/2010/main">
+                <a:solidFill>
+                  <a:srgbClr val="FFFFFF"/>
+                </a:solidFill>
+              </a14:hiddenFill>
+            </a:ext>
+          </a:extLst>
+        </p:spPr>
+      </p:pic>
+      <p:pic>
+        <p:nvPicPr>
+          <p:cNvPr id="1040" name="Picture 16" descr="Image result for azure"/>
+          <p:cNvPicPr>
+            <a:picLocks noChangeAspect="1" noChangeArrowheads="1"/>
+          </p:cNvPicPr>
+          <p:nvPr/>
+        </p:nvPicPr>
+        <p:blipFill>
+          <a:blip r:embed="rId4">
+            <a:extLst>
+              <a:ext uri="{28A0092B-C50C-407E-A947-70E740481C1C}">
+                <a14:useLocalDpi xmlns:a14="http://schemas.microsoft.com/office/drawing/2010/main" val="0"/>
+              </a:ext>
+            </a:extLst>
+          </a:blip>
+          <a:srcRect/>
+          <a:stretch>
+            <a:fillRect/>
+          </a:stretch>
+        </p:blipFill>
+        <p:spPr bwMode="auto">
+          <a:xfrm>
+            <a:off x="1703515" y="4553903"/>
+            <a:ext cx="2657475" cy="1371600"/>
+          </a:xfrm>
+          <a:prstGeom prst="rect">
+            <a:avLst/>
+          </a:prstGeom>
+          <a:noFill/>
+          <a:extLst>
+            <a:ext uri="{909E8E84-426E-40DD-AFC4-6F175D3DCCD1}">
+              <a14:hiddenFill xmlns:a14="http://schemas.microsoft.com/office/drawing/2010/main">
+                <a:solidFill>
+                  <a:srgbClr val="FFFFFF"/>
+                </a:solidFill>
+              </a14:hiddenFill>
+            </a:ext>
+          </a:extLst>
+        </p:spPr>
+      </p:pic>
+      <p:pic>
+        <p:nvPicPr>
+          <p:cNvPr id="1042" name="Picture 18" descr="Image result for giantswarm"/>
+          <p:cNvPicPr>
+            <a:picLocks noChangeAspect="1" noChangeArrowheads="1"/>
+          </p:cNvPicPr>
+          <p:nvPr/>
+        </p:nvPicPr>
+        <p:blipFill>
+          <a:blip r:embed="rId5">
+            <a:extLst>
+              <a:ext uri="{28A0092B-C50C-407E-A947-70E740481C1C}">
+                <a14:useLocalDpi xmlns:a14="http://schemas.microsoft.com/office/drawing/2010/main" val="0"/>
+              </a:ext>
+            </a:extLst>
+          </a:blip>
+          <a:srcRect/>
+          <a:stretch>
+            <a:fillRect/>
+          </a:stretch>
+        </p:blipFill>
+        <p:spPr bwMode="auto">
+          <a:xfrm>
+            <a:off x="6356668" y="3865506"/>
+            <a:ext cx="2438400" cy="2438400"/>
+          </a:xfrm>
+          <a:prstGeom prst="rect">
+            <a:avLst/>
+          </a:prstGeom>
+          <a:noFill/>
+          <a:extLst>
+            <a:ext uri="{909E8E84-426E-40DD-AFC4-6F175D3DCCD1}">
+              <a14:hiddenFill xmlns:a14="http://schemas.microsoft.com/office/drawing/2010/main">
+                <a:solidFill>
+                  <a:srgbClr val="FFFFFF"/>
+                </a:solidFill>
+              </a14:hiddenFill>
+            </a:ext>
+          </a:extLst>
+        </p:spPr>
+      </p:pic>
+      <p:pic>
+        <p:nvPicPr>
+          <p:cNvPr id="1048" name="Picture 24" descr="logo@2x.png"/>
+          <p:cNvPicPr>
+            <a:picLocks noChangeAspect="1" noChangeArrowheads="1"/>
+          </p:cNvPicPr>
+          <p:nvPr/>
+        </p:nvPicPr>
+        <p:blipFill>
+          <a:blip r:embed="rId6">
+            <a:extLst>
+              <a:ext uri="{28A0092B-C50C-407E-A947-70E740481C1C}">
+                <a14:useLocalDpi xmlns:a14="http://schemas.microsoft.com/office/drawing/2010/main" val="0"/>
+              </a:ext>
+            </a:extLst>
+          </a:blip>
+          <a:srcRect/>
+          <a:stretch>
+            <a:fillRect/>
+          </a:stretch>
+        </p:blipFill>
+        <p:spPr bwMode="auto">
+          <a:xfrm>
+            <a:off x="7857808" y="688666"/>
+            <a:ext cx="2787332" cy="2787332"/>
+          </a:xfrm>
+          <a:prstGeom prst="rect">
+            <a:avLst/>
+          </a:prstGeom>
+          <a:noFill/>
+          <a:extLst>
+            <a:ext uri="{909E8E84-426E-40DD-AFC4-6F175D3DCCD1}">
+              <a14:hiddenFill xmlns:a14="http://schemas.microsoft.com/office/drawing/2010/main">
+                <a:solidFill>
+                  <a:srgbClr val="FFFFFF"/>
+                </a:solidFill>
+              </a14:hiddenFill>
+            </a:ext>
+          </a:extLst>
+        </p:spPr>
+      </p:pic>
+    </p:spTree>
+    <p:extLst>
+      <p:ext uri="{BB962C8B-B14F-4D97-AF65-F5344CB8AC3E}">
+        <p14:creationId xmlns:p14="http://schemas.microsoft.com/office/powerpoint/2010/main" val="627288864"/>
+      </p:ext>
+    </p:extLst>
+  </p:cSld>
+  <p:clrMapOvr>
+    <a:masterClrMapping/>
+  </p:clrMapOvr>
+</p:sld>
+</file>
+
+<file path=ppt/slides/slide13.xml><?xml version="1.0" encoding="utf-8"?>
 <p:sld xmlns:a="http://schemas.openxmlformats.org/drawingml/2006/main" xmlns:r="http://schemas.openxmlformats.org/officeDocument/2006/relationships" xmlns:p="http://schemas.openxmlformats.org/presentationml/2006/main" show="0">
   <p:cSld>
     <p:spTree>

</xml_diff>

<commit_message>
added description & explanations to speaker notes
</commit_message>
<xml_diff>
--- a/kubernetes/00_intro.pptx
+++ b/kubernetes/00_intro.pptx
@@ -546,6 +546,37 @@
       </p:grpSpPr>
       <p:sp>
         <p:nvSpPr>
+          <p:cNvPr id="2" name="Slide Image Placeholder 1"/>
+          <p:cNvSpPr>
+            <a:spLocks noGrp="1" noRot="1" noChangeAspect="1"/>
+          </p:cNvSpPr>
+          <p:nvPr>
+            <p:ph type="sldImg"/>
+          </p:nvPr>
+        </p:nvSpPr>
+        <p:spPr/>
+      </p:sp>
+      <p:sp>
+        <p:nvSpPr>
+          <p:cNvPr id="3" name="Notes Placeholder 2"/>
+          <p:cNvSpPr>
+            <a:spLocks noGrp="1"/>
+          </p:cNvSpPr>
+          <p:nvPr>
+            <p:ph type="body" idx="1"/>
+          </p:nvPr>
+        </p:nvSpPr>
+        <p:spPr/>
+        <p:txBody>
+          <a:bodyPr/>
+          <a:lstStyle/>
+          <a:p>
+            <a:endParaRPr lang="en-US"/>
+          </a:p>
+        </p:txBody>
+      </p:sp>
+      <p:sp>
+        <p:nvSpPr>
           <p:cNvPr id="4" name="Slide Number Placeholder 3"/>
           <p:cNvSpPr>
             <a:spLocks noGrp="1"/>
@@ -562,6 +593,323 @@
             <a:fld id="{7D8C2C35-2B8A-446E-BEC0-FD36716C29AC}" type="slidenum">
               <a:rPr lang="de-DE" smtClean="0"/>
               <a:pPr/>
+              <a:t>1</a:t>
+            </a:fld>
+            <a:endParaRPr lang="de-DE" dirty="0"/>
+          </a:p>
+        </p:txBody>
+      </p:sp>
+    </p:spTree>
+    <p:extLst>
+      <p:ext uri="{BB962C8B-B14F-4D97-AF65-F5344CB8AC3E}">
+        <p14:creationId xmlns:p14="http://schemas.microsoft.com/office/powerpoint/2010/main" val="1301385744"/>
+      </p:ext>
+    </p:extLst>
+  </p:cSld>
+  <p:clrMapOvr>
+    <a:masterClrMapping/>
+  </p:clrMapOvr>
+</p:notes>
+</file>
+
+<file path=ppt/notesSlides/notesSlide10.xml><?xml version="1.0" encoding="utf-8"?>
+<p:notes xmlns:a="http://schemas.openxmlformats.org/drawingml/2006/main" xmlns:r="http://schemas.openxmlformats.org/officeDocument/2006/relationships" xmlns:p="http://schemas.openxmlformats.org/presentationml/2006/main">
+  <p:cSld>
+    <p:spTree>
+      <p:nvGrpSpPr>
+        <p:cNvPr id="1" name=""/>
+        <p:cNvGrpSpPr/>
+        <p:nvPr/>
+      </p:nvGrpSpPr>
+      <p:grpSpPr>
+        <a:xfrm>
+          <a:off x="0" y="0"/>
+          <a:ext cx="0" cy="0"/>
+          <a:chOff x="0" y="0"/>
+          <a:chExt cx="0" cy="0"/>
+        </a:xfrm>
+      </p:grpSpPr>
+      <p:sp>
+        <p:nvSpPr>
+          <p:cNvPr id="2" name="Slide Image Placeholder 1"/>
+          <p:cNvSpPr>
+            <a:spLocks noGrp="1" noRot="1" noChangeAspect="1"/>
+          </p:cNvSpPr>
+          <p:nvPr>
+            <p:ph type="sldImg"/>
+          </p:nvPr>
+        </p:nvSpPr>
+        <p:spPr/>
+      </p:sp>
+      <p:sp>
+        <p:nvSpPr>
+          <p:cNvPr id="3" name="Notes Placeholder 2"/>
+          <p:cNvSpPr>
+            <a:spLocks noGrp="1"/>
+          </p:cNvSpPr>
+          <p:nvPr>
+            <p:ph type="body" idx="1"/>
+          </p:nvPr>
+        </p:nvSpPr>
+        <p:spPr/>
+        <p:txBody>
+          <a:bodyPr/>
+          <a:lstStyle/>
+          <a:p>
+            <a:endParaRPr lang="en-US"/>
+          </a:p>
+        </p:txBody>
+      </p:sp>
+      <p:sp>
+        <p:nvSpPr>
+          <p:cNvPr id="4" name="Slide Number Placeholder 3"/>
+          <p:cNvSpPr>
+            <a:spLocks noGrp="1"/>
+          </p:cNvSpPr>
+          <p:nvPr>
+            <p:ph type="sldNum" sz="quarter" idx="10"/>
+          </p:nvPr>
+        </p:nvSpPr>
+        <p:spPr/>
+        <p:txBody>
+          <a:bodyPr/>
+          <a:lstStyle/>
+          <a:p>
+            <a:fld id="{7D8C2C35-2B8A-446E-BEC0-FD36716C29AC}" type="slidenum">
+              <a:rPr lang="de-DE" smtClean="0"/>
+              <a:pPr/>
+              <a:t>10</a:t>
+            </a:fld>
+            <a:endParaRPr lang="de-DE" dirty="0"/>
+          </a:p>
+        </p:txBody>
+      </p:sp>
+    </p:spTree>
+    <p:extLst>
+      <p:ext uri="{BB962C8B-B14F-4D97-AF65-F5344CB8AC3E}">
+        <p14:creationId xmlns:p14="http://schemas.microsoft.com/office/powerpoint/2010/main" val="467728202"/>
+      </p:ext>
+    </p:extLst>
+  </p:cSld>
+  <p:clrMapOvr>
+    <a:masterClrMapping/>
+  </p:clrMapOvr>
+</p:notes>
+</file>
+
+<file path=ppt/notesSlides/notesSlide11.xml><?xml version="1.0" encoding="utf-8"?>
+<p:notes xmlns:a="http://schemas.openxmlformats.org/drawingml/2006/main" xmlns:r="http://schemas.openxmlformats.org/officeDocument/2006/relationships" xmlns:p="http://schemas.openxmlformats.org/presentationml/2006/main">
+  <p:cSld>
+    <p:spTree>
+      <p:nvGrpSpPr>
+        <p:cNvPr id="1" name=""/>
+        <p:cNvGrpSpPr/>
+        <p:nvPr/>
+      </p:nvGrpSpPr>
+      <p:grpSpPr>
+        <a:xfrm>
+          <a:off x="0" y="0"/>
+          <a:ext cx="0" cy="0"/>
+          <a:chOff x="0" y="0"/>
+          <a:chExt cx="0" cy="0"/>
+        </a:xfrm>
+      </p:grpSpPr>
+      <p:sp>
+        <p:nvSpPr>
+          <p:cNvPr id="2" name="Slide Image Placeholder 1"/>
+          <p:cNvSpPr>
+            <a:spLocks noGrp="1" noRot="1" noChangeAspect="1"/>
+          </p:cNvSpPr>
+          <p:nvPr>
+            <p:ph type="sldImg"/>
+          </p:nvPr>
+        </p:nvSpPr>
+        <p:spPr/>
+      </p:sp>
+      <p:sp>
+        <p:nvSpPr>
+          <p:cNvPr id="3" name="Notes Placeholder 2"/>
+          <p:cNvSpPr>
+            <a:spLocks noGrp="1"/>
+          </p:cNvSpPr>
+          <p:nvPr>
+            <p:ph type="body" idx="1"/>
+          </p:nvPr>
+        </p:nvSpPr>
+        <p:spPr/>
+        <p:txBody>
+          <a:bodyPr/>
+          <a:lstStyle/>
+          <a:p>
+            <a:endParaRPr lang="en-US"/>
+          </a:p>
+        </p:txBody>
+      </p:sp>
+      <p:sp>
+        <p:nvSpPr>
+          <p:cNvPr id="4" name="Slide Number Placeholder 3"/>
+          <p:cNvSpPr>
+            <a:spLocks noGrp="1"/>
+          </p:cNvSpPr>
+          <p:nvPr>
+            <p:ph type="sldNum" sz="quarter" idx="10"/>
+          </p:nvPr>
+        </p:nvSpPr>
+        <p:spPr/>
+        <p:txBody>
+          <a:bodyPr/>
+          <a:lstStyle/>
+          <a:p>
+            <a:fld id="{7D8C2C35-2B8A-446E-BEC0-FD36716C29AC}" type="slidenum">
+              <a:rPr lang="de-DE" smtClean="0"/>
+              <a:pPr/>
+              <a:t>11</a:t>
+            </a:fld>
+            <a:endParaRPr lang="de-DE" dirty="0"/>
+          </a:p>
+        </p:txBody>
+      </p:sp>
+    </p:spTree>
+    <p:extLst>
+      <p:ext uri="{BB962C8B-B14F-4D97-AF65-F5344CB8AC3E}">
+        <p14:creationId xmlns:p14="http://schemas.microsoft.com/office/powerpoint/2010/main" val="1146731827"/>
+      </p:ext>
+    </p:extLst>
+  </p:cSld>
+  <p:clrMapOvr>
+    <a:masterClrMapping/>
+  </p:clrMapOvr>
+</p:notes>
+</file>
+
+<file path=ppt/notesSlides/notesSlide12.xml><?xml version="1.0" encoding="utf-8"?>
+<p:notes xmlns:a="http://schemas.openxmlformats.org/drawingml/2006/main" xmlns:r="http://schemas.openxmlformats.org/officeDocument/2006/relationships" xmlns:p="http://schemas.openxmlformats.org/presentationml/2006/main">
+  <p:cSld>
+    <p:spTree>
+      <p:nvGrpSpPr>
+        <p:cNvPr id="1" name=""/>
+        <p:cNvGrpSpPr/>
+        <p:nvPr/>
+      </p:nvGrpSpPr>
+      <p:grpSpPr>
+        <a:xfrm>
+          <a:off x="0" y="0"/>
+          <a:ext cx="0" cy="0"/>
+          <a:chOff x="0" y="0"/>
+          <a:chExt cx="0" cy="0"/>
+        </a:xfrm>
+      </p:grpSpPr>
+      <p:sp>
+        <p:nvSpPr>
+          <p:cNvPr id="2" name="Slide Image Placeholder 1"/>
+          <p:cNvSpPr>
+            <a:spLocks noGrp="1" noRot="1" noChangeAspect="1"/>
+          </p:cNvSpPr>
+          <p:nvPr>
+            <p:ph type="sldImg"/>
+          </p:nvPr>
+        </p:nvSpPr>
+        <p:spPr/>
+      </p:sp>
+      <p:sp>
+        <p:nvSpPr>
+          <p:cNvPr id="3" name="Notes Placeholder 2"/>
+          <p:cNvSpPr>
+            <a:spLocks noGrp="1"/>
+          </p:cNvSpPr>
+          <p:nvPr>
+            <p:ph type="body" idx="1"/>
+          </p:nvPr>
+        </p:nvSpPr>
+        <p:spPr/>
+        <p:txBody>
+          <a:bodyPr/>
+          <a:lstStyle/>
+          <a:p>
+            <a:r>
+              <a:rPr lang="en-US" dirty="0"/>
+              <a:t>Gardener: SAP’s solution to </a:t>
+            </a:r>
+            <a:r>
+              <a:rPr lang="en-US"/>
+              <a:t>managed Kubernetes</a:t>
+            </a:r>
+            <a:endParaRPr lang="en-US" dirty="0"/>
+          </a:p>
+        </p:txBody>
+      </p:sp>
+      <p:sp>
+        <p:nvSpPr>
+          <p:cNvPr id="4" name="Slide Number Placeholder 3"/>
+          <p:cNvSpPr>
+            <a:spLocks noGrp="1"/>
+          </p:cNvSpPr>
+          <p:nvPr>
+            <p:ph type="sldNum" sz="quarter" idx="10"/>
+          </p:nvPr>
+        </p:nvSpPr>
+        <p:spPr/>
+        <p:txBody>
+          <a:bodyPr/>
+          <a:lstStyle/>
+          <a:p>
+            <a:fld id="{7D8C2C35-2B8A-446E-BEC0-FD36716C29AC}" type="slidenum">
+              <a:rPr lang="de-DE" smtClean="0"/>
+              <a:pPr/>
+              <a:t>12</a:t>
+            </a:fld>
+            <a:endParaRPr lang="de-DE" dirty="0"/>
+          </a:p>
+        </p:txBody>
+      </p:sp>
+    </p:spTree>
+    <p:extLst>
+      <p:ext uri="{BB962C8B-B14F-4D97-AF65-F5344CB8AC3E}">
+        <p14:creationId xmlns:p14="http://schemas.microsoft.com/office/powerpoint/2010/main" val="3294899344"/>
+      </p:ext>
+    </p:extLst>
+  </p:cSld>
+  <p:clrMapOvr>
+    <a:masterClrMapping/>
+  </p:clrMapOvr>
+</p:notes>
+</file>
+
+<file path=ppt/notesSlides/notesSlide13.xml><?xml version="1.0" encoding="utf-8"?>
+<p:notes xmlns:a="http://schemas.openxmlformats.org/drawingml/2006/main" xmlns:r="http://schemas.openxmlformats.org/officeDocument/2006/relationships" xmlns:p="http://schemas.openxmlformats.org/presentationml/2006/main">
+  <p:cSld>
+    <p:spTree>
+      <p:nvGrpSpPr>
+        <p:cNvPr id="1" name=""/>
+        <p:cNvGrpSpPr/>
+        <p:nvPr/>
+      </p:nvGrpSpPr>
+      <p:grpSpPr>
+        <a:xfrm>
+          <a:off x="0" y="0"/>
+          <a:ext cx="0" cy="0"/>
+          <a:chOff x="0" y="0"/>
+          <a:chExt cx="0" cy="0"/>
+        </a:xfrm>
+      </p:grpSpPr>
+      <p:sp>
+        <p:nvSpPr>
+          <p:cNvPr id="4" name="Slide Number Placeholder 3"/>
+          <p:cNvSpPr>
+            <a:spLocks noGrp="1"/>
+          </p:cNvSpPr>
+          <p:nvPr>
+            <p:ph type="sldNum" sz="quarter" idx="10"/>
+          </p:nvPr>
+        </p:nvSpPr>
+        <p:spPr/>
+        <p:txBody>
+          <a:bodyPr/>
+          <a:lstStyle/>
+          <a:p>
+            <a:fld id="{7D8C2C35-2B8A-446E-BEC0-FD36716C29AC}" type="slidenum">
+              <a:rPr lang="de-DE" smtClean="0"/>
+              <a:pPr/>
               <a:t>13</a:t>
             </a:fld>
             <a:endParaRPr lang="de-DE" dirty="0"/>
@@ -610,6 +958,764 @@
     <p:extLst>
       <p:ext uri="{BB962C8B-B14F-4D97-AF65-F5344CB8AC3E}">
         <p14:creationId xmlns:p14="http://schemas.microsoft.com/office/powerpoint/2010/main" val="2544264309"/>
+      </p:ext>
+    </p:extLst>
+  </p:cSld>
+  <p:clrMapOvr>
+    <a:masterClrMapping/>
+  </p:clrMapOvr>
+</p:notes>
+</file>
+
+<file path=ppt/notesSlides/notesSlide2.xml><?xml version="1.0" encoding="utf-8"?>
+<p:notes xmlns:a="http://schemas.openxmlformats.org/drawingml/2006/main" xmlns:r="http://schemas.openxmlformats.org/officeDocument/2006/relationships" xmlns:p="http://schemas.openxmlformats.org/presentationml/2006/main">
+  <p:cSld>
+    <p:spTree>
+      <p:nvGrpSpPr>
+        <p:cNvPr id="1" name=""/>
+        <p:cNvGrpSpPr/>
+        <p:nvPr/>
+      </p:nvGrpSpPr>
+      <p:grpSpPr>
+        <a:xfrm>
+          <a:off x="0" y="0"/>
+          <a:ext cx="0" cy="0"/>
+          <a:chOff x="0" y="0"/>
+          <a:chExt cx="0" cy="0"/>
+        </a:xfrm>
+      </p:grpSpPr>
+      <p:sp>
+        <p:nvSpPr>
+          <p:cNvPr id="2" name="Slide Image Placeholder 1"/>
+          <p:cNvSpPr>
+            <a:spLocks noGrp="1" noRot="1" noChangeAspect="1"/>
+          </p:cNvSpPr>
+          <p:nvPr>
+            <p:ph type="sldImg"/>
+          </p:nvPr>
+        </p:nvSpPr>
+        <p:spPr/>
+      </p:sp>
+      <p:sp>
+        <p:nvSpPr>
+          <p:cNvPr id="3" name="Notes Placeholder 2"/>
+          <p:cNvSpPr>
+            <a:spLocks noGrp="1"/>
+          </p:cNvSpPr>
+          <p:nvPr>
+            <p:ph type="body" idx="1"/>
+          </p:nvPr>
+        </p:nvSpPr>
+        <p:spPr/>
+        <p:txBody>
+          <a:bodyPr/>
+          <a:lstStyle/>
+          <a:p>
+            <a:r>
+              <a:rPr lang="en-US" dirty="0"/>
+              <a:t>Docker hype started in 2013</a:t>
+            </a:r>
+          </a:p>
+          <a:p>
+            <a:r>
+              <a:rPr lang="en-US" dirty="0"/>
+              <a:t>Even more abstraction with “</a:t>
+            </a:r>
+            <a:r>
+              <a:rPr lang="en-US" dirty="0" err="1"/>
+              <a:t>serverless</a:t>
+            </a:r>
+            <a:r>
+              <a:rPr lang="en-US" dirty="0"/>
+              <a:t>” </a:t>
+            </a:r>
+          </a:p>
+          <a:p>
+            <a:r>
+              <a:rPr lang="en-US" dirty="0"/>
+              <a:t>However – does it really make sense? Probably not always…</a:t>
+            </a:r>
+          </a:p>
+        </p:txBody>
+      </p:sp>
+      <p:sp>
+        <p:nvSpPr>
+          <p:cNvPr id="4" name="Slide Number Placeholder 3"/>
+          <p:cNvSpPr>
+            <a:spLocks noGrp="1"/>
+          </p:cNvSpPr>
+          <p:nvPr>
+            <p:ph type="sldNum" sz="quarter" idx="10"/>
+          </p:nvPr>
+        </p:nvSpPr>
+        <p:spPr/>
+        <p:txBody>
+          <a:bodyPr/>
+          <a:lstStyle/>
+          <a:p>
+            <a:fld id="{7D8C2C35-2B8A-446E-BEC0-FD36716C29AC}" type="slidenum">
+              <a:rPr lang="de-DE" smtClean="0"/>
+              <a:pPr/>
+              <a:t>2</a:t>
+            </a:fld>
+            <a:endParaRPr lang="de-DE" dirty="0"/>
+          </a:p>
+        </p:txBody>
+      </p:sp>
+    </p:spTree>
+    <p:extLst>
+      <p:ext uri="{BB962C8B-B14F-4D97-AF65-F5344CB8AC3E}">
+        <p14:creationId xmlns:p14="http://schemas.microsoft.com/office/powerpoint/2010/main" val="2757086673"/>
+      </p:ext>
+    </p:extLst>
+  </p:cSld>
+  <p:clrMapOvr>
+    <a:masterClrMapping/>
+  </p:clrMapOvr>
+</p:notes>
+</file>
+
+<file path=ppt/notesSlides/notesSlide3.xml><?xml version="1.0" encoding="utf-8"?>
+<p:notes xmlns:a="http://schemas.openxmlformats.org/drawingml/2006/main" xmlns:r="http://schemas.openxmlformats.org/officeDocument/2006/relationships" xmlns:p="http://schemas.openxmlformats.org/presentationml/2006/main">
+  <p:cSld>
+    <p:spTree>
+      <p:nvGrpSpPr>
+        <p:cNvPr id="1" name=""/>
+        <p:cNvGrpSpPr/>
+        <p:nvPr/>
+      </p:nvGrpSpPr>
+      <p:grpSpPr>
+        <a:xfrm>
+          <a:off x="0" y="0"/>
+          <a:ext cx="0" cy="0"/>
+          <a:chOff x="0" y="0"/>
+          <a:chExt cx="0" cy="0"/>
+        </a:xfrm>
+      </p:grpSpPr>
+      <p:sp>
+        <p:nvSpPr>
+          <p:cNvPr id="2" name="Slide Image Placeholder 1"/>
+          <p:cNvSpPr>
+            <a:spLocks noGrp="1" noRot="1" noChangeAspect="1"/>
+          </p:cNvSpPr>
+          <p:nvPr>
+            <p:ph type="sldImg"/>
+          </p:nvPr>
+        </p:nvSpPr>
+        <p:spPr/>
+      </p:sp>
+      <p:sp>
+        <p:nvSpPr>
+          <p:cNvPr id="3" name="Notes Placeholder 2"/>
+          <p:cNvSpPr>
+            <a:spLocks noGrp="1"/>
+          </p:cNvSpPr>
+          <p:nvPr>
+            <p:ph type="body" idx="1"/>
+          </p:nvPr>
+        </p:nvSpPr>
+        <p:spPr/>
+        <p:txBody>
+          <a:bodyPr/>
+          <a:lstStyle/>
+          <a:p>
+            <a:r>
+              <a:rPr lang="en-US" dirty="0"/>
+              <a:t>“Since we introduced micro services, every outage is like a murder mystery”</a:t>
+            </a:r>
+          </a:p>
+        </p:txBody>
+      </p:sp>
+      <p:sp>
+        <p:nvSpPr>
+          <p:cNvPr id="4" name="Slide Number Placeholder 3"/>
+          <p:cNvSpPr>
+            <a:spLocks noGrp="1"/>
+          </p:cNvSpPr>
+          <p:nvPr>
+            <p:ph type="sldNum" sz="quarter" idx="10"/>
+          </p:nvPr>
+        </p:nvSpPr>
+        <p:spPr/>
+        <p:txBody>
+          <a:bodyPr/>
+          <a:lstStyle/>
+          <a:p>
+            <a:fld id="{7D8C2C35-2B8A-446E-BEC0-FD36716C29AC}" type="slidenum">
+              <a:rPr lang="de-DE" smtClean="0"/>
+              <a:pPr/>
+              <a:t>3</a:t>
+            </a:fld>
+            <a:endParaRPr lang="de-DE" dirty="0"/>
+          </a:p>
+        </p:txBody>
+      </p:sp>
+    </p:spTree>
+    <p:extLst>
+      <p:ext uri="{BB962C8B-B14F-4D97-AF65-F5344CB8AC3E}">
+        <p14:creationId xmlns:p14="http://schemas.microsoft.com/office/powerpoint/2010/main" val="1791696452"/>
+      </p:ext>
+    </p:extLst>
+  </p:cSld>
+  <p:clrMapOvr>
+    <a:masterClrMapping/>
+  </p:clrMapOvr>
+</p:notes>
+</file>
+
+<file path=ppt/notesSlides/notesSlide4.xml><?xml version="1.0" encoding="utf-8"?>
+<p:notes xmlns:a="http://schemas.openxmlformats.org/drawingml/2006/main" xmlns:r="http://schemas.openxmlformats.org/officeDocument/2006/relationships" xmlns:p="http://schemas.openxmlformats.org/presentationml/2006/main">
+  <p:cSld>
+    <p:spTree>
+      <p:nvGrpSpPr>
+        <p:cNvPr id="1" name=""/>
+        <p:cNvGrpSpPr/>
+        <p:nvPr/>
+      </p:nvGrpSpPr>
+      <p:grpSpPr>
+        <a:xfrm>
+          <a:off x="0" y="0"/>
+          <a:ext cx="0" cy="0"/>
+          <a:chOff x="0" y="0"/>
+          <a:chExt cx="0" cy="0"/>
+        </a:xfrm>
+      </p:grpSpPr>
+      <p:sp>
+        <p:nvSpPr>
+          <p:cNvPr id="2" name="Slide Image Placeholder 1"/>
+          <p:cNvSpPr>
+            <a:spLocks noGrp="1" noRot="1" noChangeAspect="1"/>
+          </p:cNvSpPr>
+          <p:nvPr>
+            <p:ph type="sldImg"/>
+          </p:nvPr>
+        </p:nvSpPr>
+        <p:spPr/>
+      </p:sp>
+      <p:sp>
+        <p:nvSpPr>
+          <p:cNvPr id="3" name="Notes Placeholder 2"/>
+          <p:cNvSpPr>
+            <a:spLocks noGrp="1"/>
+          </p:cNvSpPr>
+          <p:nvPr>
+            <p:ph type="body" idx="1"/>
+          </p:nvPr>
+        </p:nvSpPr>
+        <p:spPr/>
+        <p:txBody>
+          <a:bodyPr/>
+          <a:lstStyle/>
+          <a:p>
+            <a:r>
+              <a:rPr lang="en-US" dirty="0"/>
+              <a:t>How to tackle databases?</a:t>
+            </a:r>
+          </a:p>
+          <a:p>
+            <a:r>
+              <a:rPr lang="en-US" dirty="0"/>
+              <a:t>1 service =&gt; 1 database?</a:t>
+            </a:r>
+          </a:p>
+          <a:p>
+            <a:r>
+              <a:rPr lang="en-US" dirty="0"/>
+              <a:t>Containerize databases?</a:t>
+            </a:r>
+          </a:p>
+        </p:txBody>
+      </p:sp>
+      <p:sp>
+        <p:nvSpPr>
+          <p:cNvPr id="4" name="Slide Number Placeholder 3"/>
+          <p:cNvSpPr>
+            <a:spLocks noGrp="1"/>
+          </p:cNvSpPr>
+          <p:nvPr>
+            <p:ph type="sldNum" sz="quarter" idx="10"/>
+          </p:nvPr>
+        </p:nvSpPr>
+        <p:spPr/>
+        <p:txBody>
+          <a:bodyPr/>
+          <a:lstStyle/>
+          <a:p>
+            <a:fld id="{7D8C2C35-2B8A-446E-BEC0-FD36716C29AC}" type="slidenum">
+              <a:rPr lang="de-DE" smtClean="0"/>
+              <a:pPr/>
+              <a:t>4</a:t>
+            </a:fld>
+            <a:endParaRPr lang="de-DE" dirty="0"/>
+          </a:p>
+        </p:txBody>
+      </p:sp>
+    </p:spTree>
+    <p:extLst>
+      <p:ext uri="{BB962C8B-B14F-4D97-AF65-F5344CB8AC3E}">
+        <p14:creationId xmlns:p14="http://schemas.microsoft.com/office/powerpoint/2010/main" val="1445180977"/>
+      </p:ext>
+    </p:extLst>
+  </p:cSld>
+  <p:clrMapOvr>
+    <a:masterClrMapping/>
+  </p:clrMapOvr>
+</p:notes>
+</file>
+
+<file path=ppt/notesSlides/notesSlide5.xml><?xml version="1.0" encoding="utf-8"?>
+<p:notes xmlns:a="http://schemas.openxmlformats.org/drawingml/2006/main" xmlns:r="http://schemas.openxmlformats.org/officeDocument/2006/relationships" xmlns:p="http://schemas.openxmlformats.org/presentationml/2006/main">
+  <p:cSld>
+    <p:spTree>
+      <p:nvGrpSpPr>
+        <p:cNvPr id="1" name=""/>
+        <p:cNvGrpSpPr/>
+        <p:nvPr/>
+      </p:nvGrpSpPr>
+      <p:grpSpPr>
+        <a:xfrm>
+          <a:off x="0" y="0"/>
+          <a:ext cx="0" cy="0"/>
+          <a:chOff x="0" y="0"/>
+          <a:chExt cx="0" cy="0"/>
+        </a:xfrm>
+      </p:grpSpPr>
+      <p:sp>
+        <p:nvSpPr>
+          <p:cNvPr id="2" name="Slide Image Placeholder 1"/>
+          <p:cNvSpPr>
+            <a:spLocks noGrp="1" noRot="1" noChangeAspect="1"/>
+          </p:cNvSpPr>
+          <p:nvPr>
+            <p:ph type="sldImg"/>
+          </p:nvPr>
+        </p:nvSpPr>
+        <p:spPr/>
+      </p:sp>
+      <p:sp>
+        <p:nvSpPr>
+          <p:cNvPr id="3" name="Notes Placeholder 2"/>
+          <p:cNvSpPr>
+            <a:spLocks noGrp="1"/>
+          </p:cNvSpPr>
+          <p:nvPr>
+            <p:ph type="body" idx="1"/>
+          </p:nvPr>
+        </p:nvSpPr>
+        <p:spPr/>
+        <p:txBody>
+          <a:bodyPr/>
+          <a:lstStyle/>
+          <a:p>
+            <a:endParaRPr lang="en-US" dirty="0"/>
+          </a:p>
+        </p:txBody>
+      </p:sp>
+      <p:sp>
+        <p:nvSpPr>
+          <p:cNvPr id="4" name="Slide Number Placeholder 3"/>
+          <p:cNvSpPr>
+            <a:spLocks noGrp="1"/>
+          </p:cNvSpPr>
+          <p:nvPr>
+            <p:ph type="sldNum" sz="quarter" idx="10"/>
+          </p:nvPr>
+        </p:nvSpPr>
+        <p:spPr/>
+        <p:txBody>
+          <a:bodyPr/>
+          <a:lstStyle/>
+          <a:p>
+            <a:fld id="{7D8C2C35-2B8A-446E-BEC0-FD36716C29AC}" type="slidenum">
+              <a:rPr lang="de-DE" smtClean="0"/>
+              <a:pPr/>
+              <a:t>5</a:t>
+            </a:fld>
+            <a:endParaRPr lang="de-DE" dirty="0"/>
+          </a:p>
+        </p:txBody>
+      </p:sp>
+    </p:spTree>
+    <p:extLst>
+      <p:ext uri="{BB962C8B-B14F-4D97-AF65-F5344CB8AC3E}">
+        <p14:creationId xmlns:p14="http://schemas.microsoft.com/office/powerpoint/2010/main" val="86536247"/>
+      </p:ext>
+    </p:extLst>
+  </p:cSld>
+  <p:clrMapOvr>
+    <a:masterClrMapping/>
+  </p:clrMapOvr>
+</p:notes>
+</file>
+
+<file path=ppt/notesSlides/notesSlide6.xml><?xml version="1.0" encoding="utf-8"?>
+<p:notes xmlns:a="http://schemas.openxmlformats.org/drawingml/2006/main" xmlns:r="http://schemas.openxmlformats.org/officeDocument/2006/relationships" xmlns:p="http://schemas.openxmlformats.org/presentationml/2006/main">
+  <p:cSld>
+    <p:spTree>
+      <p:nvGrpSpPr>
+        <p:cNvPr id="1" name=""/>
+        <p:cNvGrpSpPr/>
+        <p:nvPr/>
+      </p:nvGrpSpPr>
+      <p:grpSpPr>
+        <a:xfrm>
+          <a:off x="0" y="0"/>
+          <a:ext cx="0" cy="0"/>
+          <a:chOff x="0" y="0"/>
+          <a:chExt cx="0" cy="0"/>
+        </a:xfrm>
+      </p:grpSpPr>
+      <p:sp>
+        <p:nvSpPr>
+          <p:cNvPr id="2" name="Slide Image Placeholder 1"/>
+          <p:cNvSpPr>
+            <a:spLocks noGrp="1" noRot="1" noChangeAspect="1"/>
+          </p:cNvSpPr>
+          <p:nvPr>
+            <p:ph type="sldImg"/>
+          </p:nvPr>
+        </p:nvSpPr>
+        <p:spPr/>
+      </p:sp>
+      <p:sp>
+        <p:nvSpPr>
+          <p:cNvPr id="3" name="Notes Placeholder 2"/>
+          <p:cNvSpPr>
+            <a:spLocks noGrp="1"/>
+          </p:cNvSpPr>
+          <p:nvPr>
+            <p:ph type="body" idx="1"/>
+          </p:nvPr>
+        </p:nvSpPr>
+        <p:spPr/>
+        <p:txBody>
+          <a:bodyPr/>
+          <a:lstStyle/>
+          <a:p>
+            <a:r>
+              <a:rPr lang="en-US" dirty="0"/>
+              <a:t>Local isolation like in an aquarium is not ideal. Talking from </a:t>
+            </a:r>
+            <a:r>
+              <a:rPr lang="en-US" dirty="0" err="1"/>
+              <a:t>docker</a:t>
+            </a:r>
+            <a:r>
+              <a:rPr lang="en-US" dirty="0"/>
+              <a:t> host to </a:t>
+            </a:r>
+            <a:r>
+              <a:rPr lang="en-US" dirty="0" err="1"/>
+              <a:t>docker</a:t>
+            </a:r>
+            <a:r>
+              <a:rPr lang="en-US" dirty="0"/>
+              <a:t> host is complex due to port mappings.</a:t>
+            </a:r>
+          </a:p>
+          <a:p>
+            <a:r>
+              <a:rPr lang="en-US" dirty="0"/>
+              <a:t>However deploying your apps to the wide sea of Kubernetes, doesn’t solve this fully. </a:t>
+            </a:r>
+          </a:p>
+        </p:txBody>
+      </p:sp>
+      <p:sp>
+        <p:nvSpPr>
+          <p:cNvPr id="4" name="Slide Number Placeholder 3"/>
+          <p:cNvSpPr>
+            <a:spLocks noGrp="1"/>
+          </p:cNvSpPr>
+          <p:nvPr>
+            <p:ph type="sldNum" sz="quarter" idx="10"/>
+          </p:nvPr>
+        </p:nvSpPr>
+        <p:spPr/>
+        <p:txBody>
+          <a:bodyPr/>
+          <a:lstStyle/>
+          <a:p>
+            <a:fld id="{7D8C2C35-2B8A-446E-BEC0-FD36716C29AC}" type="slidenum">
+              <a:rPr lang="de-DE" smtClean="0"/>
+              <a:pPr/>
+              <a:t>6</a:t>
+            </a:fld>
+            <a:endParaRPr lang="de-DE" dirty="0"/>
+          </a:p>
+        </p:txBody>
+      </p:sp>
+    </p:spTree>
+    <p:extLst>
+      <p:ext uri="{BB962C8B-B14F-4D97-AF65-F5344CB8AC3E}">
+        <p14:creationId xmlns:p14="http://schemas.microsoft.com/office/powerpoint/2010/main" val="2753081244"/>
+      </p:ext>
+    </p:extLst>
+  </p:cSld>
+  <p:clrMapOvr>
+    <a:masterClrMapping/>
+  </p:clrMapOvr>
+</p:notes>
+</file>
+
+<file path=ppt/notesSlides/notesSlide7.xml><?xml version="1.0" encoding="utf-8"?>
+<p:notes xmlns:a="http://schemas.openxmlformats.org/drawingml/2006/main" xmlns:r="http://schemas.openxmlformats.org/officeDocument/2006/relationships" xmlns:p="http://schemas.openxmlformats.org/presentationml/2006/main">
+  <p:cSld>
+    <p:spTree>
+      <p:nvGrpSpPr>
+        <p:cNvPr id="1" name=""/>
+        <p:cNvGrpSpPr/>
+        <p:nvPr/>
+      </p:nvGrpSpPr>
+      <p:grpSpPr>
+        <a:xfrm>
+          <a:off x="0" y="0"/>
+          <a:ext cx="0" cy="0"/>
+          <a:chOff x="0" y="0"/>
+          <a:chExt cx="0" cy="0"/>
+        </a:xfrm>
+      </p:grpSpPr>
+      <p:sp>
+        <p:nvSpPr>
+          <p:cNvPr id="2" name="Slide Image Placeholder 1"/>
+          <p:cNvSpPr>
+            <a:spLocks noGrp="1" noRot="1" noChangeAspect="1"/>
+          </p:cNvSpPr>
+          <p:nvPr>
+            <p:ph type="sldImg"/>
+          </p:nvPr>
+        </p:nvSpPr>
+        <p:spPr/>
+      </p:sp>
+      <p:sp>
+        <p:nvSpPr>
+          <p:cNvPr id="3" name="Notes Placeholder 2"/>
+          <p:cNvSpPr>
+            <a:spLocks noGrp="1"/>
+          </p:cNvSpPr>
+          <p:nvPr>
+            <p:ph type="body" idx="1"/>
+          </p:nvPr>
+        </p:nvSpPr>
+        <p:spPr/>
+        <p:txBody>
+          <a:bodyPr/>
+          <a:lstStyle/>
+          <a:p>
+            <a:endParaRPr lang="en-US"/>
+          </a:p>
+        </p:txBody>
+      </p:sp>
+      <p:sp>
+        <p:nvSpPr>
+          <p:cNvPr id="4" name="Slide Number Placeholder 3"/>
+          <p:cNvSpPr>
+            <a:spLocks noGrp="1"/>
+          </p:cNvSpPr>
+          <p:nvPr>
+            <p:ph type="sldNum" sz="quarter" idx="10"/>
+          </p:nvPr>
+        </p:nvSpPr>
+        <p:spPr/>
+        <p:txBody>
+          <a:bodyPr/>
+          <a:lstStyle/>
+          <a:p>
+            <a:fld id="{7D8C2C35-2B8A-446E-BEC0-FD36716C29AC}" type="slidenum">
+              <a:rPr lang="de-DE" smtClean="0"/>
+              <a:pPr/>
+              <a:t>7</a:t>
+            </a:fld>
+            <a:endParaRPr lang="de-DE" dirty="0"/>
+          </a:p>
+        </p:txBody>
+      </p:sp>
+    </p:spTree>
+    <p:extLst>
+      <p:ext uri="{BB962C8B-B14F-4D97-AF65-F5344CB8AC3E}">
+        <p14:creationId xmlns:p14="http://schemas.microsoft.com/office/powerpoint/2010/main" val="2185429631"/>
+      </p:ext>
+    </p:extLst>
+  </p:cSld>
+  <p:clrMapOvr>
+    <a:masterClrMapping/>
+  </p:clrMapOvr>
+</p:notes>
+</file>
+
+<file path=ppt/notesSlides/notesSlide8.xml><?xml version="1.0" encoding="utf-8"?>
+<p:notes xmlns:a="http://schemas.openxmlformats.org/drawingml/2006/main" xmlns:r="http://schemas.openxmlformats.org/officeDocument/2006/relationships" xmlns:p="http://schemas.openxmlformats.org/presentationml/2006/main">
+  <p:cSld>
+    <p:spTree>
+      <p:nvGrpSpPr>
+        <p:cNvPr id="1" name=""/>
+        <p:cNvGrpSpPr/>
+        <p:nvPr/>
+      </p:nvGrpSpPr>
+      <p:grpSpPr>
+        <a:xfrm>
+          <a:off x="0" y="0"/>
+          <a:ext cx="0" cy="0"/>
+          <a:chOff x="0" y="0"/>
+          <a:chExt cx="0" cy="0"/>
+        </a:xfrm>
+      </p:grpSpPr>
+      <p:sp>
+        <p:nvSpPr>
+          <p:cNvPr id="2" name="Slide Image Placeholder 1"/>
+          <p:cNvSpPr>
+            <a:spLocks noGrp="1" noRot="1" noChangeAspect="1"/>
+          </p:cNvSpPr>
+          <p:nvPr>
+            <p:ph type="sldImg"/>
+          </p:nvPr>
+        </p:nvSpPr>
+        <p:spPr/>
+      </p:sp>
+      <p:sp>
+        <p:nvSpPr>
+          <p:cNvPr id="3" name="Notes Placeholder 2"/>
+          <p:cNvSpPr>
+            <a:spLocks noGrp="1"/>
+          </p:cNvSpPr>
+          <p:nvPr>
+            <p:ph type="body" idx="1"/>
+          </p:nvPr>
+        </p:nvSpPr>
+        <p:spPr/>
+        <p:txBody>
+          <a:bodyPr/>
+          <a:lstStyle/>
+          <a:p>
+            <a:r>
+              <a:rPr lang="en-US" dirty="0"/>
+              <a:t>Kubernetes takes a “construction plan” and instantiates it as often as you want – as long as you have enough resources</a:t>
+            </a:r>
+          </a:p>
+          <a:p>
+            <a:r>
+              <a:rPr lang="en-US" dirty="0"/>
+              <a:t>What you describe, is what you get.</a:t>
+            </a:r>
+          </a:p>
+        </p:txBody>
+      </p:sp>
+      <p:sp>
+        <p:nvSpPr>
+          <p:cNvPr id="4" name="Slide Number Placeholder 3"/>
+          <p:cNvSpPr>
+            <a:spLocks noGrp="1"/>
+          </p:cNvSpPr>
+          <p:nvPr>
+            <p:ph type="sldNum" sz="quarter" idx="10"/>
+          </p:nvPr>
+        </p:nvSpPr>
+        <p:spPr/>
+        <p:txBody>
+          <a:bodyPr/>
+          <a:lstStyle/>
+          <a:p>
+            <a:fld id="{7D8C2C35-2B8A-446E-BEC0-FD36716C29AC}" type="slidenum">
+              <a:rPr lang="de-DE" smtClean="0"/>
+              <a:pPr/>
+              <a:t>8</a:t>
+            </a:fld>
+            <a:endParaRPr lang="de-DE" dirty="0"/>
+          </a:p>
+        </p:txBody>
+      </p:sp>
+    </p:spTree>
+    <p:extLst>
+      <p:ext uri="{BB962C8B-B14F-4D97-AF65-F5344CB8AC3E}">
+        <p14:creationId xmlns:p14="http://schemas.microsoft.com/office/powerpoint/2010/main" val="2669141511"/>
+      </p:ext>
+    </p:extLst>
+  </p:cSld>
+  <p:clrMapOvr>
+    <a:masterClrMapping/>
+  </p:clrMapOvr>
+</p:notes>
+</file>
+
+<file path=ppt/notesSlides/notesSlide9.xml><?xml version="1.0" encoding="utf-8"?>
+<p:notes xmlns:a="http://schemas.openxmlformats.org/drawingml/2006/main" xmlns:r="http://schemas.openxmlformats.org/officeDocument/2006/relationships" xmlns:p="http://schemas.openxmlformats.org/presentationml/2006/main">
+  <p:cSld>
+    <p:spTree>
+      <p:nvGrpSpPr>
+        <p:cNvPr id="1" name=""/>
+        <p:cNvGrpSpPr/>
+        <p:nvPr/>
+      </p:nvGrpSpPr>
+      <p:grpSpPr>
+        <a:xfrm>
+          <a:off x="0" y="0"/>
+          <a:ext cx="0" cy="0"/>
+          <a:chOff x="0" y="0"/>
+          <a:chExt cx="0" cy="0"/>
+        </a:xfrm>
+      </p:grpSpPr>
+      <p:sp>
+        <p:nvSpPr>
+          <p:cNvPr id="2" name="Slide Image Placeholder 1"/>
+          <p:cNvSpPr>
+            <a:spLocks noGrp="1" noRot="1" noChangeAspect="1"/>
+          </p:cNvSpPr>
+          <p:nvPr>
+            <p:ph type="sldImg"/>
+          </p:nvPr>
+        </p:nvSpPr>
+        <p:spPr/>
+      </p:sp>
+      <p:sp>
+        <p:nvSpPr>
+          <p:cNvPr id="3" name="Notes Placeholder 2"/>
+          <p:cNvSpPr>
+            <a:spLocks noGrp="1"/>
+          </p:cNvSpPr>
+          <p:nvPr>
+            <p:ph type="body" idx="1"/>
+          </p:nvPr>
+        </p:nvSpPr>
+        <p:spPr/>
+        <p:txBody>
+          <a:bodyPr/>
+          <a:lstStyle/>
+          <a:p>
+            <a:r>
+              <a:rPr lang="en-US" dirty="0"/>
+              <a:t>Kubernetes orchestrates your workloads &amp; applications – also several of them in parallel.</a:t>
+            </a:r>
+          </a:p>
+        </p:txBody>
+      </p:sp>
+      <p:sp>
+        <p:nvSpPr>
+          <p:cNvPr id="4" name="Slide Number Placeholder 3"/>
+          <p:cNvSpPr>
+            <a:spLocks noGrp="1"/>
+          </p:cNvSpPr>
+          <p:nvPr>
+            <p:ph type="sldNum" sz="quarter" idx="10"/>
+          </p:nvPr>
+        </p:nvSpPr>
+        <p:spPr/>
+        <p:txBody>
+          <a:bodyPr/>
+          <a:lstStyle/>
+          <a:p>
+            <a:fld id="{7D8C2C35-2B8A-446E-BEC0-FD36716C29AC}" type="slidenum">
+              <a:rPr lang="de-DE" smtClean="0"/>
+              <a:pPr/>
+              <a:t>9</a:t>
+            </a:fld>
+            <a:endParaRPr lang="de-DE" dirty="0"/>
+          </a:p>
+        </p:txBody>
+      </p:sp>
+    </p:spTree>
+    <p:extLst>
+      <p:ext uri="{BB962C8B-B14F-4D97-AF65-F5344CB8AC3E}">
+        <p14:creationId xmlns:p14="http://schemas.microsoft.com/office/powerpoint/2010/main" val="2088780993"/>
       </p:ext>
     </p:extLst>
   </p:cSld>
@@ -8174,7 +9280,7 @@
           <p:nvPr/>
         </p:nvPicPr>
         <p:blipFill>
-          <a:blip r:embed="rId2">
+          <a:blip r:embed="rId3">
             <a:extLst>
               <a:ext uri="{28A0092B-C50C-407E-A947-70E740481C1C}">
                 <a14:useLocalDpi xmlns:a14="http://schemas.microsoft.com/office/drawing/2010/main" val="0"/>
@@ -8525,7 +9631,7 @@
               <a:rPr lang="en-US" sz="1800" kern="0" dirty="0">
                 <a:ea typeface="Arial Unicode MS" pitchFamily="34" charset="-128"/>
                 <a:cs typeface="Arial Unicode MS" pitchFamily="34" charset="-128"/>
-                <a:hlinkClick r:id="rId2"/>
+                <a:hlinkClick r:id="rId3"/>
               </a:rPr>
               <a:t>https://kubernetes.io/docs/home/</a:t>
             </a:r>
@@ -8614,7 +9720,7 @@
           <a:p>
             <a:r>
               <a:rPr lang="en-US" dirty="0">
-                <a:hlinkClick r:id="rId2"/>
+                <a:hlinkClick r:id="rId3"/>
               </a:rPr>
               <a:t>https://github.com/kubernetes/community/blob/master/communication.md</a:t>
             </a:r>
@@ -8634,7 +9740,7 @@
           <p:nvPr/>
         </p:nvPicPr>
         <p:blipFill>
-          <a:blip r:embed="rId3"/>
+          <a:blip r:embed="rId4"/>
           <a:stretch>
             <a:fillRect/>
           </a:stretch>
@@ -8672,7 +9778,7 @@
           <a:p>
             <a:r>
               <a:rPr lang="en-US" dirty="0">
-                <a:hlinkClick r:id="rId4"/>
+                <a:hlinkClick r:id="rId5"/>
               </a:rPr>
               <a:t>https://github.com/kubernetes</a:t>
             </a:r>
@@ -8706,7 +9812,7 @@
           <a:p>
             <a:r>
               <a:rPr lang="en-US" dirty="0">
-                <a:hlinkClick r:id="rId5"/>
+                <a:hlinkClick r:id="rId6"/>
               </a:rPr>
               <a:t>https://groups.google.com/forum/#!forum/kubernetes-users</a:t>
             </a:r>
@@ -8778,7 +9884,7 @@
           <p:nvPr/>
         </p:nvPicPr>
         <p:blipFill>
-          <a:blip r:embed="rId2">
+          <a:blip r:embed="rId3">
             <a:extLst>
               <a:ext uri="{28A0092B-C50C-407E-A947-70E740481C1C}">
                 <a14:useLocalDpi xmlns:a14="http://schemas.microsoft.com/office/drawing/2010/main" val="0"/>
@@ -8819,7 +9925,7 @@
           <p:nvPr/>
         </p:nvPicPr>
         <p:blipFill>
-          <a:blip r:embed="rId3">
+          <a:blip r:embed="rId4">
             <a:extLst>
               <a:ext uri="{28A0092B-C50C-407E-A947-70E740481C1C}">
                 <a14:useLocalDpi xmlns:a14="http://schemas.microsoft.com/office/drawing/2010/main" val="0"/>
@@ -8860,7 +9966,7 @@
           <p:nvPr/>
         </p:nvPicPr>
         <p:blipFill>
-          <a:blip r:embed="rId4">
+          <a:blip r:embed="rId5">
             <a:extLst>
               <a:ext uri="{28A0092B-C50C-407E-A947-70E740481C1C}">
                 <a14:useLocalDpi xmlns:a14="http://schemas.microsoft.com/office/drawing/2010/main" val="0"/>
@@ -8901,7 +10007,7 @@
           <p:nvPr/>
         </p:nvPicPr>
         <p:blipFill>
-          <a:blip r:embed="rId5">
+          <a:blip r:embed="rId6">
             <a:extLst>
               <a:ext uri="{28A0092B-C50C-407E-A947-70E740481C1C}">
                 <a14:useLocalDpi xmlns:a14="http://schemas.microsoft.com/office/drawing/2010/main" val="0"/>
@@ -8942,7 +10048,7 @@
           <p:nvPr/>
         </p:nvPicPr>
         <p:blipFill>
-          <a:blip r:embed="rId6">
+          <a:blip r:embed="rId7">
             <a:extLst>
               <a:ext uri="{28A0092B-C50C-407E-A947-70E740481C1C}">
                 <a14:useLocalDpi xmlns:a14="http://schemas.microsoft.com/office/drawing/2010/main" val="0"/>
@@ -9087,7 +10193,7 @@
           <a:p>
             <a:r>
               <a:rPr lang="en-US" sz="1600" dirty="0">
-                <a:hlinkClick r:id="rId2"/>
+                <a:hlinkClick r:id="rId3"/>
               </a:rPr>
               <a:t>https://twitter.com/benbjohnson/status/746049032699600897</a:t>
             </a:r>
@@ -9107,7 +10213,7 @@
           <p:nvPr/>
         </p:nvPicPr>
         <p:blipFill>
-          <a:blip r:embed="rId3"/>
+          <a:blip r:embed="rId4"/>
           <a:stretch>
             <a:fillRect/>
           </a:stretch>
@@ -9239,7 +10345,7 @@
           <p:nvPr/>
         </p:nvPicPr>
         <p:blipFill>
-          <a:blip r:embed="rId2"/>
+          <a:blip r:embed="rId3"/>
           <a:stretch>
             <a:fillRect/>
           </a:stretch>
@@ -9278,7 +10384,7 @@
             <a:pPr algn="ctr"/>
             <a:r>
               <a:rPr lang="en-US" dirty="0">
-                <a:hlinkClick r:id="rId3"/>
+                <a:hlinkClick r:id="rId4"/>
               </a:rPr>
               <a:t>https://twitter.com/simonbrown/status/847339104874381312</a:t>
             </a:r>
@@ -9461,7 +10567,7 @@
           <p:nvPr/>
         </p:nvPicPr>
         <p:blipFill>
-          <a:blip r:embed="rId2">
+          <a:blip r:embed="rId3">
             <a:extLst>
               <a:ext uri="{28A0092B-C50C-407E-A947-70E740481C1C}">
                 <a14:useLocalDpi xmlns:a14="http://schemas.microsoft.com/office/drawing/2010/main" val="0"/>
@@ -9524,7 +10630,7 @@
             <a:pPr algn="ctr"/>
             <a:r>
               <a:rPr lang="en-US" sz="1800" dirty="0">
-                <a:hlinkClick r:id="rId3"/>
+                <a:hlinkClick r:id="rId4"/>
               </a:rPr>
               <a:t>https://twitter.com/mathiasverraes/status/711168935798902785</a:t>
             </a:r>
@@ -9689,7 +10795,7 @@
             <a:pPr algn="ctr"/>
             <a:r>
               <a:rPr lang="en-US" sz="1400" b="1" dirty="0">
-                <a:hlinkClick r:id="rId2"/>
+                <a:hlinkClick r:id="rId3"/>
               </a:rPr>
               <a:t>https://twitter.com/DEVOPS_BORAT/status/41587168870797312</a:t>
             </a:r>
@@ -9709,7 +10815,7 @@
           <p:nvPr/>
         </p:nvPicPr>
         <p:blipFill>
-          <a:blip r:embed="rId3"/>
+          <a:blip r:embed="rId4"/>
           <a:stretch>
             <a:fillRect/>
           </a:stretch>
@@ -9869,7 +10975,7 @@
           <p:nvPr/>
         </p:nvPicPr>
         <p:blipFill>
-          <a:blip r:embed="rId2"/>
+          <a:blip r:embed="rId3"/>
           <a:stretch>
             <a:fillRect/>
           </a:stretch>
@@ -10025,7 +11131,7 @@
           <p:nvPr/>
         </p:nvPicPr>
         <p:blipFill>
-          <a:blip r:embed="rId2">
+          <a:blip r:embed="rId3">
             <a:extLst>
               <a:ext uri="{28A0092B-C50C-407E-A947-70E740481C1C}">
                 <a14:useLocalDpi xmlns:a14="http://schemas.microsoft.com/office/drawing/2010/main" val="0"/>
@@ -10144,7 +11250,7 @@
           <p:nvPr/>
         </p:nvPicPr>
         <p:blipFill>
-          <a:blip r:embed="rId2">
+          <a:blip r:embed="rId3">
             <a:extLst>
               <a:ext uri="{28A0092B-C50C-407E-A947-70E740481C1C}">
                 <a14:useLocalDpi xmlns:a14="http://schemas.microsoft.com/office/drawing/2010/main" val="0"/>
@@ -10185,7 +11291,7 @@
           <p:nvPr/>
         </p:nvPicPr>
         <p:blipFill>
-          <a:blip r:embed="rId2">
+          <a:blip r:embed="rId3">
             <a:extLst>
               <a:ext uri="{28A0092B-C50C-407E-A947-70E740481C1C}">
                 <a14:useLocalDpi xmlns:a14="http://schemas.microsoft.com/office/drawing/2010/main" val="0"/>
@@ -10226,7 +11332,7 @@
           <p:nvPr/>
         </p:nvPicPr>
         <p:blipFill>
-          <a:blip r:embed="rId2">
+          <a:blip r:embed="rId3">
             <a:extLst>
               <a:ext uri="{28A0092B-C50C-407E-A947-70E740481C1C}">
                 <a14:useLocalDpi xmlns:a14="http://schemas.microsoft.com/office/drawing/2010/main" val="0"/>
@@ -10529,7 +11635,7 @@
           <p:nvPr/>
         </p:nvPicPr>
         <p:blipFill>
-          <a:blip r:embed="rId2">
+          <a:blip r:embed="rId3">
             <a:extLst>
               <a:ext uri="{28A0092B-C50C-407E-A947-70E740481C1C}">
                 <a14:useLocalDpi xmlns:a14="http://schemas.microsoft.com/office/drawing/2010/main" val="0"/>
@@ -10570,7 +11676,7 @@
           <p:nvPr/>
         </p:nvPicPr>
         <p:blipFill>
-          <a:blip r:embed="rId3">
+          <a:blip r:embed="rId4">
             <a:extLst>
               <a:ext uri="{28A0092B-C50C-407E-A947-70E740481C1C}">
                 <a14:useLocalDpi xmlns:a14="http://schemas.microsoft.com/office/drawing/2010/main" val="0"/>
@@ -10760,7 +11866,7 @@
           <p:nvPr/>
         </p:nvPicPr>
         <p:blipFill>
-          <a:blip r:embed="rId2">
+          <a:blip r:embed="rId3">
             <a:extLst>
               <a:ext uri="{28A0092B-C50C-407E-A947-70E740481C1C}">
                 <a14:useLocalDpi xmlns:a14="http://schemas.microsoft.com/office/drawing/2010/main" val="0"/>
@@ -10801,7 +11907,7 @@
           <p:nvPr/>
         </p:nvPicPr>
         <p:blipFill>
-          <a:blip r:embed="rId2">
+          <a:blip r:embed="rId3">
             <a:extLst>
               <a:ext uri="{28A0092B-C50C-407E-A947-70E740481C1C}">
                 <a14:useLocalDpi xmlns:a14="http://schemas.microsoft.com/office/drawing/2010/main" val="0"/>
@@ -10842,7 +11948,7 @@
           <p:nvPr/>
         </p:nvPicPr>
         <p:blipFill>
-          <a:blip r:embed="rId2">
+          <a:blip r:embed="rId3">
             <a:extLst>
               <a:ext uri="{28A0092B-C50C-407E-A947-70E740481C1C}">
                 <a14:useLocalDpi xmlns:a14="http://schemas.microsoft.com/office/drawing/2010/main" val="0"/>

</xml_diff>

<commit_message>
added sock-shop demo content
</commit_message>
<xml_diff>
--- a/kubernetes/00_intro.pptx
+++ b/kubernetes/00_intro.pptx
@@ -5,10 +5,10 @@
     <p:sldMasterId id="2147483733" r:id="rId1"/>
   </p:sldMasterIdLst>
   <p:notesMasterIdLst>
-    <p:notesMasterId r:id="rId15"/>
+    <p:notesMasterId r:id="rId16"/>
   </p:notesMasterIdLst>
   <p:handoutMasterIdLst>
-    <p:handoutMasterId r:id="rId16"/>
+    <p:handoutMasterId r:id="rId17"/>
   </p:handoutMasterIdLst>
   <p:sldIdLst>
     <p:sldId id="433" r:id="rId2"/>
@@ -20,10 +20,11 @@
     <p:sldId id="446" r:id="rId8"/>
     <p:sldId id="450" r:id="rId9"/>
     <p:sldId id="449" r:id="rId10"/>
-    <p:sldId id="447" r:id="rId11"/>
-    <p:sldId id="448" r:id="rId12"/>
-    <p:sldId id="451" r:id="rId13"/>
-    <p:sldId id="265" r:id="rId14"/>
+    <p:sldId id="452" r:id="rId11"/>
+    <p:sldId id="447" r:id="rId12"/>
+    <p:sldId id="448" r:id="rId13"/>
+    <p:sldId id="451" r:id="rId14"/>
+    <p:sldId id="265" r:id="rId15"/>
   </p:sldIdLst>
   <p:sldSz cx="12195175" cy="6858000"/>
   <p:notesSz cx="6858000" cy="9144000"/>
@@ -199,6 +200,10 @@
 </p:presentation>
 </file>
 
+<file path=ppt/revisionInfo.xml><?xml version="1.0" encoding="utf-8"?>
+<p1510:revInfo xmlns:a="http://schemas.openxmlformats.org/drawingml/2006/main" xmlns:r="http://schemas.openxmlformats.org/officeDocument/2006/relationships" xmlns:p1510="http://schemas.microsoft.com/office/powerpoint/2015/10/main"/>
+</file>
+
 <file path=ppt/handoutMasters/handoutMaster1.xml><?xml version="1.0" encoding="utf-8"?>
 <p:handoutMaster xmlns:a="http://schemas.openxmlformats.org/drawingml/2006/main" xmlns:r="http://schemas.openxmlformats.org/officeDocument/2006/relationships" xmlns:p="http://schemas.openxmlformats.org/presentationml/2006/main">
   <p:cSld>
@@ -656,7 +661,45 @@
           <a:bodyPr/>
           <a:lstStyle/>
           <a:p>
-            <a:endParaRPr lang="en-US"/>
+            <a:r>
+              <a:rPr lang="en-US" dirty="0"/>
+              <a:t>The demo is based on the “sock shop” e-commerce platform developed by </a:t>
+            </a:r>
+            <a:r>
+              <a:rPr lang="en-US" dirty="0" err="1"/>
+              <a:t>weaveworks</a:t>
+            </a:r>
+            <a:r>
+              <a:rPr lang="en-US" dirty="0"/>
+              <a:t>. This is a full-blown demo application, including content – however you have to wait ~2min until the content is fully loaded. To demo, create a “sock-shop” namespace and use the sock-</a:t>
+            </a:r>
+            <a:r>
+              <a:rPr lang="en-US" dirty="0" err="1"/>
+              <a:t>shop.yaml</a:t>
+            </a:r>
+            <a:r>
+              <a:rPr lang="en-US" dirty="0"/>
+              <a:t> from the </a:t>
+            </a:r>
+            <a:r>
+              <a:rPr lang="en-US" dirty="0" err="1"/>
+              <a:t>kubernetes</a:t>
+            </a:r>
+            <a:r>
+              <a:rPr lang="en-US" dirty="0"/>
+              <a:t>/solutions folder to deploy all components. </a:t>
+            </a:r>
+          </a:p>
+          <a:p>
+            <a:r>
+              <a:rPr lang="en-US" dirty="0"/>
+              <a:t>The design of the sock-shop is based a micro-services architecture and was containerized appropriately. See https://github.com/microservices-demo/microservices-demo/blob/master/internal-docs/design.md for </a:t>
+            </a:r>
+            <a:r>
+              <a:rPr lang="en-US"/>
+              <a:t>further details</a:t>
+            </a:r>
+            <a:endParaRPr lang="en-US" dirty="0"/>
           </a:p>
         </p:txBody>
       </p:sp>
@@ -687,7 +730,7 @@
     </p:spTree>
     <p:extLst>
       <p:ext uri="{BB962C8B-B14F-4D97-AF65-F5344CB8AC3E}">
-        <p14:creationId xmlns:p14="http://schemas.microsoft.com/office/powerpoint/2010/main" val="467728202"/>
+        <p14:creationId xmlns:p14="http://schemas.microsoft.com/office/powerpoint/2010/main" val="4246815572"/>
       </p:ext>
     </p:extLst>
   </p:cSld>
@@ -772,7 +815,7 @@
     </p:spTree>
     <p:extLst>
       <p:ext uri="{BB962C8B-B14F-4D97-AF65-F5344CB8AC3E}">
-        <p14:creationId xmlns:p14="http://schemas.microsoft.com/office/powerpoint/2010/main" val="1146731827"/>
+        <p14:creationId xmlns:p14="http://schemas.microsoft.com/office/powerpoint/2010/main" val="467728202"/>
       </p:ext>
     </p:extLst>
   </p:cSld>
@@ -826,15 +869,7 @@
           <a:bodyPr/>
           <a:lstStyle/>
           <a:p>
-            <a:r>
-              <a:rPr lang="en-US" dirty="0"/>
-              <a:t>Gardener: SAP’s solution to </a:t>
-            </a:r>
-            <a:r>
-              <a:rPr lang="en-US"/>
-              <a:t>managed Kubernetes</a:t>
-            </a:r>
-            <a:endParaRPr lang="en-US" dirty="0"/>
+            <a:endParaRPr lang="en-US"/>
           </a:p>
         </p:txBody>
       </p:sp>
@@ -865,7 +900,7 @@
     </p:spTree>
     <p:extLst>
       <p:ext uri="{BB962C8B-B14F-4D97-AF65-F5344CB8AC3E}">
-        <p14:creationId xmlns:p14="http://schemas.microsoft.com/office/powerpoint/2010/main" val="3294899344"/>
+        <p14:creationId xmlns:p14="http://schemas.microsoft.com/office/powerpoint/2010/main" val="1146731827"/>
       </p:ext>
     </p:extLst>
   </p:cSld>
@@ -894,6 +929,45 @@
       </p:grpSpPr>
       <p:sp>
         <p:nvSpPr>
+          <p:cNvPr id="2" name="Slide Image Placeholder 1"/>
+          <p:cNvSpPr>
+            <a:spLocks noGrp="1" noRot="1" noChangeAspect="1"/>
+          </p:cNvSpPr>
+          <p:nvPr>
+            <p:ph type="sldImg"/>
+          </p:nvPr>
+        </p:nvSpPr>
+        <p:spPr/>
+      </p:sp>
+      <p:sp>
+        <p:nvSpPr>
+          <p:cNvPr id="3" name="Notes Placeholder 2"/>
+          <p:cNvSpPr>
+            <a:spLocks noGrp="1"/>
+          </p:cNvSpPr>
+          <p:nvPr>
+            <p:ph type="body" idx="1"/>
+          </p:nvPr>
+        </p:nvSpPr>
+        <p:spPr/>
+        <p:txBody>
+          <a:bodyPr/>
+          <a:lstStyle/>
+          <a:p>
+            <a:r>
+              <a:rPr lang="en-US" dirty="0"/>
+              <a:t>Gardener: SAP’s solution to </a:t>
+            </a:r>
+            <a:r>
+              <a:rPr lang="en-US"/>
+              <a:t>managed Kubernetes</a:t>
+            </a:r>
+            <a:endParaRPr lang="en-US" dirty="0"/>
+          </a:p>
+        </p:txBody>
+      </p:sp>
+      <p:sp>
+        <p:nvSpPr>
           <p:cNvPr id="4" name="Slide Number Placeholder 3"/>
           <p:cNvSpPr>
             <a:spLocks noGrp="1"/>
@@ -911,6 +985,60 @@
               <a:rPr lang="de-DE" smtClean="0"/>
               <a:pPr/>
               <a:t>13</a:t>
+            </a:fld>
+            <a:endParaRPr lang="de-DE" dirty="0"/>
+          </a:p>
+        </p:txBody>
+      </p:sp>
+    </p:spTree>
+    <p:extLst>
+      <p:ext uri="{BB962C8B-B14F-4D97-AF65-F5344CB8AC3E}">
+        <p14:creationId xmlns:p14="http://schemas.microsoft.com/office/powerpoint/2010/main" val="3294899344"/>
+      </p:ext>
+    </p:extLst>
+  </p:cSld>
+  <p:clrMapOvr>
+    <a:masterClrMapping/>
+  </p:clrMapOvr>
+</p:notes>
+</file>
+
+<file path=ppt/notesSlides/notesSlide14.xml><?xml version="1.0" encoding="utf-8"?>
+<p:notes xmlns:a="http://schemas.openxmlformats.org/drawingml/2006/main" xmlns:r="http://schemas.openxmlformats.org/officeDocument/2006/relationships" xmlns:p="http://schemas.openxmlformats.org/presentationml/2006/main">
+  <p:cSld>
+    <p:spTree>
+      <p:nvGrpSpPr>
+        <p:cNvPr id="1" name=""/>
+        <p:cNvGrpSpPr/>
+        <p:nvPr/>
+      </p:nvGrpSpPr>
+      <p:grpSpPr>
+        <a:xfrm>
+          <a:off x="0" y="0"/>
+          <a:ext cx="0" cy="0"/>
+          <a:chOff x="0" y="0"/>
+          <a:chExt cx="0" cy="0"/>
+        </a:xfrm>
+      </p:grpSpPr>
+      <p:sp>
+        <p:nvSpPr>
+          <p:cNvPr id="4" name="Slide Number Placeholder 3"/>
+          <p:cNvSpPr>
+            <a:spLocks noGrp="1"/>
+          </p:cNvSpPr>
+          <p:nvPr>
+            <p:ph type="sldNum" sz="quarter" idx="10"/>
+          </p:nvPr>
+        </p:nvSpPr>
+        <p:spPr/>
+        <p:txBody>
+          <a:bodyPr/>
+          <a:lstStyle/>
+          <a:p>
+            <a:fld id="{7D8C2C35-2B8A-446E-BEC0-FD36716C29AC}" type="slidenum">
+              <a:rPr lang="de-DE" smtClean="0"/>
+              <a:pPr/>
+              <a:t>14</a:t>
             </a:fld>
             <a:endParaRPr lang="de-DE" dirty="0"/>
           </a:p>
@@ -9344,6 +9472,238 @@
       </p:grpSpPr>
       <p:sp>
         <p:nvSpPr>
+          <p:cNvPr id="2" name="Title 1">
+            <a:extLst>
+              <a:ext uri="{FF2B5EF4-FFF2-40B4-BE49-F238E27FC236}">
+                <a16:creationId xmlns:a16="http://schemas.microsoft.com/office/drawing/2014/main" id="{A283E944-42BF-41EE-84F7-320F8E39B576}"/>
+              </a:ext>
+            </a:extLst>
+          </p:cNvPr>
+          <p:cNvSpPr>
+            <a:spLocks noGrp="1"/>
+          </p:cNvSpPr>
+          <p:nvPr>
+            <p:ph type="title"/>
+          </p:nvPr>
+        </p:nvSpPr>
+        <p:spPr/>
+        <p:txBody>
+          <a:bodyPr/>
+          <a:lstStyle/>
+          <a:p>
+            <a:r>
+              <a:rPr lang="en-US" dirty="0"/>
+              <a:t>Getting started: let‘s buy some socks</a:t>
+            </a:r>
+          </a:p>
+        </p:txBody>
+      </p:sp>
+      <p:pic>
+        <p:nvPicPr>
+          <p:cNvPr id="4" name="Picture 3">
+            <a:extLst>
+              <a:ext uri="{FF2B5EF4-FFF2-40B4-BE49-F238E27FC236}">
+                <a16:creationId xmlns:a16="http://schemas.microsoft.com/office/drawing/2014/main" id="{E7DDE766-5BAC-492B-B460-5D63FF7BC52C}"/>
+              </a:ext>
+            </a:extLst>
+          </p:cNvPr>
+          <p:cNvPicPr>
+            <a:picLocks noChangeAspect="1"/>
+          </p:cNvPicPr>
+          <p:nvPr/>
+        </p:nvPicPr>
+        <p:blipFill>
+          <a:blip r:embed="rId3"/>
+          <a:stretch>
+            <a:fillRect/>
+          </a:stretch>
+        </p:blipFill>
+        <p:spPr>
+          <a:xfrm>
+            <a:off x="2418723" y="1048775"/>
+            <a:ext cx="7357031" cy="5257542"/>
+          </a:xfrm>
+          <a:prstGeom prst="rect">
+            <a:avLst/>
+          </a:prstGeom>
+        </p:spPr>
+      </p:pic>
+      <p:pic>
+        <p:nvPicPr>
+          <p:cNvPr id="5" name="Picture 4">
+            <a:extLst>
+              <a:ext uri="{FF2B5EF4-FFF2-40B4-BE49-F238E27FC236}">
+                <a16:creationId xmlns:a16="http://schemas.microsoft.com/office/drawing/2014/main" id="{9377D6B2-0289-4B8C-A793-F902D649DEBB}"/>
+              </a:ext>
+            </a:extLst>
+          </p:cNvPr>
+          <p:cNvPicPr>
+            <a:picLocks noChangeAspect="1"/>
+          </p:cNvPicPr>
+          <p:nvPr/>
+        </p:nvPicPr>
+        <p:blipFill>
+          <a:blip r:embed="rId4"/>
+          <a:stretch>
+            <a:fillRect/>
+          </a:stretch>
+        </p:blipFill>
+        <p:spPr>
+          <a:xfrm>
+            <a:off x="1841832" y="1346622"/>
+            <a:ext cx="8510813" cy="4630315"/>
+          </a:xfrm>
+          <a:prstGeom prst="rect">
+            <a:avLst/>
+          </a:prstGeom>
+          <a:effectLst>
+            <a:softEdge rad="635000"/>
+          </a:effectLst>
+        </p:spPr>
+      </p:pic>
+    </p:spTree>
+    <p:extLst>
+      <p:ext uri="{BB962C8B-B14F-4D97-AF65-F5344CB8AC3E}">
+        <p14:creationId xmlns:p14="http://schemas.microsoft.com/office/powerpoint/2010/main" val="2645232040"/>
+      </p:ext>
+    </p:extLst>
+  </p:cSld>
+  <p:clrMapOvr>
+    <a:masterClrMapping/>
+  </p:clrMapOvr>
+  <p:timing>
+    <p:tnLst>
+      <p:par>
+        <p:cTn id="1" dur="indefinite" restart="never" nodeType="tmRoot">
+          <p:childTnLst>
+            <p:seq concurrent="1" nextAc="seek">
+              <p:cTn id="2" dur="indefinite" nodeType="mainSeq">
+                <p:childTnLst>
+                  <p:par>
+                    <p:cTn id="3" fill="hold">
+                      <p:stCondLst>
+                        <p:cond delay="indefinite"/>
+                      </p:stCondLst>
+                      <p:childTnLst>
+                        <p:par>
+                          <p:cTn id="4" fill="hold">
+                            <p:stCondLst>
+                              <p:cond delay="0"/>
+                            </p:stCondLst>
+                            <p:childTnLst>
+                              <p:par>
+                                <p:cTn id="5" presetID="1" presetClass="exit" presetSubtype="0" fill="hold" nodeType="clickEffect">
+                                  <p:stCondLst>
+                                    <p:cond delay="0"/>
+                                  </p:stCondLst>
+                                  <p:childTnLst>
+                                    <p:set>
+                                      <p:cBhvr>
+                                        <p:cTn id="6" dur="1" fill="hold">
+                                          <p:stCondLst>
+                                            <p:cond delay="0"/>
+                                          </p:stCondLst>
+                                        </p:cTn>
+                                        <p:tgtEl>
+                                          <p:spTgt spid="5"/>
+                                        </p:tgtEl>
+                                        <p:attrNameLst>
+                                          <p:attrName>style.visibility</p:attrName>
+                                        </p:attrNameLst>
+                                      </p:cBhvr>
+                                      <p:to>
+                                        <p:strVal val="hidden"/>
+                                      </p:to>
+                                    </p:set>
+                                  </p:childTnLst>
+                                </p:cTn>
+                              </p:par>
+                            </p:childTnLst>
+                          </p:cTn>
+                        </p:par>
+                        <p:par>
+                          <p:cTn id="7" fill="hold">
+                            <p:stCondLst>
+                              <p:cond delay="0"/>
+                            </p:stCondLst>
+                            <p:childTnLst>
+                              <p:par>
+                                <p:cTn id="8" presetID="1" presetClass="entr" presetSubtype="0" fill="hold" nodeType="afterEffect">
+                                  <p:stCondLst>
+                                    <p:cond delay="0"/>
+                                  </p:stCondLst>
+                                  <p:childTnLst>
+                                    <p:set>
+                                      <p:cBhvr>
+                                        <p:cTn id="9" dur="1" fill="hold">
+                                          <p:stCondLst>
+                                            <p:cond delay="0"/>
+                                          </p:stCondLst>
+                                        </p:cTn>
+                                        <p:tgtEl>
+                                          <p:spTgt spid="4"/>
+                                        </p:tgtEl>
+                                        <p:attrNameLst>
+                                          <p:attrName>style.visibility</p:attrName>
+                                        </p:attrNameLst>
+                                      </p:cBhvr>
+                                      <p:to>
+                                        <p:strVal val="visible"/>
+                                      </p:to>
+                                    </p:set>
+                                  </p:childTnLst>
+                                </p:cTn>
+                              </p:par>
+                            </p:childTnLst>
+                          </p:cTn>
+                        </p:par>
+                      </p:childTnLst>
+                    </p:cTn>
+                  </p:par>
+                </p:childTnLst>
+              </p:cTn>
+              <p:prevCondLst>
+                <p:cond evt="onPrev" delay="0">
+                  <p:tgtEl>
+                    <p:sldTgt/>
+                  </p:tgtEl>
+                </p:cond>
+              </p:prevCondLst>
+              <p:nextCondLst>
+                <p:cond evt="onNext" delay="0">
+                  <p:tgtEl>
+                    <p:sldTgt/>
+                  </p:tgtEl>
+                </p:cond>
+              </p:nextCondLst>
+            </p:seq>
+          </p:childTnLst>
+        </p:cTn>
+      </p:par>
+    </p:tnLst>
+  </p:timing>
+</p:sld>
+</file>
+
+<file path=ppt/slides/slide11.xml><?xml version="1.0" encoding="utf-8"?>
+<p:sld xmlns:a="http://schemas.openxmlformats.org/drawingml/2006/main" xmlns:r="http://schemas.openxmlformats.org/officeDocument/2006/relationships" xmlns:p="http://schemas.openxmlformats.org/presentationml/2006/main">
+  <p:cSld>
+    <p:spTree>
+      <p:nvGrpSpPr>
+        <p:cNvPr id="1" name=""/>
+        <p:cNvGrpSpPr/>
+        <p:nvPr/>
+      </p:nvGrpSpPr>
+      <p:grpSpPr>
+        <a:xfrm>
+          <a:off x="0" y="0"/>
+          <a:ext cx="0" cy="0"/>
+          <a:chOff x="0" y="0"/>
+          <a:chExt cx="0" cy="0"/>
+        </a:xfrm>
+      </p:grpSpPr>
+      <p:sp>
+        <p:nvSpPr>
           <p:cNvPr id="2" name="Title 1"/>
           <p:cNvSpPr>
             <a:spLocks noGrp="1"/>
@@ -9658,7 +10018,7 @@
 </p:sld>
 </file>
 
-<file path=ppt/slides/slide11.xml><?xml version="1.0" encoding="utf-8"?>
+<file path=ppt/slides/slide12.xml><?xml version="1.0" encoding="utf-8"?>
 <p:sld xmlns:a="http://schemas.openxmlformats.org/drawingml/2006/main" xmlns:r="http://schemas.openxmlformats.org/officeDocument/2006/relationships" xmlns:p="http://schemas.openxmlformats.org/presentationml/2006/main">
   <p:cSld>
     <p:spTree>
@@ -9836,7 +10196,7 @@
 </p:sld>
 </file>
 
-<file path=ppt/slides/slide12.xml><?xml version="1.0" encoding="utf-8"?>
+<file path=ppt/slides/slide13.xml><?xml version="1.0" encoding="utf-8"?>
 <p:sld xmlns:a="http://schemas.openxmlformats.org/drawingml/2006/main" xmlns:r="http://schemas.openxmlformats.org/officeDocument/2006/relationships" xmlns:p="http://schemas.openxmlformats.org/presentationml/2006/main">
   <p:cSld>
     <p:spTree>
@@ -10093,7 +10453,7 @@
 </p:sld>
 </file>
 
-<file path=ppt/slides/slide13.xml><?xml version="1.0" encoding="utf-8"?>
+<file path=ppt/slides/slide14.xml><?xml version="1.0" encoding="utf-8"?>
 <p:sld xmlns:a="http://schemas.openxmlformats.org/drawingml/2006/main" xmlns:r="http://schemas.openxmlformats.org/officeDocument/2006/relationships" xmlns:p="http://schemas.openxmlformats.org/presentationml/2006/main" show="0">
   <p:cSld>
     <p:spTree>

</xml_diff>

<commit_message>
added enterprise it adoption cycle to k8s intro
</commit_message>
<xml_diff>
--- a/kubernetes/00_intro.pptx
+++ b/kubernetes/00_intro.pptx
@@ -5,26 +5,27 @@
     <p:sldMasterId id="2147483733" r:id="rId1"/>
   </p:sldMasterIdLst>
   <p:notesMasterIdLst>
-    <p:notesMasterId r:id="rId16"/>
+    <p:notesMasterId r:id="rId17"/>
   </p:notesMasterIdLst>
   <p:handoutMasterIdLst>
-    <p:handoutMasterId r:id="rId17"/>
+    <p:handoutMasterId r:id="rId18"/>
   </p:handoutMasterIdLst>
   <p:sldIdLst>
     <p:sldId id="433" r:id="rId2"/>
     <p:sldId id="440" r:id="rId3"/>
-    <p:sldId id="441" r:id="rId4"/>
-    <p:sldId id="444" r:id="rId5"/>
-    <p:sldId id="445" r:id="rId6"/>
-    <p:sldId id="442" r:id="rId7"/>
-    <p:sldId id="446" r:id="rId8"/>
-    <p:sldId id="450" r:id="rId9"/>
-    <p:sldId id="449" r:id="rId10"/>
-    <p:sldId id="452" r:id="rId11"/>
-    <p:sldId id="447" r:id="rId12"/>
-    <p:sldId id="448" r:id="rId13"/>
-    <p:sldId id="451" r:id="rId14"/>
-    <p:sldId id="265" r:id="rId15"/>
+    <p:sldId id="453" r:id="rId4"/>
+    <p:sldId id="441" r:id="rId5"/>
+    <p:sldId id="444" r:id="rId6"/>
+    <p:sldId id="445" r:id="rId7"/>
+    <p:sldId id="442" r:id="rId8"/>
+    <p:sldId id="446" r:id="rId9"/>
+    <p:sldId id="450" r:id="rId10"/>
+    <p:sldId id="449" r:id="rId11"/>
+    <p:sldId id="452" r:id="rId12"/>
+    <p:sldId id="447" r:id="rId13"/>
+    <p:sldId id="448" r:id="rId14"/>
+    <p:sldId id="451" r:id="rId15"/>
+    <p:sldId id="265" r:id="rId16"/>
   </p:sldIdLst>
   <p:sldSz cx="12195175" cy="6858000"/>
   <p:notesSz cx="6858000" cy="9144000"/>
@@ -663,43 +664,8 @@
           <a:p>
             <a:r>
               <a:rPr lang="en-US" dirty="0"/>
-              <a:t>The demo is based on the “sock shop” e-commerce platform developed by </a:t>
-            </a:r>
-            <a:r>
-              <a:rPr lang="en-US" dirty="0" err="1"/>
-              <a:t>weaveworks</a:t>
-            </a:r>
-            <a:r>
-              <a:rPr lang="en-US" dirty="0"/>
-              <a:t>. This is a full-blown demo application, including content – however you have to wait ~2min until the content is fully loaded. To demo, create a “sock-shop” namespace and use the sock-</a:t>
-            </a:r>
-            <a:r>
-              <a:rPr lang="en-US" dirty="0" err="1"/>
-              <a:t>shop.yaml</a:t>
-            </a:r>
-            <a:r>
-              <a:rPr lang="en-US" dirty="0"/>
-              <a:t> from the </a:t>
-            </a:r>
-            <a:r>
-              <a:rPr lang="en-US" dirty="0" err="1"/>
-              <a:t>kubernetes</a:t>
-            </a:r>
-            <a:r>
-              <a:rPr lang="en-US" dirty="0"/>
-              <a:t>/solutions folder to deploy all components. </a:t>
-            </a:r>
-          </a:p>
-          <a:p>
-            <a:r>
-              <a:rPr lang="en-US" dirty="0"/>
-              <a:t>The design of the sock-shop is based a micro-services architecture and was containerized appropriately. See https://github.com/microservices-demo/microservices-demo/blob/master/internal-docs/design.md for </a:t>
-            </a:r>
-            <a:r>
-              <a:rPr lang="en-US"/>
-              <a:t>further details</a:t>
-            </a:r>
-            <a:endParaRPr lang="en-US" dirty="0"/>
+              <a:t>Kubernetes orchestrates your workloads &amp; applications – also several of them in parallel.</a:t>
+            </a:r>
           </a:p>
         </p:txBody>
       </p:sp>
@@ -730,7 +696,7 @@
     </p:spTree>
     <p:extLst>
       <p:ext uri="{BB962C8B-B14F-4D97-AF65-F5344CB8AC3E}">
-        <p14:creationId xmlns:p14="http://schemas.microsoft.com/office/powerpoint/2010/main" val="4246815572"/>
+        <p14:creationId xmlns:p14="http://schemas.microsoft.com/office/powerpoint/2010/main" val="2088780993"/>
       </p:ext>
     </p:extLst>
   </p:cSld>
@@ -784,7 +750,45 @@
           <a:bodyPr/>
           <a:lstStyle/>
           <a:p>
-            <a:endParaRPr lang="en-US"/>
+            <a:r>
+              <a:rPr lang="en-US" dirty="0"/>
+              <a:t>The demo is based on the “sock shop” e-commerce platform developed by </a:t>
+            </a:r>
+            <a:r>
+              <a:rPr lang="en-US" dirty="0" err="1"/>
+              <a:t>weaveworks</a:t>
+            </a:r>
+            <a:r>
+              <a:rPr lang="en-US" dirty="0"/>
+              <a:t>. This is a full-blown demo application, including content – however you have to wait ~2min until the content is fully loaded. To demo, create a “sock-shop” namespace and use the sock-</a:t>
+            </a:r>
+            <a:r>
+              <a:rPr lang="en-US" dirty="0" err="1"/>
+              <a:t>shop.yaml</a:t>
+            </a:r>
+            <a:r>
+              <a:rPr lang="en-US" dirty="0"/>
+              <a:t> from the </a:t>
+            </a:r>
+            <a:r>
+              <a:rPr lang="en-US" dirty="0" err="1"/>
+              <a:t>kubernetes</a:t>
+            </a:r>
+            <a:r>
+              <a:rPr lang="en-US" dirty="0"/>
+              <a:t>/solutions folder to deploy all components. </a:t>
+            </a:r>
+          </a:p>
+          <a:p>
+            <a:r>
+              <a:rPr lang="en-US" dirty="0"/>
+              <a:t>The design of the sock-shop is based a micro-services architecture and was containerized appropriately. See https://github.com/microservices-demo/microservices-demo/blob/master/internal-docs/design.md for </a:t>
+            </a:r>
+            <a:r>
+              <a:rPr lang="en-US"/>
+              <a:t>further details</a:t>
+            </a:r>
+            <a:endParaRPr lang="en-US" dirty="0"/>
           </a:p>
         </p:txBody>
       </p:sp>
@@ -815,7 +819,7 @@
     </p:spTree>
     <p:extLst>
       <p:ext uri="{BB962C8B-B14F-4D97-AF65-F5344CB8AC3E}">
-        <p14:creationId xmlns:p14="http://schemas.microsoft.com/office/powerpoint/2010/main" val="467728202"/>
+        <p14:creationId xmlns:p14="http://schemas.microsoft.com/office/powerpoint/2010/main" val="4246815572"/>
       </p:ext>
     </p:extLst>
   </p:cSld>
@@ -900,7 +904,7 @@
     </p:spTree>
     <p:extLst>
       <p:ext uri="{BB962C8B-B14F-4D97-AF65-F5344CB8AC3E}">
-        <p14:creationId xmlns:p14="http://schemas.microsoft.com/office/powerpoint/2010/main" val="1146731827"/>
+        <p14:creationId xmlns:p14="http://schemas.microsoft.com/office/powerpoint/2010/main" val="467728202"/>
       </p:ext>
     </p:extLst>
   </p:cSld>
@@ -954,15 +958,7 @@
           <a:bodyPr/>
           <a:lstStyle/>
           <a:p>
-            <a:r>
-              <a:rPr lang="en-US" dirty="0"/>
-              <a:t>Gardener: SAP’s solution to </a:t>
-            </a:r>
-            <a:r>
-              <a:rPr lang="en-US"/>
-              <a:t>managed Kubernetes</a:t>
-            </a:r>
-            <a:endParaRPr lang="en-US" dirty="0"/>
+            <a:endParaRPr lang="en-US"/>
           </a:p>
         </p:txBody>
       </p:sp>
@@ -993,7 +989,7 @@
     </p:spTree>
     <p:extLst>
       <p:ext uri="{BB962C8B-B14F-4D97-AF65-F5344CB8AC3E}">
-        <p14:creationId xmlns:p14="http://schemas.microsoft.com/office/powerpoint/2010/main" val="3294899344"/>
+        <p14:creationId xmlns:p14="http://schemas.microsoft.com/office/powerpoint/2010/main" val="1146731827"/>
       </p:ext>
     </p:extLst>
   </p:cSld>
@@ -1022,6 +1018,45 @@
       </p:grpSpPr>
       <p:sp>
         <p:nvSpPr>
+          <p:cNvPr id="2" name="Slide Image Placeholder 1"/>
+          <p:cNvSpPr>
+            <a:spLocks noGrp="1" noRot="1" noChangeAspect="1"/>
+          </p:cNvSpPr>
+          <p:nvPr>
+            <p:ph type="sldImg"/>
+          </p:nvPr>
+        </p:nvSpPr>
+        <p:spPr/>
+      </p:sp>
+      <p:sp>
+        <p:nvSpPr>
+          <p:cNvPr id="3" name="Notes Placeholder 2"/>
+          <p:cNvSpPr>
+            <a:spLocks noGrp="1"/>
+          </p:cNvSpPr>
+          <p:nvPr>
+            <p:ph type="body" idx="1"/>
+          </p:nvPr>
+        </p:nvSpPr>
+        <p:spPr/>
+        <p:txBody>
+          <a:bodyPr/>
+          <a:lstStyle/>
+          <a:p>
+            <a:r>
+              <a:rPr lang="en-US" dirty="0"/>
+              <a:t>Gardener: SAP’s solution to </a:t>
+            </a:r>
+            <a:r>
+              <a:rPr lang="en-US"/>
+              <a:t>managed Kubernetes</a:t>
+            </a:r>
+            <a:endParaRPr lang="en-US" dirty="0"/>
+          </a:p>
+        </p:txBody>
+      </p:sp>
+      <p:sp>
+        <p:nvSpPr>
           <p:cNvPr id="4" name="Slide Number Placeholder 3"/>
           <p:cNvSpPr>
             <a:spLocks noGrp="1"/>
@@ -1039,6 +1074,60 @@
               <a:rPr lang="de-DE" smtClean="0"/>
               <a:pPr/>
               <a:t>14</a:t>
+            </a:fld>
+            <a:endParaRPr lang="de-DE" dirty="0"/>
+          </a:p>
+        </p:txBody>
+      </p:sp>
+    </p:spTree>
+    <p:extLst>
+      <p:ext uri="{BB962C8B-B14F-4D97-AF65-F5344CB8AC3E}">
+        <p14:creationId xmlns:p14="http://schemas.microsoft.com/office/powerpoint/2010/main" val="3294899344"/>
+      </p:ext>
+    </p:extLst>
+  </p:cSld>
+  <p:clrMapOvr>
+    <a:masterClrMapping/>
+  </p:clrMapOvr>
+</p:notes>
+</file>
+
+<file path=ppt/notesSlides/notesSlide15.xml><?xml version="1.0" encoding="utf-8"?>
+<p:notes xmlns:a="http://schemas.openxmlformats.org/drawingml/2006/main" xmlns:r="http://schemas.openxmlformats.org/officeDocument/2006/relationships" xmlns:p="http://schemas.openxmlformats.org/presentationml/2006/main">
+  <p:cSld>
+    <p:spTree>
+      <p:nvGrpSpPr>
+        <p:cNvPr id="1" name=""/>
+        <p:cNvGrpSpPr/>
+        <p:nvPr/>
+      </p:nvGrpSpPr>
+      <p:grpSpPr>
+        <a:xfrm>
+          <a:off x="0" y="0"/>
+          <a:ext cx="0" cy="0"/>
+          <a:chOff x="0" y="0"/>
+          <a:chExt cx="0" cy="0"/>
+        </a:xfrm>
+      </p:grpSpPr>
+      <p:sp>
+        <p:nvSpPr>
+          <p:cNvPr id="4" name="Slide Number Placeholder 3"/>
+          <p:cNvSpPr>
+            <a:spLocks noGrp="1"/>
+          </p:cNvSpPr>
+          <p:nvPr>
+            <p:ph type="sldNum" sz="quarter" idx="10"/>
+          </p:nvPr>
+        </p:nvSpPr>
+        <p:spPr/>
+        <p:txBody>
+          <a:bodyPr/>
+          <a:lstStyle/>
+          <a:p>
+            <a:fld id="{7D8C2C35-2B8A-446E-BEC0-FD36716C29AC}" type="slidenum">
+              <a:rPr lang="de-DE" smtClean="0"/>
+              <a:pPr/>
+              <a:t>15</a:t>
             </a:fld>
             <a:endParaRPr lang="de-DE" dirty="0"/>
           </a:p>
@@ -1249,8 +1338,27 @@
           <a:p>
             <a:r>
               <a:rPr lang="en-US" dirty="0"/>
-              <a:t>“Since we introduced micro services, every outage is like a murder mystery”</a:t>
-            </a:r>
+              <a:t>Why are we talking about Docker &amp; Kubernetes now?</a:t>
+            </a:r>
+          </a:p>
+          <a:p>
+            <a:r>
+              <a:rPr lang="en-US" dirty="0"/>
+              <a:t>Watch out for “</a:t>
+            </a:r>
+            <a:r>
+              <a:rPr lang="en-US" dirty="0" err="1"/>
+              <a:t>serverless</a:t>
+            </a:r>
+            <a:r>
+              <a:rPr lang="en-US" dirty="0"/>
+              <a:t>” to become more and </a:t>
+            </a:r>
+            <a:r>
+              <a:rPr lang="en-US"/>
+              <a:t>more important</a:t>
+            </a:r>
+            <a:endParaRPr lang="en-US" dirty="0"/>
           </a:p>
         </p:txBody>
       </p:sp>
@@ -1281,7 +1389,7 @@
     </p:spTree>
     <p:extLst>
       <p:ext uri="{BB962C8B-B14F-4D97-AF65-F5344CB8AC3E}">
-        <p14:creationId xmlns:p14="http://schemas.microsoft.com/office/powerpoint/2010/main" val="1791696452"/>
+        <p14:creationId xmlns:p14="http://schemas.microsoft.com/office/powerpoint/2010/main" val="2951307074"/>
       </p:ext>
     </p:extLst>
   </p:cSld>
@@ -1337,19 +1445,7 @@
           <a:p>
             <a:r>
               <a:rPr lang="en-US" dirty="0"/>
-              <a:t>How to tackle databases?</a:t>
-            </a:r>
-          </a:p>
-          <a:p>
-            <a:r>
-              <a:rPr lang="en-US" dirty="0"/>
-              <a:t>1 service =&gt; 1 database?</a:t>
-            </a:r>
-          </a:p>
-          <a:p>
-            <a:r>
-              <a:rPr lang="en-US" dirty="0"/>
-              <a:t>Containerize databases?</a:t>
+              <a:t>“Since we introduced micro services, every outage is like a murder mystery”</a:t>
             </a:r>
           </a:p>
         </p:txBody>
@@ -1381,7 +1477,7 @@
     </p:spTree>
     <p:extLst>
       <p:ext uri="{BB962C8B-B14F-4D97-AF65-F5344CB8AC3E}">
-        <p14:creationId xmlns:p14="http://schemas.microsoft.com/office/powerpoint/2010/main" val="1445180977"/>
+        <p14:creationId xmlns:p14="http://schemas.microsoft.com/office/powerpoint/2010/main" val="1791696452"/>
       </p:ext>
     </p:extLst>
   </p:cSld>
@@ -1435,7 +1531,22 @@
           <a:bodyPr/>
           <a:lstStyle/>
           <a:p>
-            <a:endParaRPr lang="en-US" dirty="0"/>
+            <a:r>
+              <a:rPr lang="en-US" dirty="0"/>
+              <a:t>How to tackle databases?</a:t>
+            </a:r>
+          </a:p>
+          <a:p>
+            <a:r>
+              <a:rPr lang="en-US" dirty="0"/>
+              <a:t>1 service =&gt; 1 database?</a:t>
+            </a:r>
+          </a:p>
+          <a:p>
+            <a:r>
+              <a:rPr lang="en-US" dirty="0"/>
+              <a:t>Containerize databases?</a:t>
+            </a:r>
           </a:p>
         </p:txBody>
       </p:sp>
@@ -1466,7 +1577,7 @@
     </p:spTree>
     <p:extLst>
       <p:ext uri="{BB962C8B-B14F-4D97-AF65-F5344CB8AC3E}">
-        <p14:creationId xmlns:p14="http://schemas.microsoft.com/office/powerpoint/2010/main" val="86536247"/>
+        <p14:creationId xmlns:p14="http://schemas.microsoft.com/office/powerpoint/2010/main" val="1445180977"/>
       </p:ext>
     </p:extLst>
   </p:cSld>
@@ -1520,32 +1631,7 @@
           <a:bodyPr/>
           <a:lstStyle/>
           <a:p>
-            <a:r>
-              <a:rPr lang="en-US" dirty="0"/>
-              <a:t>Local isolation like in an aquarium is not ideal. Talking from </a:t>
-            </a:r>
-            <a:r>
-              <a:rPr lang="en-US" dirty="0" err="1"/>
-              <a:t>docker</a:t>
-            </a:r>
-            <a:r>
-              <a:rPr lang="en-US" dirty="0"/>
-              <a:t> host to </a:t>
-            </a:r>
-            <a:r>
-              <a:rPr lang="en-US" dirty="0" err="1"/>
-              <a:t>docker</a:t>
-            </a:r>
-            <a:r>
-              <a:rPr lang="en-US" dirty="0"/>
-              <a:t> host is complex due to port mappings.</a:t>
-            </a:r>
-          </a:p>
-          <a:p>
-            <a:r>
-              <a:rPr lang="en-US" dirty="0"/>
-              <a:t>However deploying your apps to the wide sea of Kubernetes, doesn’t solve this fully. </a:t>
-            </a:r>
+            <a:endParaRPr lang="en-US" dirty="0"/>
           </a:p>
         </p:txBody>
       </p:sp>
@@ -1576,7 +1662,7 @@
     </p:spTree>
     <p:extLst>
       <p:ext uri="{BB962C8B-B14F-4D97-AF65-F5344CB8AC3E}">
-        <p14:creationId xmlns:p14="http://schemas.microsoft.com/office/powerpoint/2010/main" val="2753081244"/>
+        <p14:creationId xmlns:p14="http://schemas.microsoft.com/office/powerpoint/2010/main" val="86536247"/>
       </p:ext>
     </p:extLst>
   </p:cSld>
@@ -1630,7 +1716,32 @@
           <a:bodyPr/>
           <a:lstStyle/>
           <a:p>
-            <a:endParaRPr lang="en-US"/>
+            <a:r>
+              <a:rPr lang="en-US" dirty="0"/>
+              <a:t>Local isolation like in an aquarium is not ideal. Talking from </a:t>
+            </a:r>
+            <a:r>
+              <a:rPr lang="en-US" dirty="0" err="1"/>
+              <a:t>docker</a:t>
+            </a:r>
+            <a:r>
+              <a:rPr lang="en-US" dirty="0"/>
+              <a:t> host to </a:t>
+            </a:r>
+            <a:r>
+              <a:rPr lang="en-US" dirty="0" err="1"/>
+              <a:t>docker</a:t>
+            </a:r>
+            <a:r>
+              <a:rPr lang="en-US" dirty="0"/>
+              <a:t> host is complex due to port mappings.</a:t>
+            </a:r>
+          </a:p>
+          <a:p>
+            <a:r>
+              <a:rPr lang="en-US" dirty="0"/>
+              <a:t>However deploying your apps to the wide sea of Kubernetes, doesn’t solve this fully. </a:t>
+            </a:r>
           </a:p>
         </p:txBody>
       </p:sp>
@@ -1661,7 +1772,7 @@
     </p:spTree>
     <p:extLst>
       <p:ext uri="{BB962C8B-B14F-4D97-AF65-F5344CB8AC3E}">
-        <p14:creationId xmlns:p14="http://schemas.microsoft.com/office/powerpoint/2010/main" val="2185429631"/>
+        <p14:creationId xmlns:p14="http://schemas.microsoft.com/office/powerpoint/2010/main" val="2753081244"/>
       </p:ext>
     </p:extLst>
   </p:cSld>
@@ -1715,16 +1826,7 @@
           <a:bodyPr/>
           <a:lstStyle/>
           <a:p>
-            <a:r>
-              <a:rPr lang="en-US" dirty="0"/>
-              <a:t>Kubernetes takes a “construction plan” and instantiates it as often as you want – as long as you have enough resources</a:t>
-            </a:r>
-          </a:p>
-          <a:p>
-            <a:r>
-              <a:rPr lang="en-US" dirty="0"/>
-              <a:t>What you describe, is what you get.</a:t>
-            </a:r>
+            <a:endParaRPr lang="en-US"/>
           </a:p>
         </p:txBody>
       </p:sp>
@@ -1755,7 +1857,7 @@
     </p:spTree>
     <p:extLst>
       <p:ext uri="{BB962C8B-B14F-4D97-AF65-F5344CB8AC3E}">
-        <p14:creationId xmlns:p14="http://schemas.microsoft.com/office/powerpoint/2010/main" val="2669141511"/>
+        <p14:creationId xmlns:p14="http://schemas.microsoft.com/office/powerpoint/2010/main" val="2185429631"/>
       </p:ext>
     </p:extLst>
   </p:cSld>
@@ -1811,7 +1913,13 @@
           <a:p>
             <a:r>
               <a:rPr lang="en-US" dirty="0"/>
-              <a:t>Kubernetes orchestrates your workloads &amp; applications – also several of them in parallel.</a:t>
+              <a:t>Kubernetes takes a “construction plan” and instantiates it as often as you want – as long as you have enough resources</a:t>
+            </a:r>
+          </a:p>
+          <a:p>
+            <a:r>
+              <a:rPr lang="en-US" dirty="0"/>
+              <a:t>What you describe, is what you get.</a:t>
             </a:r>
           </a:p>
         </p:txBody>
@@ -1843,7 +1951,7 @@
     </p:spTree>
     <p:extLst>
       <p:ext uri="{BB962C8B-B14F-4D97-AF65-F5344CB8AC3E}">
-        <p14:creationId xmlns:p14="http://schemas.microsoft.com/office/powerpoint/2010/main" val="2088780993"/>
+        <p14:creationId xmlns:p14="http://schemas.microsoft.com/office/powerpoint/2010/main" val="2669141511"/>
       </p:ext>
     </p:extLst>
   </p:cSld>
@@ -9472,6 +9580,186 @@
       </p:grpSpPr>
       <p:sp>
         <p:nvSpPr>
+          <p:cNvPr id="2" name="Title 1"/>
+          <p:cNvSpPr>
+            <a:spLocks noGrp="1"/>
+          </p:cNvSpPr>
+          <p:nvPr>
+            <p:ph type="title"/>
+          </p:nvPr>
+        </p:nvSpPr>
+        <p:spPr>
+          <a:xfrm>
+            <a:off x="435421" y="443040"/>
+            <a:ext cx="11186476" cy="369332"/>
+          </a:xfrm>
+        </p:spPr>
+        <p:txBody>
+          <a:bodyPr/>
+          <a:lstStyle/>
+          <a:p>
+            <a:r>
+              <a:rPr lang="en-US" dirty="0"/>
+              <a:t>Orchestration</a:t>
+            </a:r>
+          </a:p>
+        </p:txBody>
+      </p:sp>
+      <p:pic>
+        <p:nvPicPr>
+          <p:cNvPr id="3074" name="Picture 2" descr="Bildergebnis für orchestration"/>
+          <p:cNvPicPr>
+            <a:picLocks noChangeAspect="1" noChangeArrowheads="1"/>
+          </p:cNvPicPr>
+          <p:nvPr/>
+        </p:nvPicPr>
+        <p:blipFill>
+          <a:blip r:embed="rId3">
+            <a:extLst>
+              <a:ext uri="{28A0092B-C50C-407E-A947-70E740481C1C}">
+                <a14:useLocalDpi xmlns:a14="http://schemas.microsoft.com/office/drawing/2010/main" val="0"/>
+              </a:ext>
+            </a:extLst>
+          </a:blip>
+          <a:srcRect/>
+          <a:stretch>
+            <a:fillRect/>
+          </a:stretch>
+        </p:blipFill>
+        <p:spPr bwMode="auto">
+          <a:xfrm>
+            <a:off x="1091248" y="1527974"/>
+            <a:ext cx="6406832" cy="4276561"/>
+          </a:xfrm>
+          <a:prstGeom prst="rect">
+            <a:avLst/>
+          </a:prstGeom>
+          <a:noFill/>
+          <a:extLst>
+            <a:ext uri="{909E8E84-426E-40DD-AFC4-6F175D3DCCD1}">
+              <a14:hiddenFill xmlns:a14="http://schemas.microsoft.com/office/drawing/2010/main">
+                <a:solidFill>
+                  <a:srgbClr val="FFFFFF"/>
+                </a:solidFill>
+              </a14:hiddenFill>
+            </a:ext>
+          </a:extLst>
+        </p:spPr>
+      </p:pic>
+      <p:pic>
+        <p:nvPicPr>
+          <p:cNvPr id="6" name="Picture 2" descr="Bildergebnis für orchestration"/>
+          <p:cNvPicPr>
+            <a:picLocks noChangeAspect="1" noChangeArrowheads="1"/>
+          </p:cNvPicPr>
+          <p:nvPr/>
+        </p:nvPicPr>
+        <p:blipFill>
+          <a:blip r:embed="rId3">
+            <a:extLst>
+              <a:ext uri="{28A0092B-C50C-407E-A947-70E740481C1C}">
+                <a14:useLocalDpi xmlns:a14="http://schemas.microsoft.com/office/drawing/2010/main" val="0"/>
+              </a:ext>
+            </a:extLst>
+          </a:blip>
+          <a:srcRect/>
+          <a:stretch>
+            <a:fillRect/>
+          </a:stretch>
+        </p:blipFill>
+        <p:spPr bwMode="auto">
+          <a:xfrm>
+            <a:off x="8193088" y="959790"/>
+            <a:ext cx="2947352" cy="1967358"/>
+          </a:xfrm>
+          <a:prstGeom prst="rect">
+            <a:avLst/>
+          </a:prstGeom>
+          <a:noFill/>
+          <a:extLst>
+            <a:ext uri="{909E8E84-426E-40DD-AFC4-6F175D3DCCD1}">
+              <a14:hiddenFill xmlns:a14="http://schemas.microsoft.com/office/drawing/2010/main">
+                <a:solidFill>
+                  <a:srgbClr val="FFFFFF"/>
+                </a:solidFill>
+              </a14:hiddenFill>
+            </a:ext>
+          </a:extLst>
+        </p:spPr>
+      </p:pic>
+      <p:pic>
+        <p:nvPicPr>
+          <p:cNvPr id="7" name="Picture 2" descr="Bildergebnis für orchestration"/>
+          <p:cNvPicPr>
+            <a:picLocks noChangeAspect="1" noChangeArrowheads="1"/>
+          </p:cNvPicPr>
+          <p:nvPr/>
+        </p:nvPicPr>
+        <p:blipFill>
+          <a:blip r:embed="rId3">
+            <a:extLst>
+              <a:ext uri="{28A0092B-C50C-407E-A947-70E740481C1C}">
+                <a14:useLocalDpi xmlns:a14="http://schemas.microsoft.com/office/drawing/2010/main" val="0"/>
+              </a:ext>
+            </a:extLst>
+          </a:blip>
+          <a:srcRect/>
+          <a:stretch>
+            <a:fillRect/>
+          </a:stretch>
+        </p:blipFill>
+        <p:spPr bwMode="auto">
+          <a:xfrm>
+            <a:off x="8193088" y="4004817"/>
+            <a:ext cx="2947352" cy="1967358"/>
+          </a:xfrm>
+          <a:prstGeom prst="rect">
+            <a:avLst/>
+          </a:prstGeom>
+          <a:noFill/>
+          <a:extLst>
+            <a:ext uri="{909E8E84-426E-40DD-AFC4-6F175D3DCCD1}">
+              <a14:hiddenFill xmlns:a14="http://schemas.microsoft.com/office/drawing/2010/main">
+                <a:solidFill>
+                  <a:srgbClr val="FFFFFF"/>
+                </a:solidFill>
+              </a14:hiddenFill>
+            </a:ext>
+          </a:extLst>
+        </p:spPr>
+      </p:pic>
+    </p:spTree>
+    <p:extLst>
+      <p:ext uri="{BB962C8B-B14F-4D97-AF65-F5344CB8AC3E}">
+        <p14:creationId xmlns:p14="http://schemas.microsoft.com/office/powerpoint/2010/main" val="290894176"/>
+      </p:ext>
+    </p:extLst>
+  </p:cSld>
+  <p:clrMapOvr>
+    <a:masterClrMapping/>
+  </p:clrMapOvr>
+</p:sld>
+</file>
+
+<file path=ppt/slides/slide11.xml><?xml version="1.0" encoding="utf-8"?>
+<p:sld xmlns:a="http://schemas.openxmlformats.org/drawingml/2006/main" xmlns:r="http://schemas.openxmlformats.org/officeDocument/2006/relationships" xmlns:p="http://schemas.openxmlformats.org/presentationml/2006/main">
+  <p:cSld>
+    <p:spTree>
+      <p:nvGrpSpPr>
+        <p:cNvPr id="1" name=""/>
+        <p:cNvGrpSpPr/>
+        <p:nvPr/>
+      </p:nvGrpSpPr>
+      <p:grpSpPr>
+        <a:xfrm>
+          <a:off x="0" y="0"/>
+          <a:ext cx="0" cy="0"/>
+          <a:chOff x="0" y="0"/>
+          <a:chExt cx="0" cy="0"/>
+        </a:xfrm>
+      </p:grpSpPr>
+      <p:sp>
+        <p:nvSpPr>
           <p:cNvPr id="2" name="Title 1">
             <a:extLst>
               <a:ext uri="{FF2B5EF4-FFF2-40B4-BE49-F238E27FC236}">
@@ -9685,7 +9973,7 @@
 </p:sld>
 </file>
 
-<file path=ppt/slides/slide11.xml><?xml version="1.0" encoding="utf-8"?>
+<file path=ppt/slides/slide12.xml><?xml version="1.0" encoding="utf-8"?>
 <p:sld xmlns:a="http://schemas.openxmlformats.org/drawingml/2006/main" xmlns:r="http://schemas.openxmlformats.org/officeDocument/2006/relationships" xmlns:p="http://schemas.openxmlformats.org/presentationml/2006/main">
   <p:cSld>
     <p:spTree>
@@ -10018,7 +10306,7 @@
 </p:sld>
 </file>
 
-<file path=ppt/slides/slide12.xml><?xml version="1.0" encoding="utf-8"?>
+<file path=ppt/slides/slide13.xml><?xml version="1.0" encoding="utf-8"?>
 <p:sld xmlns:a="http://schemas.openxmlformats.org/drawingml/2006/main" xmlns:r="http://schemas.openxmlformats.org/officeDocument/2006/relationships" xmlns:p="http://schemas.openxmlformats.org/presentationml/2006/main">
   <p:cSld>
     <p:spTree>
@@ -10196,7 +10484,7 @@
 </p:sld>
 </file>
 
-<file path=ppt/slides/slide13.xml><?xml version="1.0" encoding="utf-8"?>
+<file path=ppt/slides/slide14.xml><?xml version="1.0" encoding="utf-8"?>
 <p:sld xmlns:a="http://schemas.openxmlformats.org/drawingml/2006/main" xmlns:r="http://schemas.openxmlformats.org/officeDocument/2006/relationships" xmlns:p="http://schemas.openxmlformats.org/presentationml/2006/main">
   <p:cSld>
     <p:spTree>
@@ -10453,7 +10741,7 @@
 </p:sld>
 </file>
 
-<file path=ppt/slides/slide14.xml><?xml version="1.0" encoding="utf-8"?>
+<file path=ppt/slides/slide15.xml><?xml version="1.0" encoding="utf-8"?>
 <p:sld xmlns:a="http://schemas.openxmlformats.org/drawingml/2006/main" xmlns:r="http://schemas.openxmlformats.org/officeDocument/2006/relationships" xmlns:p="http://schemas.openxmlformats.org/presentationml/2006/main" show="0">
   <p:cSld>
     <p:spTree>
@@ -10696,6 +10984,237 @@
           <a:chExt cx="0" cy="0"/>
         </a:xfrm>
       </p:grpSpPr>
+      <p:sp>
+        <p:nvSpPr>
+          <p:cNvPr id="2" name="Title 1">
+            <a:extLst>
+              <a:ext uri="{FF2B5EF4-FFF2-40B4-BE49-F238E27FC236}">
+                <a16:creationId xmlns:a16="http://schemas.microsoft.com/office/drawing/2014/main" id="{87932A15-55BF-4A31-BC15-2DE4770B9DE6}"/>
+              </a:ext>
+            </a:extLst>
+          </p:cNvPr>
+          <p:cNvSpPr>
+            <a:spLocks noGrp="1"/>
+          </p:cNvSpPr>
+          <p:nvPr>
+            <p:ph type="title"/>
+          </p:nvPr>
+        </p:nvSpPr>
+        <p:spPr/>
+        <p:txBody>
+          <a:bodyPr/>
+          <a:lstStyle/>
+          <a:p>
+            <a:r>
+              <a:rPr lang="en-US" dirty="0"/>
+              <a:t>The enterprise IT adoption cycle</a:t>
+            </a:r>
+          </a:p>
+        </p:txBody>
+      </p:sp>
+      <p:pic>
+        <p:nvPicPr>
+          <p:cNvPr id="1026" name="Picture 2" descr="@swardley's Enterprise IT Adoption Cycle">
+            <a:extLst>
+              <a:ext uri="{FF2B5EF4-FFF2-40B4-BE49-F238E27FC236}">
+                <a16:creationId xmlns:a16="http://schemas.microsoft.com/office/drawing/2014/main" id="{0545D1FE-52C9-40E4-800C-5F7879713029}"/>
+              </a:ext>
+            </a:extLst>
+          </p:cNvPr>
+          <p:cNvPicPr>
+            <a:picLocks noChangeAspect="1" noChangeArrowheads="1"/>
+          </p:cNvPicPr>
+          <p:nvPr/>
+        </p:nvPicPr>
+        <p:blipFill>
+          <a:blip r:embed="rId3">
+            <a:extLst>
+              <a:ext uri="{28A0092B-C50C-407E-A947-70E740481C1C}">
+                <a14:useLocalDpi xmlns:a14="http://schemas.microsoft.com/office/drawing/2010/main" val="0"/>
+              </a:ext>
+            </a:extLst>
+          </a:blip>
+          <a:srcRect/>
+          <a:stretch>
+            <a:fillRect/>
+          </a:stretch>
+        </p:blipFill>
+        <p:spPr bwMode="auto">
+          <a:xfrm>
+            <a:off x="2477129" y="1074558"/>
+            <a:ext cx="7242175" cy="4942784"/>
+          </a:xfrm>
+          <a:prstGeom prst="rect">
+            <a:avLst/>
+          </a:prstGeom>
+          <a:noFill/>
+          <a:extLst>
+            <a:ext uri="{909E8E84-426E-40DD-AFC4-6F175D3DCCD1}">
+              <a14:hiddenFill xmlns:a14="http://schemas.microsoft.com/office/drawing/2010/main">
+                <a:solidFill>
+                  <a:srgbClr val="FFFFFF"/>
+                </a:solidFill>
+              </a14:hiddenFill>
+            </a:ext>
+          </a:extLst>
+        </p:spPr>
+      </p:pic>
+      <p:sp>
+        <p:nvSpPr>
+          <p:cNvPr id="3" name="Rectangle 2">
+            <a:extLst>
+              <a:ext uri="{FF2B5EF4-FFF2-40B4-BE49-F238E27FC236}">
+                <a16:creationId xmlns:a16="http://schemas.microsoft.com/office/drawing/2014/main" id="{2945367C-4F21-482D-96C3-B794B27BB28A}"/>
+              </a:ext>
+            </a:extLst>
+          </p:cNvPr>
+          <p:cNvSpPr/>
+          <p:nvPr/>
+        </p:nvSpPr>
+        <p:spPr>
+          <a:xfrm>
+            <a:off x="916433" y="6132900"/>
+            <a:ext cx="10361612" cy="307777"/>
+          </a:xfrm>
+          <a:prstGeom prst="rect">
+            <a:avLst/>
+          </a:prstGeom>
+        </p:spPr>
+        <p:txBody>
+          <a:bodyPr wrap="square">
+            <a:spAutoFit/>
+          </a:bodyPr>
+          <a:lstStyle/>
+          <a:p>
+            <a:r>
+              <a:rPr lang="en-US" sz="1400" dirty="0">
+                <a:solidFill>
+                  <a:srgbClr val="AAAAAA"/>
+                </a:solidFill>
+                <a:latin typeface="Helvetica Neue"/>
+              </a:rPr>
+              <a:t>Adoption cycle graphic © 2012 </a:t>
+            </a:r>
+            <a:r>
+              <a:rPr lang="en-US" sz="1400" dirty="0">
+                <a:solidFill>
+                  <a:srgbClr val="AAAAAA"/>
+                </a:solidFill>
+                <a:latin typeface="Helvetica Neue"/>
+                <a:hlinkClick r:id="rId4" tooltip="Simon Wardley"/>
+              </a:rPr>
+              <a:t>Simon </a:t>
+            </a:r>
+            <a:r>
+              <a:rPr lang="en-US" sz="1400" dirty="0" err="1">
+                <a:solidFill>
+                  <a:srgbClr val="AAAAAA"/>
+                </a:solidFill>
+                <a:latin typeface="Helvetica Neue"/>
+                <a:hlinkClick r:id="rId4" tooltip="Simon Wardley"/>
+              </a:rPr>
+              <a:t>Wardley</a:t>
+            </a:r>
+            <a:r>
+              <a:rPr lang="en-US" sz="1400" dirty="0">
+                <a:solidFill>
+                  <a:srgbClr val="AAAAAA"/>
+                </a:solidFill>
+                <a:latin typeface="Helvetica Neue"/>
+              </a:rPr>
+              <a:t> and </a:t>
+            </a:r>
+            <a:r>
+              <a:rPr lang="en-US" sz="1400" dirty="0">
+                <a:solidFill>
+                  <a:srgbClr val="AAAAAA"/>
+                </a:solidFill>
+                <a:latin typeface="Helvetica Neue"/>
+                <a:hlinkClick r:id="rId5"/>
+              </a:rPr>
+              <a:t>CC BY-SA 3.0</a:t>
+            </a:r>
+            <a:r>
+              <a:rPr lang="en-US" sz="1400" dirty="0">
+                <a:solidFill>
+                  <a:srgbClr val="AAAAAA"/>
+                </a:solidFill>
+                <a:latin typeface="Helvetica Neue"/>
+              </a:rPr>
+              <a:t>. Nicked from his </a:t>
+            </a:r>
+            <a:r>
+              <a:rPr lang="en-US" sz="1400" dirty="0">
+                <a:solidFill>
+                  <a:srgbClr val="AAAAAA"/>
+                </a:solidFill>
+                <a:latin typeface="Helvetica Neue"/>
+                <a:hlinkClick r:id="rId6" tooltip="Bits or pieces: Adoption cycles"/>
+              </a:rPr>
+              <a:t>blog</a:t>
+            </a:r>
+            <a:r>
+              <a:rPr lang="en-US" sz="1400" dirty="0">
+                <a:solidFill>
+                  <a:srgbClr val="AAAAAA"/>
+                </a:solidFill>
+                <a:latin typeface="Helvetica Neue"/>
+              </a:rPr>
+              <a:t> and placed here by </a:t>
+            </a:r>
+            <a:r>
+              <a:rPr lang="en-US" sz="1400" dirty="0">
+                <a:solidFill>
+                  <a:srgbClr val="AAAAAA"/>
+                </a:solidFill>
+                <a:latin typeface="Helvetica Neue"/>
+                <a:hlinkClick r:id="rId7" tooltip="Andrew Back"/>
+              </a:rPr>
+              <a:t>Andrew Back</a:t>
+            </a:r>
+            <a:r>
+              <a:rPr lang="en-US" sz="1400" dirty="0">
+                <a:solidFill>
+                  <a:srgbClr val="AAAAAA"/>
+                </a:solidFill>
+                <a:latin typeface="Helvetica Neue"/>
+              </a:rPr>
+              <a:t>.</a:t>
+            </a:r>
+            <a:endParaRPr lang="en-US" sz="1400" dirty="0"/>
+          </a:p>
+        </p:txBody>
+      </p:sp>
+    </p:spTree>
+    <p:extLst>
+      <p:ext uri="{BB962C8B-B14F-4D97-AF65-F5344CB8AC3E}">
+        <p14:creationId xmlns:p14="http://schemas.microsoft.com/office/powerpoint/2010/main" val="536058696"/>
+      </p:ext>
+    </p:extLst>
+  </p:cSld>
+  <p:clrMapOvr>
+    <a:masterClrMapping/>
+  </p:clrMapOvr>
+</p:sld>
+</file>
+
+<file path=ppt/slides/slide4.xml><?xml version="1.0" encoding="utf-8"?>
+<p:sld xmlns:a="http://schemas.openxmlformats.org/drawingml/2006/main" xmlns:r="http://schemas.openxmlformats.org/officeDocument/2006/relationships" xmlns:p="http://schemas.openxmlformats.org/presentationml/2006/main">
+  <p:cSld>
+    <p:spTree>
+      <p:nvGrpSpPr>
+        <p:cNvPr id="1" name=""/>
+        <p:cNvGrpSpPr/>
+        <p:nvPr/>
+      </p:nvGrpSpPr>
+      <p:grpSpPr>
+        <a:xfrm>
+          <a:off x="0" y="0"/>
+          <a:ext cx="0" cy="0"/>
+          <a:chOff x="0" y="0"/>
+          <a:chExt cx="0" cy="0"/>
+        </a:xfrm>
+      </p:grpSpPr>
       <p:pic>
         <p:nvPicPr>
           <p:cNvPr id="2" name="Picture 1"/>
@@ -10901,7 +11420,7 @@
 </p:sld>
 </file>
 
-<file path=ppt/slides/slide4.xml><?xml version="1.0" encoding="utf-8"?>
+<file path=ppt/slides/slide5.xml><?xml version="1.0" encoding="utf-8"?>
 <p:sld xmlns:a="http://schemas.openxmlformats.org/drawingml/2006/main" xmlns:r="http://schemas.openxmlformats.org/officeDocument/2006/relationships" xmlns:p="http://schemas.openxmlformats.org/presentationml/2006/main">
   <p:cSld>
     <p:spTree>
@@ -11092,7 +11611,7 @@
 </p:sld>
 </file>
 
-<file path=ppt/slides/slide5.xml><?xml version="1.0" encoding="utf-8"?>
+<file path=ppt/slides/slide6.xml><?xml version="1.0" encoding="utf-8"?>
 <p:sld xmlns:a="http://schemas.openxmlformats.org/drawingml/2006/main" xmlns:r="http://schemas.openxmlformats.org/officeDocument/2006/relationships" xmlns:p="http://schemas.openxmlformats.org/presentationml/2006/main">
   <p:cSld>
     <p:spTree>
@@ -11281,7 +11800,7 @@
 </p:sld>
 </file>
 
-<file path=ppt/slides/slide6.xml><?xml version="1.0" encoding="utf-8"?>
+<file path=ppt/slides/slide7.xml><?xml version="1.0" encoding="utf-8"?>
 <p:sld xmlns:a="http://schemas.openxmlformats.org/drawingml/2006/main" xmlns:r="http://schemas.openxmlformats.org/officeDocument/2006/relationships" xmlns:p="http://schemas.openxmlformats.org/presentationml/2006/main">
   <p:cSld>
     <p:spTree>
@@ -11438,7 +11957,7 @@
 </p:sld>
 </file>
 
-<file path=ppt/slides/slide7.xml><?xml version="1.0" encoding="utf-8"?>
+<file path=ppt/slides/slide8.xml><?xml version="1.0" encoding="utf-8"?>
 <p:sld xmlns:a="http://schemas.openxmlformats.org/drawingml/2006/main" xmlns:r="http://schemas.openxmlformats.org/officeDocument/2006/relationships" xmlns:p="http://schemas.openxmlformats.org/presentationml/2006/main">
   <p:cSld>
     <p:spTree>
@@ -11947,7 +12466,7 @@
 </p:sld>
 </file>
 
-<file path=ppt/slides/slide8.xml><?xml version="1.0" encoding="utf-8"?>
+<file path=ppt/slides/slide9.xml><?xml version="1.0" encoding="utf-8"?>
 <p:sld xmlns:a="http://schemas.openxmlformats.org/drawingml/2006/main" xmlns:r="http://schemas.openxmlformats.org/officeDocument/2006/relationships" xmlns:p="http://schemas.openxmlformats.org/presentationml/2006/main">
   <p:cSld>
     <p:spTree>
@@ -12164,186 +12683,6 @@
     <p:extLst>
       <p:ext uri="{BB962C8B-B14F-4D97-AF65-F5344CB8AC3E}">
         <p14:creationId xmlns:p14="http://schemas.microsoft.com/office/powerpoint/2010/main" val="3572379409"/>
-      </p:ext>
-    </p:extLst>
-  </p:cSld>
-  <p:clrMapOvr>
-    <a:masterClrMapping/>
-  </p:clrMapOvr>
-</p:sld>
-</file>
-
-<file path=ppt/slides/slide9.xml><?xml version="1.0" encoding="utf-8"?>
-<p:sld xmlns:a="http://schemas.openxmlformats.org/drawingml/2006/main" xmlns:r="http://schemas.openxmlformats.org/officeDocument/2006/relationships" xmlns:p="http://schemas.openxmlformats.org/presentationml/2006/main">
-  <p:cSld>
-    <p:spTree>
-      <p:nvGrpSpPr>
-        <p:cNvPr id="1" name=""/>
-        <p:cNvGrpSpPr/>
-        <p:nvPr/>
-      </p:nvGrpSpPr>
-      <p:grpSpPr>
-        <a:xfrm>
-          <a:off x="0" y="0"/>
-          <a:ext cx="0" cy="0"/>
-          <a:chOff x="0" y="0"/>
-          <a:chExt cx="0" cy="0"/>
-        </a:xfrm>
-      </p:grpSpPr>
-      <p:sp>
-        <p:nvSpPr>
-          <p:cNvPr id="2" name="Title 1"/>
-          <p:cNvSpPr>
-            <a:spLocks noGrp="1"/>
-          </p:cNvSpPr>
-          <p:nvPr>
-            <p:ph type="title"/>
-          </p:nvPr>
-        </p:nvSpPr>
-        <p:spPr>
-          <a:xfrm>
-            <a:off x="435421" y="443040"/>
-            <a:ext cx="11186476" cy="369332"/>
-          </a:xfrm>
-        </p:spPr>
-        <p:txBody>
-          <a:bodyPr/>
-          <a:lstStyle/>
-          <a:p>
-            <a:r>
-              <a:rPr lang="en-US" dirty="0"/>
-              <a:t>Orchestration</a:t>
-            </a:r>
-          </a:p>
-        </p:txBody>
-      </p:sp>
-      <p:pic>
-        <p:nvPicPr>
-          <p:cNvPr id="3074" name="Picture 2" descr="Bildergebnis für orchestration"/>
-          <p:cNvPicPr>
-            <a:picLocks noChangeAspect="1" noChangeArrowheads="1"/>
-          </p:cNvPicPr>
-          <p:nvPr/>
-        </p:nvPicPr>
-        <p:blipFill>
-          <a:blip r:embed="rId3">
-            <a:extLst>
-              <a:ext uri="{28A0092B-C50C-407E-A947-70E740481C1C}">
-                <a14:useLocalDpi xmlns:a14="http://schemas.microsoft.com/office/drawing/2010/main" val="0"/>
-              </a:ext>
-            </a:extLst>
-          </a:blip>
-          <a:srcRect/>
-          <a:stretch>
-            <a:fillRect/>
-          </a:stretch>
-        </p:blipFill>
-        <p:spPr bwMode="auto">
-          <a:xfrm>
-            <a:off x="1091248" y="1527974"/>
-            <a:ext cx="6406832" cy="4276561"/>
-          </a:xfrm>
-          <a:prstGeom prst="rect">
-            <a:avLst/>
-          </a:prstGeom>
-          <a:noFill/>
-          <a:extLst>
-            <a:ext uri="{909E8E84-426E-40DD-AFC4-6F175D3DCCD1}">
-              <a14:hiddenFill xmlns:a14="http://schemas.microsoft.com/office/drawing/2010/main">
-                <a:solidFill>
-                  <a:srgbClr val="FFFFFF"/>
-                </a:solidFill>
-              </a14:hiddenFill>
-            </a:ext>
-          </a:extLst>
-        </p:spPr>
-      </p:pic>
-      <p:pic>
-        <p:nvPicPr>
-          <p:cNvPr id="6" name="Picture 2" descr="Bildergebnis für orchestration"/>
-          <p:cNvPicPr>
-            <a:picLocks noChangeAspect="1" noChangeArrowheads="1"/>
-          </p:cNvPicPr>
-          <p:nvPr/>
-        </p:nvPicPr>
-        <p:blipFill>
-          <a:blip r:embed="rId3">
-            <a:extLst>
-              <a:ext uri="{28A0092B-C50C-407E-A947-70E740481C1C}">
-                <a14:useLocalDpi xmlns:a14="http://schemas.microsoft.com/office/drawing/2010/main" val="0"/>
-              </a:ext>
-            </a:extLst>
-          </a:blip>
-          <a:srcRect/>
-          <a:stretch>
-            <a:fillRect/>
-          </a:stretch>
-        </p:blipFill>
-        <p:spPr bwMode="auto">
-          <a:xfrm>
-            <a:off x="8193088" y="959790"/>
-            <a:ext cx="2947352" cy="1967358"/>
-          </a:xfrm>
-          <a:prstGeom prst="rect">
-            <a:avLst/>
-          </a:prstGeom>
-          <a:noFill/>
-          <a:extLst>
-            <a:ext uri="{909E8E84-426E-40DD-AFC4-6F175D3DCCD1}">
-              <a14:hiddenFill xmlns:a14="http://schemas.microsoft.com/office/drawing/2010/main">
-                <a:solidFill>
-                  <a:srgbClr val="FFFFFF"/>
-                </a:solidFill>
-              </a14:hiddenFill>
-            </a:ext>
-          </a:extLst>
-        </p:spPr>
-      </p:pic>
-      <p:pic>
-        <p:nvPicPr>
-          <p:cNvPr id="7" name="Picture 2" descr="Bildergebnis für orchestration"/>
-          <p:cNvPicPr>
-            <a:picLocks noChangeAspect="1" noChangeArrowheads="1"/>
-          </p:cNvPicPr>
-          <p:nvPr/>
-        </p:nvPicPr>
-        <p:blipFill>
-          <a:blip r:embed="rId3">
-            <a:extLst>
-              <a:ext uri="{28A0092B-C50C-407E-A947-70E740481C1C}">
-                <a14:useLocalDpi xmlns:a14="http://schemas.microsoft.com/office/drawing/2010/main" val="0"/>
-              </a:ext>
-            </a:extLst>
-          </a:blip>
-          <a:srcRect/>
-          <a:stretch>
-            <a:fillRect/>
-          </a:stretch>
-        </p:blipFill>
-        <p:spPr bwMode="auto">
-          <a:xfrm>
-            <a:off x="8193088" y="4004817"/>
-            <a:ext cx="2947352" cy="1967358"/>
-          </a:xfrm>
-          <a:prstGeom prst="rect">
-            <a:avLst/>
-          </a:prstGeom>
-          <a:noFill/>
-          <a:extLst>
-            <a:ext uri="{909E8E84-426E-40DD-AFC4-6F175D3DCCD1}">
-              <a14:hiddenFill xmlns:a14="http://schemas.microsoft.com/office/drawing/2010/main">
-                <a:solidFill>
-                  <a:srgbClr val="FFFFFF"/>
-                </a:solidFill>
-              </a14:hiddenFill>
-            </a:ext>
-          </a:extLst>
-        </p:spPr>
-      </p:pic>
-    </p:spTree>
-    <p:extLst>
-      <p:ext uri="{BB962C8B-B14F-4D97-AF65-F5344CB8AC3E}">
-        <p14:creationId xmlns:p14="http://schemas.microsoft.com/office/powerpoint/2010/main" val="290894176"/>
       </p:ext>
     </p:extLst>
   </p:cSld>

</xml_diff>

<commit_message>
small edits in speaker notes
</commit_message>
<xml_diff>
--- a/kubernetes/00_intro.pptx
+++ b/kubernetes/00_intro.pptx
@@ -577,7 +577,7 @@
           <a:bodyPr/>
           <a:lstStyle/>
           <a:p>
-            <a:endParaRPr lang="en-US"/>
+            <a:endParaRPr lang="en-US" dirty="0"/>
           </a:p>
         </p:txBody>
       </p:sp>
@@ -10340,7 +10340,7 @@
           <a:p>
             <a:r>
               <a:rPr lang="en-US" dirty="0"/>
-              <a:t>If it doesn’t work as expected …</a:t>
+              <a:t>If it doesn’t always work as expected …</a:t>
             </a:r>
           </a:p>
         </p:txBody>
@@ -11460,8 +11460,8 @@
         </p:blipFill>
         <p:spPr bwMode="auto">
           <a:xfrm>
-            <a:off x="3167698" y="603171"/>
-            <a:ext cx="5458142" cy="4093607"/>
+            <a:off x="2967486" y="396941"/>
+            <a:ext cx="6020663" cy="4515498"/>
           </a:xfrm>
           <a:prstGeom prst="rect">
             <a:avLst/>

</xml_diff>

<commit_message>
+ logo on title slide
</commit_message>
<xml_diff>
--- a/kubernetes/00_intro.pptx
+++ b/kubernetes/00_intro.pptx
@@ -9544,6 +9544,66 @@
                   <a:srgbClr val="FFFFFF"/>
                 </a:solidFill>
               </a14:hiddenFill>
+            </a:ext>
+          </a:extLst>
+        </p:spPr>
+      </p:pic>
+      <p:pic>
+        <p:nvPicPr>
+          <p:cNvPr id="4" name="Picture 3" descr="cid:image003.png@01D31CC6.A08B1C50">
+            <a:extLst>
+              <a:ext uri="{FF2B5EF4-FFF2-40B4-BE49-F238E27FC236}">
+                <a16:creationId xmlns:a16="http://schemas.microsoft.com/office/drawing/2014/main" id="{CE860390-F50F-48A8-AA1A-AE0217946FC1}"/>
+              </a:ext>
+            </a:extLst>
+          </p:cNvPr>
+          <p:cNvPicPr>
+            <a:picLocks noChangeAspect="1" noChangeArrowheads="1"/>
+          </p:cNvPicPr>
+          <p:nvPr/>
+        </p:nvPicPr>
+        <p:blipFill>
+          <a:blip r:embed="rId4">
+            <a:extLst>
+              <a:ext uri="{28A0092B-C50C-407E-A947-70E740481C1C}">
+                <a14:useLocalDpi xmlns:a14="http://schemas.microsoft.com/office/drawing/2010/main" val="0"/>
+              </a:ext>
+            </a:extLst>
+          </a:blip>
+          <a:srcRect/>
+          <a:stretch>
+            <a:fillRect/>
+          </a:stretch>
+        </p:blipFill>
+        <p:spPr bwMode="auto">
+          <a:xfrm>
+            <a:off x="10780712" y="5721975"/>
+            <a:ext cx="1414463" cy="1136025"/>
+          </a:xfrm>
+          <a:prstGeom prst="rect">
+            <a:avLst/>
+          </a:prstGeom>
+          <a:noFill/>
+          <a:ln>
+            <a:noFill/>
+          </a:ln>
+          <a:extLst>
+            <a:ext uri="{909E8E84-426E-40DD-AFC4-6F175D3DCCD1}">
+              <a14:hiddenFill xmlns:a14="http://schemas.microsoft.com/office/drawing/2010/main">
+                <a:solidFill>
+                  <a:srgbClr val="FFFFFF"/>
+                </a:solidFill>
+              </a14:hiddenFill>
+            </a:ext>
+            <a:ext uri="{91240B29-F687-4F45-9708-019B960494DF}">
+              <a14:hiddenLine xmlns:a14="http://schemas.microsoft.com/office/drawing/2010/main" w="9525">
+                <a:solidFill>
+                  <a:srgbClr val="000000"/>
+                </a:solidFill>
+                <a:miter lim="800000"/>
+                <a:headEnd/>
+                <a:tailEnd/>
+              </a14:hiddenLine>
             </a:ext>
           </a:extLst>
         </p:spPr>

</xml_diff>

<commit_message>
added a "why" ppt & removed duplicates from k8s intro
</commit_message>
<xml_diff>
--- a/kubernetes/00_intro.pptx
+++ b/kubernetes/00_intro.pptx
@@ -5,26 +5,22 @@
     <p:sldMasterId id="2147483733" r:id="rId1"/>
   </p:sldMasterIdLst>
   <p:notesMasterIdLst>
-    <p:notesMasterId r:id="rId16"/>
+    <p:notesMasterId r:id="rId12"/>
   </p:notesMasterIdLst>
   <p:handoutMasterIdLst>
-    <p:handoutMasterId r:id="rId17"/>
+    <p:handoutMasterId r:id="rId13"/>
   </p:handoutMasterIdLst>
   <p:sldIdLst>
     <p:sldId id="433" r:id="rId2"/>
-    <p:sldId id="453" r:id="rId3"/>
-    <p:sldId id="441" r:id="rId4"/>
-    <p:sldId id="444" r:id="rId5"/>
-    <p:sldId id="445" r:id="rId6"/>
-    <p:sldId id="442" r:id="rId7"/>
-    <p:sldId id="446" r:id="rId8"/>
-    <p:sldId id="450" r:id="rId9"/>
-    <p:sldId id="449" r:id="rId10"/>
-    <p:sldId id="452" r:id="rId11"/>
-    <p:sldId id="447" r:id="rId12"/>
-    <p:sldId id="448" r:id="rId13"/>
-    <p:sldId id="451" r:id="rId14"/>
-    <p:sldId id="265" r:id="rId15"/>
+    <p:sldId id="442" r:id="rId3"/>
+    <p:sldId id="446" r:id="rId4"/>
+    <p:sldId id="450" r:id="rId5"/>
+    <p:sldId id="449" r:id="rId6"/>
+    <p:sldId id="452" r:id="rId7"/>
+    <p:sldId id="447" r:id="rId8"/>
+    <p:sldId id="448" r:id="rId9"/>
+    <p:sldId id="451" r:id="rId10"/>
+    <p:sldId id="265" r:id="rId11"/>
   </p:sldIdLst>
   <p:sldSz cx="12195175" cy="6858000"/>
   <p:notesSz cx="6858000" cy="9144000"/>
@@ -200,10 +196,6 @@
 </p:presentation>
 </file>
 
-<file path=ppt/revisionInfo.xml><?xml version="1.0" encoding="utf-8"?>
-<p1510:revInfo xmlns:a="http://schemas.openxmlformats.org/drawingml/2006/main" xmlns:r="http://schemas.openxmlformats.org/officeDocument/2006/relationships" xmlns:p1510="http://schemas.microsoft.com/office/powerpoint/2015/10/main"/>
-</file>
-
 <file path=ppt/handoutMasters/handoutMaster1.xml><?xml version="1.0" encoding="utf-8"?>
 <p:handoutMaster xmlns:a="http://schemas.openxmlformats.org/drawingml/2006/main" xmlns:r="http://schemas.openxmlformats.org/officeDocument/2006/relationships" xmlns:p="http://schemas.openxmlformats.org/presentationml/2006/main">
   <p:cSld>
@@ -636,75 +628,6 @@
       </p:grpSpPr>
       <p:sp>
         <p:nvSpPr>
-          <p:cNvPr id="2" name="Slide Image Placeholder 1"/>
-          <p:cNvSpPr>
-            <a:spLocks noGrp="1" noRot="1" noChangeAspect="1"/>
-          </p:cNvSpPr>
-          <p:nvPr>
-            <p:ph type="sldImg"/>
-          </p:nvPr>
-        </p:nvSpPr>
-        <p:spPr/>
-      </p:sp>
-      <p:sp>
-        <p:nvSpPr>
-          <p:cNvPr id="3" name="Notes Placeholder 2"/>
-          <p:cNvSpPr>
-            <a:spLocks noGrp="1"/>
-          </p:cNvSpPr>
-          <p:nvPr>
-            <p:ph type="body" idx="1"/>
-          </p:nvPr>
-        </p:nvSpPr>
-        <p:spPr/>
-        <p:txBody>
-          <a:bodyPr/>
-          <a:lstStyle/>
-          <a:p>
-            <a:r>
-              <a:rPr lang="en-US" dirty="0"/>
-              <a:t>The demo is based on the “sock shop” e-commerce platform developed by </a:t>
-            </a:r>
-            <a:r>
-              <a:rPr lang="en-US" dirty="0" err="1"/>
-              <a:t>weaveworks</a:t>
-            </a:r>
-            <a:r>
-              <a:rPr lang="en-US" dirty="0"/>
-              <a:t>. This is a full-blown demo application, including content – however you have to wait ~2min until the content is fully loaded. To demo, create a “sock-shop” namespace and use the sock-</a:t>
-            </a:r>
-            <a:r>
-              <a:rPr lang="en-US" dirty="0" err="1"/>
-              <a:t>shop.yaml</a:t>
-            </a:r>
-            <a:r>
-              <a:rPr lang="en-US" dirty="0"/>
-              <a:t> from the </a:t>
-            </a:r>
-            <a:r>
-              <a:rPr lang="en-US" dirty="0" err="1"/>
-              <a:t>kubernetes</a:t>
-            </a:r>
-            <a:r>
-              <a:rPr lang="en-US" dirty="0"/>
-              <a:t>/solutions folder to deploy all components. </a:t>
-            </a:r>
-          </a:p>
-          <a:p>
-            <a:r>
-              <a:rPr lang="en-US" dirty="0"/>
-              <a:t>The design of the sock-shop is based a micro-services architecture and was containerized appropriately. See https://github.com/microservices-demo/microservices-demo/blob/master/internal-docs/design.md for </a:t>
-            </a:r>
-            <a:r>
-              <a:rPr lang="en-US"/>
-              <a:t>further details</a:t>
-            </a:r>
-            <a:endParaRPr lang="en-US" dirty="0"/>
-          </a:p>
-        </p:txBody>
-      </p:sp>
-      <p:sp>
-        <p:nvSpPr>
           <p:cNvPr id="4" name="Slide Number Placeholder 3"/>
           <p:cNvSpPr>
             <a:spLocks noGrp="1"/>
@@ -722,323 +645,6 @@
               <a:rPr lang="de-DE" smtClean="0"/>
               <a:pPr/>
               <a:t>10</a:t>
-            </a:fld>
-            <a:endParaRPr lang="de-DE" dirty="0"/>
-          </a:p>
-        </p:txBody>
-      </p:sp>
-    </p:spTree>
-    <p:extLst>
-      <p:ext uri="{BB962C8B-B14F-4D97-AF65-F5344CB8AC3E}">
-        <p14:creationId xmlns:p14="http://schemas.microsoft.com/office/powerpoint/2010/main" val="4246815572"/>
-      </p:ext>
-    </p:extLst>
-  </p:cSld>
-  <p:clrMapOvr>
-    <a:masterClrMapping/>
-  </p:clrMapOvr>
-</p:notes>
-</file>
-
-<file path=ppt/notesSlides/notesSlide11.xml><?xml version="1.0" encoding="utf-8"?>
-<p:notes xmlns:a="http://schemas.openxmlformats.org/drawingml/2006/main" xmlns:r="http://schemas.openxmlformats.org/officeDocument/2006/relationships" xmlns:p="http://schemas.openxmlformats.org/presentationml/2006/main">
-  <p:cSld>
-    <p:spTree>
-      <p:nvGrpSpPr>
-        <p:cNvPr id="1" name=""/>
-        <p:cNvGrpSpPr/>
-        <p:nvPr/>
-      </p:nvGrpSpPr>
-      <p:grpSpPr>
-        <a:xfrm>
-          <a:off x="0" y="0"/>
-          <a:ext cx="0" cy="0"/>
-          <a:chOff x="0" y="0"/>
-          <a:chExt cx="0" cy="0"/>
-        </a:xfrm>
-      </p:grpSpPr>
-      <p:sp>
-        <p:nvSpPr>
-          <p:cNvPr id="2" name="Slide Image Placeholder 1"/>
-          <p:cNvSpPr>
-            <a:spLocks noGrp="1" noRot="1" noChangeAspect="1"/>
-          </p:cNvSpPr>
-          <p:nvPr>
-            <p:ph type="sldImg"/>
-          </p:nvPr>
-        </p:nvSpPr>
-        <p:spPr/>
-      </p:sp>
-      <p:sp>
-        <p:nvSpPr>
-          <p:cNvPr id="3" name="Notes Placeholder 2"/>
-          <p:cNvSpPr>
-            <a:spLocks noGrp="1"/>
-          </p:cNvSpPr>
-          <p:nvPr>
-            <p:ph type="body" idx="1"/>
-          </p:nvPr>
-        </p:nvSpPr>
-        <p:spPr/>
-        <p:txBody>
-          <a:bodyPr/>
-          <a:lstStyle/>
-          <a:p>
-            <a:endParaRPr lang="en-US"/>
-          </a:p>
-        </p:txBody>
-      </p:sp>
-      <p:sp>
-        <p:nvSpPr>
-          <p:cNvPr id="4" name="Slide Number Placeholder 3"/>
-          <p:cNvSpPr>
-            <a:spLocks noGrp="1"/>
-          </p:cNvSpPr>
-          <p:nvPr>
-            <p:ph type="sldNum" sz="quarter" idx="10"/>
-          </p:nvPr>
-        </p:nvSpPr>
-        <p:spPr/>
-        <p:txBody>
-          <a:bodyPr/>
-          <a:lstStyle/>
-          <a:p>
-            <a:fld id="{7D8C2C35-2B8A-446E-BEC0-FD36716C29AC}" type="slidenum">
-              <a:rPr lang="de-DE" smtClean="0"/>
-              <a:pPr/>
-              <a:t>11</a:t>
-            </a:fld>
-            <a:endParaRPr lang="de-DE" dirty="0"/>
-          </a:p>
-        </p:txBody>
-      </p:sp>
-    </p:spTree>
-    <p:extLst>
-      <p:ext uri="{BB962C8B-B14F-4D97-AF65-F5344CB8AC3E}">
-        <p14:creationId xmlns:p14="http://schemas.microsoft.com/office/powerpoint/2010/main" val="467728202"/>
-      </p:ext>
-    </p:extLst>
-  </p:cSld>
-  <p:clrMapOvr>
-    <a:masterClrMapping/>
-  </p:clrMapOvr>
-</p:notes>
-</file>
-
-<file path=ppt/notesSlides/notesSlide12.xml><?xml version="1.0" encoding="utf-8"?>
-<p:notes xmlns:a="http://schemas.openxmlformats.org/drawingml/2006/main" xmlns:r="http://schemas.openxmlformats.org/officeDocument/2006/relationships" xmlns:p="http://schemas.openxmlformats.org/presentationml/2006/main">
-  <p:cSld>
-    <p:spTree>
-      <p:nvGrpSpPr>
-        <p:cNvPr id="1" name=""/>
-        <p:cNvGrpSpPr/>
-        <p:nvPr/>
-      </p:nvGrpSpPr>
-      <p:grpSpPr>
-        <a:xfrm>
-          <a:off x="0" y="0"/>
-          <a:ext cx="0" cy="0"/>
-          <a:chOff x="0" y="0"/>
-          <a:chExt cx="0" cy="0"/>
-        </a:xfrm>
-      </p:grpSpPr>
-      <p:sp>
-        <p:nvSpPr>
-          <p:cNvPr id="2" name="Slide Image Placeholder 1"/>
-          <p:cNvSpPr>
-            <a:spLocks noGrp="1" noRot="1" noChangeAspect="1"/>
-          </p:cNvSpPr>
-          <p:nvPr>
-            <p:ph type="sldImg"/>
-          </p:nvPr>
-        </p:nvSpPr>
-        <p:spPr/>
-      </p:sp>
-      <p:sp>
-        <p:nvSpPr>
-          <p:cNvPr id="3" name="Notes Placeholder 2"/>
-          <p:cNvSpPr>
-            <a:spLocks noGrp="1"/>
-          </p:cNvSpPr>
-          <p:nvPr>
-            <p:ph type="body" idx="1"/>
-          </p:nvPr>
-        </p:nvSpPr>
-        <p:spPr/>
-        <p:txBody>
-          <a:bodyPr/>
-          <a:lstStyle/>
-          <a:p>
-            <a:endParaRPr lang="en-US"/>
-          </a:p>
-        </p:txBody>
-      </p:sp>
-      <p:sp>
-        <p:nvSpPr>
-          <p:cNvPr id="4" name="Slide Number Placeholder 3"/>
-          <p:cNvSpPr>
-            <a:spLocks noGrp="1"/>
-          </p:cNvSpPr>
-          <p:nvPr>
-            <p:ph type="sldNum" sz="quarter" idx="10"/>
-          </p:nvPr>
-        </p:nvSpPr>
-        <p:spPr/>
-        <p:txBody>
-          <a:bodyPr/>
-          <a:lstStyle/>
-          <a:p>
-            <a:fld id="{7D8C2C35-2B8A-446E-BEC0-FD36716C29AC}" type="slidenum">
-              <a:rPr lang="de-DE" smtClean="0"/>
-              <a:pPr/>
-              <a:t>12</a:t>
-            </a:fld>
-            <a:endParaRPr lang="de-DE" dirty="0"/>
-          </a:p>
-        </p:txBody>
-      </p:sp>
-    </p:spTree>
-    <p:extLst>
-      <p:ext uri="{BB962C8B-B14F-4D97-AF65-F5344CB8AC3E}">
-        <p14:creationId xmlns:p14="http://schemas.microsoft.com/office/powerpoint/2010/main" val="1146731827"/>
-      </p:ext>
-    </p:extLst>
-  </p:cSld>
-  <p:clrMapOvr>
-    <a:masterClrMapping/>
-  </p:clrMapOvr>
-</p:notes>
-</file>
-
-<file path=ppt/notesSlides/notesSlide13.xml><?xml version="1.0" encoding="utf-8"?>
-<p:notes xmlns:a="http://schemas.openxmlformats.org/drawingml/2006/main" xmlns:r="http://schemas.openxmlformats.org/officeDocument/2006/relationships" xmlns:p="http://schemas.openxmlformats.org/presentationml/2006/main">
-  <p:cSld>
-    <p:spTree>
-      <p:nvGrpSpPr>
-        <p:cNvPr id="1" name=""/>
-        <p:cNvGrpSpPr/>
-        <p:nvPr/>
-      </p:nvGrpSpPr>
-      <p:grpSpPr>
-        <a:xfrm>
-          <a:off x="0" y="0"/>
-          <a:ext cx="0" cy="0"/>
-          <a:chOff x="0" y="0"/>
-          <a:chExt cx="0" cy="0"/>
-        </a:xfrm>
-      </p:grpSpPr>
-      <p:sp>
-        <p:nvSpPr>
-          <p:cNvPr id="2" name="Slide Image Placeholder 1"/>
-          <p:cNvSpPr>
-            <a:spLocks noGrp="1" noRot="1" noChangeAspect="1"/>
-          </p:cNvSpPr>
-          <p:nvPr>
-            <p:ph type="sldImg"/>
-          </p:nvPr>
-        </p:nvSpPr>
-        <p:spPr/>
-      </p:sp>
-      <p:sp>
-        <p:nvSpPr>
-          <p:cNvPr id="3" name="Notes Placeholder 2"/>
-          <p:cNvSpPr>
-            <a:spLocks noGrp="1"/>
-          </p:cNvSpPr>
-          <p:nvPr>
-            <p:ph type="body" idx="1"/>
-          </p:nvPr>
-        </p:nvSpPr>
-        <p:spPr/>
-        <p:txBody>
-          <a:bodyPr/>
-          <a:lstStyle/>
-          <a:p>
-            <a:r>
-              <a:rPr lang="en-US" dirty="0"/>
-              <a:t>Gardener: SAP’s solution to </a:t>
-            </a:r>
-            <a:r>
-              <a:rPr lang="en-US"/>
-              <a:t>managed Kubernetes</a:t>
-            </a:r>
-            <a:endParaRPr lang="en-US" dirty="0"/>
-          </a:p>
-        </p:txBody>
-      </p:sp>
-      <p:sp>
-        <p:nvSpPr>
-          <p:cNvPr id="4" name="Slide Number Placeholder 3"/>
-          <p:cNvSpPr>
-            <a:spLocks noGrp="1"/>
-          </p:cNvSpPr>
-          <p:nvPr>
-            <p:ph type="sldNum" sz="quarter" idx="10"/>
-          </p:nvPr>
-        </p:nvSpPr>
-        <p:spPr/>
-        <p:txBody>
-          <a:bodyPr/>
-          <a:lstStyle/>
-          <a:p>
-            <a:fld id="{7D8C2C35-2B8A-446E-BEC0-FD36716C29AC}" type="slidenum">
-              <a:rPr lang="de-DE" smtClean="0"/>
-              <a:pPr/>
-              <a:t>13</a:t>
-            </a:fld>
-            <a:endParaRPr lang="de-DE" dirty="0"/>
-          </a:p>
-        </p:txBody>
-      </p:sp>
-    </p:spTree>
-    <p:extLst>
-      <p:ext uri="{BB962C8B-B14F-4D97-AF65-F5344CB8AC3E}">
-        <p14:creationId xmlns:p14="http://schemas.microsoft.com/office/powerpoint/2010/main" val="3294899344"/>
-      </p:ext>
-    </p:extLst>
-  </p:cSld>
-  <p:clrMapOvr>
-    <a:masterClrMapping/>
-  </p:clrMapOvr>
-</p:notes>
-</file>
-
-<file path=ppt/notesSlides/notesSlide14.xml><?xml version="1.0" encoding="utf-8"?>
-<p:notes xmlns:a="http://schemas.openxmlformats.org/drawingml/2006/main" xmlns:r="http://schemas.openxmlformats.org/officeDocument/2006/relationships" xmlns:p="http://schemas.openxmlformats.org/presentationml/2006/main">
-  <p:cSld>
-    <p:spTree>
-      <p:nvGrpSpPr>
-        <p:cNvPr id="1" name=""/>
-        <p:cNvGrpSpPr/>
-        <p:nvPr/>
-      </p:nvGrpSpPr>
-      <p:grpSpPr>
-        <a:xfrm>
-          <a:off x="0" y="0"/>
-          <a:ext cx="0" cy="0"/>
-          <a:chOff x="0" y="0"/>
-          <a:chExt cx="0" cy="0"/>
-        </a:xfrm>
-      </p:grpSpPr>
-      <p:sp>
-        <p:nvSpPr>
-          <p:cNvPr id="4" name="Slide Number Placeholder 3"/>
-          <p:cNvSpPr>
-            <a:spLocks noGrp="1"/>
-          </p:cNvSpPr>
-          <p:nvPr>
-            <p:ph type="sldNum" sz="quarter" idx="10"/>
-          </p:nvPr>
-        </p:nvSpPr>
-        <p:spPr/>
-        <p:txBody>
-          <a:bodyPr/>
-          <a:lstStyle/>
-          <a:p>
-            <a:fld id="{7D8C2C35-2B8A-446E-BEC0-FD36716C29AC}" type="slidenum">
-              <a:rPr lang="de-DE" smtClean="0"/>
-              <a:pPr/>
-              <a:t>14</a:t>
             </a:fld>
             <a:endParaRPr lang="de-DE" dirty="0"/>
           </a:p>
@@ -1141,27 +747,29 @@
           <a:p>
             <a:r>
               <a:rPr lang="en-US" dirty="0"/>
-              <a:t>Why are we talking about Docker &amp; Kubernetes now?</a:t>
-            </a:r>
-          </a:p>
-          <a:p>
-            <a:r>
-              <a:rPr lang="en-US" dirty="0"/>
-              <a:t>Watch out for “</a:t>
-            </a:r>
-            <a:r>
-              <a:rPr lang="en-US" dirty="0" err="1"/>
-              <a:t>serverless</a:t>
-            </a:r>
-            <a:r>
-              <a:rPr lang="en-US" dirty="0"/>
-              <a:t>” to become more and </a:t>
-            </a:r>
-            <a:r>
-              <a:rPr lang="en-US"/>
-              <a:t>more important</a:t>
-            </a:r>
+              <a:t>Though isolation of individual apps is one of many goals achieved with container technology, it introduces new issues. </a:t>
+            </a:r>
+          </a:p>
+          <a:p>
+            <a:r>
+              <a:rPr lang="en-US" dirty="0"/>
+              <a:t>How should these container work together? </a:t>
+            </a:r>
+          </a:p>
+          <a:p>
+            <a:r>
+              <a:rPr lang="en-US" dirty="0"/>
+              <a:t>How can the communicate?</a:t>
+            </a:r>
+          </a:p>
+          <a:p>
             <a:endParaRPr lang="en-US" dirty="0"/>
+          </a:p>
+          <a:p>
+            <a:r>
+              <a:rPr lang="en-US" dirty="0"/>
+              <a:t>Kubernetes helps with an advanced network concepts as well as service discovery features.</a:t>
+            </a:r>
           </a:p>
         </p:txBody>
       </p:sp>
@@ -1192,7 +800,7 @@
     </p:spTree>
     <p:extLst>
       <p:ext uri="{BB962C8B-B14F-4D97-AF65-F5344CB8AC3E}">
-        <p14:creationId xmlns:p14="http://schemas.microsoft.com/office/powerpoint/2010/main" val="2951307074"/>
+        <p14:creationId xmlns:p14="http://schemas.microsoft.com/office/powerpoint/2010/main" val="2753081244"/>
       </p:ext>
     </p:extLst>
   </p:cSld>
@@ -1246,10 +854,7 @@
           <a:bodyPr/>
           <a:lstStyle/>
           <a:p>
-            <a:r>
-              <a:rPr lang="en-US" dirty="0"/>
-              <a:t>“Since we introduced micro services, every outage is like a murder mystery”</a:t>
-            </a:r>
+            <a:endParaRPr lang="en-US"/>
           </a:p>
         </p:txBody>
       </p:sp>
@@ -1280,7 +885,7 @@
     </p:spTree>
     <p:extLst>
       <p:ext uri="{BB962C8B-B14F-4D97-AF65-F5344CB8AC3E}">
-        <p14:creationId xmlns:p14="http://schemas.microsoft.com/office/powerpoint/2010/main" val="1791696452"/>
+        <p14:creationId xmlns:p14="http://schemas.microsoft.com/office/powerpoint/2010/main" val="2185429631"/>
       </p:ext>
     </p:extLst>
   </p:cSld>
@@ -1336,19 +941,13 @@
           <a:p>
             <a:r>
               <a:rPr lang="en-US" dirty="0"/>
-              <a:t>How to tackle databases?</a:t>
-            </a:r>
-          </a:p>
-          <a:p>
-            <a:r>
-              <a:rPr lang="en-US" dirty="0"/>
-              <a:t>1 service =&gt; 1 database?</a:t>
-            </a:r>
-          </a:p>
-          <a:p>
-            <a:r>
-              <a:rPr lang="en-US" dirty="0"/>
-              <a:t>Containerize databases?</a:t>
+              <a:t>Kubernetes takes a “construction plan” and instantiates it as often as you want – as long as you have enough resources</a:t>
+            </a:r>
+          </a:p>
+          <a:p>
+            <a:r>
+              <a:rPr lang="en-US" dirty="0"/>
+              <a:t>What you describe, is what you get.</a:t>
             </a:r>
           </a:p>
         </p:txBody>
@@ -1380,7 +979,7 @@
     </p:spTree>
     <p:extLst>
       <p:ext uri="{BB962C8B-B14F-4D97-AF65-F5344CB8AC3E}">
-        <p14:creationId xmlns:p14="http://schemas.microsoft.com/office/powerpoint/2010/main" val="1445180977"/>
+        <p14:creationId xmlns:p14="http://schemas.microsoft.com/office/powerpoint/2010/main" val="2669141511"/>
       </p:ext>
     </p:extLst>
   </p:cSld>
@@ -1434,7 +1033,10 @@
           <a:bodyPr/>
           <a:lstStyle/>
           <a:p>
-            <a:endParaRPr lang="en-US" dirty="0"/>
+            <a:r>
+              <a:rPr lang="en-US" dirty="0"/>
+              <a:t>Kubernetes orchestrates your workloads &amp; applications – also several of them in parallel.</a:t>
+            </a:r>
           </a:p>
         </p:txBody>
       </p:sp>
@@ -1465,7 +1067,7 @@
     </p:spTree>
     <p:extLst>
       <p:ext uri="{BB962C8B-B14F-4D97-AF65-F5344CB8AC3E}">
-        <p14:creationId xmlns:p14="http://schemas.microsoft.com/office/powerpoint/2010/main" val="86536247"/>
+        <p14:creationId xmlns:p14="http://schemas.microsoft.com/office/powerpoint/2010/main" val="2088780993"/>
       </p:ext>
     </p:extLst>
   </p:cSld>
@@ -1521,30 +1123,43 @@
           <a:p>
             <a:r>
               <a:rPr lang="en-US" dirty="0"/>
-              <a:t>Local isolation like in an aquarium is not ideal. Talking from </a:t>
+              <a:t>The demo is based on the “sock shop” e-commerce platform developed by </a:t>
             </a:r>
             <a:r>
               <a:rPr lang="en-US" dirty="0" err="1"/>
-              <a:t>docker</a:t>
-            </a:r>
-            <a:r>
-              <a:rPr lang="en-US" dirty="0"/>
-              <a:t> host to </a:t>
+              <a:t>weaveworks</a:t>
+            </a:r>
+            <a:r>
+              <a:rPr lang="en-US" dirty="0"/>
+              <a:t>. This is a full-blown demo application, including content – however you have to wait ~2min until the content is fully loaded. To demo, create a “sock-shop” namespace and use the sock-</a:t>
             </a:r>
             <a:r>
               <a:rPr lang="en-US" dirty="0" err="1"/>
-              <a:t>docker</a:t>
-            </a:r>
-            <a:r>
-              <a:rPr lang="en-US" dirty="0"/>
-              <a:t> host is complex due to port mappings.</a:t>
-            </a:r>
-          </a:p>
-          <a:p>
-            <a:r>
-              <a:rPr lang="en-US" dirty="0"/>
-              <a:t>However deploying your apps to the wide sea of Kubernetes, doesn’t solve this fully. </a:t>
-            </a:r>
+              <a:t>shop.yaml</a:t>
+            </a:r>
+            <a:r>
+              <a:rPr lang="en-US" dirty="0"/>
+              <a:t> from the </a:t>
+            </a:r>
+            <a:r>
+              <a:rPr lang="en-US" dirty="0" err="1"/>
+              <a:t>kubernetes</a:t>
+            </a:r>
+            <a:r>
+              <a:rPr lang="en-US" dirty="0"/>
+              <a:t>/solutions folder to deploy all components. </a:t>
+            </a:r>
+          </a:p>
+          <a:p>
+            <a:r>
+              <a:rPr lang="en-US" dirty="0"/>
+              <a:t>The design of the sock-shop is based a micro-services architecture and was containerized appropriately. See https://github.com/microservices-demo/microservices-demo/blob/master/internal-docs/design.md for </a:t>
+            </a:r>
+            <a:r>
+              <a:rPr lang="en-US"/>
+              <a:t>further details</a:t>
+            </a:r>
+            <a:endParaRPr lang="en-US" dirty="0"/>
           </a:p>
         </p:txBody>
       </p:sp>
@@ -1575,7 +1190,7 @@
     </p:spTree>
     <p:extLst>
       <p:ext uri="{BB962C8B-B14F-4D97-AF65-F5344CB8AC3E}">
-        <p14:creationId xmlns:p14="http://schemas.microsoft.com/office/powerpoint/2010/main" val="2753081244"/>
+        <p14:creationId xmlns:p14="http://schemas.microsoft.com/office/powerpoint/2010/main" val="4246815572"/>
       </p:ext>
     </p:extLst>
   </p:cSld>
@@ -1660,7 +1275,7 @@
     </p:spTree>
     <p:extLst>
       <p:ext uri="{BB962C8B-B14F-4D97-AF65-F5344CB8AC3E}">
-        <p14:creationId xmlns:p14="http://schemas.microsoft.com/office/powerpoint/2010/main" val="2185429631"/>
+        <p14:creationId xmlns:p14="http://schemas.microsoft.com/office/powerpoint/2010/main" val="467728202"/>
       </p:ext>
     </p:extLst>
   </p:cSld>
@@ -1714,16 +1329,7 @@
           <a:bodyPr/>
           <a:lstStyle/>
           <a:p>
-            <a:r>
-              <a:rPr lang="en-US" dirty="0"/>
-              <a:t>Kubernetes takes a “construction plan” and instantiates it as often as you want – as long as you have enough resources</a:t>
-            </a:r>
-          </a:p>
-          <a:p>
-            <a:r>
-              <a:rPr lang="en-US" dirty="0"/>
-              <a:t>What you describe, is what you get.</a:t>
-            </a:r>
+            <a:endParaRPr lang="en-US"/>
           </a:p>
         </p:txBody>
       </p:sp>
@@ -1754,7 +1360,7 @@
     </p:spTree>
     <p:extLst>
       <p:ext uri="{BB962C8B-B14F-4D97-AF65-F5344CB8AC3E}">
-        <p14:creationId xmlns:p14="http://schemas.microsoft.com/office/powerpoint/2010/main" val="2669141511"/>
+        <p14:creationId xmlns:p14="http://schemas.microsoft.com/office/powerpoint/2010/main" val="1146731827"/>
       </p:ext>
     </p:extLst>
   </p:cSld>
@@ -1810,8 +1416,13 @@
           <a:p>
             <a:r>
               <a:rPr lang="en-US" dirty="0"/>
-              <a:t>Kubernetes orchestrates your workloads &amp; applications – also several of them in parallel.</a:t>
-            </a:r>
+              <a:t>Gardener: SAP’s solution to </a:t>
+            </a:r>
+            <a:r>
+              <a:rPr lang="en-US"/>
+              <a:t>managed Kubernetes</a:t>
+            </a:r>
+            <a:endParaRPr lang="en-US" dirty="0"/>
           </a:p>
         </p:txBody>
       </p:sp>
@@ -1842,7 +1453,7 @@
     </p:spTree>
     <p:extLst>
       <p:ext uri="{BB962C8B-B14F-4D97-AF65-F5344CB8AC3E}">
-        <p14:creationId xmlns:p14="http://schemas.microsoft.com/office/powerpoint/2010/main" val="2088780993"/>
+        <p14:creationId xmlns:p14="http://schemas.microsoft.com/office/powerpoint/2010/main" val="3294899344"/>
       </p:ext>
     </p:extLst>
   </p:cSld>
@@ -9513,1006 +9124,6 @@
 </file>
 
 <file path=ppt/slides/slide10.xml><?xml version="1.0" encoding="utf-8"?>
-<p:sld xmlns:a="http://schemas.openxmlformats.org/drawingml/2006/main" xmlns:r="http://schemas.openxmlformats.org/officeDocument/2006/relationships" xmlns:p="http://schemas.openxmlformats.org/presentationml/2006/main">
-  <p:cSld>
-    <p:spTree>
-      <p:nvGrpSpPr>
-        <p:cNvPr id="1" name=""/>
-        <p:cNvGrpSpPr/>
-        <p:nvPr/>
-      </p:nvGrpSpPr>
-      <p:grpSpPr>
-        <a:xfrm>
-          <a:off x="0" y="0"/>
-          <a:ext cx="0" cy="0"/>
-          <a:chOff x="0" y="0"/>
-          <a:chExt cx="0" cy="0"/>
-        </a:xfrm>
-      </p:grpSpPr>
-      <p:sp>
-        <p:nvSpPr>
-          <p:cNvPr id="2" name="Title 1">
-            <a:extLst>
-              <a:ext uri="{FF2B5EF4-FFF2-40B4-BE49-F238E27FC236}">
-                <a16:creationId xmlns:a16="http://schemas.microsoft.com/office/drawing/2014/main" id="{A283E944-42BF-41EE-84F7-320F8E39B576}"/>
-              </a:ext>
-            </a:extLst>
-          </p:cNvPr>
-          <p:cNvSpPr>
-            <a:spLocks noGrp="1"/>
-          </p:cNvSpPr>
-          <p:nvPr>
-            <p:ph type="title"/>
-          </p:nvPr>
-        </p:nvSpPr>
-        <p:spPr/>
-        <p:txBody>
-          <a:bodyPr/>
-          <a:lstStyle/>
-          <a:p>
-            <a:r>
-              <a:rPr lang="en-US" dirty="0"/>
-              <a:t>Getting started: let‘s buy some socks</a:t>
-            </a:r>
-          </a:p>
-        </p:txBody>
-      </p:sp>
-      <p:pic>
-        <p:nvPicPr>
-          <p:cNvPr id="4" name="Picture 3">
-            <a:extLst>
-              <a:ext uri="{FF2B5EF4-FFF2-40B4-BE49-F238E27FC236}">
-                <a16:creationId xmlns:a16="http://schemas.microsoft.com/office/drawing/2014/main" id="{E7DDE766-5BAC-492B-B460-5D63FF7BC52C}"/>
-              </a:ext>
-            </a:extLst>
-          </p:cNvPr>
-          <p:cNvPicPr>
-            <a:picLocks noChangeAspect="1"/>
-          </p:cNvPicPr>
-          <p:nvPr/>
-        </p:nvPicPr>
-        <p:blipFill>
-          <a:blip r:embed="rId3"/>
-          <a:stretch>
-            <a:fillRect/>
-          </a:stretch>
-        </p:blipFill>
-        <p:spPr>
-          <a:xfrm>
-            <a:off x="2418723" y="1048775"/>
-            <a:ext cx="7357031" cy="5257542"/>
-          </a:xfrm>
-          <a:prstGeom prst="rect">
-            <a:avLst/>
-          </a:prstGeom>
-        </p:spPr>
-      </p:pic>
-      <p:pic>
-        <p:nvPicPr>
-          <p:cNvPr id="5" name="Picture 4">
-            <a:extLst>
-              <a:ext uri="{FF2B5EF4-FFF2-40B4-BE49-F238E27FC236}">
-                <a16:creationId xmlns:a16="http://schemas.microsoft.com/office/drawing/2014/main" id="{9377D6B2-0289-4B8C-A793-F902D649DEBB}"/>
-              </a:ext>
-            </a:extLst>
-          </p:cNvPr>
-          <p:cNvPicPr>
-            <a:picLocks noChangeAspect="1"/>
-          </p:cNvPicPr>
-          <p:nvPr/>
-        </p:nvPicPr>
-        <p:blipFill>
-          <a:blip r:embed="rId4"/>
-          <a:stretch>
-            <a:fillRect/>
-          </a:stretch>
-        </p:blipFill>
-        <p:spPr>
-          <a:xfrm>
-            <a:off x="1841832" y="1346622"/>
-            <a:ext cx="8510813" cy="4630315"/>
-          </a:xfrm>
-          <a:prstGeom prst="rect">
-            <a:avLst/>
-          </a:prstGeom>
-          <a:effectLst>
-            <a:softEdge rad="635000"/>
-          </a:effectLst>
-        </p:spPr>
-      </p:pic>
-    </p:spTree>
-    <p:extLst>
-      <p:ext uri="{BB962C8B-B14F-4D97-AF65-F5344CB8AC3E}">
-        <p14:creationId xmlns:p14="http://schemas.microsoft.com/office/powerpoint/2010/main" val="2645232040"/>
-      </p:ext>
-    </p:extLst>
-  </p:cSld>
-  <p:clrMapOvr>
-    <a:masterClrMapping/>
-  </p:clrMapOvr>
-  <p:timing>
-    <p:tnLst>
-      <p:par>
-        <p:cTn id="1" dur="indefinite" restart="never" nodeType="tmRoot">
-          <p:childTnLst>
-            <p:seq concurrent="1" nextAc="seek">
-              <p:cTn id="2" dur="indefinite" nodeType="mainSeq">
-                <p:childTnLst>
-                  <p:par>
-                    <p:cTn id="3" fill="hold">
-                      <p:stCondLst>
-                        <p:cond delay="indefinite"/>
-                      </p:stCondLst>
-                      <p:childTnLst>
-                        <p:par>
-                          <p:cTn id="4" fill="hold">
-                            <p:stCondLst>
-                              <p:cond delay="0"/>
-                            </p:stCondLst>
-                            <p:childTnLst>
-                              <p:par>
-                                <p:cTn id="5" presetID="1" presetClass="exit" presetSubtype="0" fill="hold" nodeType="clickEffect">
-                                  <p:stCondLst>
-                                    <p:cond delay="0"/>
-                                  </p:stCondLst>
-                                  <p:childTnLst>
-                                    <p:set>
-                                      <p:cBhvr>
-                                        <p:cTn id="6" dur="1" fill="hold">
-                                          <p:stCondLst>
-                                            <p:cond delay="0"/>
-                                          </p:stCondLst>
-                                        </p:cTn>
-                                        <p:tgtEl>
-                                          <p:spTgt spid="5"/>
-                                        </p:tgtEl>
-                                        <p:attrNameLst>
-                                          <p:attrName>style.visibility</p:attrName>
-                                        </p:attrNameLst>
-                                      </p:cBhvr>
-                                      <p:to>
-                                        <p:strVal val="hidden"/>
-                                      </p:to>
-                                    </p:set>
-                                  </p:childTnLst>
-                                </p:cTn>
-                              </p:par>
-                            </p:childTnLst>
-                          </p:cTn>
-                        </p:par>
-                        <p:par>
-                          <p:cTn id="7" fill="hold">
-                            <p:stCondLst>
-                              <p:cond delay="0"/>
-                            </p:stCondLst>
-                            <p:childTnLst>
-                              <p:par>
-                                <p:cTn id="8" presetID="1" presetClass="entr" presetSubtype="0" fill="hold" nodeType="afterEffect">
-                                  <p:stCondLst>
-                                    <p:cond delay="0"/>
-                                  </p:stCondLst>
-                                  <p:childTnLst>
-                                    <p:set>
-                                      <p:cBhvr>
-                                        <p:cTn id="9" dur="1" fill="hold">
-                                          <p:stCondLst>
-                                            <p:cond delay="0"/>
-                                          </p:stCondLst>
-                                        </p:cTn>
-                                        <p:tgtEl>
-                                          <p:spTgt spid="4"/>
-                                        </p:tgtEl>
-                                        <p:attrNameLst>
-                                          <p:attrName>style.visibility</p:attrName>
-                                        </p:attrNameLst>
-                                      </p:cBhvr>
-                                      <p:to>
-                                        <p:strVal val="visible"/>
-                                      </p:to>
-                                    </p:set>
-                                  </p:childTnLst>
-                                </p:cTn>
-                              </p:par>
-                            </p:childTnLst>
-                          </p:cTn>
-                        </p:par>
-                      </p:childTnLst>
-                    </p:cTn>
-                  </p:par>
-                </p:childTnLst>
-              </p:cTn>
-              <p:prevCondLst>
-                <p:cond evt="onPrev" delay="0">
-                  <p:tgtEl>
-                    <p:sldTgt/>
-                  </p:tgtEl>
-                </p:cond>
-              </p:prevCondLst>
-              <p:nextCondLst>
-                <p:cond evt="onNext" delay="0">
-                  <p:tgtEl>
-                    <p:sldTgt/>
-                  </p:tgtEl>
-                </p:cond>
-              </p:nextCondLst>
-            </p:seq>
-          </p:childTnLst>
-        </p:cTn>
-      </p:par>
-    </p:tnLst>
-  </p:timing>
-</p:sld>
-</file>
-
-<file path=ppt/slides/slide11.xml><?xml version="1.0" encoding="utf-8"?>
-<p:sld xmlns:a="http://schemas.openxmlformats.org/drawingml/2006/main" xmlns:r="http://schemas.openxmlformats.org/officeDocument/2006/relationships" xmlns:p="http://schemas.openxmlformats.org/presentationml/2006/main">
-  <p:cSld>
-    <p:spTree>
-      <p:nvGrpSpPr>
-        <p:cNvPr id="1" name=""/>
-        <p:cNvGrpSpPr/>
-        <p:nvPr/>
-      </p:nvGrpSpPr>
-      <p:grpSpPr>
-        <a:xfrm>
-          <a:off x="0" y="0"/>
-          <a:ext cx="0" cy="0"/>
-          <a:chOff x="0" y="0"/>
-          <a:chExt cx="0" cy="0"/>
-        </a:xfrm>
-      </p:grpSpPr>
-      <p:sp>
-        <p:nvSpPr>
-          <p:cNvPr id="2" name="Title 1"/>
-          <p:cNvSpPr>
-            <a:spLocks noGrp="1"/>
-          </p:cNvSpPr>
-          <p:nvPr>
-            <p:ph type="title"/>
-          </p:nvPr>
-        </p:nvSpPr>
-        <p:spPr/>
-        <p:txBody>
-          <a:bodyPr/>
-          <a:lstStyle/>
-          <a:p>
-            <a:r>
-              <a:rPr lang="en-US" dirty="0"/>
-              <a:t>Some facts about K8s, </a:t>
-            </a:r>
-            <a:r>
-              <a:rPr lang="en-US" dirty="0" err="1"/>
-              <a:t>kubernetes</a:t>
-            </a:r>
-            <a:r>
-              <a:rPr lang="en-US" dirty="0"/>
-              <a:t>, …</a:t>
-            </a:r>
-          </a:p>
-        </p:txBody>
-      </p:sp>
-      <p:sp>
-        <p:nvSpPr>
-          <p:cNvPr id="5" name="TextBox 4"/>
-          <p:cNvSpPr txBox="1"/>
-          <p:nvPr/>
-        </p:nvSpPr>
-        <p:spPr>
-          <a:xfrm>
-            <a:off x="504001" y="1447800"/>
-            <a:ext cx="9691559" cy="3877985"/>
-          </a:xfrm>
-          <a:prstGeom prst="rect">
-            <a:avLst/>
-          </a:prstGeom>
-          <a:noFill/>
-        </p:spPr>
-        <p:txBody>
-          <a:bodyPr wrap="square" lIns="0" tIns="0" rIns="0" bIns="0" rtlCol="0">
-            <a:spAutoFit/>
-          </a:bodyPr>
-          <a:lstStyle/>
-          <a:p>
-            <a:pPr marL="285750" indent="-285750" fontAlgn="base">
-              <a:spcBef>
-                <a:spcPct val="50000"/>
-              </a:spcBef>
-              <a:spcAft>
-                <a:spcPct val="0"/>
-              </a:spcAft>
-              <a:buClr>
-                <a:schemeClr val="tx1"/>
-              </a:buClr>
-              <a:buSzPct val="100000"/>
-              <a:buFont typeface="Wingdings" panose="05000000000000000000" pitchFamily="2" charset="2"/>
-              <a:buChar char="§"/>
-            </a:pPr>
-            <a:r>
-              <a:rPr lang="en-US" sz="1800" kern="0" dirty="0">
-                <a:ea typeface="Arial Unicode MS" pitchFamily="34" charset="-128"/>
-                <a:cs typeface="Arial Unicode MS" pitchFamily="34" charset="-128"/>
-              </a:rPr>
-              <a:t>Kubernetes = Greek for “helmsman” or “pilot”</a:t>
-            </a:r>
-          </a:p>
-          <a:p>
-            <a:pPr marL="285750" indent="-285750" fontAlgn="base">
-              <a:spcBef>
-                <a:spcPct val="50000"/>
-              </a:spcBef>
-              <a:spcAft>
-                <a:spcPct val="0"/>
-              </a:spcAft>
-              <a:buClr>
-                <a:schemeClr val="tx1"/>
-              </a:buClr>
-              <a:buSzPct val="100000"/>
-              <a:buFont typeface="Wingdings" panose="05000000000000000000" pitchFamily="2" charset="2"/>
-              <a:buChar char="§"/>
-            </a:pPr>
-            <a:r>
-              <a:rPr lang="en-US" sz="1800" kern="0" dirty="0">
-                <a:ea typeface="Arial Unicode MS" pitchFamily="34" charset="-128"/>
-                <a:cs typeface="Arial Unicode MS" pitchFamily="34" charset="-128"/>
-              </a:rPr>
-              <a:t>Based on Google’s Borg – a cluster manager for container orchestration</a:t>
-            </a:r>
-          </a:p>
-          <a:p>
-            <a:pPr marL="285750" indent="-285750" fontAlgn="base">
-              <a:spcBef>
-                <a:spcPct val="50000"/>
-              </a:spcBef>
-              <a:spcAft>
-                <a:spcPct val="0"/>
-              </a:spcAft>
-              <a:buClr>
-                <a:schemeClr val="tx1"/>
-              </a:buClr>
-              <a:buSzPct val="100000"/>
-              <a:buFont typeface="Wingdings" panose="05000000000000000000" pitchFamily="2" charset="2"/>
-              <a:buChar char="§"/>
-            </a:pPr>
-            <a:r>
-              <a:rPr lang="en-US" sz="1800" kern="0" dirty="0">
-                <a:ea typeface="Arial Unicode MS" pitchFamily="34" charset="-128"/>
-                <a:cs typeface="Arial Unicode MS" pitchFamily="34" charset="-128"/>
-              </a:rPr>
-              <a:t>Open sourced by Google and firstly announced in 2014</a:t>
-            </a:r>
-          </a:p>
-          <a:p>
-            <a:pPr marL="285750" indent="-285750" fontAlgn="base">
-              <a:spcBef>
-                <a:spcPct val="50000"/>
-              </a:spcBef>
-              <a:spcAft>
-                <a:spcPct val="0"/>
-              </a:spcAft>
-              <a:buClr>
-                <a:schemeClr val="tx1"/>
-              </a:buClr>
-              <a:buSzPct val="100000"/>
-              <a:buFont typeface="Wingdings" panose="05000000000000000000" pitchFamily="2" charset="2"/>
-              <a:buChar char="§"/>
-            </a:pPr>
-            <a:r>
-              <a:rPr lang="en-US" sz="1800" kern="0" dirty="0">
-                <a:ea typeface="Arial Unicode MS" pitchFamily="34" charset="-128"/>
-                <a:cs typeface="Arial Unicode MS" pitchFamily="34" charset="-128"/>
-              </a:rPr>
-              <a:t>v1.0 was released in July 2015</a:t>
-            </a:r>
-          </a:p>
-          <a:p>
-            <a:pPr marL="285750" indent="-285750" fontAlgn="base">
-              <a:spcBef>
-                <a:spcPct val="50000"/>
-              </a:spcBef>
-              <a:spcAft>
-                <a:spcPct val="0"/>
-              </a:spcAft>
-              <a:buClr>
-                <a:schemeClr val="tx1"/>
-              </a:buClr>
-              <a:buSzPct val="100000"/>
-              <a:buFont typeface="Wingdings" panose="05000000000000000000" pitchFamily="2" charset="2"/>
-              <a:buChar char="§"/>
-            </a:pPr>
-            <a:r>
-              <a:rPr lang="en-US" sz="1800" kern="0" dirty="0">
-                <a:ea typeface="Arial Unicode MS" pitchFamily="34" charset="-128"/>
-                <a:cs typeface="Arial Unicode MS" pitchFamily="34" charset="-128"/>
-              </a:rPr>
-              <a:t>By now K8s is governed by the Cloud Native Computing Foundation (CNCF)</a:t>
-            </a:r>
-          </a:p>
-          <a:p>
-            <a:pPr marL="285750" indent="-285750" fontAlgn="base">
-              <a:spcBef>
-                <a:spcPct val="50000"/>
-              </a:spcBef>
-              <a:spcAft>
-                <a:spcPct val="0"/>
-              </a:spcAft>
-              <a:buClr>
-                <a:schemeClr val="tx1"/>
-              </a:buClr>
-              <a:buSzPct val="100000"/>
-              <a:buFont typeface="Wingdings" panose="05000000000000000000" pitchFamily="2" charset="2"/>
-              <a:buChar char="§"/>
-            </a:pPr>
-            <a:r>
-              <a:rPr lang="en-US" sz="1800" kern="0" dirty="0">
-                <a:ea typeface="Arial Unicode MS" pitchFamily="34" charset="-128"/>
-                <a:cs typeface="Arial Unicode MS" pitchFamily="34" charset="-128"/>
-              </a:rPr>
-              <a:t>Vanilla Kubernetes is the basis for commercial products like </a:t>
-            </a:r>
-            <a:r>
-              <a:rPr lang="en-US" sz="1800" kern="0" dirty="0" err="1">
-                <a:ea typeface="Arial Unicode MS" pitchFamily="34" charset="-128"/>
-                <a:cs typeface="Arial Unicode MS" pitchFamily="34" charset="-128"/>
-              </a:rPr>
-              <a:t>RedHat’s</a:t>
-            </a:r>
-            <a:r>
-              <a:rPr lang="en-US" sz="1800" kern="0" dirty="0">
-                <a:ea typeface="Arial Unicode MS" pitchFamily="34" charset="-128"/>
-                <a:cs typeface="Arial Unicode MS" pitchFamily="34" charset="-128"/>
-              </a:rPr>
-              <a:t> </a:t>
-            </a:r>
-            <a:r>
-              <a:rPr lang="en-US" sz="1800" kern="0" dirty="0" err="1">
-                <a:ea typeface="Arial Unicode MS" pitchFamily="34" charset="-128"/>
-                <a:cs typeface="Arial Unicode MS" pitchFamily="34" charset="-128"/>
-              </a:rPr>
-              <a:t>Openshift</a:t>
-            </a:r>
-            <a:r>
-              <a:rPr lang="en-US" sz="1800" kern="0" dirty="0">
-                <a:ea typeface="Arial Unicode MS" pitchFamily="34" charset="-128"/>
-                <a:cs typeface="Arial Unicode MS" pitchFamily="34" charset="-128"/>
-              </a:rPr>
-              <a:t> or CoreOS’ tectonic</a:t>
-            </a:r>
-          </a:p>
-          <a:p>
-            <a:pPr marL="285750" indent="-285750" fontAlgn="base">
-              <a:spcBef>
-                <a:spcPct val="50000"/>
-              </a:spcBef>
-              <a:spcAft>
-                <a:spcPct val="0"/>
-              </a:spcAft>
-              <a:buClr>
-                <a:schemeClr val="tx1"/>
-              </a:buClr>
-              <a:buSzPct val="100000"/>
-              <a:buFont typeface="Wingdings" panose="05000000000000000000" pitchFamily="2" charset="2"/>
-              <a:buChar char="§"/>
-            </a:pPr>
-            <a:r>
-              <a:rPr lang="en-US" sz="1800" kern="0" dirty="0">
-                <a:ea typeface="Arial Unicode MS" pitchFamily="34" charset="-128"/>
-                <a:cs typeface="Arial Unicode MS" pitchFamily="34" charset="-128"/>
-              </a:rPr>
-              <a:t>New minor releases roughly every 3 month</a:t>
-            </a:r>
-          </a:p>
-          <a:p>
-            <a:pPr marL="285750" indent="-285750" fontAlgn="base">
-              <a:spcBef>
-                <a:spcPct val="50000"/>
-              </a:spcBef>
-              <a:spcAft>
-                <a:spcPct val="0"/>
-              </a:spcAft>
-              <a:buClr>
-                <a:schemeClr val="tx1"/>
-              </a:buClr>
-              <a:buSzPct val="100000"/>
-              <a:buFont typeface="Wingdings" panose="05000000000000000000" pitchFamily="2" charset="2"/>
-              <a:buChar char="§"/>
-            </a:pPr>
-            <a:r>
-              <a:rPr lang="en-US" sz="1800" kern="0" dirty="0">
-                <a:ea typeface="Arial Unicode MS" pitchFamily="34" charset="-128"/>
-                <a:cs typeface="Arial Unicode MS" pitchFamily="34" charset="-128"/>
-              </a:rPr>
-              <a:t>Extensive list of beta features</a:t>
-            </a:r>
-          </a:p>
-          <a:p>
-            <a:pPr marL="285750" indent="-285750" fontAlgn="base">
-              <a:spcBef>
-                <a:spcPct val="50000"/>
-              </a:spcBef>
-              <a:spcAft>
-                <a:spcPct val="0"/>
-              </a:spcAft>
-              <a:buClr>
-                <a:schemeClr val="tx1"/>
-              </a:buClr>
-              <a:buSzPct val="100000"/>
-              <a:buFont typeface="Wingdings" panose="05000000000000000000" pitchFamily="2" charset="2"/>
-              <a:buChar char="§"/>
-            </a:pPr>
-            <a:r>
-              <a:rPr lang="en-US" sz="1800" kern="0" dirty="0">
-                <a:ea typeface="Arial Unicode MS" pitchFamily="34" charset="-128"/>
-                <a:cs typeface="Arial Unicode MS" pitchFamily="34" charset="-128"/>
-              </a:rPr>
-              <a:t>Documentation: </a:t>
-            </a:r>
-            <a:r>
-              <a:rPr lang="en-US" sz="1800" kern="0" dirty="0">
-                <a:ea typeface="Arial Unicode MS" pitchFamily="34" charset="-128"/>
-                <a:cs typeface="Arial Unicode MS" pitchFamily="34" charset="-128"/>
-                <a:hlinkClick r:id="rId3"/>
-              </a:rPr>
-              <a:t>https://kubernetes.io/docs/home/</a:t>
-            </a:r>
-            <a:r>
-              <a:rPr lang="en-US" sz="1800" kern="0" dirty="0">
-                <a:ea typeface="Arial Unicode MS" pitchFamily="34" charset="-128"/>
-                <a:cs typeface="Arial Unicode MS" pitchFamily="34" charset="-128"/>
-              </a:rPr>
-              <a:t> - concepts, tasks, API reference</a:t>
-            </a:r>
-          </a:p>
-        </p:txBody>
-      </p:sp>
-    </p:spTree>
-    <p:extLst>
-      <p:ext uri="{BB962C8B-B14F-4D97-AF65-F5344CB8AC3E}">
-        <p14:creationId xmlns:p14="http://schemas.microsoft.com/office/powerpoint/2010/main" val="3263224504"/>
-      </p:ext>
-    </p:extLst>
-  </p:cSld>
-  <p:clrMapOvr>
-    <a:masterClrMapping/>
-  </p:clrMapOvr>
-</p:sld>
-</file>
-
-<file path=ppt/slides/slide12.xml><?xml version="1.0" encoding="utf-8"?>
-<p:sld xmlns:a="http://schemas.openxmlformats.org/drawingml/2006/main" xmlns:r="http://schemas.openxmlformats.org/officeDocument/2006/relationships" xmlns:p="http://schemas.openxmlformats.org/presentationml/2006/main">
-  <p:cSld>
-    <p:spTree>
-      <p:nvGrpSpPr>
-        <p:cNvPr id="1" name=""/>
-        <p:cNvGrpSpPr/>
-        <p:nvPr/>
-      </p:nvGrpSpPr>
-      <p:grpSpPr>
-        <a:xfrm>
-          <a:off x="0" y="0"/>
-          <a:ext cx="0" cy="0"/>
-          <a:chOff x="0" y="0"/>
-          <a:chExt cx="0" cy="0"/>
-        </a:xfrm>
-      </p:grpSpPr>
-      <p:sp>
-        <p:nvSpPr>
-          <p:cNvPr id="2" name="Title 1"/>
-          <p:cNvSpPr>
-            <a:spLocks noGrp="1"/>
-          </p:cNvSpPr>
-          <p:nvPr>
-            <p:ph type="title"/>
-          </p:nvPr>
-        </p:nvSpPr>
-        <p:spPr/>
-        <p:txBody>
-          <a:bodyPr/>
-          <a:lstStyle/>
-          <a:p>
-            <a:r>
-              <a:rPr lang="en-US" dirty="0"/>
-              <a:t>If it doesn’t always work as expected …</a:t>
-            </a:r>
-          </a:p>
-        </p:txBody>
-      </p:sp>
-      <p:sp>
-        <p:nvSpPr>
-          <p:cNvPr id="3" name="Rectangle 2"/>
-          <p:cNvSpPr/>
-          <p:nvPr/>
-        </p:nvSpPr>
-        <p:spPr>
-          <a:xfrm>
-            <a:off x="504001" y="5851688"/>
-            <a:ext cx="9554399" cy="415498"/>
-          </a:xfrm>
-          <a:prstGeom prst="rect">
-            <a:avLst/>
-          </a:prstGeom>
-        </p:spPr>
-        <p:txBody>
-          <a:bodyPr wrap="square">
-            <a:spAutoFit/>
-          </a:bodyPr>
-          <a:lstStyle/>
-          <a:p>
-            <a:r>
-              <a:rPr lang="en-US" dirty="0">
-                <a:hlinkClick r:id="rId3"/>
-              </a:rPr>
-              <a:t>https://github.com/kubernetes/community/blob/master/communication.md</a:t>
-            </a:r>
-            <a:r>
-              <a:rPr lang="en-US" dirty="0"/>
-              <a:t> </a:t>
-            </a:r>
-          </a:p>
-        </p:txBody>
-      </p:sp>
-      <p:pic>
-        <p:nvPicPr>
-          <p:cNvPr id="4" name="Picture 3"/>
-          <p:cNvPicPr>
-            <a:picLocks noChangeAspect="1"/>
-          </p:cNvPicPr>
-          <p:nvPr/>
-        </p:nvPicPr>
-        <p:blipFill>
-          <a:blip r:embed="rId4"/>
-          <a:stretch>
-            <a:fillRect/>
-          </a:stretch>
-        </p:blipFill>
-        <p:spPr>
-          <a:xfrm>
-            <a:off x="504001" y="1170215"/>
-            <a:ext cx="9249599" cy="3520576"/>
-          </a:xfrm>
-          <a:prstGeom prst="rect">
-            <a:avLst/>
-          </a:prstGeom>
-        </p:spPr>
-      </p:pic>
-      <p:sp>
-        <p:nvSpPr>
-          <p:cNvPr id="5" name="Rectangle 4"/>
-          <p:cNvSpPr/>
-          <p:nvPr/>
-        </p:nvSpPr>
-        <p:spPr>
-          <a:xfrm>
-            <a:off x="504001" y="5298469"/>
-            <a:ext cx="3788217" cy="415498"/>
-          </a:xfrm>
-          <a:prstGeom prst="rect">
-            <a:avLst/>
-          </a:prstGeom>
-        </p:spPr>
-        <p:txBody>
-          <a:bodyPr wrap="none">
-            <a:spAutoFit/>
-          </a:bodyPr>
-          <a:lstStyle/>
-          <a:p>
-            <a:r>
-              <a:rPr lang="en-US" dirty="0">
-                <a:hlinkClick r:id="rId5"/>
-              </a:rPr>
-              <a:t>https://github.com/kubernetes</a:t>
-            </a:r>
-            <a:r>
-              <a:rPr lang="en-US" dirty="0"/>
-              <a:t> </a:t>
-            </a:r>
-          </a:p>
-        </p:txBody>
-      </p:sp>
-      <p:sp>
-        <p:nvSpPr>
-          <p:cNvPr id="6" name="Rectangle 5"/>
-          <p:cNvSpPr/>
-          <p:nvPr/>
-        </p:nvSpPr>
-        <p:spPr>
-          <a:xfrm>
-            <a:off x="504000" y="4767554"/>
-            <a:ext cx="8792399" cy="415498"/>
-          </a:xfrm>
-          <a:prstGeom prst="rect">
-            <a:avLst/>
-          </a:prstGeom>
-        </p:spPr>
-        <p:txBody>
-          <a:bodyPr wrap="square">
-            <a:spAutoFit/>
-          </a:bodyPr>
-          <a:lstStyle/>
-          <a:p>
-            <a:r>
-              <a:rPr lang="en-US" dirty="0">
-                <a:hlinkClick r:id="rId6"/>
-              </a:rPr>
-              <a:t>https://groups.google.com/forum/#!forum/kubernetes-users</a:t>
-            </a:r>
-            <a:r>
-              <a:rPr lang="en-US" dirty="0"/>
-              <a:t> </a:t>
-            </a:r>
-          </a:p>
-        </p:txBody>
-      </p:sp>
-    </p:spTree>
-    <p:extLst>
-      <p:ext uri="{BB962C8B-B14F-4D97-AF65-F5344CB8AC3E}">
-        <p14:creationId xmlns:p14="http://schemas.microsoft.com/office/powerpoint/2010/main" val="2777277099"/>
-      </p:ext>
-    </p:extLst>
-  </p:cSld>
-  <p:clrMapOvr>
-    <a:masterClrMapping/>
-  </p:clrMapOvr>
-</p:sld>
-</file>
-
-<file path=ppt/slides/slide13.xml><?xml version="1.0" encoding="utf-8"?>
-<p:sld xmlns:a="http://schemas.openxmlformats.org/drawingml/2006/main" xmlns:r="http://schemas.openxmlformats.org/officeDocument/2006/relationships" xmlns:p="http://schemas.openxmlformats.org/presentationml/2006/main">
-  <p:cSld>
-    <p:spTree>
-      <p:nvGrpSpPr>
-        <p:cNvPr id="1" name=""/>
-        <p:cNvGrpSpPr/>
-        <p:nvPr/>
-      </p:nvGrpSpPr>
-      <p:grpSpPr>
-        <a:xfrm>
-          <a:off x="0" y="0"/>
-          <a:ext cx="0" cy="0"/>
-          <a:chOff x="0" y="0"/>
-          <a:chExt cx="0" cy="0"/>
-        </a:xfrm>
-      </p:grpSpPr>
-      <p:sp>
-        <p:nvSpPr>
-          <p:cNvPr id="2" name="Title 1"/>
-          <p:cNvSpPr>
-            <a:spLocks noGrp="1"/>
-          </p:cNvSpPr>
-          <p:nvPr>
-            <p:ph type="title"/>
-          </p:nvPr>
-        </p:nvSpPr>
-        <p:spPr/>
-        <p:txBody>
-          <a:bodyPr/>
-          <a:lstStyle/>
-          <a:p>
-            <a:r>
-              <a:rPr lang="en-US" dirty="0"/>
-              <a:t>Wherefrom can I get a cluster?</a:t>
-            </a:r>
-          </a:p>
-        </p:txBody>
-      </p:sp>
-      <p:pic>
-        <p:nvPicPr>
-          <p:cNvPr id="1028" name="Picture 4" descr="Image result for aws"/>
-          <p:cNvPicPr>
-            <a:picLocks noChangeAspect="1" noChangeArrowheads="1"/>
-          </p:cNvPicPr>
-          <p:nvPr/>
-        </p:nvPicPr>
-        <p:blipFill>
-          <a:blip r:embed="rId3">
-            <a:extLst>
-              <a:ext uri="{28A0092B-C50C-407E-A947-70E740481C1C}">
-                <a14:useLocalDpi xmlns:a14="http://schemas.microsoft.com/office/drawing/2010/main" val="0"/>
-              </a:ext>
-            </a:extLst>
-          </a:blip>
-          <a:srcRect/>
-          <a:stretch>
-            <a:fillRect/>
-          </a:stretch>
-        </p:blipFill>
-        <p:spPr bwMode="auto">
-          <a:xfrm>
-            <a:off x="625921" y="2278339"/>
-            <a:ext cx="2528252" cy="1327757"/>
-          </a:xfrm>
-          <a:prstGeom prst="rect">
-            <a:avLst/>
-          </a:prstGeom>
-          <a:noFill/>
-          <a:extLst>
-            <a:ext uri="{909E8E84-426E-40DD-AFC4-6F175D3DCCD1}">
-              <a14:hiddenFill xmlns:a14="http://schemas.microsoft.com/office/drawing/2010/main">
-                <a:solidFill>
-                  <a:srgbClr val="FFFFFF"/>
-                </a:solidFill>
-              </a14:hiddenFill>
-            </a:ext>
-          </a:extLst>
-        </p:spPr>
-      </p:pic>
-      <p:pic>
-        <p:nvPicPr>
-          <p:cNvPr id="1034" name="Picture 10" descr="Image result for gcp"/>
-          <p:cNvPicPr>
-            <a:picLocks noChangeAspect="1" noChangeArrowheads="1"/>
-          </p:cNvPicPr>
-          <p:nvPr/>
-        </p:nvPicPr>
-        <p:blipFill>
-          <a:blip r:embed="rId4">
-            <a:extLst>
-              <a:ext uri="{28A0092B-C50C-407E-A947-70E740481C1C}">
-                <a14:useLocalDpi xmlns:a14="http://schemas.microsoft.com/office/drawing/2010/main" val="0"/>
-              </a:ext>
-            </a:extLst>
-          </a:blip>
-          <a:srcRect/>
-          <a:stretch>
-            <a:fillRect/>
-          </a:stretch>
-        </p:blipFill>
-        <p:spPr bwMode="auto">
-          <a:xfrm>
-            <a:off x="2240028" y="1035919"/>
-            <a:ext cx="6667500" cy="2667000"/>
-          </a:xfrm>
-          <a:prstGeom prst="rect">
-            <a:avLst/>
-          </a:prstGeom>
-          <a:noFill/>
-          <a:extLst>
-            <a:ext uri="{909E8E84-426E-40DD-AFC4-6F175D3DCCD1}">
-              <a14:hiddenFill xmlns:a14="http://schemas.microsoft.com/office/drawing/2010/main">
-                <a:solidFill>
-                  <a:srgbClr val="FFFFFF"/>
-                </a:solidFill>
-              </a14:hiddenFill>
-            </a:ext>
-          </a:extLst>
-        </p:spPr>
-      </p:pic>
-      <p:pic>
-        <p:nvPicPr>
-          <p:cNvPr id="1040" name="Picture 16" descr="Image result for azure"/>
-          <p:cNvPicPr>
-            <a:picLocks noChangeAspect="1" noChangeArrowheads="1"/>
-          </p:cNvPicPr>
-          <p:nvPr/>
-        </p:nvPicPr>
-        <p:blipFill>
-          <a:blip r:embed="rId5">
-            <a:extLst>
-              <a:ext uri="{28A0092B-C50C-407E-A947-70E740481C1C}">
-                <a14:useLocalDpi xmlns:a14="http://schemas.microsoft.com/office/drawing/2010/main" val="0"/>
-              </a:ext>
-            </a:extLst>
-          </a:blip>
-          <a:srcRect/>
-          <a:stretch>
-            <a:fillRect/>
-          </a:stretch>
-        </p:blipFill>
-        <p:spPr bwMode="auto">
-          <a:xfrm>
-            <a:off x="1703515" y="4553903"/>
-            <a:ext cx="2657475" cy="1371600"/>
-          </a:xfrm>
-          <a:prstGeom prst="rect">
-            <a:avLst/>
-          </a:prstGeom>
-          <a:noFill/>
-          <a:extLst>
-            <a:ext uri="{909E8E84-426E-40DD-AFC4-6F175D3DCCD1}">
-              <a14:hiddenFill xmlns:a14="http://schemas.microsoft.com/office/drawing/2010/main">
-                <a:solidFill>
-                  <a:srgbClr val="FFFFFF"/>
-                </a:solidFill>
-              </a14:hiddenFill>
-            </a:ext>
-          </a:extLst>
-        </p:spPr>
-      </p:pic>
-      <p:pic>
-        <p:nvPicPr>
-          <p:cNvPr id="1042" name="Picture 18" descr="Image result for giantswarm"/>
-          <p:cNvPicPr>
-            <a:picLocks noChangeAspect="1" noChangeArrowheads="1"/>
-          </p:cNvPicPr>
-          <p:nvPr/>
-        </p:nvPicPr>
-        <p:blipFill>
-          <a:blip r:embed="rId6">
-            <a:extLst>
-              <a:ext uri="{28A0092B-C50C-407E-A947-70E740481C1C}">
-                <a14:useLocalDpi xmlns:a14="http://schemas.microsoft.com/office/drawing/2010/main" val="0"/>
-              </a:ext>
-            </a:extLst>
-          </a:blip>
-          <a:srcRect/>
-          <a:stretch>
-            <a:fillRect/>
-          </a:stretch>
-        </p:blipFill>
-        <p:spPr bwMode="auto">
-          <a:xfrm>
-            <a:off x="6356668" y="3865506"/>
-            <a:ext cx="2438400" cy="2438400"/>
-          </a:xfrm>
-          <a:prstGeom prst="rect">
-            <a:avLst/>
-          </a:prstGeom>
-          <a:noFill/>
-          <a:extLst>
-            <a:ext uri="{909E8E84-426E-40DD-AFC4-6F175D3DCCD1}">
-              <a14:hiddenFill xmlns:a14="http://schemas.microsoft.com/office/drawing/2010/main">
-                <a:solidFill>
-                  <a:srgbClr val="FFFFFF"/>
-                </a:solidFill>
-              </a14:hiddenFill>
-            </a:ext>
-          </a:extLst>
-        </p:spPr>
-      </p:pic>
-      <p:pic>
-        <p:nvPicPr>
-          <p:cNvPr id="1048" name="Picture 24" descr="logo@2x.png"/>
-          <p:cNvPicPr>
-            <a:picLocks noChangeAspect="1" noChangeArrowheads="1"/>
-          </p:cNvPicPr>
-          <p:nvPr/>
-        </p:nvPicPr>
-        <p:blipFill>
-          <a:blip r:embed="rId7">
-            <a:extLst>
-              <a:ext uri="{28A0092B-C50C-407E-A947-70E740481C1C}">
-                <a14:useLocalDpi xmlns:a14="http://schemas.microsoft.com/office/drawing/2010/main" val="0"/>
-              </a:ext>
-            </a:extLst>
-          </a:blip>
-          <a:srcRect/>
-          <a:stretch>
-            <a:fillRect/>
-          </a:stretch>
-        </p:blipFill>
-        <p:spPr bwMode="auto">
-          <a:xfrm>
-            <a:off x="7857808" y="688666"/>
-            <a:ext cx="2787332" cy="2787332"/>
-          </a:xfrm>
-          <a:prstGeom prst="rect">
-            <a:avLst/>
-          </a:prstGeom>
-          <a:noFill/>
-          <a:extLst>
-            <a:ext uri="{909E8E84-426E-40DD-AFC4-6F175D3DCCD1}">
-              <a14:hiddenFill xmlns:a14="http://schemas.microsoft.com/office/drawing/2010/main">
-                <a:solidFill>
-                  <a:srgbClr val="FFFFFF"/>
-                </a:solidFill>
-              </a14:hiddenFill>
-            </a:ext>
-          </a:extLst>
-        </p:spPr>
-      </p:pic>
-    </p:spTree>
-    <p:extLst>
-      <p:ext uri="{BB962C8B-B14F-4D97-AF65-F5344CB8AC3E}">
-        <p14:creationId xmlns:p14="http://schemas.microsoft.com/office/powerpoint/2010/main" val="627288864"/>
-      </p:ext>
-    </p:extLst>
-  </p:cSld>
-  <p:clrMapOvr>
-    <a:masterClrMapping/>
-  </p:clrMapOvr>
-</p:sld>
-</file>
-
-<file path=ppt/slides/slide14.xml><?xml version="1.0" encoding="utf-8"?>
 <p:sld xmlns:a="http://schemas.openxmlformats.org/drawingml/2006/main" xmlns:r="http://schemas.openxmlformats.org/officeDocument/2006/relationships" xmlns:p="http://schemas.openxmlformats.org/presentationml/2006/main" show="0">
   <p:cSld>
     <p:spTree>
@@ -10557,13 +9168,7 @@
       </p:grpSpPr>
       <p:sp>
         <p:nvSpPr>
-          <p:cNvPr id="2" name="Title 1">
-            <a:extLst>
-              <a:ext uri="{FF2B5EF4-FFF2-40B4-BE49-F238E27FC236}">
-                <a16:creationId xmlns:a16="http://schemas.microsoft.com/office/drawing/2014/main" id="{87932A15-55BF-4A31-BC15-2DE4770B9DE6}"/>
-              </a:ext>
-            </a:extLst>
-          </p:cNvPr>
+          <p:cNvPr id="2" name="Title 1"/>
           <p:cNvSpPr>
             <a:spLocks noGrp="1"/>
           </p:cNvSpPr>
@@ -10571,29 +9176,35 @@
             <p:ph type="title"/>
           </p:nvPr>
         </p:nvSpPr>
-        <p:spPr/>
+        <p:spPr>
+          <a:xfrm>
+            <a:off x="504001" y="504000"/>
+            <a:ext cx="11186476" cy="553998"/>
+          </a:xfrm>
+        </p:spPr>
         <p:txBody>
           <a:bodyPr/>
           <a:lstStyle/>
           <a:p>
-            <a:r>
-              <a:rPr lang="en-US" dirty="0"/>
-              <a:t>The enterprise IT adoption cycle</a:t>
+            <a:pPr algn="ctr"/>
+            <a:r>
+              <a:rPr lang="en-US" sz="3600" dirty="0"/>
+              <a:t>We have isolated containers!</a:t>
             </a:r>
           </a:p>
         </p:txBody>
       </p:sp>
       <p:pic>
         <p:nvPicPr>
-          <p:cNvPr id="1026" name="Picture 2" descr="@swardley's Enterprise IT Adoption Cycle">
+          <p:cNvPr id="1026" name="Picture 2" descr="https://i.kym-cdn.com/photos/images/original/001/142/233/897.gif">
             <a:extLst>
               <a:ext uri="{FF2B5EF4-FFF2-40B4-BE49-F238E27FC236}">
-                <a16:creationId xmlns:a16="http://schemas.microsoft.com/office/drawing/2014/main" id="{0545D1FE-52C9-40E4-800C-5F7879713029}"/>
+                <a16:creationId xmlns:a16="http://schemas.microsoft.com/office/drawing/2014/main" id="{1BB82D96-E312-4B93-8E2A-1376E90FB9B8}"/>
               </a:ext>
             </a:extLst>
           </p:cNvPr>
           <p:cNvPicPr>
-            <a:picLocks noChangeAspect="1" noChangeArrowheads="1"/>
+            <a:picLocks noChangeAspect="1" noChangeArrowheads="1" noCrop="1"/>
           </p:cNvPicPr>
           <p:nvPr/>
         </p:nvPicPr>
@@ -10612,8 +9223,8 @@
         </p:blipFill>
         <p:spPr bwMode="auto">
           <a:xfrm>
-            <a:off x="2477129" y="1074558"/>
-            <a:ext cx="7242175" cy="4942784"/>
+            <a:off x="2577186" y="1832469"/>
+            <a:ext cx="7040802" cy="3520401"/>
           </a:xfrm>
           <a:prstGeom prst="rect">
             <a:avLst/>
@@ -10632,10 +9243,10 @@
       </p:pic>
       <p:sp>
         <p:nvSpPr>
-          <p:cNvPr id="3" name="Rectangle 2">
+          <p:cNvPr id="4" name="Rectangle 3">
             <a:extLst>
               <a:ext uri="{FF2B5EF4-FFF2-40B4-BE49-F238E27FC236}">
-                <a16:creationId xmlns:a16="http://schemas.microsoft.com/office/drawing/2014/main" id="{2945367C-4F21-482D-96C3-B794B27BB28A}"/>
+                <a16:creationId xmlns:a16="http://schemas.microsoft.com/office/drawing/2014/main" id="{9D590C08-612C-4505-A457-A42E8D833E1D}"/>
               </a:ext>
             </a:extLst>
           </p:cNvPr>
@@ -10644,8 +9255,8 @@
         </p:nvSpPr>
         <p:spPr>
           <a:xfrm>
-            <a:off x="916433" y="6132900"/>
-            <a:ext cx="10361612" cy="307777"/>
+            <a:off x="2635934" y="5529141"/>
+            <a:ext cx="7586782" cy="338554"/>
           </a:xfrm>
           <a:prstGeom prst="rect">
             <a:avLst/>
@@ -10657,109 +9268,24 @@
           </a:bodyPr>
           <a:lstStyle/>
           <a:p>
-            <a:r>
-              <a:rPr lang="en-US" sz="1400" dirty="0">
-                <a:solidFill>
-                  <a:srgbClr val="AAAAAA"/>
-                </a:solidFill>
-                <a:latin typeface="Helvetica Neue"/>
+            <a:pPr algn="ctr"/>
+            <a:r>
+              <a:rPr lang="en-US" sz="1600" dirty="0">
+                <a:hlinkClick r:id="rId4"/>
               </a:rPr>
-              <a:t>Adoption cycle graphic © 2012 </a:t>
-            </a:r>
-            <a:r>
-              <a:rPr lang="en-US" sz="1400" dirty="0">
-                <a:solidFill>
-                  <a:srgbClr val="AAAAAA"/>
-                </a:solidFill>
-                <a:latin typeface="Helvetica Neue"/>
-                <a:hlinkClick r:id="rId4" tooltip="Simon Wardley"/>
-              </a:rPr>
-              <a:t>Simon </a:t>
-            </a:r>
-            <a:r>
-              <a:rPr lang="en-US" sz="1400" dirty="0" err="1">
-                <a:solidFill>
-                  <a:srgbClr val="AAAAAA"/>
-                </a:solidFill>
-                <a:latin typeface="Helvetica Neue"/>
-                <a:hlinkClick r:id="rId4" tooltip="Simon Wardley"/>
-              </a:rPr>
-              <a:t>Wardley</a:t>
-            </a:r>
-            <a:r>
-              <a:rPr lang="en-US" sz="1400" dirty="0">
-                <a:solidFill>
-                  <a:srgbClr val="AAAAAA"/>
-                </a:solidFill>
-                <a:latin typeface="Helvetica Neue"/>
-              </a:rPr>
-              <a:t> and </a:t>
-            </a:r>
-            <a:r>
-              <a:rPr lang="en-US" sz="1400" dirty="0">
-                <a:solidFill>
-                  <a:srgbClr val="AAAAAA"/>
-                </a:solidFill>
-                <a:latin typeface="Helvetica Neue"/>
-                <a:hlinkClick r:id="rId5"/>
-              </a:rPr>
-              <a:t>CC BY-SA 3.0</a:t>
-            </a:r>
-            <a:r>
-              <a:rPr lang="en-US" sz="1400" dirty="0">
-                <a:solidFill>
-                  <a:srgbClr val="AAAAAA"/>
-                </a:solidFill>
-                <a:latin typeface="Helvetica Neue"/>
-              </a:rPr>
-              <a:t>. Nicked from his </a:t>
-            </a:r>
-            <a:r>
-              <a:rPr lang="en-US" sz="1400" dirty="0">
-                <a:solidFill>
-                  <a:srgbClr val="AAAAAA"/>
-                </a:solidFill>
-                <a:latin typeface="Helvetica Neue"/>
-                <a:hlinkClick r:id="rId6" tooltip="Bits or pieces: Adoption cycles"/>
-              </a:rPr>
-              <a:t>blog</a:t>
-            </a:r>
-            <a:r>
-              <a:rPr lang="en-US" sz="1400" dirty="0">
-                <a:solidFill>
-                  <a:srgbClr val="AAAAAA"/>
-                </a:solidFill>
-                <a:latin typeface="Helvetica Neue"/>
-              </a:rPr>
-              <a:t> and placed here by </a:t>
-            </a:r>
-            <a:r>
-              <a:rPr lang="en-US" sz="1400" dirty="0">
-                <a:solidFill>
-                  <a:srgbClr val="AAAAAA"/>
-                </a:solidFill>
-                <a:latin typeface="Helvetica Neue"/>
-                <a:hlinkClick r:id="rId7" tooltip="Andrew Back"/>
-              </a:rPr>
-              <a:t>Andrew Back</a:t>
-            </a:r>
-            <a:r>
-              <a:rPr lang="en-US" sz="1400" dirty="0">
-                <a:solidFill>
-                  <a:srgbClr val="AAAAAA"/>
-                </a:solidFill>
-                <a:latin typeface="Helvetica Neue"/>
-              </a:rPr>
-              <a:t>.</a:t>
-            </a:r>
-            <a:endParaRPr lang="en-US" sz="1400" dirty="0"/>
+              <a:t>https://i.kym-cdn.com/photos/images/original/001/142/233/897.gif</a:t>
+            </a:r>
+            <a:r>
+              <a:rPr lang="en-US" sz="1600" dirty="0"/>
+              <a:t> </a:t>
+            </a:r>
           </a:p>
         </p:txBody>
       </p:sp>
     </p:spTree>
     <p:extLst>
       <p:ext uri="{BB962C8B-B14F-4D97-AF65-F5344CB8AC3E}">
-        <p14:creationId xmlns:p14="http://schemas.microsoft.com/office/powerpoint/2010/main" val="536058696"/>
+        <p14:creationId xmlns:p14="http://schemas.microsoft.com/office/powerpoint/2010/main" val="2698542487"/>
       </p:ext>
     </p:extLst>
   </p:cSld>
@@ -10770,765 +9296,6 @@
 </file>
 
 <file path=ppt/slides/slide3.xml><?xml version="1.0" encoding="utf-8"?>
-<p:sld xmlns:a="http://schemas.openxmlformats.org/drawingml/2006/main" xmlns:r="http://schemas.openxmlformats.org/officeDocument/2006/relationships" xmlns:p="http://schemas.openxmlformats.org/presentationml/2006/main">
-  <p:cSld>
-    <p:spTree>
-      <p:nvGrpSpPr>
-        <p:cNvPr id="1" name=""/>
-        <p:cNvGrpSpPr/>
-        <p:nvPr/>
-      </p:nvGrpSpPr>
-      <p:grpSpPr>
-        <a:xfrm>
-          <a:off x="0" y="0"/>
-          <a:ext cx="0" cy="0"/>
-          <a:chOff x="0" y="0"/>
-          <a:chExt cx="0" cy="0"/>
-        </a:xfrm>
-      </p:grpSpPr>
-      <p:pic>
-        <p:nvPicPr>
-          <p:cNvPr id="2" name="Picture 1"/>
-          <p:cNvPicPr>
-            <a:picLocks noChangeAspect="1"/>
-          </p:cNvPicPr>
-          <p:nvPr/>
-        </p:nvPicPr>
-        <p:blipFill>
-          <a:blip r:embed="rId3"/>
-          <a:stretch>
-            <a:fillRect/>
-          </a:stretch>
-        </p:blipFill>
-        <p:spPr>
-          <a:xfrm>
-            <a:off x="2502640" y="1302384"/>
-            <a:ext cx="7736947" cy="4342786"/>
-          </a:xfrm>
-          <a:prstGeom prst="rect">
-            <a:avLst/>
-          </a:prstGeom>
-        </p:spPr>
-      </p:pic>
-      <p:sp>
-        <p:nvSpPr>
-          <p:cNvPr id="3" name="Rectangle 2"/>
-          <p:cNvSpPr/>
-          <p:nvPr/>
-        </p:nvSpPr>
-        <p:spPr>
-          <a:xfrm>
-            <a:off x="2502639" y="5932408"/>
-            <a:ext cx="7736947" cy="415498"/>
-          </a:xfrm>
-          <a:prstGeom prst="rect">
-            <a:avLst/>
-          </a:prstGeom>
-        </p:spPr>
-        <p:txBody>
-          <a:bodyPr wrap="square">
-            <a:spAutoFit/>
-          </a:bodyPr>
-          <a:lstStyle/>
-          <a:p>
-            <a:pPr algn="ctr"/>
-            <a:r>
-              <a:rPr lang="en-US" dirty="0">
-                <a:hlinkClick r:id="rId4"/>
-              </a:rPr>
-              <a:t>https://twitter.com/simonbrown/status/847339104874381312</a:t>
-            </a:r>
-            <a:r>
-              <a:rPr lang="en-US" dirty="0"/>
-              <a:t> </a:t>
-            </a:r>
-          </a:p>
-        </p:txBody>
-      </p:sp>
-      <p:sp>
-        <p:nvSpPr>
-          <p:cNvPr id="8" name="Title 1"/>
-          <p:cNvSpPr>
-            <a:spLocks noGrp="1"/>
-          </p:cNvSpPr>
-          <p:nvPr>
-            <p:ph type="title"/>
-          </p:nvPr>
-        </p:nvSpPr>
-        <p:spPr>
-          <a:xfrm>
-            <a:off x="663732" y="367386"/>
-            <a:ext cx="11414760" cy="1107996"/>
-          </a:xfrm>
-        </p:spPr>
-        <p:txBody>
-          <a:bodyPr/>
-          <a:lstStyle/>
-          <a:p>
-            <a:pPr algn="ctr"/>
-            <a:r>
-              <a:rPr lang="en-US" sz="3600" dirty="0"/>
-              <a:t>Containers will NOT fix a broken architecture!</a:t>
-            </a:r>
-          </a:p>
-        </p:txBody>
-      </p:sp>
-    </p:spTree>
-    <p:extLst>
-      <p:ext uri="{BB962C8B-B14F-4D97-AF65-F5344CB8AC3E}">
-        <p14:creationId xmlns:p14="http://schemas.microsoft.com/office/powerpoint/2010/main" val="2802130325"/>
-      </p:ext>
-    </p:extLst>
-  </p:cSld>
-  <p:clrMapOvr>
-    <a:masterClrMapping/>
-  </p:clrMapOvr>
-  <p:timing>
-    <p:tnLst>
-      <p:par>
-        <p:cTn id="1" dur="indefinite" restart="never" nodeType="tmRoot">
-          <p:childTnLst>
-            <p:seq concurrent="1" nextAc="seek">
-              <p:cTn id="2" dur="indefinite" nodeType="mainSeq">
-                <p:childTnLst>
-                  <p:par>
-                    <p:cTn id="3" fill="hold">
-                      <p:stCondLst>
-                        <p:cond delay="indefinite"/>
-                      </p:stCondLst>
-                      <p:childTnLst>
-                        <p:par>
-                          <p:cTn id="4" fill="hold">
-                            <p:stCondLst>
-                              <p:cond delay="0"/>
-                            </p:stCondLst>
-                            <p:childTnLst>
-                              <p:par>
-                                <p:cTn id="5" presetID="1" presetClass="entr" presetSubtype="0" fill="hold" grpId="0" nodeType="clickEffect">
-                                  <p:stCondLst>
-                                    <p:cond delay="0"/>
-                                  </p:stCondLst>
-                                  <p:childTnLst>
-                                    <p:set>
-                                      <p:cBhvr>
-                                        <p:cTn id="6" dur="1" fill="hold">
-                                          <p:stCondLst>
-                                            <p:cond delay="0"/>
-                                          </p:stCondLst>
-                                        </p:cTn>
-                                        <p:tgtEl>
-                                          <p:spTgt spid="3"/>
-                                        </p:tgtEl>
-                                        <p:attrNameLst>
-                                          <p:attrName>style.visibility</p:attrName>
-                                        </p:attrNameLst>
-                                      </p:cBhvr>
-                                      <p:to>
-                                        <p:strVal val="visible"/>
-                                      </p:to>
-                                    </p:set>
-                                  </p:childTnLst>
-                                </p:cTn>
-                              </p:par>
-                              <p:par>
-                                <p:cTn id="7" presetID="1" presetClass="entr" presetSubtype="0" fill="hold" nodeType="withEffect">
-                                  <p:stCondLst>
-                                    <p:cond delay="0"/>
-                                  </p:stCondLst>
-                                  <p:childTnLst>
-                                    <p:set>
-                                      <p:cBhvr>
-                                        <p:cTn id="8" dur="1" fill="hold">
-                                          <p:stCondLst>
-                                            <p:cond delay="0"/>
-                                          </p:stCondLst>
-                                        </p:cTn>
-                                        <p:tgtEl>
-                                          <p:spTgt spid="2"/>
-                                        </p:tgtEl>
-                                        <p:attrNameLst>
-                                          <p:attrName>style.visibility</p:attrName>
-                                        </p:attrNameLst>
-                                      </p:cBhvr>
-                                      <p:to>
-                                        <p:strVal val="visible"/>
-                                      </p:to>
-                                    </p:set>
-                                  </p:childTnLst>
-                                </p:cTn>
-                              </p:par>
-                            </p:childTnLst>
-                          </p:cTn>
-                        </p:par>
-                      </p:childTnLst>
-                    </p:cTn>
-                  </p:par>
-                </p:childTnLst>
-              </p:cTn>
-              <p:prevCondLst>
-                <p:cond evt="onPrev" delay="0">
-                  <p:tgtEl>
-                    <p:sldTgt/>
-                  </p:tgtEl>
-                </p:cond>
-              </p:prevCondLst>
-              <p:nextCondLst>
-                <p:cond evt="onNext" delay="0">
-                  <p:tgtEl>
-                    <p:sldTgt/>
-                  </p:tgtEl>
-                </p:cond>
-              </p:nextCondLst>
-            </p:seq>
-          </p:childTnLst>
-        </p:cTn>
-      </p:par>
-    </p:tnLst>
-    <p:bldLst>
-      <p:bldP spid="3" grpId="0"/>
-    </p:bldLst>
-  </p:timing>
-</p:sld>
-</file>
-
-<file path=ppt/slides/slide4.xml><?xml version="1.0" encoding="utf-8"?>
-<p:sld xmlns:a="http://schemas.openxmlformats.org/drawingml/2006/main" xmlns:r="http://schemas.openxmlformats.org/officeDocument/2006/relationships" xmlns:p="http://schemas.openxmlformats.org/presentationml/2006/main">
-  <p:cSld>
-    <p:spTree>
-      <p:nvGrpSpPr>
-        <p:cNvPr id="1" name=""/>
-        <p:cNvGrpSpPr/>
-        <p:nvPr/>
-      </p:nvGrpSpPr>
-      <p:grpSpPr>
-        <a:xfrm>
-          <a:off x="0" y="0"/>
-          <a:ext cx="0" cy="0"/>
-          <a:chOff x="0" y="0"/>
-          <a:chExt cx="0" cy="0"/>
-        </a:xfrm>
-      </p:grpSpPr>
-      <p:pic>
-        <p:nvPicPr>
-          <p:cNvPr id="2050" name="Picture 2" descr="https://pbs.twimg.com/media/Cd6UYMOWoAAgVUp.jpg:small"/>
-          <p:cNvPicPr>
-            <a:picLocks noChangeAspect="1" noChangeArrowheads="1"/>
-          </p:cNvPicPr>
-          <p:nvPr/>
-        </p:nvPicPr>
-        <p:blipFill>
-          <a:blip r:embed="rId3">
-            <a:extLst>
-              <a:ext uri="{28A0092B-C50C-407E-A947-70E740481C1C}">
-                <a14:useLocalDpi xmlns:a14="http://schemas.microsoft.com/office/drawing/2010/main" val="0"/>
-              </a:ext>
-            </a:extLst>
-          </a:blip>
-          <a:srcRect/>
-          <a:stretch>
-            <a:fillRect/>
-          </a:stretch>
-        </p:blipFill>
-        <p:spPr bwMode="auto">
-          <a:xfrm>
-            <a:off x="2967486" y="396941"/>
-            <a:ext cx="6020663" cy="4515498"/>
-          </a:xfrm>
-          <a:prstGeom prst="rect">
-            <a:avLst/>
-          </a:prstGeom>
-          <a:noFill/>
-          <a:extLst>
-            <a:ext uri="{909E8E84-426E-40DD-AFC4-6F175D3DCCD1}">
-              <a14:hiddenFill xmlns:a14="http://schemas.microsoft.com/office/drawing/2010/main">
-                <a:solidFill>
-                  <a:srgbClr val="FFFFFF"/>
-                </a:solidFill>
-              </a14:hiddenFill>
-            </a:ext>
-          </a:extLst>
-        </p:spPr>
-      </p:pic>
-      <p:sp>
-        <p:nvSpPr>
-          <p:cNvPr id="4" name="Rectangle 3"/>
-          <p:cNvSpPr/>
-          <p:nvPr/>
-        </p:nvSpPr>
-        <p:spPr>
-          <a:xfrm>
-            <a:off x="839787" y="5014883"/>
-            <a:ext cx="10515600" cy="738664"/>
-          </a:xfrm>
-          <a:prstGeom prst="rect">
-            <a:avLst/>
-          </a:prstGeom>
-        </p:spPr>
-        <p:txBody>
-          <a:bodyPr wrap="square">
-            <a:spAutoFit/>
-          </a:bodyPr>
-          <a:lstStyle/>
-          <a:p>
-            <a:pPr algn="ctr"/>
-            <a:r>
-              <a:rPr lang="en-US" sz="2400" b="1" dirty="0"/>
-              <a:t>Here's a diagram of two microservices and their shared database.</a:t>
-            </a:r>
-          </a:p>
-          <a:p>
-            <a:pPr algn="ctr"/>
-            <a:r>
-              <a:rPr lang="en-US" sz="1800" dirty="0">
-                <a:hlinkClick r:id="rId4"/>
-              </a:rPr>
-              <a:t>https://twitter.com/mathiasverraes/status/711168935798902785</a:t>
-            </a:r>
-            <a:r>
-              <a:rPr lang="en-US" sz="1800" dirty="0"/>
-              <a:t> </a:t>
-            </a:r>
-          </a:p>
-        </p:txBody>
-      </p:sp>
-    </p:spTree>
-    <p:extLst>
-      <p:ext uri="{BB962C8B-B14F-4D97-AF65-F5344CB8AC3E}">
-        <p14:creationId xmlns:p14="http://schemas.microsoft.com/office/powerpoint/2010/main" val="2585139535"/>
-      </p:ext>
-    </p:extLst>
-  </p:cSld>
-  <p:clrMapOvr>
-    <a:masterClrMapping/>
-  </p:clrMapOvr>
-  <p:timing>
-    <p:tnLst>
-      <p:par>
-        <p:cTn id="1" dur="indefinite" restart="never" nodeType="tmRoot">
-          <p:childTnLst>
-            <p:seq concurrent="1" nextAc="seek">
-              <p:cTn id="2" dur="indefinite" nodeType="mainSeq">
-                <p:childTnLst>
-                  <p:par>
-                    <p:cTn id="3" fill="hold">
-                      <p:stCondLst>
-                        <p:cond delay="indefinite"/>
-                      </p:stCondLst>
-                      <p:childTnLst>
-                        <p:par>
-                          <p:cTn id="4" fill="hold">
-                            <p:stCondLst>
-                              <p:cond delay="0"/>
-                            </p:stCondLst>
-                            <p:childTnLst>
-                              <p:par>
-                                <p:cTn id="5" presetID="1" presetClass="entr" presetSubtype="0" fill="hold" grpId="0" nodeType="clickEffect">
-                                  <p:stCondLst>
-                                    <p:cond delay="0"/>
-                                  </p:stCondLst>
-                                  <p:childTnLst>
-                                    <p:set>
-                                      <p:cBhvr>
-                                        <p:cTn id="6" dur="1" fill="hold">
-                                          <p:stCondLst>
-                                            <p:cond delay="0"/>
-                                          </p:stCondLst>
-                                        </p:cTn>
-                                        <p:tgtEl>
-                                          <p:spTgt spid="4"/>
-                                        </p:tgtEl>
-                                        <p:attrNameLst>
-                                          <p:attrName>style.visibility</p:attrName>
-                                        </p:attrNameLst>
-                                      </p:cBhvr>
-                                      <p:to>
-                                        <p:strVal val="visible"/>
-                                      </p:to>
-                                    </p:set>
-                                  </p:childTnLst>
-                                </p:cTn>
-                              </p:par>
-                            </p:childTnLst>
-                          </p:cTn>
-                        </p:par>
-                      </p:childTnLst>
-                    </p:cTn>
-                  </p:par>
-                </p:childTnLst>
-              </p:cTn>
-              <p:prevCondLst>
-                <p:cond evt="onPrev" delay="0">
-                  <p:tgtEl>
-                    <p:sldTgt/>
-                  </p:tgtEl>
-                </p:cond>
-              </p:prevCondLst>
-              <p:nextCondLst>
-                <p:cond evt="onNext" delay="0">
-                  <p:tgtEl>
-                    <p:sldTgt/>
-                  </p:tgtEl>
-                </p:cond>
-              </p:nextCondLst>
-            </p:seq>
-          </p:childTnLst>
-        </p:cTn>
-      </p:par>
-    </p:tnLst>
-    <p:bldLst>
-      <p:bldP spid="4" grpId="0"/>
-    </p:bldLst>
-  </p:timing>
-</p:sld>
-</file>
-
-<file path=ppt/slides/slide5.xml><?xml version="1.0" encoding="utf-8"?>
-<p:sld xmlns:a="http://schemas.openxmlformats.org/drawingml/2006/main" xmlns:r="http://schemas.openxmlformats.org/officeDocument/2006/relationships" xmlns:p="http://schemas.openxmlformats.org/presentationml/2006/main">
-  <p:cSld>
-    <p:spTree>
-      <p:nvGrpSpPr>
-        <p:cNvPr id="1" name=""/>
-        <p:cNvGrpSpPr/>
-        <p:nvPr/>
-      </p:nvGrpSpPr>
-      <p:grpSpPr>
-        <a:xfrm>
-          <a:off x="0" y="0"/>
-          <a:ext cx="0" cy="0"/>
-          <a:chOff x="0" y="0"/>
-          <a:chExt cx="0" cy="0"/>
-        </a:xfrm>
-      </p:grpSpPr>
-      <p:sp>
-        <p:nvSpPr>
-          <p:cNvPr id="3" name="Rectangle 2"/>
-          <p:cNvSpPr/>
-          <p:nvPr/>
-        </p:nvSpPr>
-        <p:spPr>
-          <a:xfrm>
-            <a:off x="1213166" y="4295408"/>
-            <a:ext cx="10285412" cy="1785104"/>
-          </a:xfrm>
-          <a:prstGeom prst="rect">
-            <a:avLst/>
-          </a:prstGeom>
-        </p:spPr>
-        <p:txBody>
-          <a:bodyPr wrap="square">
-            <a:spAutoFit/>
-          </a:bodyPr>
-          <a:lstStyle/>
-          <a:p>
-            <a:pPr algn="ctr"/>
-            <a:r>
-              <a:rPr lang="en-US" sz="3200" b="1" dirty="0"/>
-              <a:t>To make error is human. </a:t>
-            </a:r>
-          </a:p>
-          <a:p>
-            <a:pPr algn="ctr"/>
-            <a:r>
-              <a:rPr lang="en-US" sz="3200" b="1" dirty="0"/>
-              <a:t>To propagate error to all server in automatic way is #</a:t>
-            </a:r>
-            <a:r>
-              <a:rPr lang="en-US" sz="3200" b="1" dirty="0" err="1"/>
-              <a:t>devops</a:t>
-            </a:r>
-            <a:r>
-              <a:rPr lang="en-US" sz="3200" b="1" dirty="0"/>
-              <a:t>.</a:t>
-            </a:r>
-          </a:p>
-          <a:p>
-            <a:pPr algn="ctr"/>
-            <a:r>
-              <a:rPr lang="en-US" sz="1400" b="1" dirty="0">
-                <a:hlinkClick r:id="rId3"/>
-              </a:rPr>
-              <a:t>https://twitter.com/DEVOPS_BORAT/status/41587168870797312</a:t>
-            </a:r>
-            <a:r>
-              <a:rPr lang="en-US" sz="1400" b="1" dirty="0"/>
-              <a:t> </a:t>
-            </a:r>
-          </a:p>
-        </p:txBody>
-      </p:sp>
-      <p:pic>
-        <p:nvPicPr>
-          <p:cNvPr id="2" name="Picture 1"/>
-          <p:cNvPicPr>
-            <a:picLocks noChangeAspect="1"/>
-          </p:cNvPicPr>
-          <p:nvPr/>
-        </p:nvPicPr>
-        <p:blipFill>
-          <a:blip r:embed="rId4"/>
-          <a:stretch>
-            <a:fillRect/>
-          </a:stretch>
-        </p:blipFill>
-        <p:spPr>
-          <a:xfrm>
-            <a:off x="3342197" y="494983"/>
-            <a:ext cx="6027351" cy="3448272"/>
-          </a:xfrm>
-          <a:prstGeom prst="rect">
-            <a:avLst/>
-          </a:prstGeom>
-        </p:spPr>
-      </p:pic>
-    </p:spTree>
-    <p:extLst>
-      <p:ext uri="{BB962C8B-B14F-4D97-AF65-F5344CB8AC3E}">
-        <p14:creationId xmlns:p14="http://schemas.microsoft.com/office/powerpoint/2010/main" val="3634449589"/>
-      </p:ext>
-    </p:extLst>
-  </p:cSld>
-  <p:clrMapOvr>
-    <a:masterClrMapping/>
-  </p:clrMapOvr>
-  <p:timing>
-    <p:tnLst>
-      <p:par>
-        <p:cTn id="1" dur="indefinite" restart="never" nodeType="tmRoot">
-          <p:childTnLst>
-            <p:seq concurrent="1" nextAc="seek">
-              <p:cTn id="2" dur="indefinite" nodeType="mainSeq">
-                <p:childTnLst>
-                  <p:par>
-                    <p:cTn id="3" fill="hold">
-                      <p:stCondLst>
-                        <p:cond delay="indefinite"/>
-                      </p:stCondLst>
-                      <p:childTnLst>
-                        <p:par>
-                          <p:cTn id="4" fill="hold">
-                            <p:stCondLst>
-                              <p:cond delay="0"/>
-                            </p:stCondLst>
-                            <p:childTnLst>
-                              <p:par>
-                                <p:cTn id="5" presetID="1" presetClass="entr" presetSubtype="0" fill="hold" grpId="0" nodeType="clickEffect">
-                                  <p:stCondLst>
-                                    <p:cond delay="0"/>
-                                  </p:stCondLst>
-                                  <p:childTnLst>
-                                    <p:set>
-                                      <p:cBhvr>
-                                        <p:cTn id="6" dur="1" fill="hold">
-                                          <p:stCondLst>
-                                            <p:cond delay="0"/>
-                                          </p:stCondLst>
-                                        </p:cTn>
-                                        <p:tgtEl>
-                                          <p:spTgt spid="3"/>
-                                        </p:tgtEl>
-                                        <p:attrNameLst>
-                                          <p:attrName>style.visibility</p:attrName>
-                                        </p:attrNameLst>
-                                      </p:cBhvr>
-                                      <p:to>
-                                        <p:strVal val="visible"/>
-                                      </p:to>
-                                    </p:set>
-                                  </p:childTnLst>
-                                </p:cTn>
-                              </p:par>
-                            </p:childTnLst>
-                          </p:cTn>
-                        </p:par>
-                      </p:childTnLst>
-                    </p:cTn>
-                  </p:par>
-                </p:childTnLst>
-              </p:cTn>
-              <p:prevCondLst>
-                <p:cond evt="onPrev" delay="0">
-                  <p:tgtEl>
-                    <p:sldTgt/>
-                  </p:tgtEl>
-                </p:cond>
-              </p:prevCondLst>
-              <p:nextCondLst>
-                <p:cond evt="onNext" delay="0">
-                  <p:tgtEl>
-                    <p:sldTgt/>
-                  </p:tgtEl>
-                </p:cond>
-              </p:nextCondLst>
-            </p:seq>
-          </p:childTnLst>
-        </p:cTn>
-      </p:par>
-    </p:tnLst>
-    <p:bldLst>
-      <p:bldP spid="3" grpId="0"/>
-    </p:bldLst>
-  </p:timing>
-</p:sld>
-</file>
-
-<file path=ppt/slides/slide6.xml><?xml version="1.0" encoding="utf-8"?>
-<p:sld xmlns:a="http://schemas.openxmlformats.org/drawingml/2006/main" xmlns:r="http://schemas.openxmlformats.org/officeDocument/2006/relationships" xmlns:p="http://schemas.openxmlformats.org/presentationml/2006/main">
-  <p:cSld>
-    <p:spTree>
-      <p:nvGrpSpPr>
-        <p:cNvPr id="1" name=""/>
-        <p:cNvGrpSpPr/>
-        <p:nvPr/>
-      </p:nvGrpSpPr>
-      <p:grpSpPr>
-        <a:xfrm>
-          <a:off x="0" y="0"/>
-          <a:ext cx="0" cy="0"/>
-          <a:chOff x="0" y="0"/>
-          <a:chExt cx="0" cy="0"/>
-        </a:xfrm>
-      </p:grpSpPr>
-      <p:sp>
-        <p:nvSpPr>
-          <p:cNvPr id="2" name="Title 1"/>
-          <p:cNvSpPr>
-            <a:spLocks noGrp="1"/>
-          </p:cNvSpPr>
-          <p:nvPr>
-            <p:ph type="title"/>
-          </p:nvPr>
-        </p:nvSpPr>
-        <p:spPr>
-          <a:xfrm>
-            <a:off x="504001" y="504000"/>
-            <a:ext cx="11186476" cy="553998"/>
-          </a:xfrm>
-        </p:spPr>
-        <p:txBody>
-          <a:bodyPr/>
-          <a:lstStyle/>
-          <a:p>
-            <a:pPr algn="ctr"/>
-            <a:r>
-              <a:rPr lang="en-US" sz="3600" dirty="0"/>
-              <a:t>But it works on my machine!</a:t>
-            </a:r>
-          </a:p>
-        </p:txBody>
-      </p:sp>
-      <p:pic>
-        <p:nvPicPr>
-          <p:cNvPr id="3" name="Picture 2"/>
-          <p:cNvPicPr>
-            <a:picLocks noChangeAspect="1"/>
-          </p:cNvPicPr>
-          <p:nvPr/>
-        </p:nvPicPr>
-        <p:blipFill>
-          <a:blip r:embed="rId3"/>
-          <a:stretch>
-            <a:fillRect/>
-          </a:stretch>
-        </p:blipFill>
-        <p:spPr>
-          <a:xfrm>
-            <a:off x="2044858" y="1342360"/>
-            <a:ext cx="8104762" cy="4600000"/>
-          </a:xfrm>
-          <a:prstGeom prst="rect">
-            <a:avLst/>
-          </a:prstGeom>
-        </p:spPr>
-      </p:pic>
-    </p:spTree>
-    <p:extLst>
-      <p:ext uri="{BB962C8B-B14F-4D97-AF65-F5344CB8AC3E}">
-        <p14:creationId xmlns:p14="http://schemas.microsoft.com/office/powerpoint/2010/main" val="2698542487"/>
-      </p:ext>
-    </p:extLst>
-  </p:cSld>
-  <p:clrMapOvr>
-    <a:masterClrMapping/>
-  </p:clrMapOvr>
-  <p:timing>
-    <p:tnLst>
-      <p:par>
-        <p:cTn id="1" dur="indefinite" restart="never" nodeType="tmRoot">
-          <p:childTnLst>
-            <p:seq concurrent="1" nextAc="seek">
-              <p:cTn id="2" dur="indefinite" nodeType="mainSeq">
-                <p:childTnLst>
-                  <p:par>
-                    <p:cTn id="3" fill="hold">
-                      <p:stCondLst>
-                        <p:cond delay="indefinite"/>
-                      </p:stCondLst>
-                      <p:childTnLst>
-                        <p:par>
-                          <p:cTn id="4" fill="hold">
-                            <p:stCondLst>
-                              <p:cond delay="0"/>
-                            </p:stCondLst>
-                            <p:childTnLst>
-                              <p:par>
-                                <p:cTn id="5" presetID="1" presetClass="entr" presetSubtype="0" fill="hold" nodeType="clickEffect">
-                                  <p:stCondLst>
-                                    <p:cond delay="0"/>
-                                  </p:stCondLst>
-                                  <p:childTnLst>
-                                    <p:set>
-                                      <p:cBhvr>
-                                        <p:cTn id="6" dur="1" fill="hold">
-                                          <p:stCondLst>
-                                            <p:cond delay="0"/>
-                                          </p:stCondLst>
-                                        </p:cTn>
-                                        <p:tgtEl>
-                                          <p:spTgt spid="3"/>
-                                        </p:tgtEl>
-                                        <p:attrNameLst>
-                                          <p:attrName>style.visibility</p:attrName>
-                                        </p:attrNameLst>
-                                      </p:cBhvr>
-                                      <p:to>
-                                        <p:strVal val="visible"/>
-                                      </p:to>
-                                    </p:set>
-                                  </p:childTnLst>
-                                </p:cTn>
-                              </p:par>
-                            </p:childTnLst>
-                          </p:cTn>
-                        </p:par>
-                      </p:childTnLst>
-                    </p:cTn>
-                  </p:par>
-                </p:childTnLst>
-              </p:cTn>
-              <p:prevCondLst>
-                <p:cond evt="onPrev" delay="0">
-                  <p:tgtEl>
-                    <p:sldTgt/>
-                  </p:tgtEl>
-                </p:cond>
-              </p:prevCondLst>
-              <p:nextCondLst>
-                <p:cond evt="onNext" delay="0">
-                  <p:tgtEl>
-                    <p:sldTgt/>
-                  </p:tgtEl>
-                </p:cond>
-              </p:nextCondLst>
-            </p:seq>
-          </p:childTnLst>
-        </p:cTn>
-      </p:par>
-    </p:tnLst>
-  </p:timing>
-</p:sld>
-</file>
-
-<file path=ppt/slides/slide7.xml><?xml version="1.0" encoding="utf-8"?>
 <p:sld xmlns:a="http://schemas.openxmlformats.org/drawingml/2006/main" xmlns:r="http://schemas.openxmlformats.org/officeDocument/2006/relationships" xmlns:p="http://schemas.openxmlformats.org/presentationml/2006/main">
   <p:cSld>
     <p:spTree>
@@ -12037,7 +9804,7 @@
 </p:sld>
 </file>
 
-<file path=ppt/slides/slide8.xml><?xml version="1.0" encoding="utf-8"?>
+<file path=ppt/slides/slide4.xml><?xml version="1.0" encoding="utf-8"?>
 <p:sld xmlns:a="http://schemas.openxmlformats.org/drawingml/2006/main" xmlns:r="http://schemas.openxmlformats.org/officeDocument/2006/relationships" xmlns:p="http://schemas.openxmlformats.org/presentationml/2006/main">
   <p:cSld>
     <p:spTree>
@@ -12263,7 +10030,7 @@
 </p:sld>
 </file>
 
-<file path=ppt/slides/slide9.xml><?xml version="1.0" encoding="utf-8"?>
+<file path=ppt/slides/slide5.xml><?xml version="1.0" encoding="utf-8"?>
 <p:sld xmlns:a="http://schemas.openxmlformats.org/drawingml/2006/main" xmlns:r="http://schemas.openxmlformats.org/officeDocument/2006/relationships" xmlns:p="http://schemas.openxmlformats.org/presentationml/2006/main">
   <p:cSld>
     <p:spTree>
@@ -12434,6 +10201,1006 @@
     <p:extLst>
       <p:ext uri="{BB962C8B-B14F-4D97-AF65-F5344CB8AC3E}">
         <p14:creationId xmlns:p14="http://schemas.microsoft.com/office/powerpoint/2010/main" val="290894176"/>
+      </p:ext>
+    </p:extLst>
+  </p:cSld>
+  <p:clrMapOvr>
+    <a:masterClrMapping/>
+  </p:clrMapOvr>
+</p:sld>
+</file>
+
+<file path=ppt/slides/slide6.xml><?xml version="1.0" encoding="utf-8"?>
+<p:sld xmlns:a="http://schemas.openxmlformats.org/drawingml/2006/main" xmlns:r="http://schemas.openxmlformats.org/officeDocument/2006/relationships" xmlns:p="http://schemas.openxmlformats.org/presentationml/2006/main">
+  <p:cSld>
+    <p:spTree>
+      <p:nvGrpSpPr>
+        <p:cNvPr id="1" name=""/>
+        <p:cNvGrpSpPr/>
+        <p:nvPr/>
+      </p:nvGrpSpPr>
+      <p:grpSpPr>
+        <a:xfrm>
+          <a:off x="0" y="0"/>
+          <a:ext cx="0" cy="0"/>
+          <a:chOff x="0" y="0"/>
+          <a:chExt cx="0" cy="0"/>
+        </a:xfrm>
+      </p:grpSpPr>
+      <p:sp>
+        <p:nvSpPr>
+          <p:cNvPr id="2" name="Title 1">
+            <a:extLst>
+              <a:ext uri="{FF2B5EF4-FFF2-40B4-BE49-F238E27FC236}">
+                <a16:creationId xmlns:a16="http://schemas.microsoft.com/office/drawing/2014/main" id="{A283E944-42BF-41EE-84F7-320F8E39B576}"/>
+              </a:ext>
+            </a:extLst>
+          </p:cNvPr>
+          <p:cNvSpPr>
+            <a:spLocks noGrp="1"/>
+          </p:cNvSpPr>
+          <p:nvPr>
+            <p:ph type="title"/>
+          </p:nvPr>
+        </p:nvSpPr>
+        <p:spPr/>
+        <p:txBody>
+          <a:bodyPr/>
+          <a:lstStyle/>
+          <a:p>
+            <a:r>
+              <a:rPr lang="en-US" dirty="0"/>
+              <a:t>Getting started: let‘s buy some socks</a:t>
+            </a:r>
+          </a:p>
+        </p:txBody>
+      </p:sp>
+      <p:pic>
+        <p:nvPicPr>
+          <p:cNvPr id="4" name="Picture 3">
+            <a:extLst>
+              <a:ext uri="{FF2B5EF4-FFF2-40B4-BE49-F238E27FC236}">
+                <a16:creationId xmlns:a16="http://schemas.microsoft.com/office/drawing/2014/main" id="{E7DDE766-5BAC-492B-B460-5D63FF7BC52C}"/>
+              </a:ext>
+            </a:extLst>
+          </p:cNvPr>
+          <p:cNvPicPr>
+            <a:picLocks noChangeAspect="1"/>
+          </p:cNvPicPr>
+          <p:nvPr/>
+        </p:nvPicPr>
+        <p:blipFill>
+          <a:blip r:embed="rId3"/>
+          <a:stretch>
+            <a:fillRect/>
+          </a:stretch>
+        </p:blipFill>
+        <p:spPr>
+          <a:xfrm>
+            <a:off x="2418723" y="1048775"/>
+            <a:ext cx="7357031" cy="5257542"/>
+          </a:xfrm>
+          <a:prstGeom prst="rect">
+            <a:avLst/>
+          </a:prstGeom>
+        </p:spPr>
+      </p:pic>
+      <p:pic>
+        <p:nvPicPr>
+          <p:cNvPr id="5" name="Picture 4">
+            <a:extLst>
+              <a:ext uri="{FF2B5EF4-FFF2-40B4-BE49-F238E27FC236}">
+                <a16:creationId xmlns:a16="http://schemas.microsoft.com/office/drawing/2014/main" id="{9377D6B2-0289-4B8C-A793-F902D649DEBB}"/>
+              </a:ext>
+            </a:extLst>
+          </p:cNvPr>
+          <p:cNvPicPr>
+            <a:picLocks noChangeAspect="1"/>
+          </p:cNvPicPr>
+          <p:nvPr/>
+        </p:nvPicPr>
+        <p:blipFill>
+          <a:blip r:embed="rId4"/>
+          <a:stretch>
+            <a:fillRect/>
+          </a:stretch>
+        </p:blipFill>
+        <p:spPr>
+          <a:xfrm>
+            <a:off x="1841832" y="1346622"/>
+            <a:ext cx="8510813" cy="4630315"/>
+          </a:xfrm>
+          <a:prstGeom prst="rect">
+            <a:avLst/>
+          </a:prstGeom>
+          <a:effectLst>
+            <a:softEdge rad="635000"/>
+          </a:effectLst>
+        </p:spPr>
+      </p:pic>
+    </p:spTree>
+    <p:extLst>
+      <p:ext uri="{BB962C8B-B14F-4D97-AF65-F5344CB8AC3E}">
+        <p14:creationId xmlns:p14="http://schemas.microsoft.com/office/powerpoint/2010/main" val="2645232040"/>
+      </p:ext>
+    </p:extLst>
+  </p:cSld>
+  <p:clrMapOvr>
+    <a:masterClrMapping/>
+  </p:clrMapOvr>
+  <p:timing>
+    <p:tnLst>
+      <p:par>
+        <p:cTn id="1" dur="indefinite" restart="never" nodeType="tmRoot">
+          <p:childTnLst>
+            <p:seq concurrent="1" nextAc="seek">
+              <p:cTn id="2" dur="indefinite" nodeType="mainSeq">
+                <p:childTnLst>
+                  <p:par>
+                    <p:cTn id="3" fill="hold">
+                      <p:stCondLst>
+                        <p:cond delay="indefinite"/>
+                      </p:stCondLst>
+                      <p:childTnLst>
+                        <p:par>
+                          <p:cTn id="4" fill="hold">
+                            <p:stCondLst>
+                              <p:cond delay="0"/>
+                            </p:stCondLst>
+                            <p:childTnLst>
+                              <p:par>
+                                <p:cTn id="5" presetID="1" presetClass="exit" presetSubtype="0" fill="hold" nodeType="clickEffect">
+                                  <p:stCondLst>
+                                    <p:cond delay="0"/>
+                                  </p:stCondLst>
+                                  <p:childTnLst>
+                                    <p:set>
+                                      <p:cBhvr>
+                                        <p:cTn id="6" dur="1" fill="hold">
+                                          <p:stCondLst>
+                                            <p:cond delay="0"/>
+                                          </p:stCondLst>
+                                        </p:cTn>
+                                        <p:tgtEl>
+                                          <p:spTgt spid="5"/>
+                                        </p:tgtEl>
+                                        <p:attrNameLst>
+                                          <p:attrName>style.visibility</p:attrName>
+                                        </p:attrNameLst>
+                                      </p:cBhvr>
+                                      <p:to>
+                                        <p:strVal val="hidden"/>
+                                      </p:to>
+                                    </p:set>
+                                  </p:childTnLst>
+                                </p:cTn>
+                              </p:par>
+                            </p:childTnLst>
+                          </p:cTn>
+                        </p:par>
+                        <p:par>
+                          <p:cTn id="7" fill="hold">
+                            <p:stCondLst>
+                              <p:cond delay="0"/>
+                            </p:stCondLst>
+                            <p:childTnLst>
+                              <p:par>
+                                <p:cTn id="8" presetID="1" presetClass="entr" presetSubtype="0" fill="hold" nodeType="afterEffect">
+                                  <p:stCondLst>
+                                    <p:cond delay="0"/>
+                                  </p:stCondLst>
+                                  <p:childTnLst>
+                                    <p:set>
+                                      <p:cBhvr>
+                                        <p:cTn id="9" dur="1" fill="hold">
+                                          <p:stCondLst>
+                                            <p:cond delay="0"/>
+                                          </p:stCondLst>
+                                        </p:cTn>
+                                        <p:tgtEl>
+                                          <p:spTgt spid="4"/>
+                                        </p:tgtEl>
+                                        <p:attrNameLst>
+                                          <p:attrName>style.visibility</p:attrName>
+                                        </p:attrNameLst>
+                                      </p:cBhvr>
+                                      <p:to>
+                                        <p:strVal val="visible"/>
+                                      </p:to>
+                                    </p:set>
+                                  </p:childTnLst>
+                                </p:cTn>
+                              </p:par>
+                            </p:childTnLst>
+                          </p:cTn>
+                        </p:par>
+                      </p:childTnLst>
+                    </p:cTn>
+                  </p:par>
+                </p:childTnLst>
+              </p:cTn>
+              <p:prevCondLst>
+                <p:cond evt="onPrev" delay="0">
+                  <p:tgtEl>
+                    <p:sldTgt/>
+                  </p:tgtEl>
+                </p:cond>
+              </p:prevCondLst>
+              <p:nextCondLst>
+                <p:cond evt="onNext" delay="0">
+                  <p:tgtEl>
+                    <p:sldTgt/>
+                  </p:tgtEl>
+                </p:cond>
+              </p:nextCondLst>
+            </p:seq>
+          </p:childTnLst>
+        </p:cTn>
+      </p:par>
+    </p:tnLst>
+  </p:timing>
+</p:sld>
+</file>
+
+<file path=ppt/slides/slide7.xml><?xml version="1.0" encoding="utf-8"?>
+<p:sld xmlns:a="http://schemas.openxmlformats.org/drawingml/2006/main" xmlns:r="http://schemas.openxmlformats.org/officeDocument/2006/relationships" xmlns:p="http://schemas.openxmlformats.org/presentationml/2006/main">
+  <p:cSld>
+    <p:spTree>
+      <p:nvGrpSpPr>
+        <p:cNvPr id="1" name=""/>
+        <p:cNvGrpSpPr/>
+        <p:nvPr/>
+      </p:nvGrpSpPr>
+      <p:grpSpPr>
+        <a:xfrm>
+          <a:off x="0" y="0"/>
+          <a:ext cx="0" cy="0"/>
+          <a:chOff x="0" y="0"/>
+          <a:chExt cx="0" cy="0"/>
+        </a:xfrm>
+      </p:grpSpPr>
+      <p:sp>
+        <p:nvSpPr>
+          <p:cNvPr id="2" name="Title 1"/>
+          <p:cNvSpPr>
+            <a:spLocks noGrp="1"/>
+          </p:cNvSpPr>
+          <p:nvPr>
+            <p:ph type="title"/>
+          </p:nvPr>
+        </p:nvSpPr>
+        <p:spPr/>
+        <p:txBody>
+          <a:bodyPr/>
+          <a:lstStyle/>
+          <a:p>
+            <a:r>
+              <a:rPr lang="en-US" dirty="0"/>
+              <a:t>Some facts about K8s, </a:t>
+            </a:r>
+            <a:r>
+              <a:rPr lang="en-US" dirty="0" err="1"/>
+              <a:t>kubernetes</a:t>
+            </a:r>
+            <a:r>
+              <a:rPr lang="en-US" dirty="0"/>
+              <a:t>, …</a:t>
+            </a:r>
+          </a:p>
+        </p:txBody>
+      </p:sp>
+      <p:sp>
+        <p:nvSpPr>
+          <p:cNvPr id="5" name="TextBox 4"/>
+          <p:cNvSpPr txBox="1"/>
+          <p:nvPr/>
+        </p:nvSpPr>
+        <p:spPr>
+          <a:xfrm>
+            <a:off x="504001" y="1447800"/>
+            <a:ext cx="9691559" cy="3877985"/>
+          </a:xfrm>
+          <a:prstGeom prst="rect">
+            <a:avLst/>
+          </a:prstGeom>
+          <a:noFill/>
+        </p:spPr>
+        <p:txBody>
+          <a:bodyPr wrap="square" lIns="0" tIns="0" rIns="0" bIns="0" rtlCol="0">
+            <a:spAutoFit/>
+          </a:bodyPr>
+          <a:lstStyle/>
+          <a:p>
+            <a:pPr marL="285750" indent="-285750" fontAlgn="base">
+              <a:spcBef>
+                <a:spcPct val="50000"/>
+              </a:spcBef>
+              <a:spcAft>
+                <a:spcPct val="0"/>
+              </a:spcAft>
+              <a:buClr>
+                <a:schemeClr val="tx1"/>
+              </a:buClr>
+              <a:buSzPct val="100000"/>
+              <a:buFont typeface="Wingdings" panose="05000000000000000000" pitchFamily="2" charset="2"/>
+              <a:buChar char="§"/>
+            </a:pPr>
+            <a:r>
+              <a:rPr lang="en-US" sz="1800" kern="0" dirty="0">
+                <a:ea typeface="Arial Unicode MS" pitchFamily="34" charset="-128"/>
+                <a:cs typeface="Arial Unicode MS" pitchFamily="34" charset="-128"/>
+              </a:rPr>
+              <a:t>Kubernetes = Greek for “helmsman” or “pilot”</a:t>
+            </a:r>
+          </a:p>
+          <a:p>
+            <a:pPr marL="285750" indent="-285750" fontAlgn="base">
+              <a:spcBef>
+                <a:spcPct val="50000"/>
+              </a:spcBef>
+              <a:spcAft>
+                <a:spcPct val="0"/>
+              </a:spcAft>
+              <a:buClr>
+                <a:schemeClr val="tx1"/>
+              </a:buClr>
+              <a:buSzPct val="100000"/>
+              <a:buFont typeface="Wingdings" panose="05000000000000000000" pitchFamily="2" charset="2"/>
+              <a:buChar char="§"/>
+            </a:pPr>
+            <a:r>
+              <a:rPr lang="en-US" sz="1800" kern="0" dirty="0">
+                <a:ea typeface="Arial Unicode MS" pitchFamily="34" charset="-128"/>
+                <a:cs typeface="Arial Unicode MS" pitchFamily="34" charset="-128"/>
+              </a:rPr>
+              <a:t>Based on Google’s Borg – a cluster manager for container orchestration</a:t>
+            </a:r>
+          </a:p>
+          <a:p>
+            <a:pPr marL="285750" indent="-285750" fontAlgn="base">
+              <a:spcBef>
+                <a:spcPct val="50000"/>
+              </a:spcBef>
+              <a:spcAft>
+                <a:spcPct val="0"/>
+              </a:spcAft>
+              <a:buClr>
+                <a:schemeClr val="tx1"/>
+              </a:buClr>
+              <a:buSzPct val="100000"/>
+              <a:buFont typeface="Wingdings" panose="05000000000000000000" pitchFamily="2" charset="2"/>
+              <a:buChar char="§"/>
+            </a:pPr>
+            <a:r>
+              <a:rPr lang="en-US" sz="1800" kern="0" dirty="0">
+                <a:ea typeface="Arial Unicode MS" pitchFamily="34" charset="-128"/>
+                <a:cs typeface="Arial Unicode MS" pitchFamily="34" charset="-128"/>
+              </a:rPr>
+              <a:t>Open sourced by Google and firstly announced in 2014</a:t>
+            </a:r>
+          </a:p>
+          <a:p>
+            <a:pPr marL="285750" indent="-285750" fontAlgn="base">
+              <a:spcBef>
+                <a:spcPct val="50000"/>
+              </a:spcBef>
+              <a:spcAft>
+                <a:spcPct val="0"/>
+              </a:spcAft>
+              <a:buClr>
+                <a:schemeClr val="tx1"/>
+              </a:buClr>
+              <a:buSzPct val="100000"/>
+              <a:buFont typeface="Wingdings" panose="05000000000000000000" pitchFamily="2" charset="2"/>
+              <a:buChar char="§"/>
+            </a:pPr>
+            <a:r>
+              <a:rPr lang="en-US" sz="1800" kern="0" dirty="0">
+                <a:ea typeface="Arial Unicode MS" pitchFamily="34" charset="-128"/>
+                <a:cs typeface="Arial Unicode MS" pitchFamily="34" charset="-128"/>
+              </a:rPr>
+              <a:t>v1.0 was released in July 2015</a:t>
+            </a:r>
+          </a:p>
+          <a:p>
+            <a:pPr marL="285750" indent="-285750" fontAlgn="base">
+              <a:spcBef>
+                <a:spcPct val="50000"/>
+              </a:spcBef>
+              <a:spcAft>
+                <a:spcPct val="0"/>
+              </a:spcAft>
+              <a:buClr>
+                <a:schemeClr val="tx1"/>
+              </a:buClr>
+              <a:buSzPct val="100000"/>
+              <a:buFont typeface="Wingdings" panose="05000000000000000000" pitchFamily="2" charset="2"/>
+              <a:buChar char="§"/>
+            </a:pPr>
+            <a:r>
+              <a:rPr lang="en-US" sz="1800" kern="0" dirty="0">
+                <a:ea typeface="Arial Unicode MS" pitchFamily="34" charset="-128"/>
+                <a:cs typeface="Arial Unicode MS" pitchFamily="34" charset="-128"/>
+              </a:rPr>
+              <a:t>By now K8s is governed by the Cloud Native Computing Foundation (CNCF)</a:t>
+            </a:r>
+          </a:p>
+          <a:p>
+            <a:pPr marL="285750" indent="-285750" fontAlgn="base">
+              <a:spcBef>
+                <a:spcPct val="50000"/>
+              </a:spcBef>
+              <a:spcAft>
+                <a:spcPct val="0"/>
+              </a:spcAft>
+              <a:buClr>
+                <a:schemeClr val="tx1"/>
+              </a:buClr>
+              <a:buSzPct val="100000"/>
+              <a:buFont typeface="Wingdings" panose="05000000000000000000" pitchFamily="2" charset="2"/>
+              <a:buChar char="§"/>
+            </a:pPr>
+            <a:r>
+              <a:rPr lang="en-US" sz="1800" kern="0" dirty="0">
+                <a:ea typeface="Arial Unicode MS" pitchFamily="34" charset="-128"/>
+                <a:cs typeface="Arial Unicode MS" pitchFamily="34" charset="-128"/>
+              </a:rPr>
+              <a:t>Vanilla Kubernetes is the basis for commercial products like </a:t>
+            </a:r>
+            <a:r>
+              <a:rPr lang="en-US" sz="1800" kern="0" dirty="0" err="1">
+                <a:ea typeface="Arial Unicode MS" pitchFamily="34" charset="-128"/>
+                <a:cs typeface="Arial Unicode MS" pitchFamily="34" charset="-128"/>
+              </a:rPr>
+              <a:t>RedHat’s</a:t>
+            </a:r>
+            <a:r>
+              <a:rPr lang="en-US" sz="1800" kern="0" dirty="0">
+                <a:ea typeface="Arial Unicode MS" pitchFamily="34" charset="-128"/>
+                <a:cs typeface="Arial Unicode MS" pitchFamily="34" charset="-128"/>
+              </a:rPr>
+              <a:t> </a:t>
+            </a:r>
+            <a:r>
+              <a:rPr lang="en-US" sz="1800" kern="0" dirty="0" err="1">
+                <a:ea typeface="Arial Unicode MS" pitchFamily="34" charset="-128"/>
+                <a:cs typeface="Arial Unicode MS" pitchFamily="34" charset="-128"/>
+              </a:rPr>
+              <a:t>Openshift</a:t>
+            </a:r>
+            <a:r>
+              <a:rPr lang="en-US" sz="1800" kern="0" dirty="0">
+                <a:ea typeface="Arial Unicode MS" pitchFamily="34" charset="-128"/>
+                <a:cs typeface="Arial Unicode MS" pitchFamily="34" charset="-128"/>
+              </a:rPr>
+              <a:t> or CoreOS’ tectonic</a:t>
+            </a:r>
+          </a:p>
+          <a:p>
+            <a:pPr marL="285750" indent="-285750" fontAlgn="base">
+              <a:spcBef>
+                <a:spcPct val="50000"/>
+              </a:spcBef>
+              <a:spcAft>
+                <a:spcPct val="0"/>
+              </a:spcAft>
+              <a:buClr>
+                <a:schemeClr val="tx1"/>
+              </a:buClr>
+              <a:buSzPct val="100000"/>
+              <a:buFont typeface="Wingdings" panose="05000000000000000000" pitchFamily="2" charset="2"/>
+              <a:buChar char="§"/>
+            </a:pPr>
+            <a:r>
+              <a:rPr lang="en-US" sz="1800" kern="0" dirty="0">
+                <a:ea typeface="Arial Unicode MS" pitchFamily="34" charset="-128"/>
+                <a:cs typeface="Arial Unicode MS" pitchFamily="34" charset="-128"/>
+              </a:rPr>
+              <a:t>New minor releases roughly every 3 month</a:t>
+            </a:r>
+          </a:p>
+          <a:p>
+            <a:pPr marL="285750" indent="-285750" fontAlgn="base">
+              <a:spcBef>
+                <a:spcPct val="50000"/>
+              </a:spcBef>
+              <a:spcAft>
+                <a:spcPct val="0"/>
+              </a:spcAft>
+              <a:buClr>
+                <a:schemeClr val="tx1"/>
+              </a:buClr>
+              <a:buSzPct val="100000"/>
+              <a:buFont typeface="Wingdings" panose="05000000000000000000" pitchFamily="2" charset="2"/>
+              <a:buChar char="§"/>
+            </a:pPr>
+            <a:r>
+              <a:rPr lang="en-US" sz="1800" kern="0" dirty="0">
+                <a:ea typeface="Arial Unicode MS" pitchFamily="34" charset="-128"/>
+                <a:cs typeface="Arial Unicode MS" pitchFamily="34" charset="-128"/>
+              </a:rPr>
+              <a:t>Extensive list of beta features</a:t>
+            </a:r>
+          </a:p>
+          <a:p>
+            <a:pPr marL="285750" indent="-285750" fontAlgn="base">
+              <a:spcBef>
+                <a:spcPct val="50000"/>
+              </a:spcBef>
+              <a:spcAft>
+                <a:spcPct val="0"/>
+              </a:spcAft>
+              <a:buClr>
+                <a:schemeClr val="tx1"/>
+              </a:buClr>
+              <a:buSzPct val="100000"/>
+              <a:buFont typeface="Wingdings" panose="05000000000000000000" pitchFamily="2" charset="2"/>
+              <a:buChar char="§"/>
+            </a:pPr>
+            <a:r>
+              <a:rPr lang="en-US" sz="1800" kern="0" dirty="0">
+                <a:ea typeface="Arial Unicode MS" pitchFamily="34" charset="-128"/>
+                <a:cs typeface="Arial Unicode MS" pitchFamily="34" charset="-128"/>
+              </a:rPr>
+              <a:t>Documentation: </a:t>
+            </a:r>
+            <a:r>
+              <a:rPr lang="en-US" sz="1800" kern="0" dirty="0">
+                <a:ea typeface="Arial Unicode MS" pitchFamily="34" charset="-128"/>
+                <a:cs typeface="Arial Unicode MS" pitchFamily="34" charset="-128"/>
+                <a:hlinkClick r:id="rId3"/>
+              </a:rPr>
+              <a:t>https://kubernetes.io/docs/home/</a:t>
+            </a:r>
+            <a:r>
+              <a:rPr lang="en-US" sz="1800" kern="0" dirty="0">
+                <a:ea typeface="Arial Unicode MS" pitchFamily="34" charset="-128"/>
+                <a:cs typeface="Arial Unicode MS" pitchFamily="34" charset="-128"/>
+              </a:rPr>
+              <a:t> - concepts, tasks, API reference</a:t>
+            </a:r>
+          </a:p>
+        </p:txBody>
+      </p:sp>
+    </p:spTree>
+    <p:extLst>
+      <p:ext uri="{BB962C8B-B14F-4D97-AF65-F5344CB8AC3E}">
+        <p14:creationId xmlns:p14="http://schemas.microsoft.com/office/powerpoint/2010/main" val="3263224504"/>
+      </p:ext>
+    </p:extLst>
+  </p:cSld>
+  <p:clrMapOvr>
+    <a:masterClrMapping/>
+  </p:clrMapOvr>
+</p:sld>
+</file>
+
+<file path=ppt/slides/slide8.xml><?xml version="1.0" encoding="utf-8"?>
+<p:sld xmlns:a="http://schemas.openxmlformats.org/drawingml/2006/main" xmlns:r="http://schemas.openxmlformats.org/officeDocument/2006/relationships" xmlns:p="http://schemas.openxmlformats.org/presentationml/2006/main">
+  <p:cSld>
+    <p:spTree>
+      <p:nvGrpSpPr>
+        <p:cNvPr id="1" name=""/>
+        <p:cNvGrpSpPr/>
+        <p:nvPr/>
+      </p:nvGrpSpPr>
+      <p:grpSpPr>
+        <a:xfrm>
+          <a:off x="0" y="0"/>
+          <a:ext cx="0" cy="0"/>
+          <a:chOff x="0" y="0"/>
+          <a:chExt cx="0" cy="0"/>
+        </a:xfrm>
+      </p:grpSpPr>
+      <p:sp>
+        <p:nvSpPr>
+          <p:cNvPr id="2" name="Title 1"/>
+          <p:cNvSpPr>
+            <a:spLocks noGrp="1"/>
+          </p:cNvSpPr>
+          <p:nvPr>
+            <p:ph type="title"/>
+          </p:nvPr>
+        </p:nvSpPr>
+        <p:spPr/>
+        <p:txBody>
+          <a:bodyPr/>
+          <a:lstStyle/>
+          <a:p>
+            <a:r>
+              <a:rPr lang="en-US" dirty="0"/>
+              <a:t>If it doesn’t always work as expected …</a:t>
+            </a:r>
+          </a:p>
+        </p:txBody>
+      </p:sp>
+      <p:sp>
+        <p:nvSpPr>
+          <p:cNvPr id="3" name="Rectangle 2"/>
+          <p:cNvSpPr/>
+          <p:nvPr/>
+        </p:nvSpPr>
+        <p:spPr>
+          <a:xfrm>
+            <a:off x="504001" y="5851688"/>
+            <a:ext cx="9554399" cy="415498"/>
+          </a:xfrm>
+          <a:prstGeom prst="rect">
+            <a:avLst/>
+          </a:prstGeom>
+        </p:spPr>
+        <p:txBody>
+          <a:bodyPr wrap="square">
+            <a:spAutoFit/>
+          </a:bodyPr>
+          <a:lstStyle/>
+          <a:p>
+            <a:r>
+              <a:rPr lang="en-US" dirty="0">
+                <a:hlinkClick r:id="rId3"/>
+              </a:rPr>
+              <a:t>https://github.com/kubernetes/community/blob/master/communication.md</a:t>
+            </a:r>
+            <a:r>
+              <a:rPr lang="en-US" dirty="0"/>
+              <a:t> </a:t>
+            </a:r>
+          </a:p>
+        </p:txBody>
+      </p:sp>
+      <p:pic>
+        <p:nvPicPr>
+          <p:cNvPr id="4" name="Picture 3"/>
+          <p:cNvPicPr>
+            <a:picLocks noChangeAspect="1"/>
+          </p:cNvPicPr>
+          <p:nvPr/>
+        </p:nvPicPr>
+        <p:blipFill>
+          <a:blip r:embed="rId4"/>
+          <a:stretch>
+            <a:fillRect/>
+          </a:stretch>
+        </p:blipFill>
+        <p:spPr>
+          <a:xfrm>
+            <a:off x="504001" y="1170215"/>
+            <a:ext cx="9249599" cy="3520576"/>
+          </a:xfrm>
+          <a:prstGeom prst="rect">
+            <a:avLst/>
+          </a:prstGeom>
+        </p:spPr>
+      </p:pic>
+      <p:sp>
+        <p:nvSpPr>
+          <p:cNvPr id="5" name="Rectangle 4"/>
+          <p:cNvSpPr/>
+          <p:nvPr/>
+        </p:nvSpPr>
+        <p:spPr>
+          <a:xfrm>
+            <a:off x="504001" y="5298469"/>
+            <a:ext cx="3788217" cy="415498"/>
+          </a:xfrm>
+          <a:prstGeom prst="rect">
+            <a:avLst/>
+          </a:prstGeom>
+        </p:spPr>
+        <p:txBody>
+          <a:bodyPr wrap="none">
+            <a:spAutoFit/>
+          </a:bodyPr>
+          <a:lstStyle/>
+          <a:p>
+            <a:r>
+              <a:rPr lang="en-US" dirty="0">
+                <a:hlinkClick r:id="rId5"/>
+              </a:rPr>
+              <a:t>https://github.com/kubernetes</a:t>
+            </a:r>
+            <a:r>
+              <a:rPr lang="en-US" dirty="0"/>
+              <a:t> </a:t>
+            </a:r>
+          </a:p>
+        </p:txBody>
+      </p:sp>
+      <p:sp>
+        <p:nvSpPr>
+          <p:cNvPr id="6" name="Rectangle 5"/>
+          <p:cNvSpPr/>
+          <p:nvPr/>
+        </p:nvSpPr>
+        <p:spPr>
+          <a:xfrm>
+            <a:off x="504000" y="4767554"/>
+            <a:ext cx="8792399" cy="415498"/>
+          </a:xfrm>
+          <a:prstGeom prst="rect">
+            <a:avLst/>
+          </a:prstGeom>
+        </p:spPr>
+        <p:txBody>
+          <a:bodyPr wrap="square">
+            <a:spAutoFit/>
+          </a:bodyPr>
+          <a:lstStyle/>
+          <a:p>
+            <a:r>
+              <a:rPr lang="en-US" dirty="0">
+                <a:hlinkClick r:id="rId6"/>
+              </a:rPr>
+              <a:t>https://groups.google.com/forum/#!forum/kubernetes-users</a:t>
+            </a:r>
+            <a:r>
+              <a:rPr lang="en-US" dirty="0"/>
+              <a:t> </a:t>
+            </a:r>
+          </a:p>
+        </p:txBody>
+      </p:sp>
+    </p:spTree>
+    <p:extLst>
+      <p:ext uri="{BB962C8B-B14F-4D97-AF65-F5344CB8AC3E}">
+        <p14:creationId xmlns:p14="http://schemas.microsoft.com/office/powerpoint/2010/main" val="2777277099"/>
+      </p:ext>
+    </p:extLst>
+  </p:cSld>
+  <p:clrMapOvr>
+    <a:masterClrMapping/>
+  </p:clrMapOvr>
+</p:sld>
+</file>
+
+<file path=ppt/slides/slide9.xml><?xml version="1.0" encoding="utf-8"?>
+<p:sld xmlns:a="http://schemas.openxmlformats.org/drawingml/2006/main" xmlns:r="http://schemas.openxmlformats.org/officeDocument/2006/relationships" xmlns:p="http://schemas.openxmlformats.org/presentationml/2006/main">
+  <p:cSld>
+    <p:spTree>
+      <p:nvGrpSpPr>
+        <p:cNvPr id="1" name=""/>
+        <p:cNvGrpSpPr/>
+        <p:nvPr/>
+      </p:nvGrpSpPr>
+      <p:grpSpPr>
+        <a:xfrm>
+          <a:off x="0" y="0"/>
+          <a:ext cx="0" cy="0"/>
+          <a:chOff x="0" y="0"/>
+          <a:chExt cx="0" cy="0"/>
+        </a:xfrm>
+      </p:grpSpPr>
+      <p:sp>
+        <p:nvSpPr>
+          <p:cNvPr id="2" name="Title 1"/>
+          <p:cNvSpPr>
+            <a:spLocks noGrp="1"/>
+          </p:cNvSpPr>
+          <p:nvPr>
+            <p:ph type="title"/>
+          </p:nvPr>
+        </p:nvSpPr>
+        <p:spPr/>
+        <p:txBody>
+          <a:bodyPr/>
+          <a:lstStyle/>
+          <a:p>
+            <a:r>
+              <a:rPr lang="en-US" dirty="0"/>
+              <a:t>Wherefrom can I get a cluster?</a:t>
+            </a:r>
+          </a:p>
+        </p:txBody>
+      </p:sp>
+      <p:pic>
+        <p:nvPicPr>
+          <p:cNvPr id="1028" name="Picture 4" descr="Image result for aws"/>
+          <p:cNvPicPr>
+            <a:picLocks noChangeAspect="1" noChangeArrowheads="1"/>
+          </p:cNvPicPr>
+          <p:nvPr/>
+        </p:nvPicPr>
+        <p:blipFill>
+          <a:blip r:embed="rId3">
+            <a:extLst>
+              <a:ext uri="{28A0092B-C50C-407E-A947-70E740481C1C}">
+                <a14:useLocalDpi xmlns:a14="http://schemas.microsoft.com/office/drawing/2010/main" val="0"/>
+              </a:ext>
+            </a:extLst>
+          </a:blip>
+          <a:srcRect/>
+          <a:stretch>
+            <a:fillRect/>
+          </a:stretch>
+        </p:blipFill>
+        <p:spPr bwMode="auto">
+          <a:xfrm>
+            <a:off x="625921" y="2278339"/>
+            <a:ext cx="2528252" cy="1327757"/>
+          </a:xfrm>
+          <a:prstGeom prst="rect">
+            <a:avLst/>
+          </a:prstGeom>
+          <a:noFill/>
+          <a:extLst>
+            <a:ext uri="{909E8E84-426E-40DD-AFC4-6F175D3DCCD1}">
+              <a14:hiddenFill xmlns:a14="http://schemas.microsoft.com/office/drawing/2010/main">
+                <a:solidFill>
+                  <a:srgbClr val="FFFFFF"/>
+                </a:solidFill>
+              </a14:hiddenFill>
+            </a:ext>
+          </a:extLst>
+        </p:spPr>
+      </p:pic>
+      <p:pic>
+        <p:nvPicPr>
+          <p:cNvPr id="1034" name="Picture 10" descr="Image result for gcp"/>
+          <p:cNvPicPr>
+            <a:picLocks noChangeAspect="1" noChangeArrowheads="1"/>
+          </p:cNvPicPr>
+          <p:nvPr/>
+        </p:nvPicPr>
+        <p:blipFill>
+          <a:blip r:embed="rId4">
+            <a:extLst>
+              <a:ext uri="{28A0092B-C50C-407E-A947-70E740481C1C}">
+                <a14:useLocalDpi xmlns:a14="http://schemas.microsoft.com/office/drawing/2010/main" val="0"/>
+              </a:ext>
+            </a:extLst>
+          </a:blip>
+          <a:srcRect/>
+          <a:stretch>
+            <a:fillRect/>
+          </a:stretch>
+        </p:blipFill>
+        <p:spPr bwMode="auto">
+          <a:xfrm>
+            <a:off x="2240028" y="1035919"/>
+            <a:ext cx="6667500" cy="2667000"/>
+          </a:xfrm>
+          <a:prstGeom prst="rect">
+            <a:avLst/>
+          </a:prstGeom>
+          <a:noFill/>
+          <a:extLst>
+            <a:ext uri="{909E8E84-426E-40DD-AFC4-6F175D3DCCD1}">
+              <a14:hiddenFill xmlns:a14="http://schemas.microsoft.com/office/drawing/2010/main">
+                <a:solidFill>
+                  <a:srgbClr val="FFFFFF"/>
+                </a:solidFill>
+              </a14:hiddenFill>
+            </a:ext>
+          </a:extLst>
+        </p:spPr>
+      </p:pic>
+      <p:pic>
+        <p:nvPicPr>
+          <p:cNvPr id="1040" name="Picture 16" descr="Image result for azure"/>
+          <p:cNvPicPr>
+            <a:picLocks noChangeAspect="1" noChangeArrowheads="1"/>
+          </p:cNvPicPr>
+          <p:nvPr/>
+        </p:nvPicPr>
+        <p:blipFill>
+          <a:blip r:embed="rId5">
+            <a:extLst>
+              <a:ext uri="{28A0092B-C50C-407E-A947-70E740481C1C}">
+                <a14:useLocalDpi xmlns:a14="http://schemas.microsoft.com/office/drawing/2010/main" val="0"/>
+              </a:ext>
+            </a:extLst>
+          </a:blip>
+          <a:srcRect/>
+          <a:stretch>
+            <a:fillRect/>
+          </a:stretch>
+        </p:blipFill>
+        <p:spPr bwMode="auto">
+          <a:xfrm>
+            <a:off x="1703515" y="4553903"/>
+            <a:ext cx="2657475" cy="1371600"/>
+          </a:xfrm>
+          <a:prstGeom prst="rect">
+            <a:avLst/>
+          </a:prstGeom>
+          <a:noFill/>
+          <a:extLst>
+            <a:ext uri="{909E8E84-426E-40DD-AFC4-6F175D3DCCD1}">
+              <a14:hiddenFill xmlns:a14="http://schemas.microsoft.com/office/drawing/2010/main">
+                <a:solidFill>
+                  <a:srgbClr val="FFFFFF"/>
+                </a:solidFill>
+              </a14:hiddenFill>
+            </a:ext>
+          </a:extLst>
+        </p:spPr>
+      </p:pic>
+      <p:pic>
+        <p:nvPicPr>
+          <p:cNvPr id="1042" name="Picture 18" descr="Image result for giantswarm"/>
+          <p:cNvPicPr>
+            <a:picLocks noChangeAspect="1" noChangeArrowheads="1"/>
+          </p:cNvPicPr>
+          <p:nvPr/>
+        </p:nvPicPr>
+        <p:blipFill>
+          <a:blip r:embed="rId6">
+            <a:extLst>
+              <a:ext uri="{28A0092B-C50C-407E-A947-70E740481C1C}">
+                <a14:useLocalDpi xmlns:a14="http://schemas.microsoft.com/office/drawing/2010/main" val="0"/>
+              </a:ext>
+            </a:extLst>
+          </a:blip>
+          <a:srcRect/>
+          <a:stretch>
+            <a:fillRect/>
+          </a:stretch>
+        </p:blipFill>
+        <p:spPr bwMode="auto">
+          <a:xfrm>
+            <a:off x="6356668" y="3865506"/>
+            <a:ext cx="2438400" cy="2438400"/>
+          </a:xfrm>
+          <a:prstGeom prst="rect">
+            <a:avLst/>
+          </a:prstGeom>
+          <a:noFill/>
+          <a:extLst>
+            <a:ext uri="{909E8E84-426E-40DD-AFC4-6F175D3DCCD1}">
+              <a14:hiddenFill xmlns:a14="http://schemas.microsoft.com/office/drawing/2010/main">
+                <a:solidFill>
+                  <a:srgbClr val="FFFFFF"/>
+                </a:solidFill>
+              </a14:hiddenFill>
+            </a:ext>
+          </a:extLst>
+        </p:spPr>
+      </p:pic>
+      <p:pic>
+        <p:nvPicPr>
+          <p:cNvPr id="1048" name="Picture 24" descr="logo@2x.png"/>
+          <p:cNvPicPr>
+            <a:picLocks noChangeAspect="1" noChangeArrowheads="1"/>
+          </p:cNvPicPr>
+          <p:nvPr/>
+        </p:nvPicPr>
+        <p:blipFill>
+          <a:blip r:embed="rId7">
+            <a:extLst>
+              <a:ext uri="{28A0092B-C50C-407E-A947-70E740481C1C}">
+                <a14:useLocalDpi xmlns:a14="http://schemas.microsoft.com/office/drawing/2010/main" val="0"/>
+              </a:ext>
+            </a:extLst>
+          </a:blip>
+          <a:srcRect/>
+          <a:stretch>
+            <a:fillRect/>
+          </a:stretch>
+        </p:blipFill>
+        <p:spPr bwMode="auto">
+          <a:xfrm>
+            <a:off x="7857808" y="688666"/>
+            <a:ext cx="2787332" cy="2787332"/>
+          </a:xfrm>
+          <a:prstGeom prst="rect">
+            <a:avLst/>
+          </a:prstGeom>
+          <a:noFill/>
+          <a:extLst>
+            <a:ext uri="{909E8E84-426E-40DD-AFC4-6F175D3DCCD1}">
+              <a14:hiddenFill xmlns:a14="http://schemas.microsoft.com/office/drawing/2010/main">
+                <a:solidFill>
+                  <a:srgbClr val="FFFFFF"/>
+                </a:solidFill>
+              </a14:hiddenFill>
+            </a:ext>
+          </a:extLst>
+        </p:spPr>
+      </p:pic>
+    </p:spTree>
+    <p:extLst>
+      <p:ext uri="{BB962C8B-B14F-4D97-AF65-F5344CB8AC3E}">
+        <p14:creationId xmlns:p14="http://schemas.microsoft.com/office/powerpoint/2010/main" val="627288864"/>
       </p:ext>
     </p:extLst>
   </p:cSld>

</xml_diff>

<commit_message>
minor enhancements to k8s slides
</commit_message>
<xml_diff>
--- a/kubernetes/00_intro.pptx
+++ b/kubernetes/00_intro.pptx
@@ -5,10 +5,10 @@
     <p:sldMasterId id="2147483733" r:id="rId1"/>
   </p:sldMasterIdLst>
   <p:notesMasterIdLst>
-    <p:notesMasterId r:id="rId12"/>
+    <p:notesMasterId r:id="rId14"/>
   </p:notesMasterIdLst>
   <p:handoutMasterIdLst>
-    <p:handoutMasterId r:id="rId13"/>
+    <p:handoutMasterId r:id="rId15"/>
   </p:handoutMasterIdLst>
   <p:sldIdLst>
     <p:sldId id="433" r:id="rId2"/>
@@ -16,11 +16,13 @@
     <p:sldId id="446" r:id="rId4"/>
     <p:sldId id="450" r:id="rId5"/>
     <p:sldId id="449" r:id="rId6"/>
-    <p:sldId id="452" r:id="rId7"/>
+    <p:sldId id="454" r:id="rId7"/>
     <p:sldId id="447" r:id="rId8"/>
     <p:sldId id="448" r:id="rId9"/>
     <p:sldId id="451" r:id="rId10"/>
-    <p:sldId id="265" r:id="rId11"/>
+    <p:sldId id="453" r:id="rId11"/>
+    <p:sldId id="452" r:id="rId12"/>
+    <p:sldId id="265" r:id="rId13"/>
   </p:sldIdLst>
   <p:sldSz cx="12195175" cy="6858000"/>
   <p:notesSz cx="6858000" cy="9144000"/>
@@ -628,6 +630,43 @@
       </p:grpSpPr>
       <p:sp>
         <p:nvSpPr>
+          <p:cNvPr id="2" name="Slide Image Placeholder 1"/>
+          <p:cNvSpPr>
+            <a:spLocks noGrp="1" noRot="1" noChangeAspect="1"/>
+          </p:cNvSpPr>
+          <p:nvPr>
+            <p:ph type="sldImg"/>
+          </p:nvPr>
+        </p:nvSpPr>
+        <p:spPr/>
+      </p:sp>
+      <p:sp>
+        <p:nvSpPr>
+          <p:cNvPr id="3" name="Notes Placeholder 2"/>
+          <p:cNvSpPr>
+            <a:spLocks noGrp="1"/>
+          </p:cNvSpPr>
+          <p:nvPr>
+            <p:ph type="body" idx="1"/>
+          </p:nvPr>
+        </p:nvSpPr>
+        <p:spPr/>
+        <p:txBody>
+          <a:bodyPr>
+            <a:normAutofit fontScale="92500"/>
+          </a:bodyPr>
+          <a:lstStyle/>
+          <a:p>
+            <a:pPr marL="285750" indent="-285750">
+              <a:buFontTx/>
+              <a:buChar char="-"/>
+            </a:pPr>
+            <a:endParaRPr lang="en-US" dirty="0"/>
+          </a:p>
+        </p:txBody>
+      </p:sp>
+      <p:sp>
+        <p:nvSpPr>
           <p:cNvPr id="4" name="Slide Number Placeholder 3"/>
           <p:cNvSpPr>
             <a:spLocks noGrp="1"/>
@@ -644,7 +683,61 @@
             <a:fld id="{7D8C2C35-2B8A-446E-BEC0-FD36716C29AC}" type="slidenum">
               <a:rPr lang="de-DE" smtClean="0"/>
               <a:pPr/>
-              <a:t>10</a:t>
+              <a:t>11</a:t>
+            </a:fld>
+            <a:endParaRPr lang="de-DE" dirty="0"/>
+          </a:p>
+        </p:txBody>
+      </p:sp>
+    </p:spTree>
+    <p:extLst>
+      <p:ext uri="{BB962C8B-B14F-4D97-AF65-F5344CB8AC3E}">
+        <p14:creationId xmlns:p14="http://schemas.microsoft.com/office/powerpoint/2010/main" val="4246815572"/>
+      </p:ext>
+    </p:extLst>
+  </p:cSld>
+  <p:clrMapOvr>
+    <a:masterClrMapping/>
+  </p:clrMapOvr>
+</p:notes>
+</file>
+
+<file path=ppt/notesSlides/notesSlide11.xml><?xml version="1.0" encoding="utf-8"?>
+<p:notes xmlns:a="http://schemas.openxmlformats.org/drawingml/2006/main" xmlns:r="http://schemas.openxmlformats.org/officeDocument/2006/relationships" xmlns:p="http://schemas.openxmlformats.org/presentationml/2006/main">
+  <p:cSld>
+    <p:spTree>
+      <p:nvGrpSpPr>
+        <p:cNvPr id="1" name=""/>
+        <p:cNvGrpSpPr/>
+        <p:nvPr/>
+      </p:nvGrpSpPr>
+      <p:grpSpPr>
+        <a:xfrm>
+          <a:off x="0" y="0"/>
+          <a:ext cx="0" cy="0"/>
+          <a:chOff x="0" y="0"/>
+          <a:chExt cx="0" cy="0"/>
+        </a:xfrm>
+      </p:grpSpPr>
+      <p:sp>
+        <p:nvSpPr>
+          <p:cNvPr id="4" name="Slide Number Placeholder 3"/>
+          <p:cNvSpPr>
+            <a:spLocks noGrp="1"/>
+          </p:cNvSpPr>
+          <p:nvPr>
+            <p:ph type="sldNum" sz="quarter" idx="10"/>
+          </p:nvPr>
+        </p:nvSpPr>
+        <p:spPr/>
+        <p:txBody>
+          <a:bodyPr/>
+          <a:lstStyle/>
+          <a:p>
+            <a:fld id="{7D8C2C35-2B8A-446E-BEC0-FD36716C29AC}" type="slidenum">
+              <a:rPr lang="de-DE" smtClean="0"/>
+              <a:pPr/>
+              <a:t>12</a:t>
             </a:fld>
             <a:endParaRPr lang="de-DE" dirty="0"/>
           </a:p>
@@ -1118,9 +1211,15 @@
         </p:nvSpPr>
         <p:spPr/>
         <p:txBody>
-          <a:bodyPr/>
+          <a:bodyPr>
+            <a:normAutofit fontScale="92500"/>
+          </a:bodyPr>
           <a:lstStyle/>
           <a:p>
+            <a:pPr marL="285750" indent="-285750">
+              <a:buFontTx/>
+              <a:buChar char="-"/>
+            </a:pPr>
             <a:r>
               <a:rPr lang="en-US" dirty="0"/>
               <a:t>The demo is based on the “sock shop” e-commerce platform developed by </a:t>
@@ -1131,7 +1230,24 @@
             </a:r>
             <a:r>
               <a:rPr lang="en-US" dirty="0"/>
-              <a:t>. This is a full-blown demo application, including content – however you have to wait ~2min until the content is fully loaded. To demo, create a “sock-shop” namespace and use the sock-</a:t>
+              <a:t>. This is a full-blown demo application, including content – however you have to wait ~2min until the content is fully loaded. </a:t>
+            </a:r>
+          </a:p>
+          <a:p>
+            <a:pPr marL="285750" indent="-285750">
+              <a:buFontTx/>
+              <a:buChar char="-"/>
+            </a:pPr>
+            <a:endParaRPr lang="en-US" dirty="0"/>
+          </a:p>
+          <a:p>
+            <a:pPr marL="285750" indent="-285750">
+              <a:buFontTx/>
+              <a:buChar char="-"/>
+            </a:pPr>
+            <a:r>
+              <a:rPr lang="en-US" dirty="0"/>
+              <a:t>To demo use the sock-</a:t>
             </a:r>
             <a:r>
               <a:rPr lang="en-US" dirty="0" err="1"/>
@@ -1147,19 +1263,96 @@
             </a:r>
             <a:r>
               <a:rPr lang="en-US" dirty="0"/>
-              <a:t>/solutions folder to deploy all components. </a:t>
-            </a:r>
-          </a:p>
-          <a:p>
-            <a:r>
-              <a:rPr lang="en-US" dirty="0"/>
-              <a:t>The design of the sock-shop is based a micro-services architecture and was containerized appropriately. See https://github.com/microservices-demo/microservices-demo/blob/master/internal-docs/design.md for </a:t>
+              <a:t>/demo folder to deploy all components. Adapt the host on the Ingress according to the cluster-name and project-name, used within your training (line with ‘host: sock-</a:t>
+            </a:r>
+            <a:r>
+              <a:rPr lang="en-US" dirty="0" err="1"/>
+              <a:t>shop.ingress</a:t>
+            </a:r>
+            <a:r>
+              <a:rPr lang="en-US" dirty="0"/>
+              <a:t>.&lt;cluster-name&gt;.&lt;project-name&gt;.shoot.canary.k8s-hana.ondemand.com’) before you call ‘</a:t>
+            </a:r>
+            <a:r>
+              <a:rPr lang="en-US" dirty="0" err="1"/>
+              <a:t>kubectl</a:t>
+            </a:r>
+            <a:r>
+              <a:rPr lang="en-US" dirty="0"/>
+              <a:t> apply –f sock-</a:t>
+            </a:r>
+            <a:r>
+              <a:rPr lang="en-US" dirty="0" err="1"/>
+              <a:t>shop.yaml</a:t>
+            </a:r>
+            <a:r>
+              <a:rPr lang="en-US" dirty="0"/>
+              <a:t>’.</a:t>
+            </a:r>
+          </a:p>
+          <a:p>
+            <a:pPr marL="285750" indent="-285750">
+              <a:buFontTx/>
+              <a:buChar char="-"/>
+            </a:pPr>
+            <a:endParaRPr lang="en-US" dirty="0"/>
+          </a:p>
+          <a:p>
+            <a:pPr marL="285750" indent="-285750">
+              <a:buFontTx/>
+              <a:buChar char="-"/>
+            </a:pPr>
+            <a:r>
+              <a:rPr lang="en-US" dirty="0"/>
+              <a:t>You can find all needed K8s entities in the namespace ‘sock-shop’, which gets automatically created.</a:t>
+            </a:r>
+          </a:p>
+          <a:p>
+            <a:pPr marL="285750" indent="-285750">
+              <a:buFontTx/>
+              <a:buChar char="-"/>
+            </a:pPr>
+            <a:endParaRPr lang="en-US" dirty="0"/>
+          </a:p>
+          <a:p>
+            <a:pPr marL="285750" indent="-285750">
+              <a:buFontTx/>
+              <a:buChar char="-"/>
+            </a:pPr>
+            <a:r>
+              <a:rPr lang="en-US" dirty="0"/>
+              <a:t>The URL to call the sock-shop in the browser is: sock-</a:t>
+            </a:r>
+            <a:r>
+              <a:rPr lang="en-US" dirty="0" err="1"/>
+              <a:t>shop.ingress</a:t>
+            </a:r>
+            <a:r>
+              <a:rPr lang="en-US" dirty="0"/>
+              <a:t>.&lt;cluster-name&gt;.&lt;project-name&gt;.shoot.canary.k8s-hana.ondemand.com (e.g. http://sock-shop.ingress.wdfcw43a.k8s-train.shoot.canary.k8s-hana.ondemand.</a:t>
             </a:r>
             <a:r>
               <a:rPr lang="en-US"/>
-              <a:t>further details</a:t>
+              <a:t>com/)</a:t>
             </a:r>
             <a:endParaRPr lang="en-US" dirty="0"/>
+          </a:p>
+          <a:p>
+            <a:pPr marL="285750" indent="-285750">
+              <a:buFontTx/>
+              <a:buChar char="-"/>
+            </a:pPr>
+            <a:endParaRPr lang="en-US" dirty="0"/>
+          </a:p>
+          <a:p>
+            <a:pPr marL="285750" indent="-285750">
+              <a:buFontTx/>
+              <a:buChar char="-"/>
+            </a:pPr>
+            <a:r>
+              <a:rPr lang="en-US" dirty="0"/>
+              <a:t>The design of the sock-shop is based a micro-services architecture and was containerized appropriately. See https://github.com/microservices-demo/microservices-demo/blob/master/internal-docs/design.md for further details</a:t>
+            </a:r>
           </a:p>
         </p:txBody>
       </p:sp>
@@ -1190,7 +1383,7 @@
     </p:spTree>
     <p:extLst>
       <p:ext uri="{BB962C8B-B14F-4D97-AF65-F5344CB8AC3E}">
-        <p14:creationId xmlns:p14="http://schemas.microsoft.com/office/powerpoint/2010/main" val="4246815572"/>
+        <p14:creationId xmlns:p14="http://schemas.microsoft.com/office/powerpoint/2010/main" val="1711056181"/>
       </p:ext>
     </p:extLst>
   </p:cSld>
@@ -9124,6 +9317,433 @@
 </file>
 
 <file path=ppt/slides/slide10.xml><?xml version="1.0" encoding="utf-8"?>
+<p:sld xmlns:a="http://schemas.openxmlformats.org/drawingml/2006/main" xmlns:r="http://schemas.openxmlformats.org/officeDocument/2006/relationships" xmlns:p="http://schemas.openxmlformats.org/presentationml/2006/main">
+  <p:cSld>
+    <p:spTree>
+      <p:nvGrpSpPr>
+        <p:cNvPr id="1" name=""/>
+        <p:cNvGrpSpPr/>
+        <p:nvPr/>
+      </p:nvGrpSpPr>
+      <p:grpSpPr>
+        <a:xfrm>
+          <a:off x="0" y="0"/>
+          <a:ext cx="0" cy="0"/>
+          <a:chOff x="0" y="0"/>
+          <a:chExt cx="0" cy="0"/>
+        </a:xfrm>
+      </p:grpSpPr>
+      <p:sp>
+        <p:nvSpPr>
+          <p:cNvPr id="2" name="Title 1">
+            <a:extLst>
+              <a:ext uri="{FF2B5EF4-FFF2-40B4-BE49-F238E27FC236}">
+                <a16:creationId xmlns:a16="http://schemas.microsoft.com/office/drawing/2014/main" id="{63C4E14F-7A44-4F89-82BB-7569709F5D01}"/>
+              </a:ext>
+            </a:extLst>
+          </p:cNvPr>
+          <p:cNvSpPr>
+            <a:spLocks noGrp="1"/>
+          </p:cNvSpPr>
+          <p:nvPr>
+            <p:ph type="title"/>
+          </p:nvPr>
+        </p:nvSpPr>
+        <p:spPr>
+          <a:xfrm>
+            <a:off x="504001" y="504000"/>
+            <a:ext cx="11186476" cy="738664"/>
+          </a:xfrm>
+        </p:spPr>
+        <p:txBody>
+          <a:bodyPr/>
+          <a:lstStyle/>
+          <a:p>
+            <a:r>
+              <a:rPr lang="de-DE" dirty="0"/>
+              <a:t>Appendix</a:t>
+            </a:r>
+            <a:br>
+              <a:rPr lang="de-DE" dirty="0"/>
+            </a:br>
+            <a:endParaRPr lang="de-DE" dirty="0"/>
+          </a:p>
+        </p:txBody>
+      </p:sp>
+    </p:spTree>
+    <p:extLst>
+      <p:ext uri="{BB962C8B-B14F-4D97-AF65-F5344CB8AC3E}">
+        <p14:creationId xmlns:p14="http://schemas.microsoft.com/office/powerpoint/2010/main" val="4249795005"/>
+      </p:ext>
+    </p:extLst>
+  </p:cSld>
+  <p:clrMapOvr>
+    <a:masterClrMapping/>
+  </p:clrMapOvr>
+</p:sld>
+</file>
+
+<file path=ppt/slides/slide11.xml><?xml version="1.0" encoding="utf-8"?>
+<p:sld xmlns:a="http://schemas.openxmlformats.org/drawingml/2006/main" xmlns:r="http://schemas.openxmlformats.org/officeDocument/2006/relationships" xmlns:p="http://schemas.openxmlformats.org/presentationml/2006/main">
+  <p:cSld>
+    <p:spTree>
+      <p:nvGrpSpPr>
+        <p:cNvPr id="1" name=""/>
+        <p:cNvGrpSpPr/>
+        <p:nvPr/>
+      </p:nvGrpSpPr>
+      <p:grpSpPr>
+        <a:xfrm>
+          <a:off x="0" y="0"/>
+          <a:ext cx="0" cy="0"/>
+          <a:chOff x="0" y="0"/>
+          <a:chExt cx="0" cy="0"/>
+        </a:xfrm>
+      </p:grpSpPr>
+      <p:sp>
+        <p:nvSpPr>
+          <p:cNvPr id="2" name="Title 1">
+            <a:extLst>
+              <a:ext uri="{FF2B5EF4-FFF2-40B4-BE49-F238E27FC236}">
+                <a16:creationId xmlns:a16="http://schemas.microsoft.com/office/drawing/2014/main" id="{A283E944-42BF-41EE-84F7-320F8E39B576}"/>
+              </a:ext>
+            </a:extLst>
+          </p:cNvPr>
+          <p:cNvSpPr>
+            <a:spLocks noGrp="1"/>
+          </p:cNvSpPr>
+          <p:nvPr>
+            <p:ph type="title"/>
+          </p:nvPr>
+        </p:nvSpPr>
+        <p:spPr/>
+        <p:txBody>
+          <a:bodyPr/>
+          <a:lstStyle/>
+          <a:p>
+            <a:r>
+              <a:rPr lang="en-US" dirty="0"/>
+              <a:t>Sock-Shop in Trainings Cluster</a:t>
+            </a:r>
+          </a:p>
+        </p:txBody>
+      </p:sp>
+      <p:pic>
+        <p:nvPicPr>
+          <p:cNvPr id="6" name="Picture 5">
+            <a:extLst>
+              <a:ext uri="{FF2B5EF4-FFF2-40B4-BE49-F238E27FC236}">
+                <a16:creationId xmlns:a16="http://schemas.microsoft.com/office/drawing/2014/main" id="{6D69F8F6-1271-4EA1-A8DA-E24169FA7200}"/>
+              </a:ext>
+            </a:extLst>
+          </p:cNvPr>
+          <p:cNvPicPr>
+            <a:picLocks noChangeAspect="1"/>
+          </p:cNvPicPr>
+          <p:nvPr/>
+        </p:nvPicPr>
+        <p:blipFill>
+          <a:blip r:embed="rId3"/>
+          <a:stretch>
+            <a:fillRect/>
+          </a:stretch>
+        </p:blipFill>
+        <p:spPr>
+          <a:xfrm>
+            <a:off x="200708" y="1112095"/>
+            <a:ext cx="8045714" cy="4324571"/>
+          </a:xfrm>
+          <a:prstGeom prst="rect">
+            <a:avLst/>
+          </a:prstGeom>
+        </p:spPr>
+      </p:pic>
+      <p:pic>
+        <p:nvPicPr>
+          <p:cNvPr id="7" name="Picture 6">
+            <a:extLst>
+              <a:ext uri="{FF2B5EF4-FFF2-40B4-BE49-F238E27FC236}">
+                <a16:creationId xmlns:a16="http://schemas.microsoft.com/office/drawing/2014/main" id="{04D6AF51-2784-4334-9741-432F6432C7B0}"/>
+              </a:ext>
+            </a:extLst>
+          </p:cNvPr>
+          <p:cNvPicPr>
+            <a:picLocks noChangeAspect="1"/>
+          </p:cNvPicPr>
+          <p:nvPr/>
+        </p:nvPicPr>
+        <p:blipFill>
+          <a:blip r:embed="rId4"/>
+          <a:stretch>
+            <a:fillRect/>
+          </a:stretch>
+        </p:blipFill>
+        <p:spPr>
+          <a:xfrm>
+            <a:off x="1616717" y="1651373"/>
+            <a:ext cx="8039428" cy="4488000"/>
+          </a:xfrm>
+          <a:prstGeom prst="rect">
+            <a:avLst/>
+          </a:prstGeom>
+        </p:spPr>
+      </p:pic>
+      <p:pic>
+        <p:nvPicPr>
+          <p:cNvPr id="8" name="Picture 7">
+            <a:extLst>
+              <a:ext uri="{FF2B5EF4-FFF2-40B4-BE49-F238E27FC236}">
+                <a16:creationId xmlns:a16="http://schemas.microsoft.com/office/drawing/2014/main" id="{803F6B18-2B4D-48B2-B1F0-DE3FCD46AE99}"/>
+              </a:ext>
+            </a:extLst>
+          </p:cNvPr>
+          <p:cNvPicPr>
+            <a:picLocks noChangeAspect="1"/>
+          </p:cNvPicPr>
+          <p:nvPr/>
+        </p:nvPicPr>
+        <p:blipFill>
+          <a:blip r:embed="rId4"/>
+          <a:stretch>
+            <a:fillRect/>
+          </a:stretch>
+        </p:blipFill>
+        <p:spPr>
+          <a:xfrm>
+            <a:off x="3703101" y="2002607"/>
+            <a:ext cx="8039428" cy="4488000"/>
+          </a:xfrm>
+          <a:prstGeom prst="rect">
+            <a:avLst/>
+          </a:prstGeom>
+        </p:spPr>
+      </p:pic>
+    </p:spTree>
+    <p:extLst>
+      <p:ext uri="{BB962C8B-B14F-4D97-AF65-F5344CB8AC3E}">
+        <p14:creationId xmlns:p14="http://schemas.microsoft.com/office/powerpoint/2010/main" val="2645232040"/>
+      </p:ext>
+    </p:extLst>
+  </p:cSld>
+  <p:clrMapOvr>
+    <a:masterClrMapping/>
+  </p:clrMapOvr>
+  <p:timing>
+    <p:tnLst>
+      <p:par>
+        <p:cTn id="1" dur="indefinite" restart="never" nodeType="tmRoot">
+          <p:childTnLst>
+            <p:seq concurrent="1" nextAc="seek">
+              <p:cTn id="2" dur="indefinite" nodeType="mainSeq">
+                <p:childTnLst>
+                  <p:par>
+                    <p:cTn id="3" fill="hold">
+                      <p:stCondLst>
+                        <p:cond delay="indefinite"/>
+                      </p:stCondLst>
+                      <p:childTnLst>
+                        <p:par>
+                          <p:cTn id="4" fill="hold">
+                            <p:stCondLst>
+                              <p:cond delay="0"/>
+                            </p:stCondLst>
+                            <p:childTnLst>
+                              <p:par>
+                                <p:cTn id="5" presetID="2" presetClass="entr" presetSubtype="4" fill="hold" nodeType="clickEffect">
+                                  <p:stCondLst>
+                                    <p:cond delay="0"/>
+                                  </p:stCondLst>
+                                  <p:childTnLst>
+                                    <p:set>
+                                      <p:cBhvr>
+                                        <p:cTn id="6" dur="1" fill="hold">
+                                          <p:stCondLst>
+                                            <p:cond delay="0"/>
+                                          </p:stCondLst>
+                                        </p:cTn>
+                                        <p:tgtEl>
+                                          <p:spTgt spid="7"/>
+                                        </p:tgtEl>
+                                        <p:attrNameLst>
+                                          <p:attrName>style.visibility</p:attrName>
+                                        </p:attrNameLst>
+                                      </p:cBhvr>
+                                      <p:to>
+                                        <p:strVal val="visible"/>
+                                      </p:to>
+                                    </p:set>
+                                    <p:anim calcmode="lin" valueType="num">
+                                      <p:cBhvr additive="base">
+                                        <p:cTn id="7" dur="500" fill="hold"/>
+                                        <p:tgtEl>
+                                          <p:spTgt spid="7"/>
+                                        </p:tgtEl>
+                                        <p:attrNameLst>
+                                          <p:attrName>ppt_x</p:attrName>
+                                        </p:attrNameLst>
+                                      </p:cBhvr>
+                                      <p:tavLst>
+                                        <p:tav tm="0">
+                                          <p:val>
+                                            <p:strVal val="#ppt_x"/>
+                                          </p:val>
+                                        </p:tav>
+                                        <p:tav tm="100000">
+                                          <p:val>
+                                            <p:strVal val="#ppt_x"/>
+                                          </p:val>
+                                        </p:tav>
+                                      </p:tavLst>
+                                    </p:anim>
+                                    <p:anim calcmode="lin" valueType="num">
+                                      <p:cBhvr additive="base">
+                                        <p:cTn id="8" dur="500" fill="hold"/>
+                                        <p:tgtEl>
+                                          <p:spTgt spid="7"/>
+                                        </p:tgtEl>
+                                        <p:attrNameLst>
+                                          <p:attrName>ppt_y</p:attrName>
+                                        </p:attrNameLst>
+                                      </p:cBhvr>
+                                      <p:tavLst>
+                                        <p:tav tm="0">
+                                          <p:val>
+                                            <p:strVal val="1+#ppt_h/2"/>
+                                          </p:val>
+                                        </p:tav>
+                                        <p:tav tm="100000">
+                                          <p:val>
+                                            <p:strVal val="#ppt_y"/>
+                                          </p:val>
+                                        </p:tav>
+                                      </p:tavLst>
+                                    </p:anim>
+                                  </p:childTnLst>
+                                </p:cTn>
+                              </p:par>
+                            </p:childTnLst>
+                          </p:cTn>
+                        </p:par>
+                      </p:childTnLst>
+                    </p:cTn>
+                  </p:par>
+                  <p:par>
+                    <p:cTn id="9" fill="hold">
+                      <p:stCondLst>
+                        <p:cond delay="indefinite"/>
+                      </p:stCondLst>
+                      <p:childTnLst>
+                        <p:par>
+                          <p:cTn id="10" fill="hold">
+                            <p:stCondLst>
+                              <p:cond delay="0"/>
+                            </p:stCondLst>
+                            <p:childTnLst>
+                              <p:par>
+                                <p:cTn id="11" presetID="2" presetClass="entr" presetSubtype="4" fill="hold" nodeType="clickEffect">
+                                  <p:stCondLst>
+                                    <p:cond delay="0"/>
+                                  </p:stCondLst>
+                                  <p:childTnLst>
+                                    <p:set>
+                                      <p:cBhvr>
+                                        <p:cTn id="12" dur="1" fill="hold">
+                                          <p:stCondLst>
+                                            <p:cond delay="0"/>
+                                          </p:stCondLst>
+                                        </p:cTn>
+                                        <p:tgtEl>
+                                          <p:spTgt spid="8"/>
+                                        </p:tgtEl>
+                                        <p:attrNameLst>
+                                          <p:attrName>style.visibility</p:attrName>
+                                        </p:attrNameLst>
+                                      </p:cBhvr>
+                                      <p:to>
+                                        <p:strVal val="visible"/>
+                                      </p:to>
+                                    </p:set>
+                                    <p:anim calcmode="lin" valueType="num">
+                                      <p:cBhvr additive="base">
+                                        <p:cTn id="13" dur="500" fill="hold"/>
+                                        <p:tgtEl>
+                                          <p:spTgt spid="8"/>
+                                        </p:tgtEl>
+                                        <p:attrNameLst>
+                                          <p:attrName>ppt_x</p:attrName>
+                                        </p:attrNameLst>
+                                      </p:cBhvr>
+                                      <p:tavLst>
+                                        <p:tav tm="0">
+                                          <p:val>
+                                            <p:strVal val="#ppt_x"/>
+                                          </p:val>
+                                        </p:tav>
+                                        <p:tav tm="100000">
+                                          <p:val>
+                                            <p:strVal val="#ppt_x"/>
+                                          </p:val>
+                                        </p:tav>
+                                      </p:tavLst>
+                                    </p:anim>
+                                    <p:anim calcmode="lin" valueType="num">
+                                      <p:cBhvr additive="base">
+                                        <p:cTn id="14" dur="500" fill="hold"/>
+                                        <p:tgtEl>
+                                          <p:spTgt spid="8"/>
+                                        </p:tgtEl>
+                                        <p:attrNameLst>
+                                          <p:attrName>ppt_y</p:attrName>
+                                        </p:attrNameLst>
+                                      </p:cBhvr>
+                                      <p:tavLst>
+                                        <p:tav tm="0">
+                                          <p:val>
+                                            <p:strVal val="1+#ppt_h/2"/>
+                                          </p:val>
+                                        </p:tav>
+                                        <p:tav tm="100000">
+                                          <p:val>
+                                            <p:strVal val="#ppt_y"/>
+                                          </p:val>
+                                        </p:tav>
+                                      </p:tavLst>
+                                    </p:anim>
+                                  </p:childTnLst>
+                                </p:cTn>
+                              </p:par>
+                            </p:childTnLst>
+                          </p:cTn>
+                        </p:par>
+                      </p:childTnLst>
+                    </p:cTn>
+                  </p:par>
+                </p:childTnLst>
+              </p:cTn>
+              <p:prevCondLst>
+                <p:cond evt="onPrev" delay="0">
+                  <p:tgtEl>
+                    <p:sldTgt/>
+                  </p:tgtEl>
+                </p:cond>
+              </p:prevCondLst>
+              <p:nextCondLst>
+                <p:cond evt="onNext" delay="0">
+                  <p:tgtEl>
+                    <p:sldTgt/>
+                  </p:tgtEl>
+                </p:cond>
+              </p:nextCondLst>
+            </p:seq>
+          </p:childTnLst>
+        </p:cTn>
+      </p:par>
+    </p:tnLst>
+  </p:timing>
+</p:sld>
+</file>
+
+<file path=ppt/slides/slide12.xml><?xml version="1.0" encoding="utf-8"?>
 <p:sld xmlns:a="http://schemas.openxmlformats.org/drawingml/2006/main" xmlns:r="http://schemas.openxmlformats.org/officeDocument/2006/relationships" xmlns:p="http://schemas.openxmlformats.org/presentationml/2006/main" show="0">
   <p:cSld>
     <p:spTree>
@@ -10321,7 +10941,7 @@
     </p:spTree>
     <p:extLst>
       <p:ext uri="{BB962C8B-B14F-4D97-AF65-F5344CB8AC3E}">
-        <p14:creationId xmlns:p14="http://schemas.microsoft.com/office/powerpoint/2010/main" val="2645232040"/>
+        <p14:creationId xmlns:p14="http://schemas.microsoft.com/office/powerpoint/2010/main" val="1174221135"/>
       </p:ext>
     </p:extLst>
   </p:cSld>

</xml_diff>